<commit_message>
MakeVersionInfo: fix a typo
</commit_message>
<xml_diff>
--- a/TaskScheduler/TaskScheduler.pptx
+++ b/TaskScheduler/TaskScheduler.pptx
@@ -1010,7 +1010,7 @@
           <a:p>
             <a:fld id="{857CC94D-E614-4874-A919-F25B27309A09}" type="datetimeFigureOut">
               <a:rPr lang="en-CA" smtClean="0"/>
-              <a:t>2024-08-11</a:t>
+              <a:t>2024-08-20</a:t>
             </a:fld>
             <a:endParaRPr lang="en-CA"/>
           </a:p>
@@ -3961,7 +3961,7 @@
           <a:noFill/>
           <a:extLst>
             <a:ext uri="{909E8E84-426E-40dd-AFC4-6F175D3DCCD1}">
-              <a14:hiddenFill xmlns="" xmlns:a14="http://schemas.microsoft.com/office/drawing/2010/main">
+              <a14:hiddenFill xmlns:a14="http://schemas.microsoft.com/office/drawing/2010/main" xmlns="">
                 <a:solidFill>
                   <a:srgbClr val="FFFFFF"/>
                 </a:solidFill>
@@ -4027,7 +4027,7 @@
             </a:ln>
             <a:extLst>
               <a:ext uri="{91240B29-F687-4f45-9708-019B960494DF}">
-                <a14:hiddenLine xmlns="" xmlns:a14="http://schemas.microsoft.com/office/drawing/2010/main" w="9525">
+                <a14:hiddenLine xmlns:a14="http://schemas.microsoft.com/office/drawing/2010/main" xmlns="" w="9525">
                   <a:solidFill>
                     <a:srgbClr val="000000"/>
                   </a:solidFill>
@@ -4117,7 +4117,7 @@
             </a:ln>
             <a:extLst>
               <a:ext uri="{91240B29-F687-4f45-9708-019B960494DF}">
-                <a14:hiddenLine xmlns="" xmlns:a14="http://schemas.microsoft.com/office/drawing/2010/main" w="9525">
+                <a14:hiddenLine xmlns:a14="http://schemas.microsoft.com/office/drawing/2010/main" xmlns="" w="9525">
                   <a:solidFill>
                     <a:srgbClr val="000000"/>
                   </a:solidFill>
@@ -4207,7 +4207,7 @@
             </a:ln>
             <a:extLst>
               <a:ext uri="{91240B29-F687-4f45-9708-019B960494DF}">
-                <a14:hiddenLine xmlns="" xmlns:a14="http://schemas.microsoft.com/office/drawing/2010/main" w="9525">
+                <a14:hiddenLine xmlns:a14="http://schemas.microsoft.com/office/drawing/2010/main" xmlns="" w="9525">
                   <a:solidFill>
                     <a:srgbClr val="000000"/>
                   </a:solidFill>
@@ -4241,7 +4241,7 @@
             </a:ln>
             <a:extLst>
               <a:ext uri="{91240B29-F687-4f45-9708-019B960494DF}">
-                <a14:hiddenLine xmlns="" xmlns:a14="http://schemas.microsoft.com/office/drawing/2010/main" w="9525">
+                <a14:hiddenLine xmlns:a14="http://schemas.microsoft.com/office/drawing/2010/main" xmlns="" w="9525">
                   <a:solidFill>
                     <a:srgbClr val="000000"/>
                   </a:solidFill>
@@ -4331,7 +4331,7 @@
             </a:ln>
             <a:extLst>
               <a:ext uri="{91240B29-F687-4f45-9708-019B960494DF}">
-                <a14:hiddenLine xmlns="" xmlns:a14="http://schemas.microsoft.com/office/drawing/2010/main" w="9525">
+                <a14:hiddenLine xmlns:a14="http://schemas.microsoft.com/office/drawing/2010/main" xmlns="" w="9525">
                   <a:solidFill>
                     <a:srgbClr val="000000"/>
                   </a:solidFill>
@@ -4393,7 +4393,7 @@
             </a:ln>
             <a:extLst>
               <a:ext uri="{91240B29-F687-4f45-9708-019B960494DF}">
-                <a14:hiddenLine xmlns="" xmlns:a14="http://schemas.microsoft.com/office/drawing/2010/main" w="9525">
+                <a14:hiddenLine xmlns:a14="http://schemas.microsoft.com/office/drawing/2010/main" xmlns="" w="9525">
                   <a:solidFill>
                     <a:srgbClr val="000000"/>
                   </a:solidFill>
@@ -4455,7 +4455,7 @@
             </a:ln>
             <a:extLst>
               <a:ext uri="{91240B29-F687-4f45-9708-019B960494DF}">
-                <a14:hiddenLine xmlns="" xmlns:a14="http://schemas.microsoft.com/office/drawing/2010/main" w="9525">
+                <a14:hiddenLine xmlns:a14="http://schemas.microsoft.com/office/drawing/2010/main" xmlns="" w="9525">
                   <a:solidFill>
                     <a:srgbClr val="000000"/>
                   </a:solidFill>
@@ -4545,7 +4545,7 @@
             </a:ln>
             <a:extLst>
               <a:ext uri="{91240B29-F687-4f45-9708-019B960494DF}">
-                <a14:hiddenLine xmlns="" xmlns:a14="http://schemas.microsoft.com/office/drawing/2010/main" w="9525">
+                <a14:hiddenLine xmlns:a14="http://schemas.microsoft.com/office/drawing/2010/main" xmlns="" w="9525">
                   <a:solidFill>
                     <a:srgbClr val="000000"/>
                   </a:solidFill>
@@ -4607,7 +4607,7 @@
             </a:ln>
             <a:extLst>
               <a:ext uri="{91240B29-F687-4f45-9708-019B960494DF}">
-                <a14:hiddenLine xmlns="" xmlns:a14="http://schemas.microsoft.com/office/drawing/2010/main" w="9525">
+                <a14:hiddenLine xmlns:a14="http://schemas.microsoft.com/office/drawing/2010/main" xmlns="" w="9525">
                   <a:solidFill>
                     <a:srgbClr val="000000"/>
                   </a:solidFill>
@@ -4669,7 +4669,7 @@
             </a:ln>
             <a:extLst>
               <a:ext uri="{91240B29-F687-4f45-9708-019B960494DF}">
-                <a14:hiddenLine xmlns="" xmlns:a14="http://schemas.microsoft.com/office/drawing/2010/main" w="9525">
+                <a14:hiddenLine xmlns:a14="http://schemas.microsoft.com/office/drawing/2010/main" xmlns="" w="9525">
                   <a:solidFill>
                     <a:srgbClr val="000000"/>
                   </a:solidFill>
@@ -4759,7 +4759,7 @@
             </a:ln>
             <a:extLst>
               <a:ext uri="{91240B29-F687-4f45-9708-019B960494DF}">
-                <a14:hiddenLine xmlns="" xmlns:a14="http://schemas.microsoft.com/office/drawing/2010/main" w="9525">
+                <a14:hiddenLine xmlns:a14="http://schemas.microsoft.com/office/drawing/2010/main" xmlns="" w="9525">
                   <a:solidFill>
                     <a:srgbClr val="000000"/>
                   </a:solidFill>
@@ -4849,7 +4849,7 @@
             </a:ln>
             <a:extLst>
               <a:ext uri="{91240B29-F687-4f45-9708-019B960494DF}">
-                <a14:hiddenLine xmlns="" xmlns:a14="http://schemas.microsoft.com/office/drawing/2010/main" w="9525">
+                <a14:hiddenLine xmlns:a14="http://schemas.microsoft.com/office/drawing/2010/main" xmlns="" w="9525">
                   <a:solidFill>
                     <a:srgbClr val="000000"/>
                   </a:solidFill>
@@ -4911,7 +4911,7 @@
             </a:ln>
             <a:extLst>
               <a:ext uri="{91240B29-F687-4f45-9708-019B960494DF}">
-                <a14:hiddenLine xmlns="" xmlns:a14="http://schemas.microsoft.com/office/drawing/2010/main" w="9525">
+                <a14:hiddenLine xmlns:a14="http://schemas.microsoft.com/office/drawing/2010/main" xmlns="" w="9525">
                   <a:solidFill>
                     <a:srgbClr val="000000"/>
                   </a:solidFill>
@@ -5021,7 +5021,7 @@
             </a:ln>
             <a:extLst>
               <a:ext uri="{91240B29-F687-4f45-9708-019B960494DF}">
-                <a14:hiddenLine xmlns="" xmlns:a14="http://schemas.microsoft.com/office/drawing/2010/main" w="9525">
+                <a14:hiddenLine xmlns:a14="http://schemas.microsoft.com/office/drawing/2010/main" xmlns="" w="9525">
                   <a:solidFill>
                     <a:srgbClr val="000000"/>
                   </a:solidFill>
@@ -5083,7 +5083,7 @@
             </a:ln>
             <a:extLst>
               <a:ext uri="{91240B29-F687-4f45-9708-019B960494DF}">
-                <a14:hiddenLine xmlns="" xmlns:a14="http://schemas.microsoft.com/office/drawing/2010/main" w="9525">
+                <a14:hiddenLine xmlns:a14="http://schemas.microsoft.com/office/drawing/2010/main" xmlns="" w="9525">
                   <a:solidFill>
                     <a:srgbClr val="000000"/>
                   </a:solidFill>
@@ -5173,7 +5173,7 @@
             </a:ln>
             <a:extLst>
               <a:ext uri="{91240B29-F687-4f45-9708-019B960494DF}">
-                <a14:hiddenLine xmlns="" xmlns:a14="http://schemas.microsoft.com/office/drawing/2010/main" w="9525">
+                <a14:hiddenLine xmlns:a14="http://schemas.microsoft.com/office/drawing/2010/main" xmlns="" w="9525">
                   <a:solidFill>
                     <a:srgbClr val="000000"/>
                   </a:solidFill>
@@ -5263,7 +5263,7 @@
             </a:ln>
             <a:extLst>
               <a:ext uri="{91240B29-F687-4f45-9708-019B960494DF}">
-                <a14:hiddenLine xmlns="" xmlns:a14="http://schemas.microsoft.com/office/drawing/2010/main" w="9525">
+                <a14:hiddenLine xmlns:a14="http://schemas.microsoft.com/office/drawing/2010/main" xmlns="" w="9525">
                   <a:solidFill>
                     <a:srgbClr val="000000"/>
                   </a:solidFill>
@@ -5325,7 +5325,7 @@
             </a:ln>
             <a:extLst>
               <a:ext uri="{91240B29-F687-4f45-9708-019B960494DF}">
-                <a14:hiddenLine xmlns="" xmlns:a14="http://schemas.microsoft.com/office/drawing/2010/main" w="9525">
+                <a14:hiddenLine xmlns:a14="http://schemas.microsoft.com/office/drawing/2010/main" xmlns="" w="9525">
                   <a:solidFill>
                     <a:srgbClr val="000000"/>
                   </a:solidFill>
@@ -5415,7 +5415,7 @@
             </a:ln>
             <a:extLst>
               <a:ext uri="{91240B29-F687-4f45-9708-019B960494DF}">
-                <a14:hiddenLine xmlns="" xmlns:a14="http://schemas.microsoft.com/office/drawing/2010/main" w="9525">
+                <a14:hiddenLine xmlns:a14="http://schemas.microsoft.com/office/drawing/2010/main" xmlns="" w="9525">
                   <a:solidFill>
                     <a:srgbClr val="000000"/>
                   </a:solidFill>
@@ -5505,7 +5505,7 @@
             </a:ln>
             <a:extLst>
               <a:ext uri="{91240B29-F687-4f45-9708-019B960494DF}">
-                <a14:hiddenLine xmlns="" xmlns:a14="http://schemas.microsoft.com/office/drawing/2010/main" w="9525">
+                <a14:hiddenLine xmlns:a14="http://schemas.microsoft.com/office/drawing/2010/main" xmlns="" w="9525">
                   <a:solidFill>
                     <a:srgbClr val="000000"/>
                   </a:solidFill>
@@ -5561,7 +5561,7 @@
             </a:ln>
             <a:extLst>
               <a:ext uri="{91240B29-F687-4f45-9708-019B960494DF}">
-                <a14:hiddenLine xmlns="" xmlns:a14="http://schemas.microsoft.com/office/drawing/2010/main" w="9525">
+                <a14:hiddenLine xmlns:a14="http://schemas.microsoft.com/office/drawing/2010/main" xmlns="" w="9525">
                   <a:solidFill>
                     <a:srgbClr val="000000"/>
                   </a:solidFill>
@@ -5651,7 +5651,7 @@
             </a:ln>
             <a:extLst>
               <a:ext uri="{91240B29-F687-4f45-9708-019B960494DF}">
-                <a14:hiddenLine xmlns="" xmlns:a14="http://schemas.microsoft.com/office/drawing/2010/main" w="9525">
+                <a14:hiddenLine xmlns:a14="http://schemas.microsoft.com/office/drawing/2010/main" xmlns="" w="9525">
                   <a:solidFill>
                     <a:srgbClr val="000000"/>
                   </a:solidFill>
@@ -5707,7 +5707,7 @@
             </a:ln>
             <a:extLst>
               <a:ext uri="{91240B29-F687-4f45-9708-019B960494DF}">
-                <a14:hiddenLine xmlns="" xmlns:a14="http://schemas.microsoft.com/office/drawing/2010/main" w="9525">
+                <a14:hiddenLine xmlns:a14="http://schemas.microsoft.com/office/drawing/2010/main" xmlns="" w="9525">
                   <a:solidFill>
                     <a:srgbClr val="000000"/>
                   </a:solidFill>
@@ -5797,7 +5797,7 @@
             </a:ln>
             <a:extLst>
               <a:ext uri="{91240B29-F687-4f45-9708-019B960494DF}">
-                <a14:hiddenLine xmlns="" xmlns:a14="http://schemas.microsoft.com/office/drawing/2010/main" w="9525">
+                <a14:hiddenLine xmlns:a14="http://schemas.microsoft.com/office/drawing/2010/main" xmlns="" w="9525">
                   <a:solidFill>
                     <a:srgbClr val="000000"/>
                   </a:solidFill>
@@ -5865,7 +5865,7 @@
             </a:ln>
             <a:extLst>
               <a:ext uri="{91240B29-F687-4f45-9708-019B960494DF}">
-                <a14:hiddenLine xmlns="" xmlns:a14="http://schemas.microsoft.com/office/drawing/2010/main" w="9525">
+                <a14:hiddenLine xmlns:a14="http://schemas.microsoft.com/office/drawing/2010/main" xmlns="" w="9525">
                   <a:solidFill>
                     <a:srgbClr val="000000"/>
                   </a:solidFill>
@@ -5955,7 +5955,7 @@
             </a:ln>
             <a:extLst>
               <a:ext uri="{91240B29-F687-4f45-9708-019B960494DF}">
-                <a14:hiddenLine xmlns="" xmlns:a14="http://schemas.microsoft.com/office/drawing/2010/main" w="9525">
+                <a14:hiddenLine xmlns:a14="http://schemas.microsoft.com/office/drawing/2010/main" xmlns="" w="9525">
                   <a:solidFill>
                     <a:srgbClr val="000000"/>
                   </a:solidFill>
@@ -6023,7 +6023,7 @@
             </a:ln>
             <a:extLst>
               <a:ext uri="{91240B29-F687-4f45-9708-019B960494DF}">
-                <a14:hiddenLine xmlns="" xmlns:a14="http://schemas.microsoft.com/office/drawing/2010/main" w="9525">
+                <a14:hiddenLine xmlns:a14="http://schemas.microsoft.com/office/drawing/2010/main" xmlns="" w="9525">
                   <a:solidFill>
                     <a:srgbClr val="000000"/>
                   </a:solidFill>
@@ -6113,7 +6113,7 @@
             </a:ln>
             <a:extLst>
               <a:ext uri="{91240B29-F687-4f45-9708-019B960494DF}">
-                <a14:hiddenLine xmlns="" xmlns:a14="http://schemas.microsoft.com/office/drawing/2010/main" w="9525">
+                <a14:hiddenLine xmlns:a14="http://schemas.microsoft.com/office/drawing/2010/main" xmlns="" w="9525">
                   <a:solidFill>
                     <a:srgbClr val="000000"/>
                   </a:solidFill>
@@ -6147,7 +6147,7 @@
             </a:ln>
             <a:extLst>
               <a:ext uri="{91240B29-F687-4f45-9708-019B960494DF}">
-                <a14:hiddenLine xmlns="" xmlns:a14="http://schemas.microsoft.com/office/drawing/2010/main" w="9525">
+                <a14:hiddenLine xmlns:a14="http://schemas.microsoft.com/office/drawing/2010/main" xmlns="" w="9525">
                   <a:solidFill>
                     <a:srgbClr val="000000"/>
                   </a:solidFill>
@@ -6237,7 +6237,7 @@
             </a:ln>
             <a:extLst>
               <a:ext uri="{91240B29-F687-4f45-9708-019B960494DF}">
-                <a14:hiddenLine xmlns="" xmlns:a14="http://schemas.microsoft.com/office/drawing/2010/main" w="9525">
+                <a14:hiddenLine xmlns:a14="http://schemas.microsoft.com/office/drawing/2010/main" xmlns="" w="9525">
                   <a:solidFill>
                     <a:srgbClr val="000000"/>
                   </a:solidFill>
@@ -6299,7 +6299,7 @@
             </a:ln>
             <a:extLst>
               <a:ext uri="{91240B29-F687-4f45-9708-019B960494DF}">
-                <a14:hiddenLine xmlns="" xmlns:a14="http://schemas.microsoft.com/office/drawing/2010/main" w="9525">
+                <a14:hiddenLine xmlns:a14="http://schemas.microsoft.com/office/drawing/2010/main" xmlns="" w="9525">
                   <a:solidFill>
                     <a:srgbClr val="000000"/>
                   </a:solidFill>
@@ -6361,7 +6361,7 @@
             </a:ln>
             <a:extLst>
               <a:ext uri="{91240B29-F687-4f45-9708-019B960494DF}">
-                <a14:hiddenLine xmlns="" xmlns:a14="http://schemas.microsoft.com/office/drawing/2010/main" w="9525">
+                <a14:hiddenLine xmlns:a14="http://schemas.microsoft.com/office/drawing/2010/main" xmlns="" w="9525">
                   <a:solidFill>
                     <a:srgbClr val="000000"/>
                   </a:solidFill>
@@ -6451,7 +6451,7 @@
             </a:ln>
             <a:extLst>
               <a:ext uri="{91240B29-F687-4f45-9708-019B960494DF}">
-                <a14:hiddenLine xmlns="" xmlns:a14="http://schemas.microsoft.com/office/drawing/2010/main" w="9525">
+                <a14:hiddenLine xmlns:a14="http://schemas.microsoft.com/office/drawing/2010/main" xmlns="" w="9525">
                   <a:solidFill>
                     <a:srgbClr val="000000"/>
                   </a:solidFill>
@@ -6519,7 +6519,7 @@
             </a:ln>
             <a:extLst>
               <a:ext uri="{91240B29-F687-4f45-9708-019B960494DF}">
-                <a14:hiddenLine xmlns="" xmlns:a14="http://schemas.microsoft.com/office/drawing/2010/main" w="9525">
+                <a14:hiddenLine xmlns:a14="http://schemas.microsoft.com/office/drawing/2010/main" xmlns="" w="9525">
                   <a:solidFill>
                     <a:srgbClr val="000000"/>
                   </a:solidFill>
@@ -6581,7 +6581,7 @@
             </a:ln>
             <a:extLst>
               <a:ext uri="{91240B29-F687-4f45-9708-019B960494DF}">
-                <a14:hiddenLine xmlns="" xmlns:a14="http://schemas.microsoft.com/office/drawing/2010/main" w="9525">
+                <a14:hiddenLine xmlns:a14="http://schemas.microsoft.com/office/drawing/2010/main" xmlns="" w="9525">
                   <a:solidFill>
                     <a:srgbClr val="000000"/>
                   </a:solidFill>
@@ -6671,7 +6671,7 @@
             </a:ln>
             <a:extLst>
               <a:ext uri="{91240B29-F687-4f45-9708-019B960494DF}">
-                <a14:hiddenLine xmlns="" xmlns:a14="http://schemas.microsoft.com/office/drawing/2010/main" w="9525">
+                <a14:hiddenLine xmlns:a14="http://schemas.microsoft.com/office/drawing/2010/main" xmlns="" w="9525">
                   <a:solidFill>
                     <a:srgbClr val="000000"/>
                   </a:solidFill>
@@ -6733,7 +6733,7 @@
             </a:ln>
             <a:extLst>
               <a:ext uri="{91240B29-F687-4f45-9708-019B960494DF}">
-                <a14:hiddenLine xmlns="" xmlns:a14="http://schemas.microsoft.com/office/drawing/2010/main" w="9525">
+                <a14:hiddenLine xmlns:a14="http://schemas.microsoft.com/office/drawing/2010/main" xmlns="" w="9525">
                   <a:solidFill>
                     <a:srgbClr val="000000"/>
                   </a:solidFill>
@@ -6823,7 +6823,7 @@
             </a:ln>
             <a:extLst>
               <a:ext uri="{91240B29-F687-4f45-9708-019B960494DF}">
-                <a14:hiddenLine xmlns="" xmlns:a14="http://schemas.microsoft.com/office/drawing/2010/main" w="9525">
+                <a14:hiddenLine xmlns:a14="http://schemas.microsoft.com/office/drawing/2010/main" xmlns="" w="9525">
                   <a:solidFill>
                     <a:srgbClr val="000000"/>
                   </a:solidFill>
@@ -6885,7 +6885,7 @@
             </a:ln>
             <a:extLst>
               <a:ext uri="{91240B29-F687-4f45-9708-019B960494DF}">
-                <a14:hiddenLine xmlns="" xmlns:a14="http://schemas.microsoft.com/office/drawing/2010/main" w="9525">
+                <a14:hiddenLine xmlns:a14="http://schemas.microsoft.com/office/drawing/2010/main" xmlns="" w="9525">
                   <a:solidFill>
                     <a:srgbClr val="000000"/>
                   </a:solidFill>
@@ -6975,7 +6975,7 @@
             </a:ln>
             <a:extLst>
               <a:ext uri="{91240B29-F687-4f45-9708-019B960494DF}">
-                <a14:hiddenLine xmlns="" xmlns:a14="http://schemas.microsoft.com/office/drawing/2010/main" w="9525">
+                <a14:hiddenLine xmlns:a14="http://schemas.microsoft.com/office/drawing/2010/main" xmlns="" w="9525">
                   <a:solidFill>
                     <a:srgbClr val="000000"/>
                   </a:solidFill>
@@ -7009,7 +7009,7 @@
             </a:ln>
             <a:extLst>
               <a:ext uri="{91240B29-F687-4f45-9708-019B960494DF}">
-                <a14:hiddenLine xmlns="" xmlns:a14="http://schemas.microsoft.com/office/drawing/2010/main" w="9525">
+                <a14:hiddenLine xmlns:a14="http://schemas.microsoft.com/office/drawing/2010/main" xmlns="" w="9525">
                   <a:solidFill>
                     <a:srgbClr val="000000"/>
                   </a:solidFill>
@@ -7074,7 +7074,7 @@
             </a:ln>
             <a:extLst>
               <a:ext uri="{91240B29-F687-4f45-9708-019B960494DF}">
-                <a14:hiddenLine xmlns="" xmlns:a14="http://schemas.microsoft.com/office/drawing/2010/main" w="9525">
+                <a14:hiddenLine xmlns:a14="http://schemas.microsoft.com/office/drawing/2010/main" xmlns="" w="9525">
                   <a:solidFill>
                     <a:srgbClr val="000000"/>
                   </a:solidFill>
@@ -7164,7 +7164,7 @@
             </a:ln>
             <a:extLst>
               <a:ext uri="{91240B29-F687-4f45-9708-019B960494DF}">
-                <a14:hiddenLine xmlns="" xmlns:a14="http://schemas.microsoft.com/office/drawing/2010/main" w="9525">
+                <a14:hiddenLine xmlns:a14="http://schemas.microsoft.com/office/drawing/2010/main" xmlns="" w="9525">
                   <a:solidFill>
                     <a:srgbClr val="000000"/>
                   </a:solidFill>
@@ -7226,7 +7226,7 @@
             </a:ln>
             <a:extLst>
               <a:ext uri="{91240B29-F687-4f45-9708-019B960494DF}">
-                <a14:hiddenLine xmlns="" xmlns:a14="http://schemas.microsoft.com/office/drawing/2010/main" w="9525">
+                <a14:hiddenLine xmlns:a14="http://schemas.microsoft.com/office/drawing/2010/main" xmlns="" w="9525">
                   <a:solidFill>
                     <a:srgbClr val="000000"/>
                   </a:solidFill>
@@ -7316,7 +7316,7 @@
             </a:ln>
             <a:extLst>
               <a:ext uri="{91240B29-F687-4f45-9708-019B960494DF}">
-                <a14:hiddenLine xmlns="" xmlns:a14="http://schemas.microsoft.com/office/drawing/2010/main" w="9525">
+                <a14:hiddenLine xmlns:a14="http://schemas.microsoft.com/office/drawing/2010/main" xmlns="" w="9525">
                   <a:solidFill>
                     <a:srgbClr val="000000"/>
                   </a:solidFill>
@@ -7406,7 +7406,7 @@
             </a:ln>
             <a:extLst>
               <a:ext uri="{91240B29-F687-4f45-9708-019B960494DF}">
-                <a14:hiddenLine xmlns="" xmlns:a14="http://schemas.microsoft.com/office/drawing/2010/main" w="9525">
+                <a14:hiddenLine xmlns:a14="http://schemas.microsoft.com/office/drawing/2010/main" xmlns="" w="9525">
                   <a:solidFill>
                     <a:srgbClr val="000000"/>
                   </a:solidFill>
@@ -7471,7 +7471,7 @@
             </a:ln>
             <a:extLst>
               <a:ext uri="{91240B29-F687-4f45-9708-019B960494DF}">
-                <a14:hiddenLine xmlns="" xmlns:a14="http://schemas.microsoft.com/office/drawing/2010/main" w="9525">
+                <a14:hiddenLine xmlns:a14="http://schemas.microsoft.com/office/drawing/2010/main" xmlns="" w="9525">
                   <a:solidFill>
                     <a:srgbClr val="000000"/>
                   </a:solidFill>
@@ -7533,7 +7533,7 @@
             </a:ln>
             <a:extLst>
               <a:ext uri="{91240B29-F687-4f45-9708-019B960494DF}">
-                <a14:hiddenLine xmlns="" xmlns:a14="http://schemas.microsoft.com/office/drawing/2010/main" w="9525">
+                <a14:hiddenLine xmlns:a14="http://schemas.microsoft.com/office/drawing/2010/main" xmlns="" w="9525">
                   <a:solidFill>
                     <a:srgbClr val="000000"/>
                   </a:solidFill>
@@ -7623,7 +7623,7 @@
             </a:ln>
             <a:extLst>
               <a:ext uri="{91240B29-F687-4f45-9708-019B960494DF}">
-                <a14:hiddenLine xmlns="" xmlns:a14="http://schemas.microsoft.com/office/drawing/2010/main" w="9525">
+                <a14:hiddenLine xmlns:a14="http://schemas.microsoft.com/office/drawing/2010/main" xmlns="" w="9525">
                   <a:solidFill>
                     <a:srgbClr val="000000"/>
                   </a:solidFill>
@@ -7713,7 +7713,7 @@
             </a:ln>
             <a:extLst>
               <a:ext uri="{91240B29-F687-4f45-9708-019B960494DF}">
-                <a14:hiddenLine xmlns="" xmlns:a14="http://schemas.microsoft.com/office/drawing/2010/main" w="9525">
+                <a14:hiddenLine xmlns:a14="http://schemas.microsoft.com/office/drawing/2010/main" xmlns="" w="9525">
                   <a:solidFill>
                     <a:srgbClr val="000000"/>
                   </a:solidFill>
@@ -7775,7 +7775,7 @@
             </a:ln>
             <a:extLst>
               <a:ext uri="{91240B29-F687-4f45-9708-019B960494DF}">
-                <a14:hiddenLine xmlns="" xmlns:a14="http://schemas.microsoft.com/office/drawing/2010/main" w="9525">
+                <a14:hiddenLine xmlns:a14="http://schemas.microsoft.com/office/drawing/2010/main" xmlns="" w="9525">
                   <a:solidFill>
                     <a:srgbClr val="000000"/>
                   </a:solidFill>
@@ -7895,7 +7895,7 @@
             </a:ln>
             <a:extLst>
               <a:ext uri="{91240B29-F687-4f45-9708-019B960494DF}">
-                <a14:hiddenLine xmlns="" xmlns:a14="http://schemas.microsoft.com/office/drawing/2010/main" w="9525">
+                <a14:hiddenLine xmlns:a14="http://schemas.microsoft.com/office/drawing/2010/main" xmlns="" w="9525">
                   <a:solidFill>
                     <a:srgbClr val="000000"/>
                   </a:solidFill>
@@ -7963,7 +7963,7 @@
             </a:ln>
             <a:extLst>
               <a:ext uri="{91240B29-F687-4f45-9708-019B960494DF}">
-                <a14:hiddenLine xmlns="" xmlns:a14="http://schemas.microsoft.com/office/drawing/2010/main" w="9525">
+                <a14:hiddenLine xmlns:a14="http://schemas.microsoft.com/office/drawing/2010/main" xmlns="" w="9525">
                   <a:solidFill>
                     <a:srgbClr val="000000"/>
                   </a:solidFill>
@@ -8053,7 +8053,7 @@
             </a:ln>
             <a:extLst>
               <a:ext uri="{91240B29-F687-4f45-9708-019B960494DF}">
-                <a14:hiddenLine xmlns="" xmlns:a14="http://schemas.microsoft.com/office/drawing/2010/main" w="9525">
+                <a14:hiddenLine xmlns:a14="http://schemas.microsoft.com/office/drawing/2010/main" xmlns="" w="9525">
                   <a:solidFill>
                     <a:srgbClr val="000000"/>
                   </a:solidFill>
@@ -8241,7 +8241,7 @@
           <a:p>
             <a:r>
               <a:rPr lang="en-US"/>
-              <a:t>2024-08-09</a:t>
+              <a:t>2024-08-20</a:t>
             </a:r>
             <a:endParaRPr lang="en-US" dirty="0"/>
           </a:p>
@@ -8695,7 +8695,7 @@
           <a:p>
             <a:r>
               <a:rPr lang="en-US"/>
-              <a:t>2024-08-09</a:t>
+              <a:t>2024-08-20</a:t>
             </a:r>
             <a:endParaRPr lang="en-US" dirty="0"/>
           </a:p>
@@ -9062,7 +9062,7 @@
           <a:p>
             <a:r>
               <a:rPr lang="en-US"/>
-              <a:t>2024-08-09</a:t>
+              <a:t>2024-08-20</a:t>
             </a:r>
             <a:endParaRPr lang="en-US" dirty="0"/>
           </a:p>
@@ -9306,7 +9306,7 @@
           <a:p>
             <a:r>
               <a:rPr lang="en-US"/>
-              <a:t>2024-08-09</a:t>
+              <a:t>2024-08-20</a:t>
             </a:r>
             <a:endParaRPr lang="en-US" dirty="0"/>
           </a:p>
@@ -9594,7 +9594,7 @@
           <a:p>
             <a:r>
               <a:rPr lang="en-US"/>
-              <a:t>2024-08-09</a:t>
+              <a:t>2024-08-20</a:t>
             </a:r>
             <a:endParaRPr lang="en-US" dirty="0"/>
           </a:p>
@@ -10096,7 +10096,7 @@
           <a:p>
             <a:r>
               <a:rPr lang="en-US"/>
-              <a:t>2024-08-09</a:t>
+              <a:t>2024-08-20</a:t>
             </a:r>
             <a:endParaRPr lang="en-US" dirty="0"/>
           </a:p>
@@ -10755,7 +10755,7 @@
           <a:p>
             <a:r>
               <a:rPr lang="en-US"/>
-              <a:t>2024-08-09</a:t>
+              <a:t>2024-08-20</a:t>
             </a:r>
             <a:endParaRPr lang="en-US" dirty="0"/>
           </a:p>
@@ -11491,7 +11491,7 @@
           <a:p>
             <a:r>
               <a:rPr lang="en-US"/>
-              <a:t>2024-08-09</a:t>
+              <a:t>2024-08-20</a:t>
             </a:r>
             <a:endParaRPr lang="en-US" dirty="0"/>
           </a:p>
@@ -11677,7 +11677,7 @@
           <a:p>
             <a:r>
               <a:rPr lang="en-US"/>
-              <a:t>2024-08-09</a:t>
+              <a:t>2024-08-20</a:t>
             </a:r>
             <a:endParaRPr lang="en-US" dirty="0"/>
           </a:p>
@@ -11873,7 +11873,7 @@
           <a:p>
             <a:r>
               <a:rPr lang="en-US"/>
-              <a:t>2024-08-09</a:t>
+              <a:t>2024-08-20</a:t>
             </a:r>
             <a:endParaRPr lang="en-US" dirty="0"/>
           </a:p>
@@ -12059,7 +12059,7 @@
           <a:p>
             <a:r>
               <a:rPr lang="en-US"/>
-              <a:t>2024-08-09</a:t>
+              <a:t>2024-08-20</a:t>
             </a:r>
             <a:endParaRPr lang="en-US" dirty="0"/>
           </a:p>
@@ -12361,7 +12361,7 @@
           <a:p>
             <a:r>
               <a:rPr lang="en-US"/>
-              <a:t>2024-08-09</a:t>
+              <a:t>2024-08-20</a:t>
             </a:r>
             <a:endParaRPr lang="en-US" dirty="0"/>
           </a:p>
@@ -12618,7 +12618,7 @@
           <a:p>
             <a:r>
               <a:rPr lang="en-US"/>
-              <a:t>2024-08-09</a:t>
+              <a:t>2024-08-20</a:t>
             </a:r>
             <a:endParaRPr lang="en-US" dirty="0"/>
           </a:p>
@@ -13015,7 +13015,7 @@
           <a:p>
             <a:r>
               <a:rPr lang="en-US"/>
-              <a:t>2024-08-09</a:t>
+              <a:t>2024-08-20</a:t>
             </a:r>
             <a:endParaRPr lang="en-US" dirty="0"/>
           </a:p>
@@ -13181,7 +13181,7 @@
           <a:p>
             <a:r>
               <a:rPr lang="en-US"/>
-              <a:t>2024-08-09</a:t>
+              <a:t>2024-08-20</a:t>
             </a:r>
             <a:endParaRPr lang="en-US" dirty="0"/>
           </a:p>
@@ -13301,7 +13301,7 @@
           <a:p>
             <a:r>
               <a:rPr lang="en-US"/>
-              <a:t>2024-08-09</a:t>
+              <a:t>2024-08-20</a:t>
             </a:r>
             <a:endParaRPr lang="en-US" dirty="0"/>
           </a:p>
@@ -13566,7 +13566,7 @@
           <a:p>
             <a:r>
               <a:rPr lang="en-US"/>
-              <a:t>2024-08-09</a:t>
+              <a:t>2024-08-20</a:t>
             </a:r>
             <a:endParaRPr lang="en-US" dirty="0"/>
           </a:p>
@@ -13862,7 +13862,7 @@
           <a:p>
             <a:r>
               <a:rPr lang="en-US"/>
-              <a:t>2024-08-09</a:t>
+              <a:t>2024-08-20</a:t>
             </a:r>
             <a:endParaRPr lang="en-US" dirty="0"/>
           </a:p>
@@ -13980,7 +13980,7 @@
           <a:noFill/>
           <a:extLst>
             <a:ext uri="{909E8E84-426E-40dd-AFC4-6F175D3DCCD1}">
-              <a14:hiddenFill xmlns="" xmlns:a14="http://schemas.microsoft.com/office/drawing/2010/main">
+              <a14:hiddenFill xmlns:a14="http://schemas.microsoft.com/office/drawing/2010/main" xmlns="">
                 <a:solidFill>
                   <a:srgbClr val="FFFFFF"/>
                 </a:solidFill>
@@ -14060,7 +14060,7 @@
               </a:ln>
               <a:extLst>
                 <a:ext uri="{91240B29-F687-4f45-9708-019B960494DF}">
-                  <a14:hiddenLine xmlns="" xmlns:a14="http://schemas.microsoft.com/office/drawing/2010/main" w="9525">
+                  <a14:hiddenLine xmlns:a14="http://schemas.microsoft.com/office/drawing/2010/main" xmlns="" w="9525">
                     <a:solidFill>
                       <a:srgbClr val="000000"/>
                     </a:solidFill>
@@ -14150,7 +14150,7 @@
               </a:ln>
               <a:extLst>
                 <a:ext uri="{91240B29-F687-4f45-9708-019B960494DF}">
-                  <a14:hiddenLine xmlns="" xmlns:a14="http://schemas.microsoft.com/office/drawing/2010/main" w="9525">
+                  <a14:hiddenLine xmlns:a14="http://schemas.microsoft.com/office/drawing/2010/main" xmlns="" w="9525">
                     <a:solidFill>
                       <a:srgbClr val="000000"/>
                     </a:solidFill>
@@ -14240,7 +14240,7 @@
               </a:ln>
               <a:extLst>
                 <a:ext uri="{91240B29-F687-4f45-9708-019B960494DF}">
-                  <a14:hiddenLine xmlns="" xmlns:a14="http://schemas.microsoft.com/office/drawing/2010/main" w="9525">
+                  <a14:hiddenLine xmlns:a14="http://schemas.microsoft.com/office/drawing/2010/main" xmlns="" w="9525">
                     <a:solidFill>
                       <a:srgbClr val="000000"/>
                     </a:solidFill>
@@ -14302,7 +14302,7 @@
               </a:ln>
               <a:extLst>
                 <a:ext uri="{91240B29-F687-4f45-9708-019B960494DF}">
-                  <a14:hiddenLine xmlns="" xmlns:a14="http://schemas.microsoft.com/office/drawing/2010/main" w="9525">
+                  <a14:hiddenLine xmlns:a14="http://schemas.microsoft.com/office/drawing/2010/main" xmlns="" w="9525">
                     <a:solidFill>
                       <a:srgbClr val="000000"/>
                     </a:solidFill>
@@ -14392,7 +14392,7 @@
               </a:ln>
               <a:extLst>
                 <a:ext uri="{91240B29-F687-4f45-9708-019B960494DF}">
-                  <a14:hiddenLine xmlns="" xmlns:a14="http://schemas.microsoft.com/office/drawing/2010/main" w="9525">
+                  <a14:hiddenLine xmlns:a14="http://schemas.microsoft.com/office/drawing/2010/main" xmlns="" w="9525">
                     <a:solidFill>
                       <a:srgbClr val="000000"/>
                     </a:solidFill>
@@ -14454,7 +14454,7 @@
               </a:ln>
               <a:extLst>
                 <a:ext uri="{91240B29-F687-4f45-9708-019B960494DF}">
-                  <a14:hiddenLine xmlns="" xmlns:a14="http://schemas.microsoft.com/office/drawing/2010/main" w="9525">
+                  <a14:hiddenLine xmlns:a14="http://schemas.microsoft.com/office/drawing/2010/main" xmlns="" w="9525">
                     <a:solidFill>
                       <a:srgbClr val="000000"/>
                     </a:solidFill>
@@ -14516,7 +14516,7 @@
               </a:ln>
               <a:extLst>
                 <a:ext uri="{91240B29-F687-4f45-9708-019B960494DF}">
-                  <a14:hiddenLine xmlns="" xmlns:a14="http://schemas.microsoft.com/office/drawing/2010/main" w="9525">
+                  <a14:hiddenLine xmlns:a14="http://schemas.microsoft.com/office/drawing/2010/main" xmlns="" w="9525">
                     <a:solidFill>
                       <a:srgbClr val="000000"/>
                     </a:solidFill>
@@ -14606,7 +14606,7 @@
               </a:ln>
               <a:extLst>
                 <a:ext uri="{91240B29-F687-4f45-9708-019B960494DF}">
-                  <a14:hiddenLine xmlns="" xmlns:a14="http://schemas.microsoft.com/office/drawing/2010/main" w="9525">
+                  <a14:hiddenLine xmlns:a14="http://schemas.microsoft.com/office/drawing/2010/main" xmlns="" w="9525">
                     <a:solidFill>
                       <a:srgbClr val="000000"/>
                     </a:solidFill>
@@ -14696,7 +14696,7 @@
               </a:ln>
               <a:extLst>
                 <a:ext uri="{91240B29-F687-4f45-9708-019B960494DF}">
-                  <a14:hiddenLine xmlns="" xmlns:a14="http://schemas.microsoft.com/office/drawing/2010/main" w="9525">
+                  <a14:hiddenLine xmlns:a14="http://schemas.microsoft.com/office/drawing/2010/main" xmlns="" w="9525">
                     <a:solidFill>
                       <a:srgbClr val="000000"/>
                     </a:solidFill>
@@ -14758,7 +14758,7 @@
               </a:ln>
               <a:extLst>
                 <a:ext uri="{91240B29-F687-4f45-9708-019B960494DF}">
-                  <a14:hiddenLine xmlns="" xmlns:a14="http://schemas.microsoft.com/office/drawing/2010/main" w="9525">
+                  <a14:hiddenLine xmlns:a14="http://schemas.microsoft.com/office/drawing/2010/main" xmlns="" w="9525">
                     <a:solidFill>
                       <a:srgbClr val="000000"/>
                     </a:solidFill>
@@ -14868,7 +14868,7 @@
               </a:ln>
               <a:extLst>
                 <a:ext uri="{91240B29-F687-4f45-9708-019B960494DF}">
-                  <a14:hiddenLine xmlns="" xmlns:a14="http://schemas.microsoft.com/office/drawing/2010/main" w="9525">
+                  <a14:hiddenLine xmlns:a14="http://schemas.microsoft.com/office/drawing/2010/main" xmlns="" w="9525">
                     <a:solidFill>
                       <a:srgbClr val="000000"/>
                     </a:solidFill>
@@ -14952,7 +14952,7 @@
               </a:ln>
               <a:extLst>
                 <a:ext uri="{91240B29-F687-4f45-9708-019B960494DF}">
-                  <a14:hiddenLine xmlns="" xmlns:a14="http://schemas.microsoft.com/office/drawing/2010/main" w="9525">
+                  <a14:hiddenLine xmlns:a14="http://schemas.microsoft.com/office/drawing/2010/main" xmlns="" w="9525">
                     <a:solidFill>
                       <a:srgbClr val="000000"/>
                     </a:solidFill>
@@ -15014,7 +15014,7 @@
               </a:ln>
               <a:extLst>
                 <a:ext uri="{91240B29-F687-4f45-9708-019B960494DF}">
-                  <a14:hiddenLine xmlns="" xmlns:a14="http://schemas.microsoft.com/office/drawing/2010/main" w="9525">
+                  <a14:hiddenLine xmlns:a14="http://schemas.microsoft.com/office/drawing/2010/main" xmlns="" w="9525">
                     <a:solidFill>
                       <a:srgbClr val="000000"/>
                     </a:solidFill>
@@ -15076,7 +15076,7 @@
               </a:ln>
               <a:extLst>
                 <a:ext uri="{91240B29-F687-4f45-9708-019B960494DF}">
-                  <a14:hiddenLine xmlns="" xmlns:a14="http://schemas.microsoft.com/office/drawing/2010/main" w="9525">
+                  <a14:hiddenLine xmlns:a14="http://schemas.microsoft.com/office/drawing/2010/main" xmlns="" w="9525">
                     <a:solidFill>
                       <a:srgbClr val="000000"/>
                     </a:solidFill>
@@ -15166,7 +15166,7 @@
               </a:ln>
               <a:extLst>
                 <a:ext uri="{91240B29-F687-4f45-9708-019B960494DF}">
-                  <a14:hiddenLine xmlns="" xmlns:a14="http://schemas.microsoft.com/office/drawing/2010/main" w="9525">
+                  <a14:hiddenLine xmlns:a14="http://schemas.microsoft.com/office/drawing/2010/main" xmlns="" w="9525">
                     <a:solidFill>
                       <a:srgbClr val="000000"/>
                     </a:solidFill>
@@ -15200,7 +15200,7 @@
               </a:ln>
               <a:extLst>
                 <a:ext uri="{91240B29-F687-4f45-9708-019B960494DF}">
-                  <a14:hiddenLine xmlns="" xmlns:a14="http://schemas.microsoft.com/office/drawing/2010/main" w="9525">
+                  <a14:hiddenLine xmlns:a14="http://schemas.microsoft.com/office/drawing/2010/main" xmlns="" w="9525">
                     <a:solidFill>
                       <a:srgbClr val="000000"/>
                     </a:solidFill>
@@ -15265,7 +15265,7 @@
               </a:ln>
               <a:extLst>
                 <a:ext uri="{91240B29-F687-4f45-9708-019B960494DF}">
-                  <a14:hiddenLine xmlns="" xmlns:a14="http://schemas.microsoft.com/office/drawing/2010/main" w="9525">
+                  <a14:hiddenLine xmlns:a14="http://schemas.microsoft.com/office/drawing/2010/main" xmlns="" w="9525">
                     <a:solidFill>
                       <a:srgbClr val="000000"/>
                     </a:solidFill>
@@ -15355,7 +15355,7 @@
               </a:ln>
               <a:extLst>
                 <a:ext uri="{91240B29-F687-4f45-9708-019B960494DF}">
-                  <a14:hiddenLine xmlns="" xmlns:a14="http://schemas.microsoft.com/office/drawing/2010/main" w="9525">
+                  <a14:hiddenLine xmlns:a14="http://schemas.microsoft.com/office/drawing/2010/main" xmlns="" w="9525">
                     <a:solidFill>
                       <a:srgbClr val="000000"/>
                     </a:solidFill>
@@ -15417,7 +15417,7 @@
               </a:ln>
               <a:extLst>
                 <a:ext uri="{91240B29-F687-4f45-9708-019B960494DF}">
-                  <a14:hiddenLine xmlns="" xmlns:a14="http://schemas.microsoft.com/office/drawing/2010/main" w="9525">
+                  <a14:hiddenLine xmlns:a14="http://schemas.microsoft.com/office/drawing/2010/main" xmlns="" w="9525">
                     <a:solidFill>
                       <a:srgbClr val="000000"/>
                     </a:solidFill>
@@ -15507,7 +15507,7 @@
               </a:ln>
               <a:extLst>
                 <a:ext uri="{91240B29-F687-4f45-9708-019B960494DF}">
-                  <a14:hiddenLine xmlns="" xmlns:a14="http://schemas.microsoft.com/office/drawing/2010/main" w="9525">
+                  <a14:hiddenLine xmlns:a14="http://schemas.microsoft.com/office/drawing/2010/main" xmlns="" w="9525">
                     <a:solidFill>
                       <a:srgbClr val="000000"/>
                     </a:solidFill>
@@ -15572,7 +15572,7 @@
               </a:ln>
               <a:extLst>
                 <a:ext uri="{91240B29-F687-4f45-9708-019B960494DF}">
-                  <a14:hiddenLine xmlns="" xmlns:a14="http://schemas.microsoft.com/office/drawing/2010/main" w="9525">
+                  <a14:hiddenLine xmlns:a14="http://schemas.microsoft.com/office/drawing/2010/main" xmlns="" w="9525">
                     <a:solidFill>
                       <a:srgbClr val="000000"/>
                     </a:solidFill>
@@ -15634,7 +15634,7 @@
               </a:ln>
               <a:extLst>
                 <a:ext uri="{91240B29-F687-4f45-9708-019B960494DF}">
-                  <a14:hiddenLine xmlns="" xmlns:a14="http://schemas.microsoft.com/office/drawing/2010/main" w="9525">
+                  <a14:hiddenLine xmlns:a14="http://schemas.microsoft.com/office/drawing/2010/main" xmlns="" w="9525">
                     <a:solidFill>
                       <a:srgbClr val="000000"/>
                     </a:solidFill>
@@ -15724,7 +15724,7 @@
               </a:ln>
               <a:extLst>
                 <a:ext uri="{91240B29-F687-4f45-9708-019B960494DF}">
-                  <a14:hiddenLine xmlns="" xmlns:a14="http://schemas.microsoft.com/office/drawing/2010/main" w="9525">
+                  <a14:hiddenLine xmlns:a14="http://schemas.microsoft.com/office/drawing/2010/main" xmlns="" w="9525">
                     <a:solidFill>
                       <a:srgbClr val="000000"/>
                     </a:solidFill>
@@ -15814,7 +15814,7 @@
               </a:ln>
               <a:extLst>
                 <a:ext uri="{91240B29-F687-4f45-9708-019B960494DF}">
-                  <a14:hiddenLine xmlns="" xmlns:a14="http://schemas.microsoft.com/office/drawing/2010/main" w="9525">
+                  <a14:hiddenLine xmlns:a14="http://schemas.microsoft.com/office/drawing/2010/main" xmlns="" w="9525">
                     <a:solidFill>
                       <a:srgbClr val="000000"/>
                     </a:solidFill>
@@ -15879,7 +15879,7 @@
               </a:ln>
               <a:extLst>
                 <a:ext uri="{91240B29-F687-4f45-9708-019B960494DF}">
-                  <a14:hiddenLine xmlns="" xmlns:a14="http://schemas.microsoft.com/office/drawing/2010/main" w="9525">
+                  <a14:hiddenLine xmlns:a14="http://schemas.microsoft.com/office/drawing/2010/main" xmlns="" w="9525">
                     <a:solidFill>
                       <a:srgbClr val="000000"/>
                     </a:solidFill>
@@ -15999,7 +15999,7 @@
               </a:ln>
               <a:extLst>
                 <a:ext uri="{91240B29-F687-4f45-9708-019B960494DF}">
-                  <a14:hiddenLine xmlns="" xmlns:a14="http://schemas.microsoft.com/office/drawing/2010/main" w="9525">
+                  <a14:hiddenLine xmlns:a14="http://schemas.microsoft.com/office/drawing/2010/main" xmlns="" w="9525">
                     <a:solidFill>
                       <a:srgbClr val="000000"/>
                     </a:solidFill>
@@ -16097,7 +16097,7 @@
               </a:ln>
               <a:extLst>
                 <a:ext uri="{91240B29-F687-4f45-9708-019B960494DF}">
-                  <a14:hiddenLine xmlns="" xmlns:a14="http://schemas.microsoft.com/office/drawing/2010/main" w="9525">
+                  <a14:hiddenLine xmlns:a14="http://schemas.microsoft.com/office/drawing/2010/main" xmlns="" w="9525">
                     <a:solidFill>
                       <a:srgbClr val="000000"/>
                     </a:solidFill>
@@ -16212,7 +16212,7 @@
               </a:ln>
               <a:extLst>
                 <a:ext uri="{91240B29-F687-4f45-9708-019B960494DF}">
-                  <a14:hiddenLine xmlns="" xmlns:a14="http://schemas.microsoft.com/office/drawing/2010/main" w="9525">
+                  <a14:hiddenLine xmlns:a14="http://schemas.microsoft.com/office/drawing/2010/main" xmlns="" w="9525">
                     <a:solidFill>
                       <a:srgbClr val="000000"/>
                     </a:solidFill>
@@ -16302,7 +16302,7 @@
               </a:ln>
               <a:extLst>
                 <a:ext uri="{91240B29-F687-4f45-9708-019B960494DF}">
-                  <a14:hiddenLine xmlns="" xmlns:a14="http://schemas.microsoft.com/office/drawing/2010/main" w="9525">
+                  <a14:hiddenLine xmlns:a14="http://schemas.microsoft.com/office/drawing/2010/main" xmlns="" w="9525">
                     <a:solidFill>
                       <a:srgbClr val="000000"/>
                     </a:solidFill>
@@ -16367,7 +16367,7 @@
               </a:ln>
               <a:extLst>
                 <a:ext uri="{91240B29-F687-4f45-9708-019B960494DF}">
-                  <a14:hiddenLine xmlns="" xmlns:a14="http://schemas.microsoft.com/office/drawing/2010/main" w="9525">
+                  <a14:hiddenLine xmlns:a14="http://schemas.microsoft.com/office/drawing/2010/main" xmlns="" w="9525">
                     <a:solidFill>
                       <a:srgbClr val="000000"/>
                     </a:solidFill>
@@ -16457,7 +16457,7 @@
               </a:ln>
               <a:extLst>
                 <a:ext uri="{91240B29-F687-4f45-9708-019B960494DF}">
-                  <a14:hiddenLine xmlns="" xmlns:a14="http://schemas.microsoft.com/office/drawing/2010/main" w="9525">
+                  <a14:hiddenLine xmlns:a14="http://schemas.microsoft.com/office/drawing/2010/main" xmlns="" w="9525">
                     <a:solidFill>
                       <a:srgbClr val="000000"/>
                     </a:solidFill>
@@ -16525,7 +16525,7 @@
               </a:ln>
               <a:extLst>
                 <a:ext uri="{91240B29-F687-4f45-9708-019B960494DF}">
-                  <a14:hiddenLine xmlns="" xmlns:a14="http://schemas.microsoft.com/office/drawing/2010/main" w="9525">
+                  <a14:hiddenLine xmlns:a14="http://schemas.microsoft.com/office/drawing/2010/main" xmlns="" w="9525">
                     <a:solidFill>
                       <a:srgbClr val="000000"/>
                     </a:solidFill>
@@ -16615,7 +16615,7 @@
               </a:ln>
               <a:extLst>
                 <a:ext uri="{91240B29-F687-4f45-9708-019B960494DF}">
-                  <a14:hiddenLine xmlns="" xmlns:a14="http://schemas.microsoft.com/office/drawing/2010/main" w="9525">
+                  <a14:hiddenLine xmlns:a14="http://schemas.microsoft.com/office/drawing/2010/main" xmlns="" w="9525">
                     <a:solidFill>
                       <a:srgbClr val="000000"/>
                     </a:solidFill>
@@ -16683,7 +16683,7 @@
               </a:ln>
               <a:extLst>
                 <a:ext uri="{91240B29-F687-4f45-9708-019B960494DF}">
-                  <a14:hiddenLine xmlns="" xmlns:a14="http://schemas.microsoft.com/office/drawing/2010/main" w="9525">
+                  <a14:hiddenLine xmlns:a14="http://schemas.microsoft.com/office/drawing/2010/main" xmlns="" w="9525">
                     <a:solidFill>
                       <a:srgbClr val="000000"/>
                     </a:solidFill>
@@ -16773,7 +16773,7 @@
               </a:ln>
               <a:extLst>
                 <a:ext uri="{91240B29-F687-4f45-9708-019B960494DF}">
-                  <a14:hiddenLine xmlns="" xmlns:a14="http://schemas.microsoft.com/office/drawing/2010/main" w="9525">
+                  <a14:hiddenLine xmlns:a14="http://schemas.microsoft.com/office/drawing/2010/main" xmlns="" w="9525">
                     <a:solidFill>
                       <a:srgbClr val="000000"/>
                     </a:solidFill>
@@ -16807,7 +16807,7 @@
               </a:ln>
               <a:extLst>
                 <a:ext uri="{91240B29-F687-4f45-9708-019B960494DF}">
-                  <a14:hiddenLine xmlns="" xmlns:a14="http://schemas.microsoft.com/office/drawing/2010/main" w="9525">
+                  <a14:hiddenLine xmlns:a14="http://schemas.microsoft.com/office/drawing/2010/main" xmlns="" w="9525">
                     <a:solidFill>
                       <a:srgbClr val="000000"/>
                     </a:solidFill>
@@ -16984,7 +16984,7 @@
           <a:p>
             <a:r>
               <a:rPr lang="en-US"/>
-              <a:t>2024-08-09</a:t>
+              <a:t>2024-08-20</a:t>
             </a:r>
             <a:endParaRPr lang="en-US" dirty="0"/>
           </a:p>
@@ -18048,7 +18048,7 @@
           <a:p>
             <a:r>
               <a:rPr lang="en-US"/>
-              <a:t>2024-08-09</a:t>
+              <a:t>2024-08-20</a:t>
             </a:r>
             <a:endParaRPr lang="en-US" dirty="0"/>
           </a:p>
@@ -18433,7 +18433,7 @@
           <a:p>
             <a:r>
               <a:rPr lang="en-US"/>
-              <a:t>2024-08-09</a:t>
+              <a:t>2024-08-20</a:t>
             </a:r>
             <a:endParaRPr lang="en-US" dirty="0"/>
           </a:p>
@@ -18645,7 +18645,7 @@
           <a:p>
             <a:r>
               <a:rPr lang="en-US"/>
-              <a:t>2024-08-09</a:t>
+              <a:t>2024-08-20</a:t>
             </a:r>
             <a:endParaRPr lang="en-US" dirty="0"/>
           </a:p>
@@ -18850,7 +18850,7 @@
           <a:p>
             <a:r>
               <a:rPr lang="en-US"/>
-              <a:t>2024-08-09</a:t>
+              <a:t>2024-08-20</a:t>
             </a:r>
             <a:endParaRPr lang="en-US" dirty="0"/>
           </a:p>
@@ -19035,7 +19035,7 @@
           <a:p>
             <a:r>
               <a:rPr lang="en-US"/>
-              <a:t>2024-08-09</a:t>
+              <a:t>2024-08-20</a:t>
             </a:r>
             <a:endParaRPr lang="en-US" dirty="0"/>
           </a:p>
@@ -19999,7 +19999,7 @@
           <a:p>
             <a:r>
               <a:rPr lang="en-US"/>
-              <a:t>2024-08-09</a:t>
+              <a:t>2024-08-20</a:t>
             </a:r>
             <a:endParaRPr lang="en-US" dirty="0"/>
           </a:p>
@@ -20962,18 +20962,26 @@
               <a:t>Done automatically by </a:t>
             </a:r>
             <a:r>
-              <a:rPr lang="en-CA" sz="1100" dirty="0" err="1">
+              <a:rPr lang="en-CA" sz="1100" dirty="0">
                 <a:solidFill>
                   <a:schemeClr val="bg2"/>
                 </a:solidFill>
-                <a:highlight>
-                  <a:srgbClr val="FFFFFF"/>
-                </a:highlight>
                 <a:latin typeface="Hack" panose="020B0609030202020204" pitchFamily="49" charset="0"/>
                 <a:ea typeface="Hack" panose="020B0609030202020204" pitchFamily="49" charset="0"/>
                 <a:cs typeface="Hack" panose="020B0609030202020204" pitchFamily="49" charset="0"/>
               </a:rPr>
-              <a:t>makeTaskList</a:t>
+              <a:t>Tasks::</a:t>
+            </a:r>
+            <a:r>
+              <a:rPr lang="en-CA" sz="1100" dirty="0" err="1">
+                <a:solidFill>
+                  <a:schemeClr val="bg2"/>
+                </a:solidFill>
+                <a:latin typeface="Hack" panose="020B0609030202020204" pitchFamily="49" charset="0"/>
+                <a:ea typeface="Hack" panose="020B0609030202020204" pitchFamily="49" charset="0"/>
+                <a:cs typeface="Hack" panose="020B0609030202020204" pitchFamily="49" charset="0"/>
+              </a:rPr>
+              <a:t>TaskList</a:t>
             </a:r>
             <a:endParaRPr lang="en-CA" sz="1200" dirty="0">
               <a:solidFill>
@@ -21984,7 +21992,7 @@
           <a:p>
             <a:r>
               <a:rPr lang="en-US"/>
-              <a:t>2024-08-09</a:t>
+              <a:t>2024-08-20</a:t>
             </a:r>
             <a:endParaRPr lang="en-US" dirty="0"/>
           </a:p>
@@ -23039,7 +23047,7 @@
           <a:p>
             <a:r>
               <a:rPr lang="en-US"/>
-              <a:t>2024-08-09</a:t>
+              <a:t>2024-08-20</a:t>
             </a:r>
             <a:endParaRPr lang="en-US" dirty="0"/>
           </a:p>
@@ -24517,7 +24525,7 @@
           <a:p>
             <a:r>
               <a:rPr lang="en-US"/>
-              <a:t>2024-08-09</a:t>
+              <a:t>2024-08-20</a:t>
             </a:r>
             <a:endParaRPr lang="en-US" dirty="0"/>
           </a:p>
@@ -26738,7 +26746,7 @@
           <a:p>
             <a:r>
               <a:rPr lang="en-US"/>
-              <a:t>2024-08-09</a:t>
+              <a:t>2024-08-20</a:t>
             </a:r>
             <a:endParaRPr lang="en-US" dirty="0"/>
           </a:p>
@@ -28935,7 +28943,7 @@
           <a:p>
             <a:r>
               <a:rPr lang="en-US"/>
-              <a:t>2024-08-09</a:t>
+              <a:t>2024-08-20</a:t>
             </a:r>
             <a:endParaRPr lang="en-US" dirty="0"/>
           </a:p>
@@ -29367,7 +29375,7 @@
           <a:p>
             <a:r>
               <a:rPr lang="en-US"/>
-              <a:t>2024-08-09</a:t>
+              <a:t>2024-08-20</a:t>
             </a:r>
             <a:endParaRPr lang="en-US" dirty="0"/>
           </a:p>
@@ -29586,7 +29594,7 @@
           <a:p>
             <a:r>
               <a:rPr lang="en-US"/>
-              <a:t>2024-08-09</a:t>
+              <a:t>2024-08-20</a:t>
             </a:r>
             <a:endParaRPr lang="en-US" dirty="0"/>
           </a:p>
@@ -29811,7 +29819,7 @@
           <a:p>
             <a:r>
               <a:rPr lang="en-US"/>
-              <a:t>2024-08-09</a:t>
+              <a:t>2024-08-20</a:t>
             </a:r>
             <a:endParaRPr lang="en-US" dirty="0"/>
           </a:p>
@@ -30003,7 +30011,7 @@
           <a:p>
             <a:r>
               <a:rPr lang="en-US"/>
-              <a:t>2024-08-09</a:t>
+              <a:t>2024-08-20</a:t>
             </a:r>
             <a:endParaRPr lang="en-US" dirty="0"/>
           </a:p>
@@ -30194,7 +30202,7 @@
           <a:p>
             <a:r>
               <a:rPr lang="en-US"/>
-              <a:t>2024-08-09</a:t>
+              <a:t>2024-08-20</a:t>
             </a:r>
             <a:endParaRPr lang="en-US" dirty="0"/>
           </a:p>
@@ -30379,7 +30387,7 @@
           <a:p>
             <a:r>
               <a:rPr lang="en-US"/>
-              <a:t>2024-08-09</a:t>
+              <a:t>2024-08-20</a:t>
             </a:r>
             <a:endParaRPr lang="en-US" dirty="0"/>
           </a:p>
@@ -30551,7 +30559,7 @@
           <a:p>
             <a:r>
               <a:rPr lang="en-US"/>
-              <a:t>2024-08-09</a:t>
+              <a:t>2024-08-20</a:t>
             </a:r>
             <a:endParaRPr lang="en-US" dirty="0"/>
           </a:p>
@@ -30816,7 +30824,7 @@
           <a:p>
             <a:r>
               <a:rPr lang="en-US"/>
-              <a:t>2024-08-09</a:t>
+              <a:t>2024-08-20</a:t>
             </a:r>
             <a:endParaRPr lang="en-US" dirty="0"/>
           </a:p>
@@ -31007,7 +31015,7 @@
           <a:p>
             <a:r>
               <a:rPr lang="en-US"/>
-              <a:t>2024-08-09</a:t>
+              <a:t>2024-08-20</a:t>
             </a:r>
             <a:endParaRPr lang="en-US" dirty="0"/>
           </a:p>
@@ -31237,7 +31245,7 @@
           <a:p>
             <a:r>
               <a:rPr lang="en-US"/>
-              <a:t>2024-08-09</a:t>
+              <a:t>2024-08-20</a:t>
             </a:r>
             <a:endParaRPr lang="en-US" dirty="0"/>
           </a:p>
@@ -31559,7 +31567,7 @@
           <a:p>
             <a:r>
               <a:rPr lang="en-US"/>
-              <a:t>2024-08-09</a:t>
+              <a:t>2024-08-20</a:t>
             </a:r>
             <a:endParaRPr lang="en-US" dirty="0"/>
           </a:p>
@@ -32409,7 +32417,7 @@
           <a:p>
             <a:r>
               <a:rPr lang="en-US"/>
-              <a:t>2024-08-09</a:t>
+              <a:t>2024-08-20</a:t>
             </a:r>
             <a:endParaRPr lang="en-US" dirty="0"/>
           </a:p>
@@ -33025,7 +33033,7 @@
           <a:p>
             <a:r>
               <a:rPr lang="en-US"/>
-              <a:t>2024-08-09</a:t>
+              <a:t>2024-08-20</a:t>
             </a:r>
             <a:endParaRPr lang="en-US" dirty="0"/>
           </a:p>

</xml_diff>

<commit_message>
MakeVersionInfo: add a note
</commit_message>
<xml_diff>
--- a/TaskScheduler/TaskScheduler.pptx
+++ b/TaskScheduler/TaskScheduler.pptx
@@ -2474,7 +2474,15 @@
             </a:pPr>
             <a:r>
               <a:rPr lang="en-CA" dirty="0"/>
-              <a:t>Constructor is declared </a:t>
+              <a:t>(C++</a:t>
+            </a:r>
+            <a:r>
+              <a:rPr lang="en-CA"/>
+              <a:t>20 warning): Constructor </a:t>
+            </a:r>
+            <a:r>
+              <a:rPr lang="en-CA" dirty="0"/>
+              <a:t>is declared </a:t>
             </a:r>
             <a:r>
               <a:rPr lang="en-CA" dirty="0" err="1"/>
@@ -3961,7 +3969,7 @@
           <a:noFill/>
           <a:extLst>
             <a:ext uri="{909E8E84-426E-40dd-AFC4-6F175D3DCCD1}">
-              <a14:hiddenFill xmlns:a14="http://schemas.microsoft.com/office/drawing/2010/main" xmlns="">
+              <a14:hiddenFill xmlns="" xmlns:a14="http://schemas.microsoft.com/office/drawing/2010/main">
                 <a:solidFill>
                   <a:srgbClr val="FFFFFF"/>
                 </a:solidFill>
@@ -4027,7 +4035,7 @@
             </a:ln>
             <a:extLst>
               <a:ext uri="{91240B29-F687-4f45-9708-019B960494DF}">
-                <a14:hiddenLine xmlns:a14="http://schemas.microsoft.com/office/drawing/2010/main" xmlns="" w="9525">
+                <a14:hiddenLine xmlns="" xmlns:a14="http://schemas.microsoft.com/office/drawing/2010/main" w="9525">
                   <a:solidFill>
                     <a:srgbClr val="000000"/>
                   </a:solidFill>
@@ -4117,7 +4125,7 @@
             </a:ln>
             <a:extLst>
               <a:ext uri="{91240B29-F687-4f45-9708-019B960494DF}">
-                <a14:hiddenLine xmlns:a14="http://schemas.microsoft.com/office/drawing/2010/main" xmlns="" w="9525">
+                <a14:hiddenLine xmlns="" xmlns:a14="http://schemas.microsoft.com/office/drawing/2010/main" w="9525">
                   <a:solidFill>
                     <a:srgbClr val="000000"/>
                   </a:solidFill>
@@ -4207,7 +4215,7 @@
             </a:ln>
             <a:extLst>
               <a:ext uri="{91240B29-F687-4f45-9708-019B960494DF}">
-                <a14:hiddenLine xmlns:a14="http://schemas.microsoft.com/office/drawing/2010/main" xmlns="" w="9525">
+                <a14:hiddenLine xmlns="" xmlns:a14="http://schemas.microsoft.com/office/drawing/2010/main" w="9525">
                   <a:solidFill>
                     <a:srgbClr val="000000"/>
                   </a:solidFill>
@@ -4241,7 +4249,7 @@
             </a:ln>
             <a:extLst>
               <a:ext uri="{91240B29-F687-4f45-9708-019B960494DF}">
-                <a14:hiddenLine xmlns:a14="http://schemas.microsoft.com/office/drawing/2010/main" xmlns="" w="9525">
+                <a14:hiddenLine xmlns="" xmlns:a14="http://schemas.microsoft.com/office/drawing/2010/main" w="9525">
                   <a:solidFill>
                     <a:srgbClr val="000000"/>
                   </a:solidFill>
@@ -4331,7 +4339,7 @@
             </a:ln>
             <a:extLst>
               <a:ext uri="{91240B29-F687-4f45-9708-019B960494DF}">
-                <a14:hiddenLine xmlns:a14="http://schemas.microsoft.com/office/drawing/2010/main" xmlns="" w="9525">
+                <a14:hiddenLine xmlns="" xmlns:a14="http://schemas.microsoft.com/office/drawing/2010/main" w="9525">
                   <a:solidFill>
                     <a:srgbClr val="000000"/>
                   </a:solidFill>
@@ -4393,7 +4401,7 @@
             </a:ln>
             <a:extLst>
               <a:ext uri="{91240B29-F687-4f45-9708-019B960494DF}">
-                <a14:hiddenLine xmlns:a14="http://schemas.microsoft.com/office/drawing/2010/main" xmlns="" w="9525">
+                <a14:hiddenLine xmlns="" xmlns:a14="http://schemas.microsoft.com/office/drawing/2010/main" w="9525">
                   <a:solidFill>
                     <a:srgbClr val="000000"/>
                   </a:solidFill>
@@ -4455,7 +4463,7 @@
             </a:ln>
             <a:extLst>
               <a:ext uri="{91240B29-F687-4f45-9708-019B960494DF}">
-                <a14:hiddenLine xmlns:a14="http://schemas.microsoft.com/office/drawing/2010/main" xmlns="" w="9525">
+                <a14:hiddenLine xmlns="" xmlns:a14="http://schemas.microsoft.com/office/drawing/2010/main" w="9525">
                   <a:solidFill>
                     <a:srgbClr val="000000"/>
                   </a:solidFill>
@@ -4545,7 +4553,7 @@
             </a:ln>
             <a:extLst>
               <a:ext uri="{91240B29-F687-4f45-9708-019B960494DF}">
-                <a14:hiddenLine xmlns:a14="http://schemas.microsoft.com/office/drawing/2010/main" xmlns="" w="9525">
+                <a14:hiddenLine xmlns="" xmlns:a14="http://schemas.microsoft.com/office/drawing/2010/main" w="9525">
                   <a:solidFill>
                     <a:srgbClr val="000000"/>
                   </a:solidFill>
@@ -4607,7 +4615,7 @@
             </a:ln>
             <a:extLst>
               <a:ext uri="{91240B29-F687-4f45-9708-019B960494DF}">
-                <a14:hiddenLine xmlns:a14="http://schemas.microsoft.com/office/drawing/2010/main" xmlns="" w="9525">
+                <a14:hiddenLine xmlns="" xmlns:a14="http://schemas.microsoft.com/office/drawing/2010/main" w="9525">
                   <a:solidFill>
                     <a:srgbClr val="000000"/>
                   </a:solidFill>
@@ -4669,7 +4677,7 @@
             </a:ln>
             <a:extLst>
               <a:ext uri="{91240B29-F687-4f45-9708-019B960494DF}">
-                <a14:hiddenLine xmlns:a14="http://schemas.microsoft.com/office/drawing/2010/main" xmlns="" w="9525">
+                <a14:hiddenLine xmlns="" xmlns:a14="http://schemas.microsoft.com/office/drawing/2010/main" w="9525">
                   <a:solidFill>
                     <a:srgbClr val="000000"/>
                   </a:solidFill>
@@ -4759,7 +4767,7 @@
             </a:ln>
             <a:extLst>
               <a:ext uri="{91240B29-F687-4f45-9708-019B960494DF}">
-                <a14:hiddenLine xmlns:a14="http://schemas.microsoft.com/office/drawing/2010/main" xmlns="" w="9525">
+                <a14:hiddenLine xmlns="" xmlns:a14="http://schemas.microsoft.com/office/drawing/2010/main" w="9525">
                   <a:solidFill>
                     <a:srgbClr val="000000"/>
                   </a:solidFill>
@@ -4849,7 +4857,7 @@
             </a:ln>
             <a:extLst>
               <a:ext uri="{91240B29-F687-4f45-9708-019B960494DF}">
-                <a14:hiddenLine xmlns:a14="http://schemas.microsoft.com/office/drawing/2010/main" xmlns="" w="9525">
+                <a14:hiddenLine xmlns="" xmlns:a14="http://schemas.microsoft.com/office/drawing/2010/main" w="9525">
                   <a:solidFill>
                     <a:srgbClr val="000000"/>
                   </a:solidFill>
@@ -4911,7 +4919,7 @@
             </a:ln>
             <a:extLst>
               <a:ext uri="{91240B29-F687-4f45-9708-019B960494DF}">
-                <a14:hiddenLine xmlns:a14="http://schemas.microsoft.com/office/drawing/2010/main" xmlns="" w="9525">
+                <a14:hiddenLine xmlns="" xmlns:a14="http://schemas.microsoft.com/office/drawing/2010/main" w="9525">
                   <a:solidFill>
                     <a:srgbClr val="000000"/>
                   </a:solidFill>
@@ -5021,7 +5029,7 @@
             </a:ln>
             <a:extLst>
               <a:ext uri="{91240B29-F687-4f45-9708-019B960494DF}">
-                <a14:hiddenLine xmlns:a14="http://schemas.microsoft.com/office/drawing/2010/main" xmlns="" w="9525">
+                <a14:hiddenLine xmlns="" xmlns:a14="http://schemas.microsoft.com/office/drawing/2010/main" w="9525">
                   <a:solidFill>
                     <a:srgbClr val="000000"/>
                   </a:solidFill>
@@ -5083,7 +5091,7 @@
             </a:ln>
             <a:extLst>
               <a:ext uri="{91240B29-F687-4f45-9708-019B960494DF}">
-                <a14:hiddenLine xmlns:a14="http://schemas.microsoft.com/office/drawing/2010/main" xmlns="" w="9525">
+                <a14:hiddenLine xmlns="" xmlns:a14="http://schemas.microsoft.com/office/drawing/2010/main" w="9525">
                   <a:solidFill>
                     <a:srgbClr val="000000"/>
                   </a:solidFill>
@@ -5173,7 +5181,7 @@
             </a:ln>
             <a:extLst>
               <a:ext uri="{91240B29-F687-4f45-9708-019B960494DF}">
-                <a14:hiddenLine xmlns:a14="http://schemas.microsoft.com/office/drawing/2010/main" xmlns="" w="9525">
+                <a14:hiddenLine xmlns="" xmlns:a14="http://schemas.microsoft.com/office/drawing/2010/main" w="9525">
                   <a:solidFill>
                     <a:srgbClr val="000000"/>
                   </a:solidFill>
@@ -5263,7 +5271,7 @@
             </a:ln>
             <a:extLst>
               <a:ext uri="{91240B29-F687-4f45-9708-019B960494DF}">
-                <a14:hiddenLine xmlns:a14="http://schemas.microsoft.com/office/drawing/2010/main" xmlns="" w="9525">
+                <a14:hiddenLine xmlns="" xmlns:a14="http://schemas.microsoft.com/office/drawing/2010/main" w="9525">
                   <a:solidFill>
                     <a:srgbClr val="000000"/>
                   </a:solidFill>
@@ -5325,7 +5333,7 @@
             </a:ln>
             <a:extLst>
               <a:ext uri="{91240B29-F687-4f45-9708-019B960494DF}">
-                <a14:hiddenLine xmlns:a14="http://schemas.microsoft.com/office/drawing/2010/main" xmlns="" w="9525">
+                <a14:hiddenLine xmlns="" xmlns:a14="http://schemas.microsoft.com/office/drawing/2010/main" w="9525">
                   <a:solidFill>
                     <a:srgbClr val="000000"/>
                   </a:solidFill>
@@ -5415,7 +5423,7 @@
             </a:ln>
             <a:extLst>
               <a:ext uri="{91240B29-F687-4f45-9708-019B960494DF}">
-                <a14:hiddenLine xmlns:a14="http://schemas.microsoft.com/office/drawing/2010/main" xmlns="" w="9525">
+                <a14:hiddenLine xmlns="" xmlns:a14="http://schemas.microsoft.com/office/drawing/2010/main" w="9525">
                   <a:solidFill>
                     <a:srgbClr val="000000"/>
                   </a:solidFill>
@@ -5505,7 +5513,7 @@
             </a:ln>
             <a:extLst>
               <a:ext uri="{91240B29-F687-4f45-9708-019B960494DF}">
-                <a14:hiddenLine xmlns:a14="http://schemas.microsoft.com/office/drawing/2010/main" xmlns="" w="9525">
+                <a14:hiddenLine xmlns="" xmlns:a14="http://schemas.microsoft.com/office/drawing/2010/main" w="9525">
                   <a:solidFill>
                     <a:srgbClr val="000000"/>
                   </a:solidFill>
@@ -5561,7 +5569,7 @@
             </a:ln>
             <a:extLst>
               <a:ext uri="{91240B29-F687-4f45-9708-019B960494DF}">
-                <a14:hiddenLine xmlns:a14="http://schemas.microsoft.com/office/drawing/2010/main" xmlns="" w="9525">
+                <a14:hiddenLine xmlns="" xmlns:a14="http://schemas.microsoft.com/office/drawing/2010/main" w="9525">
                   <a:solidFill>
                     <a:srgbClr val="000000"/>
                   </a:solidFill>
@@ -5651,7 +5659,7 @@
             </a:ln>
             <a:extLst>
               <a:ext uri="{91240B29-F687-4f45-9708-019B960494DF}">
-                <a14:hiddenLine xmlns:a14="http://schemas.microsoft.com/office/drawing/2010/main" xmlns="" w="9525">
+                <a14:hiddenLine xmlns="" xmlns:a14="http://schemas.microsoft.com/office/drawing/2010/main" w="9525">
                   <a:solidFill>
                     <a:srgbClr val="000000"/>
                   </a:solidFill>
@@ -5707,7 +5715,7 @@
             </a:ln>
             <a:extLst>
               <a:ext uri="{91240B29-F687-4f45-9708-019B960494DF}">
-                <a14:hiddenLine xmlns:a14="http://schemas.microsoft.com/office/drawing/2010/main" xmlns="" w="9525">
+                <a14:hiddenLine xmlns="" xmlns:a14="http://schemas.microsoft.com/office/drawing/2010/main" w="9525">
                   <a:solidFill>
                     <a:srgbClr val="000000"/>
                   </a:solidFill>
@@ -5797,7 +5805,7 @@
             </a:ln>
             <a:extLst>
               <a:ext uri="{91240B29-F687-4f45-9708-019B960494DF}">
-                <a14:hiddenLine xmlns:a14="http://schemas.microsoft.com/office/drawing/2010/main" xmlns="" w="9525">
+                <a14:hiddenLine xmlns="" xmlns:a14="http://schemas.microsoft.com/office/drawing/2010/main" w="9525">
                   <a:solidFill>
                     <a:srgbClr val="000000"/>
                   </a:solidFill>
@@ -5865,7 +5873,7 @@
             </a:ln>
             <a:extLst>
               <a:ext uri="{91240B29-F687-4f45-9708-019B960494DF}">
-                <a14:hiddenLine xmlns:a14="http://schemas.microsoft.com/office/drawing/2010/main" xmlns="" w="9525">
+                <a14:hiddenLine xmlns="" xmlns:a14="http://schemas.microsoft.com/office/drawing/2010/main" w="9525">
                   <a:solidFill>
                     <a:srgbClr val="000000"/>
                   </a:solidFill>
@@ -5955,7 +5963,7 @@
             </a:ln>
             <a:extLst>
               <a:ext uri="{91240B29-F687-4f45-9708-019B960494DF}">
-                <a14:hiddenLine xmlns:a14="http://schemas.microsoft.com/office/drawing/2010/main" xmlns="" w="9525">
+                <a14:hiddenLine xmlns="" xmlns:a14="http://schemas.microsoft.com/office/drawing/2010/main" w="9525">
                   <a:solidFill>
                     <a:srgbClr val="000000"/>
                   </a:solidFill>
@@ -6023,7 +6031,7 @@
             </a:ln>
             <a:extLst>
               <a:ext uri="{91240B29-F687-4f45-9708-019B960494DF}">
-                <a14:hiddenLine xmlns:a14="http://schemas.microsoft.com/office/drawing/2010/main" xmlns="" w="9525">
+                <a14:hiddenLine xmlns="" xmlns:a14="http://schemas.microsoft.com/office/drawing/2010/main" w="9525">
                   <a:solidFill>
                     <a:srgbClr val="000000"/>
                   </a:solidFill>
@@ -6113,7 +6121,7 @@
             </a:ln>
             <a:extLst>
               <a:ext uri="{91240B29-F687-4f45-9708-019B960494DF}">
-                <a14:hiddenLine xmlns:a14="http://schemas.microsoft.com/office/drawing/2010/main" xmlns="" w="9525">
+                <a14:hiddenLine xmlns="" xmlns:a14="http://schemas.microsoft.com/office/drawing/2010/main" w="9525">
                   <a:solidFill>
                     <a:srgbClr val="000000"/>
                   </a:solidFill>
@@ -6147,7 +6155,7 @@
             </a:ln>
             <a:extLst>
               <a:ext uri="{91240B29-F687-4f45-9708-019B960494DF}">
-                <a14:hiddenLine xmlns:a14="http://schemas.microsoft.com/office/drawing/2010/main" xmlns="" w="9525">
+                <a14:hiddenLine xmlns="" xmlns:a14="http://schemas.microsoft.com/office/drawing/2010/main" w="9525">
                   <a:solidFill>
                     <a:srgbClr val="000000"/>
                   </a:solidFill>
@@ -6237,7 +6245,7 @@
             </a:ln>
             <a:extLst>
               <a:ext uri="{91240B29-F687-4f45-9708-019B960494DF}">
-                <a14:hiddenLine xmlns:a14="http://schemas.microsoft.com/office/drawing/2010/main" xmlns="" w="9525">
+                <a14:hiddenLine xmlns="" xmlns:a14="http://schemas.microsoft.com/office/drawing/2010/main" w="9525">
                   <a:solidFill>
                     <a:srgbClr val="000000"/>
                   </a:solidFill>
@@ -6299,7 +6307,7 @@
             </a:ln>
             <a:extLst>
               <a:ext uri="{91240B29-F687-4f45-9708-019B960494DF}">
-                <a14:hiddenLine xmlns:a14="http://schemas.microsoft.com/office/drawing/2010/main" xmlns="" w="9525">
+                <a14:hiddenLine xmlns="" xmlns:a14="http://schemas.microsoft.com/office/drawing/2010/main" w="9525">
                   <a:solidFill>
                     <a:srgbClr val="000000"/>
                   </a:solidFill>
@@ -6361,7 +6369,7 @@
             </a:ln>
             <a:extLst>
               <a:ext uri="{91240B29-F687-4f45-9708-019B960494DF}">
-                <a14:hiddenLine xmlns:a14="http://schemas.microsoft.com/office/drawing/2010/main" xmlns="" w="9525">
+                <a14:hiddenLine xmlns="" xmlns:a14="http://schemas.microsoft.com/office/drawing/2010/main" w="9525">
                   <a:solidFill>
                     <a:srgbClr val="000000"/>
                   </a:solidFill>
@@ -6451,7 +6459,7 @@
             </a:ln>
             <a:extLst>
               <a:ext uri="{91240B29-F687-4f45-9708-019B960494DF}">
-                <a14:hiddenLine xmlns:a14="http://schemas.microsoft.com/office/drawing/2010/main" xmlns="" w="9525">
+                <a14:hiddenLine xmlns="" xmlns:a14="http://schemas.microsoft.com/office/drawing/2010/main" w="9525">
                   <a:solidFill>
                     <a:srgbClr val="000000"/>
                   </a:solidFill>
@@ -6519,7 +6527,7 @@
             </a:ln>
             <a:extLst>
               <a:ext uri="{91240B29-F687-4f45-9708-019B960494DF}">
-                <a14:hiddenLine xmlns:a14="http://schemas.microsoft.com/office/drawing/2010/main" xmlns="" w="9525">
+                <a14:hiddenLine xmlns="" xmlns:a14="http://schemas.microsoft.com/office/drawing/2010/main" w="9525">
                   <a:solidFill>
                     <a:srgbClr val="000000"/>
                   </a:solidFill>
@@ -6581,7 +6589,7 @@
             </a:ln>
             <a:extLst>
               <a:ext uri="{91240B29-F687-4f45-9708-019B960494DF}">
-                <a14:hiddenLine xmlns:a14="http://schemas.microsoft.com/office/drawing/2010/main" xmlns="" w="9525">
+                <a14:hiddenLine xmlns="" xmlns:a14="http://schemas.microsoft.com/office/drawing/2010/main" w="9525">
                   <a:solidFill>
                     <a:srgbClr val="000000"/>
                   </a:solidFill>
@@ -6671,7 +6679,7 @@
             </a:ln>
             <a:extLst>
               <a:ext uri="{91240B29-F687-4f45-9708-019B960494DF}">
-                <a14:hiddenLine xmlns:a14="http://schemas.microsoft.com/office/drawing/2010/main" xmlns="" w="9525">
+                <a14:hiddenLine xmlns="" xmlns:a14="http://schemas.microsoft.com/office/drawing/2010/main" w="9525">
                   <a:solidFill>
                     <a:srgbClr val="000000"/>
                   </a:solidFill>
@@ -6733,7 +6741,7 @@
             </a:ln>
             <a:extLst>
               <a:ext uri="{91240B29-F687-4f45-9708-019B960494DF}">
-                <a14:hiddenLine xmlns:a14="http://schemas.microsoft.com/office/drawing/2010/main" xmlns="" w="9525">
+                <a14:hiddenLine xmlns="" xmlns:a14="http://schemas.microsoft.com/office/drawing/2010/main" w="9525">
                   <a:solidFill>
                     <a:srgbClr val="000000"/>
                   </a:solidFill>
@@ -6823,7 +6831,7 @@
             </a:ln>
             <a:extLst>
               <a:ext uri="{91240B29-F687-4f45-9708-019B960494DF}">
-                <a14:hiddenLine xmlns:a14="http://schemas.microsoft.com/office/drawing/2010/main" xmlns="" w="9525">
+                <a14:hiddenLine xmlns="" xmlns:a14="http://schemas.microsoft.com/office/drawing/2010/main" w="9525">
                   <a:solidFill>
                     <a:srgbClr val="000000"/>
                   </a:solidFill>
@@ -6885,7 +6893,7 @@
             </a:ln>
             <a:extLst>
               <a:ext uri="{91240B29-F687-4f45-9708-019B960494DF}">
-                <a14:hiddenLine xmlns:a14="http://schemas.microsoft.com/office/drawing/2010/main" xmlns="" w="9525">
+                <a14:hiddenLine xmlns="" xmlns:a14="http://schemas.microsoft.com/office/drawing/2010/main" w="9525">
                   <a:solidFill>
                     <a:srgbClr val="000000"/>
                   </a:solidFill>
@@ -6975,7 +6983,7 @@
             </a:ln>
             <a:extLst>
               <a:ext uri="{91240B29-F687-4f45-9708-019B960494DF}">
-                <a14:hiddenLine xmlns:a14="http://schemas.microsoft.com/office/drawing/2010/main" xmlns="" w="9525">
+                <a14:hiddenLine xmlns="" xmlns:a14="http://schemas.microsoft.com/office/drawing/2010/main" w="9525">
                   <a:solidFill>
                     <a:srgbClr val="000000"/>
                   </a:solidFill>
@@ -7009,7 +7017,7 @@
             </a:ln>
             <a:extLst>
               <a:ext uri="{91240B29-F687-4f45-9708-019B960494DF}">
-                <a14:hiddenLine xmlns:a14="http://schemas.microsoft.com/office/drawing/2010/main" xmlns="" w="9525">
+                <a14:hiddenLine xmlns="" xmlns:a14="http://schemas.microsoft.com/office/drawing/2010/main" w="9525">
                   <a:solidFill>
                     <a:srgbClr val="000000"/>
                   </a:solidFill>
@@ -7074,7 +7082,7 @@
             </a:ln>
             <a:extLst>
               <a:ext uri="{91240B29-F687-4f45-9708-019B960494DF}">
-                <a14:hiddenLine xmlns:a14="http://schemas.microsoft.com/office/drawing/2010/main" xmlns="" w="9525">
+                <a14:hiddenLine xmlns="" xmlns:a14="http://schemas.microsoft.com/office/drawing/2010/main" w="9525">
                   <a:solidFill>
                     <a:srgbClr val="000000"/>
                   </a:solidFill>
@@ -7164,7 +7172,7 @@
             </a:ln>
             <a:extLst>
               <a:ext uri="{91240B29-F687-4f45-9708-019B960494DF}">
-                <a14:hiddenLine xmlns:a14="http://schemas.microsoft.com/office/drawing/2010/main" xmlns="" w="9525">
+                <a14:hiddenLine xmlns="" xmlns:a14="http://schemas.microsoft.com/office/drawing/2010/main" w="9525">
                   <a:solidFill>
                     <a:srgbClr val="000000"/>
                   </a:solidFill>
@@ -7226,7 +7234,7 @@
             </a:ln>
             <a:extLst>
               <a:ext uri="{91240B29-F687-4f45-9708-019B960494DF}">
-                <a14:hiddenLine xmlns:a14="http://schemas.microsoft.com/office/drawing/2010/main" xmlns="" w="9525">
+                <a14:hiddenLine xmlns="" xmlns:a14="http://schemas.microsoft.com/office/drawing/2010/main" w="9525">
                   <a:solidFill>
                     <a:srgbClr val="000000"/>
                   </a:solidFill>
@@ -7316,7 +7324,7 @@
             </a:ln>
             <a:extLst>
               <a:ext uri="{91240B29-F687-4f45-9708-019B960494DF}">
-                <a14:hiddenLine xmlns:a14="http://schemas.microsoft.com/office/drawing/2010/main" xmlns="" w="9525">
+                <a14:hiddenLine xmlns="" xmlns:a14="http://schemas.microsoft.com/office/drawing/2010/main" w="9525">
                   <a:solidFill>
                     <a:srgbClr val="000000"/>
                   </a:solidFill>
@@ -7406,7 +7414,7 @@
             </a:ln>
             <a:extLst>
               <a:ext uri="{91240B29-F687-4f45-9708-019B960494DF}">
-                <a14:hiddenLine xmlns:a14="http://schemas.microsoft.com/office/drawing/2010/main" xmlns="" w="9525">
+                <a14:hiddenLine xmlns="" xmlns:a14="http://schemas.microsoft.com/office/drawing/2010/main" w="9525">
                   <a:solidFill>
                     <a:srgbClr val="000000"/>
                   </a:solidFill>
@@ -7471,7 +7479,7 @@
             </a:ln>
             <a:extLst>
               <a:ext uri="{91240B29-F687-4f45-9708-019B960494DF}">
-                <a14:hiddenLine xmlns:a14="http://schemas.microsoft.com/office/drawing/2010/main" xmlns="" w="9525">
+                <a14:hiddenLine xmlns="" xmlns:a14="http://schemas.microsoft.com/office/drawing/2010/main" w="9525">
                   <a:solidFill>
                     <a:srgbClr val="000000"/>
                   </a:solidFill>
@@ -7533,7 +7541,7 @@
             </a:ln>
             <a:extLst>
               <a:ext uri="{91240B29-F687-4f45-9708-019B960494DF}">
-                <a14:hiddenLine xmlns:a14="http://schemas.microsoft.com/office/drawing/2010/main" xmlns="" w="9525">
+                <a14:hiddenLine xmlns="" xmlns:a14="http://schemas.microsoft.com/office/drawing/2010/main" w="9525">
                   <a:solidFill>
                     <a:srgbClr val="000000"/>
                   </a:solidFill>
@@ -7623,7 +7631,7 @@
             </a:ln>
             <a:extLst>
               <a:ext uri="{91240B29-F687-4f45-9708-019B960494DF}">
-                <a14:hiddenLine xmlns:a14="http://schemas.microsoft.com/office/drawing/2010/main" xmlns="" w="9525">
+                <a14:hiddenLine xmlns="" xmlns:a14="http://schemas.microsoft.com/office/drawing/2010/main" w="9525">
                   <a:solidFill>
                     <a:srgbClr val="000000"/>
                   </a:solidFill>
@@ -7713,7 +7721,7 @@
             </a:ln>
             <a:extLst>
               <a:ext uri="{91240B29-F687-4f45-9708-019B960494DF}">
-                <a14:hiddenLine xmlns:a14="http://schemas.microsoft.com/office/drawing/2010/main" xmlns="" w="9525">
+                <a14:hiddenLine xmlns="" xmlns:a14="http://schemas.microsoft.com/office/drawing/2010/main" w="9525">
                   <a:solidFill>
                     <a:srgbClr val="000000"/>
                   </a:solidFill>
@@ -7775,7 +7783,7 @@
             </a:ln>
             <a:extLst>
               <a:ext uri="{91240B29-F687-4f45-9708-019B960494DF}">
-                <a14:hiddenLine xmlns:a14="http://schemas.microsoft.com/office/drawing/2010/main" xmlns="" w="9525">
+                <a14:hiddenLine xmlns="" xmlns:a14="http://schemas.microsoft.com/office/drawing/2010/main" w="9525">
                   <a:solidFill>
                     <a:srgbClr val="000000"/>
                   </a:solidFill>
@@ -7895,7 +7903,7 @@
             </a:ln>
             <a:extLst>
               <a:ext uri="{91240B29-F687-4f45-9708-019B960494DF}">
-                <a14:hiddenLine xmlns:a14="http://schemas.microsoft.com/office/drawing/2010/main" xmlns="" w="9525">
+                <a14:hiddenLine xmlns="" xmlns:a14="http://schemas.microsoft.com/office/drawing/2010/main" w="9525">
                   <a:solidFill>
                     <a:srgbClr val="000000"/>
                   </a:solidFill>
@@ -7963,7 +7971,7 @@
             </a:ln>
             <a:extLst>
               <a:ext uri="{91240B29-F687-4f45-9708-019B960494DF}">
-                <a14:hiddenLine xmlns:a14="http://schemas.microsoft.com/office/drawing/2010/main" xmlns="" w="9525">
+                <a14:hiddenLine xmlns="" xmlns:a14="http://schemas.microsoft.com/office/drawing/2010/main" w="9525">
                   <a:solidFill>
                     <a:srgbClr val="000000"/>
                   </a:solidFill>
@@ -8053,7 +8061,7 @@
             </a:ln>
             <a:extLst>
               <a:ext uri="{91240B29-F687-4f45-9708-019B960494DF}">
-                <a14:hiddenLine xmlns:a14="http://schemas.microsoft.com/office/drawing/2010/main" xmlns="" w="9525">
+                <a14:hiddenLine xmlns="" xmlns:a14="http://schemas.microsoft.com/office/drawing/2010/main" w="9525">
                   <a:solidFill>
                     <a:srgbClr val="000000"/>
                   </a:solidFill>
@@ -13980,7 +13988,7 @@
           <a:noFill/>
           <a:extLst>
             <a:ext uri="{909E8E84-426E-40dd-AFC4-6F175D3DCCD1}">
-              <a14:hiddenFill xmlns:a14="http://schemas.microsoft.com/office/drawing/2010/main" xmlns="">
+              <a14:hiddenFill xmlns="" xmlns:a14="http://schemas.microsoft.com/office/drawing/2010/main">
                 <a:solidFill>
                   <a:srgbClr val="FFFFFF"/>
                 </a:solidFill>
@@ -14060,7 +14068,7 @@
               </a:ln>
               <a:extLst>
                 <a:ext uri="{91240B29-F687-4f45-9708-019B960494DF}">
-                  <a14:hiddenLine xmlns:a14="http://schemas.microsoft.com/office/drawing/2010/main" xmlns="" w="9525">
+                  <a14:hiddenLine xmlns="" xmlns:a14="http://schemas.microsoft.com/office/drawing/2010/main" w="9525">
                     <a:solidFill>
                       <a:srgbClr val="000000"/>
                     </a:solidFill>
@@ -14150,7 +14158,7 @@
               </a:ln>
               <a:extLst>
                 <a:ext uri="{91240B29-F687-4f45-9708-019B960494DF}">
-                  <a14:hiddenLine xmlns:a14="http://schemas.microsoft.com/office/drawing/2010/main" xmlns="" w="9525">
+                  <a14:hiddenLine xmlns="" xmlns:a14="http://schemas.microsoft.com/office/drawing/2010/main" w="9525">
                     <a:solidFill>
                       <a:srgbClr val="000000"/>
                     </a:solidFill>
@@ -14240,7 +14248,7 @@
               </a:ln>
               <a:extLst>
                 <a:ext uri="{91240B29-F687-4f45-9708-019B960494DF}">
-                  <a14:hiddenLine xmlns:a14="http://schemas.microsoft.com/office/drawing/2010/main" xmlns="" w="9525">
+                  <a14:hiddenLine xmlns="" xmlns:a14="http://schemas.microsoft.com/office/drawing/2010/main" w="9525">
                     <a:solidFill>
                       <a:srgbClr val="000000"/>
                     </a:solidFill>
@@ -14302,7 +14310,7 @@
               </a:ln>
               <a:extLst>
                 <a:ext uri="{91240B29-F687-4f45-9708-019B960494DF}">
-                  <a14:hiddenLine xmlns:a14="http://schemas.microsoft.com/office/drawing/2010/main" xmlns="" w="9525">
+                  <a14:hiddenLine xmlns="" xmlns:a14="http://schemas.microsoft.com/office/drawing/2010/main" w="9525">
                     <a:solidFill>
                       <a:srgbClr val="000000"/>
                     </a:solidFill>
@@ -14392,7 +14400,7 @@
               </a:ln>
               <a:extLst>
                 <a:ext uri="{91240B29-F687-4f45-9708-019B960494DF}">
-                  <a14:hiddenLine xmlns:a14="http://schemas.microsoft.com/office/drawing/2010/main" xmlns="" w="9525">
+                  <a14:hiddenLine xmlns="" xmlns:a14="http://schemas.microsoft.com/office/drawing/2010/main" w="9525">
                     <a:solidFill>
                       <a:srgbClr val="000000"/>
                     </a:solidFill>
@@ -14454,7 +14462,7 @@
               </a:ln>
               <a:extLst>
                 <a:ext uri="{91240B29-F687-4f45-9708-019B960494DF}">
-                  <a14:hiddenLine xmlns:a14="http://schemas.microsoft.com/office/drawing/2010/main" xmlns="" w="9525">
+                  <a14:hiddenLine xmlns="" xmlns:a14="http://schemas.microsoft.com/office/drawing/2010/main" w="9525">
                     <a:solidFill>
                       <a:srgbClr val="000000"/>
                     </a:solidFill>
@@ -14516,7 +14524,7 @@
               </a:ln>
               <a:extLst>
                 <a:ext uri="{91240B29-F687-4f45-9708-019B960494DF}">
-                  <a14:hiddenLine xmlns:a14="http://schemas.microsoft.com/office/drawing/2010/main" xmlns="" w="9525">
+                  <a14:hiddenLine xmlns="" xmlns:a14="http://schemas.microsoft.com/office/drawing/2010/main" w="9525">
                     <a:solidFill>
                       <a:srgbClr val="000000"/>
                     </a:solidFill>
@@ -14606,7 +14614,7 @@
               </a:ln>
               <a:extLst>
                 <a:ext uri="{91240B29-F687-4f45-9708-019B960494DF}">
-                  <a14:hiddenLine xmlns:a14="http://schemas.microsoft.com/office/drawing/2010/main" xmlns="" w="9525">
+                  <a14:hiddenLine xmlns="" xmlns:a14="http://schemas.microsoft.com/office/drawing/2010/main" w="9525">
                     <a:solidFill>
                       <a:srgbClr val="000000"/>
                     </a:solidFill>
@@ -14696,7 +14704,7 @@
               </a:ln>
               <a:extLst>
                 <a:ext uri="{91240B29-F687-4f45-9708-019B960494DF}">
-                  <a14:hiddenLine xmlns:a14="http://schemas.microsoft.com/office/drawing/2010/main" xmlns="" w="9525">
+                  <a14:hiddenLine xmlns="" xmlns:a14="http://schemas.microsoft.com/office/drawing/2010/main" w="9525">
                     <a:solidFill>
                       <a:srgbClr val="000000"/>
                     </a:solidFill>
@@ -14758,7 +14766,7 @@
               </a:ln>
               <a:extLst>
                 <a:ext uri="{91240B29-F687-4f45-9708-019B960494DF}">
-                  <a14:hiddenLine xmlns:a14="http://schemas.microsoft.com/office/drawing/2010/main" xmlns="" w="9525">
+                  <a14:hiddenLine xmlns="" xmlns:a14="http://schemas.microsoft.com/office/drawing/2010/main" w="9525">
                     <a:solidFill>
                       <a:srgbClr val="000000"/>
                     </a:solidFill>
@@ -14868,7 +14876,7 @@
               </a:ln>
               <a:extLst>
                 <a:ext uri="{91240B29-F687-4f45-9708-019B960494DF}">
-                  <a14:hiddenLine xmlns:a14="http://schemas.microsoft.com/office/drawing/2010/main" xmlns="" w="9525">
+                  <a14:hiddenLine xmlns="" xmlns:a14="http://schemas.microsoft.com/office/drawing/2010/main" w="9525">
                     <a:solidFill>
                       <a:srgbClr val="000000"/>
                     </a:solidFill>
@@ -14952,7 +14960,7 @@
               </a:ln>
               <a:extLst>
                 <a:ext uri="{91240B29-F687-4f45-9708-019B960494DF}">
-                  <a14:hiddenLine xmlns:a14="http://schemas.microsoft.com/office/drawing/2010/main" xmlns="" w="9525">
+                  <a14:hiddenLine xmlns="" xmlns:a14="http://schemas.microsoft.com/office/drawing/2010/main" w="9525">
                     <a:solidFill>
                       <a:srgbClr val="000000"/>
                     </a:solidFill>
@@ -15014,7 +15022,7 @@
               </a:ln>
               <a:extLst>
                 <a:ext uri="{91240B29-F687-4f45-9708-019B960494DF}">
-                  <a14:hiddenLine xmlns:a14="http://schemas.microsoft.com/office/drawing/2010/main" xmlns="" w="9525">
+                  <a14:hiddenLine xmlns="" xmlns:a14="http://schemas.microsoft.com/office/drawing/2010/main" w="9525">
                     <a:solidFill>
                       <a:srgbClr val="000000"/>
                     </a:solidFill>
@@ -15076,7 +15084,7 @@
               </a:ln>
               <a:extLst>
                 <a:ext uri="{91240B29-F687-4f45-9708-019B960494DF}">
-                  <a14:hiddenLine xmlns:a14="http://schemas.microsoft.com/office/drawing/2010/main" xmlns="" w="9525">
+                  <a14:hiddenLine xmlns="" xmlns:a14="http://schemas.microsoft.com/office/drawing/2010/main" w="9525">
                     <a:solidFill>
                       <a:srgbClr val="000000"/>
                     </a:solidFill>
@@ -15166,7 +15174,7 @@
               </a:ln>
               <a:extLst>
                 <a:ext uri="{91240B29-F687-4f45-9708-019B960494DF}">
-                  <a14:hiddenLine xmlns:a14="http://schemas.microsoft.com/office/drawing/2010/main" xmlns="" w="9525">
+                  <a14:hiddenLine xmlns="" xmlns:a14="http://schemas.microsoft.com/office/drawing/2010/main" w="9525">
                     <a:solidFill>
                       <a:srgbClr val="000000"/>
                     </a:solidFill>
@@ -15200,7 +15208,7 @@
               </a:ln>
               <a:extLst>
                 <a:ext uri="{91240B29-F687-4f45-9708-019B960494DF}">
-                  <a14:hiddenLine xmlns:a14="http://schemas.microsoft.com/office/drawing/2010/main" xmlns="" w="9525">
+                  <a14:hiddenLine xmlns="" xmlns:a14="http://schemas.microsoft.com/office/drawing/2010/main" w="9525">
                     <a:solidFill>
                       <a:srgbClr val="000000"/>
                     </a:solidFill>
@@ -15265,7 +15273,7 @@
               </a:ln>
               <a:extLst>
                 <a:ext uri="{91240B29-F687-4f45-9708-019B960494DF}">
-                  <a14:hiddenLine xmlns:a14="http://schemas.microsoft.com/office/drawing/2010/main" xmlns="" w="9525">
+                  <a14:hiddenLine xmlns="" xmlns:a14="http://schemas.microsoft.com/office/drawing/2010/main" w="9525">
                     <a:solidFill>
                       <a:srgbClr val="000000"/>
                     </a:solidFill>
@@ -15355,7 +15363,7 @@
               </a:ln>
               <a:extLst>
                 <a:ext uri="{91240B29-F687-4f45-9708-019B960494DF}">
-                  <a14:hiddenLine xmlns:a14="http://schemas.microsoft.com/office/drawing/2010/main" xmlns="" w="9525">
+                  <a14:hiddenLine xmlns="" xmlns:a14="http://schemas.microsoft.com/office/drawing/2010/main" w="9525">
                     <a:solidFill>
                       <a:srgbClr val="000000"/>
                     </a:solidFill>
@@ -15417,7 +15425,7 @@
               </a:ln>
               <a:extLst>
                 <a:ext uri="{91240B29-F687-4f45-9708-019B960494DF}">
-                  <a14:hiddenLine xmlns:a14="http://schemas.microsoft.com/office/drawing/2010/main" xmlns="" w="9525">
+                  <a14:hiddenLine xmlns="" xmlns:a14="http://schemas.microsoft.com/office/drawing/2010/main" w="9525">
                     <a:solidFill>
                       <a:srgbClr val="000000"/>
                     </a:solidFill>
@@ -15507,7 +15515,7 @@
               </a:ln>
               <a:extLst>
                 <a:ext uri="{91240B29-F687-4f45-9708-019B960494DF}">
-                  <a14:hiddenLine xmlns:a14="http://schemas.microsoft.com/office/drawing/2010/main" xmlns="" w="9525">
+                  <a14:hiddenLine xmlns="" xmlns:a14="http://schemas.microsoft.com/office/drawing/2010/main" w="9525">
                     <a:solidFill>
                       <a:srgbClr val="000000"/>
                     </a:solidFill>
@@ -15572,7 +15580,7 @@
               </a:ln>
               <a:extLst>
                 <a:ext uri="{91240B29-F687-4f45-9708-019B960494DF}">
-                  <a14:hiddenLine xmlns:a14="http://schemas.microsoft.com/office/drawing/2010/main" xmlns="" w="9525">
+                  <a14:hiddenLine xmlns="" xmlns:a14="http://schemas.microsoft.com/office/drawing/2010/main" w="9525">
                     <a:solidFill>
                       <a:srgbClr val="000000"/>
                     </a:solidFill>
@@ -15634,7 +15642,7 @@
               </a:ln>
               <a:extLst>
                 <a:ext uri="{91240B29-F687-4f45-9708-019B960494DF}">
-                  <a14:hiddenLine xmlns:a14="http://schemas.microsoft.com/office/drawing/2010/main" xmlns="" w="9525">
+                  <a14:hiddenLine xmlns="" xmlns:a14="http://schemas.microsoft.com/office/drawing/2010/main" w="9525">
                     <a:solidFill>
                       <a:srgbClr val="000000"/>
                     </a:solidFill>
@@ -15724,7 +15732,7 @@
               </a:ln>
               <a:extLst>
                 <a:ext uri="{91240B29-F687-4f45-9708-019B960494DF}">
-                  <a14:hiddenLine xmlns:a14="http://schemas.microsoft.com/office/drawing/2010/main" xmlns="" w="9525">
+                  <a14:hiddenLine xmlns="" xmlns:a14="http://schemas.microsoft.com/office/drawing/2010/main" w="9525">
                     <a:solidFill>
                       <a:srgbClr val="000000"/>
                     </a:solidFill>
@@ -15814,7 +15822,7 @@
               </a:ln>
               <a:extLst>
                 <a:ext uri="{91240B29-F687-4f45-9708-019B960494DF}">
-                  <a14:hiddenLine xmlns:a14="http://schemas.microsoft.com/office/drawing/2010/main" xmlns="" w="9525">
+                  <a14:hiddenLine xmlns="" xmlns:a14="http://schemas.microsoft.com/office/drawing/2010/main" w="9525">
                     <a:solidFill>
                       <a:srgbClr val="000000"/>
                     </a:solidFill>
@@ -15879,7 +15887,7 @@
               </a:ln>
               <a:extLst>
                 <a:ext uri="{91240B29-F687-4f45-9708-019B960494DF}">
-                  <a14:hiddenLine xmlns:a14="http://schemas.microsoft.com/office/drawing/2010/main" xmlns="" w="9525">
+                  <a14:hiddenLine xmlns="" xmlns:a14="http://schemas.microsoft.com/office/drawing/2010/main" w="9525">
                     <a:solidFill>
                       <a:srgbClr val="000000"/>
                     </a:solidFill>
@@ -15999,7 +16007,7 @@
               </a:ln>
               <a:extLst>
                 <a:ext uri="{91240B29-F687-4f45-9708-019B960494DF}">
-                  <a14:hiddenLine xmlns:a14="http://schemas.microsoft.com/office/drawing/2010/main" xmlns="" w="9525">
+                  <a14:hiddenLine xmlns="" xmlns:a14="http://schemas.microsoft.com/office/drawing/2010/main" w="9525">
                     <a:solidFill>
                       <a:srgbClr val="000000"/>
                     </a:solidFill>
@@ -16097,7 +16105,7 @@
               </a:ln>
               <a:extLst>
                 <a:ext uri="{91240B29-F687-4f45-9708-019B960494DF}">
-                  <a14:hiddenLine xmlns:a14="http://schemas.microsoft.com/office/drawing/2010/main" xmlns="" w="9525">
+                  <a14:hiddenLine xmlns="" xmlns:a14="http://schemas.microsoft.com/office/drawing/2010/main" w="9525">
                     <a:solidFill>
                       <a:srgbClr val="000000"/>
                     </a:solidFill>
@@ -16212,7 +16220,7 @@
               </a:ln>
               <a:extLst>
                 <a:ext uri="{91240B29-F687-4f45-9708-019B960494DF}">
-                  <a14:hiddenLine xmlns:a14="http://schemas.microsoft.com/office/drawing/2010/main" xmlns="" w="9525">
+                  <a14:hiddenLine xmlns="" xmlns:a14="http://schemas.microsoft.com/office/drawing/2010/main" w="9525">
                     <a:solidFill>
                       <a:srgbClr val="000000"/>
                     </a:solidFill>
@@ -16302,7 +16310,7 @@
               </a:ln>
               <a:extLst>
                 <a:ext uri="{91240B29-F687-4f45-9708-019B960494DF}">
-                  <a14:hiddenLine xmlns:a14="http://schemas.microsoft.com/office/drawing/2010/main" xmlns="" w="9525">
+                  <a14:hiddenLine xmlns="" xmlns:a14="http://schemas.microsoft.com/office/drawing/2010/main" w="9525">
                     <a:solidFill>
                       <a:srgbClr val="000000"/>
                     </a:solidFill>
@@ -16367,7 +16375,7 @@
               </a:ln>
               <a:extLst>
                 <a:ext uri="{91240B29-F687-4f45-9708-019B960494DF}">
-                  <a14:hiddenLine xmlns:a14="http://schemas.microsoft.com/office/drawing/2010/main" xmlns="" w="9525">
+                  <a14:hiddenLine xmlns="" xmlns:a14="http://schemas.microsoft.com/office/drawing/2010/main" w="9525">
                     <a:solidFill>
                       <a:srgbClr val="000000"/>
                     </a:solidFill>
@@ -16457,7 +16465,7 @@
               </a:ln>
               <a:extLst>
                 <a:ext uri="{91240B29-F687-4f45-9708-019B960494DF}">
-                  <a14:hiddenLine xmlns:a14="http://schemas.microsoft.com/office/drawing/2010/main" xmlns="" w="9525">
+                  <a14:hiddenLine xmlns="" xmlns:a14="http://schemas.microsoft.com/office/drawing/2010/main" w="9525">
                     <a:solidFill>
                       <a:srgbClr val="000000"/>
                     </a:solidFill>
@@ -16525,7 +16533,7 @@
               </a:ln>
               <a:extLst>
                 <a:ext uri="{91240B29-F687-4f45-9708-019B960494DF}">
-                  <a14:hiddenLine xmlns:a14="http://schemas.microsoft.com/office/drawing/2010/main" xmlns="" w="9525">
+                  <a14:hiddenLine xmlns="" xmlns:a14="http://schemas.microsoft.com/office/drawing/2010/main" w="9525">
                     <a:solidFill>
                       <a:srgbClr val="000000"/>
                     </a:solidFill>
@@ -16615,7 +16623,7 @@
               </a:ln>
               <a:extLst>
                 <a:ext uri="{91240B29-F687-4f45-9708-019B960494DF}">
-                  <a14:hiddenLine xmlns:a14="http://schemas.microsoft.com/office/drawing/2010/main" xmlns="" w="9525">
+                  <a14:hiddenLine xmlns="" xmlns:a14="http://schemas.microsoft.com/office/drawing/2010/main" w="9525">
                     <a:solidFill>
                       <a:srgbClr val="000000"/>
                     </a:solidFill>
@@ -16683,7 +16691,7 @@
               </a:ln>
               <a:extLst>
                 <a:ext uri="{91240B29-F687-4f45-9708-019B960494DF}">
-                  <a14:hiddenLine xmlns:a14="http://schemas.microsoft.com/office/drawing/2010/main" xmlns="" w="9525">
+                  <a14:hiddenLine xmlns="" xmlns:a14="http://schemas.microsoft.com/office/drawing/2010/main" w="9525">
                     <a:solidFill>
                       <a:srgbClr val="000000"/>
                     </a:solidFill>
@@ -16773,7 +16781,7 @@
               </a:ln>
               <a:extLst>
                 <a:ext uri="{91240B29-F687-4f45-9708-019B960494DF}">
-                  <a14:hiddenLine xmlns:a14="http://schemas.microsoft.com/office/drawing/2010/main" xmlns="" w="9525">
+                  <a14:hiddenLine xmlns="" xmlns:a14="http://schemas.microsoft.com/office/drawing/2010/main" w="9525">
                     <a:solidFill>
                       <a:srgbClr val="000000"/>
                     </a:solidFill>
@@ -16807,7 +16815,7 @@
               </a:ln>
               <a:extLst>
                 <a:ext uri="{91240B29-F687-4f45-9708-019B960494DF}">
-                  <a14:hiddenLine xmlns:a14="http://schemas.microsoft.com/office/drawing/2010/main" xmlns="" w="9525">
+                  <a14:hiddenLine xmlns="" xmlns:a14="http://schemas.microsoft.com/office/drawing/2010/main" w="9525">
                     <a:solidFill>
                       <a:srgbClr val="000000"/>
                     </a:solidFill>

</xml_diff>

<commit_message>
TaskScheduler: Add a note, fix the PDF
</commit_message>
<xml_diff>
--- a/TaskScheduler/TaskScheduler.pptx
+++ b/TaskScheduler/TaskScheduler.pptx
@@ -1010,7 +1010,7 @@
           <a:p>
             <a:fld id="{857CC94D-E614-4874-A919-F25B27309A09}" type="datetimeFigureOut">
               <a:rPr lang="en-CA" smtClean="0"/>
-              <a:t>2024-08-20</a:t>
+              <a:t>2024-08-28</a:t>
             </a:fld>
             <a:endParaRPr lang="en-CA"/>
           </a:p>
@@ -2691,7 +2691,7 @@
           <a:bodyPr/>
           <a:lstStyle/>
           <a:p>
-            <a:pPr marL="0" marR="0" lvl="0" indent="0" algn="l" defTabSz="914400" rtl="0" eaLnBrk="1" fontAlgn="auto" latinLnBrk="0" hangingPunct="1">
+            <a:pPr marL="171450" marR="0" lvl="0" indent="-171450" algn="l" defTabSz="914400" rtl="0" eaLnBrk="1" fontAlgn="auto" latinLnBrk="0" hangingPunct="1">
               <a:lnSpc>
                 <a:spcPct val="100000"/>
               </a:lnSpc>
@@ -2703,8 +2703,8 @@
               </a:spcAft>
               <a:buClrTx/>
               <a:buSzTx/>
-              <a:buFontTx/>
-              <a:buNone/>
+              <a:buFont typeface="Arial" panose="020B0604020202020204" pitchFamily="34" charset="0"/>
+              <a:buChar char="•"/>
               <a:tabLst/>
               <a:defRPr/>
             </a:pPr>
@@ -2718,11 +2718,42 @@
             </a:r>
             <a:r>
               <a:rPr lang="en-CA" dirty="0"/>
-              <a:t> Systems for a </a:t>
-            </a:r>
-            <a:r>
-              <a:rPr lang="en-CA"/>
-              <a:t>long time</a:t>
+              <a:t> Systems for a long time</a:t>
+            </a:r>
+          </a:p>
+          <a:p>
+            <a:pPr marL="171450" marR="0" lvl="0" indent="-171450" algn="l" defTabSz="914400" rtl="0" eaLnBrk="1" fontAlgn="auto" latinLnBrk="0" hangingPunct="1">
+              <a:lnSpc>
+                <a:spcPct val="100000"/>
+              </a:lnSpc>
+              <a:spcBef>
+                <a:spcPts val="0"/>
+              </a:spcBef>
+              <a:spcAft>
+                <a:spcPts val="0"/>
+              </a:spcAft>
+              <a:buClrTx/>
+              <a:buSzTx/>
+              <a:buFont typeface="Arial" panose="020B0604020202020204" pitchFamily="34" charset="0"/>
+              <a:buChar char="•"/>
+              <a:tabLst/>
+              <a:defRPr/>
+            </a:pPr>
+            <a:r>
+              <a:rPr lang="en-CA" dirty="0"/>
+              <a:t>This is based on my hobby projects – I don’t have </a:t>
+            </a:r>
+            <a:r>
+              <a:rPr lang="en-CA" i="1" dirty="0"/>
+              <a:t>professional</a:t>
+            </a:r>
+            <a:r>
+              <a:rPr lang="en-CA" i="0" dirty="0"/>
+              <a:t> experience in embedded </a:t>
+            </a:r>
+            <a:r>
+              <a:rPr lang="en-CA" i="0"/>
+              <a:t>systems programming</a:t>
             </a:r>
             <a:endParaRPr lang="en-CA" dirty="0"/>
           </a:p>
@@ -3969,7 +4000,7 @@
           <a:noFill/>
           <a:extLst>
             <a:ext uri="{909E8E84-426E-40dd-AFC4-6F175D3DCCD1}">
-              <a14:hiddenFill xmlns="" xmlns:a14="http://schemas.microsoft.com/office/drawing/2010/main">
+              <a14:hiddenFill xmlns:a14="http://schemas.microsoft.com/office/drawing/2010/main" xmlns="">
                 <a:solidFill>
                   <a:srgbClr val="FFFFFF"/>
                 </a:solidFill>
@@ -4035,7 +4066,7 @@
             </a:ln>
             <a:extLst>
               <a:ext uri="{91240B29-F687-4f45-9708-019B960494DF}">
-                <a14:hiddenLine xmlns="" xmlns:a14="http://schemas.microsoft.com/office/drawing/2010/main" w="9525">
+                <a14:hiddenLine xmlns:a14="http://schemas.microsoft.com/office/drawing/2010/main" xmlns="" w="9525">
                   <a:solidFill>
                     <a:srgbClr val="000000"/>
                   </a:solidFill>
@@ -4125,7 +4156,7 @@
             </a:ln>
             <a:extLst>
               <a:ext uri="{91240B29-F687-4f45-9708-019B960494DF}">
-                <a14:hiddenLine xmlns="" xmlns:a14="http://schemas.microsoft.com/office/drawing/2010/main" w="9525">
+                <a14:hiddenLine xmlns:a14="http://schemas.microsoft.com/office/drawing/2010/main" xmlns="" w="9525">
                   <a:solidFill>
                     <a:srgbClr val="000000"/>
                   </a:solidFill>
@@ -4215,7 +4246,7 @@
             </a:ln>
             <a:extLst>
               <a:ext uri="{91240B29-F687-4f45-9708-019B960494DF}">
-                <a14:hiddenLine xmlns="" xmlns:a14="http://schemas.microsoft.com/office/drawing/2010/main" w="9525">
+                <a14:hiddenLine xmlns:a14="http://schemas.microsoft.com/office/drawing/2010/main" xmlns="" w="9525">
                   <a:solidFill>
                     <a:srgbClr val="000000"/>
                   </a:solidFill>
@@ -4249,7 +4280,7 @@
             </a:ln>
             <a:extLst>
               <a:ext uri="{91240B29-F687-4f45-9708-019B960494DF}">
-                <a14:hiddenLine xmlns="" xmlns:a14="http://schemas.microsoft.com/office/drawing/2010/main" w="9525">
+                <a14:hiddenLine xmlns:a14="http://schemas.microsoft.com/office/drawing/2010/main" xmlns="" w="9525">
                   <a:solidFill>
                     <a:srgbClr val="000000"/>
                   </a:solidFill>
@@ -4339,7 +4370,7 @@
             </a:ln>
             <a:extLst>
               <a:ext uri="{91240B29-F687-4f45-9708-019B960494DF}">
-                <a14:hiddenLine xmlns="" xmlns:a14="http://schemas.microsoft.com/office/drawing/2010/main" w="9525">
+                <a14:hiddenLine xmlns:a14="http://schemas.microsoft.com/office/drawing/2010/main" xmlns="" w="9525">
                   <a:solidFill>
                     <a:srgbClr val="000000"/>
                   </a:solidFill>
@@ -4401,7 +4432,7 @@
             </a:ln>
             <a:extLst>
               <a:ext uri="{91240B29-F687-4f45-9708-019B960494DF}">
-                <a14:hiddenLine xmlns="" xmlns:a14="http://schemas.microsoft.com/office/drawing/2010/main" w="9525">
+                <a14:hiddenLine xmlns:a14="http://schemas.microsoft.com/office/drawing/2010/main" xmlns="" w="9525">
                   <a:solidFill>
                     <a:srgbClr val="000000"/>
                   </a:solidFill>
@@ -4463,7 +4494,7 @@
             </a:ln>
             <a:extLst>
               <a:ext uri="{91240B29-F687-4f45-9708-019B960494DF}">
-                <a14:hiddenLine xmlns="" xmlns:a14="http://schemas.microsoft.com/office/drawing/2010/main" w="9525">
+                <a14:hiddenLine xmlns:a14="http://schemas.microsoft.com/office/drawing/2010/main" xmlns="" w="9525">
                   <a:solidFill>
                     <a:srgbClr val="000000"/>
                   </a:solidFill>
@@ -4553,7 +4584,7 @@
             </a:ln>
             <a:extLst>
               <a:ext uri="{91240B29-F687-4f45-9708-019B960494DF}">
-                <a14:hiddenLine xmlns="" xmlns:a14="http://schemas.microsoft.com/office/drawing/2010/main" w="9525">
+                <a14:hiddenLine xmlns:a14="http://schemas.microsoft.com/office/drawing/2010/main" xmlns="" w="9525">
                   <a:solidFill>
                     <a:srgbClr val="000000"/>
                   </a:solidFill>
@@ -4615,7 +4646,7 @@
             </a:ln>
             <a:extLst>
               <a:ext uri="{91240B29-F687-4f45-9708-019B960494DF}">
-                <a14:hiddenLine xmlns="" xmlns:a14="http://schemas.microsoft.com/office/drawing/2010/main" w="9525">
+                <a14:hiddenLine xmlns:a14="http://schemas.microsoft.com/office/drawing/2010/main" xmlns="" w="9525">
                   <a:solidFill>
                     <a:srgbClr val="000000"/>
                   </a:solidFill>
@@ -4677,7 +4708,7 @@
             </a:ln>
             <a:extLst>
               <a:ext uri="{91240B29-F687-4f45-9708-019B960494DF}">
-                <a14:hiddenLine xmlns="" xmlns:a14="http://schemas.microsoft.com/office/drawing/2010/main" w="9525">
+                <a14:hiddenLine xmlns:a14="http://schemas.microsoft.com/office/drawing/2010/main" xmlns="" w="9525">
                   <a:solidFill>
                     <a:srgbClr val="000000"/>
                   </a:solidFill>
@@ -4767,7 +4798,7 @@
             </a:ln>
             <a:extLst>
               <a:ext uri="{91240B29-F687-4f45-9708-019B960494DF}">
-                <a14:hiddenLine xmlns="" xmlns:a14="http://schemas.microsoft.com/office/drawing/2010/main" w="9525">
+                <a14:hiddenLine xmlns:a14="http://schemas.microsoft.com/office/drawing/2010/main" xmlns="" w="9525">
                   <a:solidFill>
                     <a:srgbClr val="000000"/>
                   </a:solidFill>
@@ -4857,7 +4888,7 @@
             </a:ln>
             <a:extLst>
               <a:ext uri="{91240B29-F687-4f45-9708-019B960494DF}">
-                <a14:hiddenLine xmlns="" xmlns:a14="http://schemas.microsoft.com/office/drawing/2010/main" w="9525">
+                <a14:hiddenLine xmlns:a14="http://schemas.microsoft.com/office/drawing/2010/main" xmlns="" w="9525">
                   <a:solidFill>
                     <a:srgbClr val="000000"/>
                   </a:solidFill>
@@ -4919,7 +4950,7 @@
             </a:ln>
             <a:extLst>
               <a:ext uri="{91240B29-F687-4f45-9708-019B960494DF}">
-                <a14:hiddenLine xmlns="" xmlns:a14="http://schemas.microsoft.com/office/drawing/2010/main" w="9525">
+                <a14:hiddenLine xmlns:a14="http://schemas.microsoft.com/office/drawing/2010/main" xmlns="" w="9525">
                   <a:solidFill>
                     <a:srgbClr val="000000"/>
                   </a:solidFill>
@@ -5029,7 +5060,7 @@
             </a:ln>
             <a:extLst>
               <a:ext uri="{91240B29-F687-4f45-9708-019B960494DF}">
-                <a14:hiddenLine xmlns="" xmlns:a14="http://schemas.microsoft.com/office/drawing/2010/main" w="9525">
+                <a14:hiddenLine xmlns:a14="http://schemas.microsoft.com/office/drawing/2010/main" xmlns="" w="9525">
                   <a:solidFill>
                     <a:srgbClr val="000000"/>
                   </a:solidFill>
@@ -5091,7 +5122,7 @@
             </a:ln>
             <a:extLst>
               <a:ext uri="{91240B29-F687-4f45-9708-019B960494DF}">
-                <a14:hiddenLine xmlns="" xmlns:a14="http://schemas.microsoft.com/office/drawing/2010/main" w="9525">
+                <a14:hiddenLine xmlns:a14="http://schemas.microsoft.com/office/drawing/2010/main" xmlns="" w="9525">
                   <a:solidFill>
                     <a:srgbClr val="000000"/>
                   </a:solidFill>
@@ -5181,7 +5212,7 @@
             </a:ln>
             <a:extLst>
               <a:ext uri="{91240B29-F687-4f45-9708-019B960494DF}">
-                <a14:hiddenLine xmlns="" xmlns:a14="http://schemas.microsoft.com/office/drawing/2010/main" w="9525">
+                <a14:hiddenLine xmlns:a14="http://schemas.microsoft.com/office/drawing/2010/main" xmlns="" w="9525">
                   <a:solidFill>
                     <a:srgbClr val="000000"/>
                   </a:solidFill>
@@ -5271,7 +5302,7 @@
             </a:ln>
             <a:extLst>
               <a:ext uri="{91240B29-F687-4f45-9708-019B960494DF}">
-                <a14:hiddenLine xmlns="" xmlns:a14="http://schemas.microsoft.com/office/drawing/2010/main" w="9525">
+                <a14:hiddenLine xmlns:a14="http://schemas.microsoft.com/office/drawing/2010/main" xmlns="" w="9525">
                   <a:solidFill>
                     <a:srgbClr val="000000"/>
                   </a:solidFill>
@@ -5333,7 +5364,7 @@
             </a:ln>
             <a:extLst>
               <a:ext uri="{91240B29-F687-4f45-9708-019B960494DF}">
-                <a14:hiddenLine xmlns="" xmlns:a14="http://schemas.microsoft.com/office/drawing/2010/main" w="9525">
+                <a14:hiddenLine xmlns:a14="http://schemas.microsoft.com/office/drawing/2010/main" xmlns="" w="9525">
                   <a:solidFill>
                     <a:srgbClr val="000000"/>
                   </a:solidFill>
@@ -5423,7 +5454,7 @@
             </a:ln>
             <a:extLst>
               <a:ext uri="{91240B29-F687-4f45-9708-019B960494DF}">
-                <a14:hiddenLine xmlns="" xmlns:a14="http://schemas.microsoft.com/office/drawing/2010/main" w="9525">
+                <a14:hiddenLine xmlns:a14="http://schemas.microsoft.com/office/drawing/2010/main" xmlns="" w="9525">
                   <a:solidFill>
                     <a:srgbClr val="000000"/>
                   </a:solidFill>
@@ -5513,7 +5544,7 @@
             </a:ln>
             <a:extLst>
               <a:ext uri="{91240B29-F687-4f45-9708-019B960494DF}">
-                <a14:hiddenLine xmlns="" xmlns:a14="http://schemas.microsoft.com/office/drawing/2010/main" w="9525">
+                <a14:hiddenLine xmlns:a14="http://schemas.microsoft.com/office/drawing/2010/main" xmlns="" w="9525">
                   <a:solidFill>
                     <a:srgbClr val="000000"/>
                   </a:solidFill>
@@ -5569,7 +5600,7 @@
             </a:ln>
             <a:extLst>
               <a:ext uri="{91240B29-F687-4f45-9708-019B960494DF}">
-                <a14:hiddenLine xmlns="" xmlns:a14="http://schemas.microsoft.com/office/drawing/2010/main" w="9525">
+                <a14:hiddenLine xmlns:a14="http://schemas.microsoft.com/office/drawing/2010/main" xmlns="" w="9525">
                   <a:solidFill>
                     <a:srgbClr val="000000"/>
                   </a:solidFill>
@@ -5659,7 +5690,7 @@
             </a:ln>
             <a:extLst>
               <a:ext uri="{91240B29-F687-4f45-9708-019B960494DF}">
-                <a14:hiddenLine xmlns="" xmlns:a14="http://schemas.microsoft.com/office/drawing/2010/main" w="9525">
+                <a14:hiddenLine xmlns:a14="http://schemas.microsoft.com/office/drawing/2010/main" xmlns="" w="9525">
                   <a:solidFill>
                     <a:srgbClr val="000000"/>
                   </a:solidFill>
@@ -5715,7 +5746,7 @@
             </a:ln>
             <a:extLst>
               <a:ext uri="{91240B29-F687-4f45-9708-019B960494DF}">
-                <a14:hiddenLine xmlns="" xmlns:a14="http://schemas.microsoft.com/office/drawing/2010/main" w="9525">
+                <a14:hiddenLine xmlns:a14="http://schemas.microsoft.com/office/drawing/2010/main" xmlns="" w="9525">
                   <a:solidFill>
                     <a:srgbClr val="000000"/>
                   </a:solidFill>
@@ -5805,7 +5836,7 @@
             </a:ln>
             <a:extLst>
               <a:ext uri="{91240B29-F687-4f45-9708-019B960494DF}">
-                <a14:hiddenLine xmlns="" xmlns:a14="http://schemas.microsoft.com/office/drawing/2010/main" w="9525">
+                <a14:hiddenLine xmlns:a14="http://schemas.microsoft.com/office/drawing/2010/main" xmlns="" w="9525">
                   <a:solidFill>
                     <a:srgbClr val="000000"/>
                   </a:solidFill>
@@ -5873,7 +5904,7 @@
             </a:ln>
             <a:extLst>
               <a:ext uri="{91240B29-F687-4f45-9708-019B960494DF}">
-                <a14:hiddenLine xmlns="" xmlns:a14="http://schemas.microsoft.com/office/drawing/2010/main" w="9525">
+                <a14:hiddenLine xmlns:a14="http://schemas.microsoft.com/office/drawing/2010/main" xmlns="" w="9525">
                   <a:solidFill>
                     <a:srgbClr val="000000"/>
                   </a:solidFill>
@@ -5963,7 +5994,7 @@
             </a:ln>
             <a:extLst>
               <a:ext uri="{91240B29-F687-4f45-9708-019B960494DF}">
-                <a14:hiddenLine xmlns="" xmlns:a14="http://schemas.microsoft.com/office/drawing/2010/main" w="9525">
+                <a14:hiddenLine xmlns:a14="http://schemas.microsoft.com/office/drawing/2010/main" xmlns="" w="9525">
                   <a:solidFill>
                     <a:srgbClr val="000000"/>
                   </a:solidFill>
@@ -6031,7 +6062,7 @@
             </a:ln>
             <a:extLst>
               <a:ext uri="{91240B29-F687-4f45-9708-019B960494DF}">
-                <a14:hiddenLine xmlns="" xmlns:a14="http://schemas.microsoft.com/office/drawing/2010/main" w="9525">
+                <a14:hiddenLine xmlns:a14="http://schemas.microsoft.com/office/drawing/2010/main" xmlns="" w="9525">
                   <a:solidFill>
                     <a:srgbClr val="000000"/>
                   </a:solidFill>
@@ -6121,7 +6152,7 @@
             </a:ln>
             <a:extLst>
               <a:ext uri="{91240B29-F687-4f45-9708-019B960494DF}">
-                <a14:hiddenLine xmlns="" xmlns:a14="http://schemas.microsoft.com/office/drawing/2010/main" w="9525">
+                <a14:hiddenLine xmlns:a14="http://schemas.microsoft.com/office/drawing/2010/main" xmlns="" w="9525">
                   <a:solidFill>
                     <a:srgbClr val="000000"/>
                   </a:solidFill>
@@ -6155,7 +6186,7 @@
             </a:ln>
             <a:extLst>
               <a:ext uri="{91240B29-F687-4f45-9708-019B960494DF}">
-                <a14:hiddenLine xmlns="" xmlns:a14="http://schemas.microsoft.com/office/drawing/2010/main" w="9525">
+                <a14:hiddenLine xmlns:a14="http://schemas.microsoft.com/office/drawing/2010/main" xmlns="" w="9525">
                   <a:solidFill>
                     <a:srgbClr val="000000"/>
                   </a:solidFill>
@@ -6245,7 +6276,7 @@
             </a:ln>
             <a:extLst>
               <a:ext uri="{91240B29-F687-4f45-9708-019B960494DF}">
-                <a14:hiddenLine xmlns="" xmlns:a14="http://schemas.microsoft.com/office/drawing/2010/main" w="9525">
+                <a14:hiddenLine xmlns:a14="http://schemas.microsoft.com/office/drawing/2010/main" xmlns="" w="9525">
                   <a:solidFill>
                     <a:srgbClr val="000000"/>
                   </a:solidFill>
@@ -6307,7 +6338,7 @@
             </a:ln>
             <a:extLst>
               <a:ext uri="{91240B29-F687-4f45-9708-019B960494DF}">
-                <a14:hiddenLine xmlns="" xmlns:a14="http://schemas.microsoft.com/office/drawing/2010/main" w="9525">
+                <a14:hiddenLine xmlns:a14="http://schemas.microsoft.com/office/drawing/2010/main" xmlns="" w="9525">
                   <a:solidFill>
                     <a:srgbClr val="000000"/>
                   </a:solidFill>
@@ -6369,7 +6400,7 @@
             </a:ln>
             <a:extLst>
               <a:ext uri="{91240B29-F687-4f45-9708-019B960494DF}">
-                <a14:hiddenLine xmlns="" xmlns:a14="http://schemas.microsoft.com/office/drawing/2010/main" w="9525">
+                <a14:hiddenLine xmlns:a14="http://schemas.microsoft.com/office/drawing/2010/main" xmlns="" w="9525">
                   <a:solidFill>
                     <a:srgbClr val="000000"/>
                   </a:solidFill>
@@ -6459,7 +6490,7 @@
             </a:ln>
             <a:extLst>
               <a:ext uri="{91240B29-F687-4f45-9708-019B960494DF}">
-                <a14:hiddenLine xmlns="" xmlns:a14="http://schemas.microsoft.com/office/drawing/2010/main" w="9525">
+                <a14:hiddenLine xmlns:a14="http://schemas.microsoft.com/office/drawing/2010/main" xmlns="" w="9525">
                   <a:solidFill>
                     <a:srgbClr val="000000"/>
                   </a:solidFill>
@@ -6527,7 +6558,7 @@
             </a:ln>
             <a:extLst>
               <a:ext uri="{91240B29-F687-4f45-9708-019B960494DF}">
-                <a14:hiddenLine xmlns="" xmlns:a14="http://schemas.microsoft.com/office/drawing/2010/main" w="9525">
+                <a14:hiddenLine xmlns:a14="http://schemas.microsoft.com/office/drawing/2010/main" xmlns="" w="9525">
                   <a:solidFill>
                     <a:srgbClr val="000000"/>
                   </a:solidFill>
@@ -6589,7 +6620,7 @@
             </a:ln>
             <a:extLst>
               <a:ext uri="{91240B29-F687-4f45-9708-019B960494DF}">
-                <a14:hiddenLine xmlns="" xmlns:a14="http://schemas.microsoft.com/office/drawing/2010/main" w="9525">
+                <a14:hiddenLine xmlns:a14="http://schemas.microsoft.com/office/drawing/2010/main" xmlns="" w="9525">
                   <a:solidFill>
                     <a:srgbClr val="000000"/>
                   </a:solidFill>
@@ -6679,7 +6710,7 @@
             </a:ln>
             <a:extLst>
               <a:ext uri="{91240B29-F687-4f45-9708-019B960494DF}">
-                <a14:hiddenLine xmlns="" xmlns:a14="http://schemas.microsoft.com/office/drawing/2010/main" w="9525">
+                <a14:hiddenLine xmlns:a14="http://schemas.microsoft.com/office/drawing/2010/main" xmlns="" w="9525">
                   <a:solidFill>
                     <a:srgbClr val="000000"/>
                   </a:solidFill>
@@ -6741,7 +6772,7 @@
             </a:ln>
             <a:extLst>
               <a:ext uri="{91240B29-F687-4f45-9708-019B960494DF}">
-                <a14:hiddenLine xmlns="" xmlns:a14="http://schemas.microsoft.com/office/drawing/2010/main" w="9525">
+                <a14:hiddenLine xmlns:a14="http://schemas.microsoft.com/office/drawing/2010/main" xmlns="" w="9525">
                   <a:solidFill>
                     <a:srgbClr val="000000"/>
                   </a:solidFill>
@@ -6831,7 +6862,7 @@
             </a:ln>
             <a:extLst>
               <a:ext uri="{91240B29-F687-4f45-9708-019B960494DF}">
-                <a14:hiddenLine xmlns="" xmlns:a14="http://schemas.microsoft.com/office/drawing/2010/main" w="9525">
+                <a14:hiddenLine xmlns:a14="http://schemas.microsoft.com/office/drawing/2010/main" xmlns="" w="9525">
                   <a:solidFill>
                     <a:srgbClr val="000000"/>
                   </a:solidFill>
@@ -6893,7 +6924,7 @@
             </a:ln>
             <a:extLst>
               <a:ext uri="{91240B29-F687-4f45-9708-019B960494DF}">
-                <a14:hiddenLine xmlns="" xmlns:a14="http://schemas.microsoft.com/office/drawing/2010/main" w="9525">
+                <a14:hiddenLine xmlns:a14="http://schemas.microsoft.com/office/drawing/2010/main" xmlns="" w="9525">
                   <a:solidFill>
                     <a:srgbClr val="000000"/>
                   </a:solidFill>
@@ -6983,7 +7014,7 @@
             </a:ln>
             <a:extLst>
               <a:ext uri="{91240B29-F687-4f45-9708-019B960494DF}">
-                <a14:hiddenLine xmlns="" xmlns:a14="http://schemas.microsoft.com/office/drawing/2010/main" w="9525">
+                <a14:hiddenLine xmlns:a14="http://schemas.microsoft.com/office/drawing/2010/main" xmlns="" w="9525">
                   <a:solidFill>
                     <a:srgbClr val="000000"/>
                   </a:solidFill>
@@ -7017,7 +7048,7 @@
             </a:ln>
             <a:extLst>
               <a:ext uri="{91240B29-F687-4f45-9708-019B960494DF}">
-                <a14:hiddenLine xmlns="" xmlns:a14="http://schemas.microsoft.com/office/drawing/2010/main" w="9525">
+                <a14:hiddenLine xmlns:a14="http://schemas.microsoft.com/office/drawing/2010/main" xmlns="" w="9525">
                   <a:solidFill>
                     <a:srgbClr val="000000"/>
                   </a:solidFill>
@@ -7082,7 +7113,7 @@
             </a:ln>
             <a:extLst>
               <a:ext uri="{91240B29-F687-4f45-9708-019B960494DF}">
-                <a14:hiddenLine xmlns="" xmlns:a14="http://schemas.microsoft.com/office/drawing/2010/main" w="9525">
+                <a14:hiddenLine xmlns:a14="http://schemas.microsoft.com/office/drawing/2010/main" xmlns="" w="9525">
                   <a:solidFill>
                     <a:srgbClr val="000000"/>
                   </a:solidFill>
@@ -7172,7 +7203,7 @@
             </a:ln>
             <a:extLst>
               <a:ext uri="{91240B29-F687-4f45-9708-019B960494DF}">
-                <a14:hiddenLine xmlns="" xmlns:a14="http://schemas.microsoft.com/office/drawing/2010/main" w="9525">
+                <a14:hiddenLine xmlns:a14="http://schemas.microsoft.com/office/drawing/2010/main" xmlns="" w="9525">
                   <a:solidFill>
                     <a:srgbClr val="000000"/>
                   </a:solidFill>
@@ -7234,7 +7265,7 @@
             </a:ln>
             <a:extLst>
               <a:ext uri="{91240B29-F687-4f45-9708-019B960494DF}">
-                <a14:hiddenLine xmlns="" xmlns:a14="http://schemas.microsoft.com/office/drawing/2010/main" w="9525">
+                <a14:hiddenLine xmlns:a14="http://schemas.microsoft.com/office/drawing/2010/main" xmlns="" w="9525">
                   <a:solidFill>
                     <a:srgbClr val="000000"/>
                   </a:solidFill>
@@ -7324,7 +7355,7 @@
             </a:ln>
             <a:extLst>
               <a:ext uri="{91240B29-F687-4f45-9708-019B960494DF}">
-                <a14:hiddenLine xmlns="" xmlns:a14="http://schemas.microsoft.com/office/drawing/2010/main" w="9525">
+                <a14:hiddenLine xmlns:a14="http://schemas.microsoft.com/office/drawing/2010/main" xmlns="" w="9525">
                   <a:solidFill>
                     <a:srgbClr val="000000"/>
                   </a:solidFill>
@@ -7414,7 +7445,7 @@
             </a:ln>
             <a:extLst>
               <a:ext uri="{91240B29-F687-4f45-9708-019B960494DF}">
-                <a14:hiddenLine xmlns="" xmlns:a14="http://schemas.microsoft.com/office/drawing/2010/main" w="9525">
+                <a14:hiddenLine xmlns:a14="http://schemas.microsoft.com/office/drawing/2010/main" xmlns="" w="9525">
                   <a:solidFill>
                     <a:srgbClr val="000000"/>
                   </a:solidFill>
@@ -7479,7 +7510,7 @@
             </a:ln>
             <a:extLst>
               <a:ext uri="{91240B29-F687-4f45-9708-019B960494DF}">
-                <a14:hiddenLine xmlns="" xmlns:a14="http://schemas.microsoft.com/office/drawing/2010/main" w="9525">
+                <a14:hiddenLine xmlns:a14="http://schemas.microsoft.com/office/drawing/2010/main" xmlns="" w="9525">
                   <a:solidFill>
                     <a:srgbClr val="000000"/>
                   </a:solidFill>
@@ -7541,7 +7572,7 @@
             </a:ln>
             <a:extLst>
               <a:ext uri="{91240B29-F687-4f45-9708-019B960494DF}">
-                <a14:hiddenLine xmlns="" xmlns:a14="http://schemas.microsoft.com/office/drawing/2010/main" w="9525">
+                <a14:hiddenLine xmlns:a14="http://schemas.microsoft.com/office/drawing/2010/main" xmlns="" w="9525">
                   <a:solidFill>
                     <a:srgbClr val="000000"/>
                   </a:solidFill>
@@ -7631,7 +7662,7 @@
             </a:ln>
             <a:extLst>
               <a:ext uri="{91240B29-F687-4f45-9708-019B960494DF}">
-                <a14:hiddenLine xmlns="" xmlns:a14="http://schemas.microsoft.com/office/drawing/2010/main" w="9525">
+                <a14:hiddenLine xmlns:a14="http://schemas.microsoft.com/office/drawing/2010/main" xmlns="" w="9525">
                   <a:solidFill>
                     <a:srgbClr val="000000"/>
                   </a:solidFill>
@@ -7721,7 +7752,7 @@
             </a:ln>
             <a:extLst>
               <a:ext uri="{91240B29-F687-4f45-9708-019B960494DF}">
-                <a14:hiddenLine xmlns="" xmlns:a14="http://schemas.microsoft.com/office/drawing/2010/main" w="9525">
+                <a14:hiddenLine xmlns:a14="http://schemas.microsoft.com/office/drawing/2010/main" xmlns="" w="9525">
                   <a:solidFill>
                     <a:srgbClr val="000000"/>
                   </a:solidFill>
@@ -7783,7 +7814,7 @@
             </a:ln>
             <a:extLst>
               <a:ext uri="{91240B29-F687-4f45-9708-019B960494DF}">
-                <a14:hiddenLine xmlns="" xmlns:a14="http://schemas.microsoft.com/office/drawing/2010/main" w="9525">
+                <a14:hiddenLine xmlns:a14="http://schemas.microsoft.com/office/drawing/2010/main" xmlns="" w="9525">
                   <a:solidFill>
                     <a:srgbClr val="000000"/>
                   </a:solidFill>
@@ -7903,7 +7934,7 @@
             </a:ln>
             <a:extLst>
               <a:ext uri="{91240B29-F687-4f45-9708-019B960494DF}">
-                <a14:hiddenLine xmlns="" xmlns:a14="http://schemas.microsoft.com/office/drawing/2010/main" w="9525">
+                <a14:hiddenLine xmlns:a14="http://schemas.microsoft.com/office/drawing/2010/main" xmlns="" w="9525">
                   <a:solidFill>
                     <a:srgbClr val="000000"/>
                   </a:solidFill>
@@ -7971,7 +8002,7 @@
             </a:ln>
             <a:extLst>
               <a:ext uri="{91240B29-F687-4f45-9708-019B960494DF}">
-                <a14:hiddenLine xmlns="" xmlns:a14="http://schemas.microsoft.com/office/drawing/2010/main" w="9525">
+                <a14:hiddenLine xmlns:a14="http://schemas.microsoft.com/office/drawing/2010/main" xmlns="" w="9525">
                   <a:solidFill>
                     <a:srgbClr val="000000"/>
                   </a:solidFill>
@@ -8061,7 +8092,7 @@
             </a:ln>
             <a:extLst>
               <a:ext uri="{91240B29-F687-4f45-9708-019B960494DF}">
-                <a14:hiddenLine xmlns="" xmlns:a14="http://schemas.microsoft.com/office/drawing/2010/main" w="9525">
+                <a14:hiddenLine xmlns:a14="http://schemas.microsoft.com/office/drawing/2010/main" xmlns="" w="9525">
                   <a:solidFill>
                     <a:srgbClr val="000000"/>
                   </a:solidFill>
@@ -13988,7 +14019,7 @@
           <a:noFill/>
           <a:extLst>
             <a:ext uri="{909E8E84-426E-40dd-AFC4-6F175D3DCCD1}">
-              <a14:hiddenFill xmlns="" xmlns:a14="http://schemas.microsoft.com/office/drawing/2010/main">
+              <a14:hiddenFill xmlns:a14="http://schemas.microsoft.com/office/drawing/2010/main" xmlns="">
                 <a:solidFill>
                   <a:srgbClr val="FFFFFF"/>
                 </a:solidFill>
@@ -14068,7 +14099,7 @@
               </a:ln>
               <a:extLst>
                 <a:ext uri="{91240B29-F687-4f45-9708-019B960494DF}">
-                  <a14:hiddenLine xmlns="" xmlns:a14="http://schemas.microsoft.com/office/drawing/2010/main" w="9525">
+                  <a14:hiddenLine xmlns:a14="http://schemas.microsoft.com/office/drawing/2010/main" xmlns="" w="9525">
                     <a:solidFill>
                       <a:srgbClr val="000000"/>
                     </a:solidFill>
@@ -14158,7 +14189,7 @@
               </a:ln>
               <a:extLst>
                 <a:ext uri="{91240B29-F687-4f45-9708-019B960494DF}">
-                  <a14:hiddenLine xmlns="" xmlns:a14="http://schemas.microsoft.com/office/drawing/2010/main" w="9525">
+                  <a14:hiddenLine xmlns:a14="http://schemas.microsoft.com/office/drawing/2010/main" xmlns="" w="9525">
                     <a:solidFill>
                       <a:srgbClr val="000000"/>
                     </a:solidFill>
@@ -14248,7 +14279,7 @@
               </a:ln>
               <a:extLst>
                 <a:ext uri="{91240B29-F687-4f45-9708-019B960494DF}">
-                  <a14:hiddenLine xmlns="" xmlns:a14="http://schemas.microsoft.com/office/drawing/2010/main" w="9525">
+                  <a14:hiddenLine xmlns:a14="http://schemas.microsoft.com/office/drawing/2010/main" xmlns="" w="9525">
                     <a:solidFill>
                       <a:srgbClr val="000000"/>
                     </a:solidFill>
@@ -14310,7 +14341,7 @@
               </a:ln>
               <a:extLst>
                 <a:ext uri="{91240B29-F687-4f45-9708-019B960494DF}">
-                  <a14:hiddenLine xmlns="" xmlns:a14="http://schemas.microsoft.com/office/drawing/2010/main" w="9525">
+                  <a14:hiddenLine xmlns:a14="http://schemas.microsoft.com/office/drawing/2010/main" xmlns="" w="9525">
                     <a:solidFill>
                       <a:srgbClr val="000000"/>
                     </a:solidFill>
@@ -14400,7 +14431,7 @@
               </a:ln>
               <a:extLst>
                 <a:ext uri="{91240B29-F687-4f45-9708-019B960494DF}">
-                  <a14:hiddenLine xmlns="" xmlns:a14="http://schemas.microsoft.com/office/drawing/2010/main" w="9525">
+                  <a14:hiddenLine xmlns:a14="http://schemas.microsoft.com/office/drawing/2010/main" xmlns="" w="9525">
                     <a:solidFill>
                       <a:srgbClr val="000000"/>
                     </a:solidFill>
@@ -14462,7 +14493,7 @@
               </a:ln>
               <a:extLst>
                 <a:ext uri="{91240B29-F687-4f45-9708-019B960494DF}">
-                  <a14:hiddenLine xmlns="" xmlns:a14="http://schemas.microsoft.com/office/drawing/2010/main" w="9525">
+                  <a14:hiddenLine xmlns:a14="http://schemas.microsoft.com/office/drawing/2010/main" xmlns="" w="9525">
                     <a:solidFill>
                       <a:srgbClr val="000000"/>
                     </a:solidFill>
@@ -14524,7 +14555,7 @@
               </a:ln>
               <a:extLst>
                 <a:ext uri="{91240B29-F687-4f45-9708-019B960494DF}">
-                  <a14:hiddenLine xmlns="" xmlns:a14="http://schemas.microsoft.com/office/drawing/2010/main" w="9525">
+                  <a14:hiddenLine xmlns:a14="http://schemas.microsoft.com/office/drawing/2010/main" xmlns="" w="9525">
                     <a:solidFill>
                       <a:srgbClr val="000000"/>
                     </a:solidFill>
@@ -14614,7 +14645,7 @@
               </a:ln>
               <a:extLst>
                 <a:ext uri="{91240B29-F687-4f45-9708-019B960494DF}">
-                  <a14:hiddenLine xmlns="" xmlns:a14="http://schemas.microsoft.com/office/drawing/2010/main" w="9525">
+                  <a14:hiddenLine xmlns:a14="http://schemas.microsoft.com/office/drawing/2010/main" xmlns="" w="9525">
                     <a:solidFill>
                       <a:srgbClr val="000000"/>
                     </a:solidFill>
@@ -14704,7 +14735,7 @@
               </a:ln>
               <a:extLst>
                 <a:ext uri="{91240B29-F687-4f45-9708-019B960494DF}">
-                  <a14:hiddenLine xmlns="" xmlns:a14="http://schemas.microsoft.com/office/drawing/2010/main" w="9525">
+                  <a14:hiddenLine xmlns:a14="http://schemas.microsoft.com/office/drawing/2010/main" xmlns="" w="9525">
                     <a:solidFill>
                       <a:srgbClr val="000000"/>
                     </a:solidFill>
@@ -14766,7 +14797,7 @@
               </a:ln>
               <a:extLst>
                 <a:ext uri="{91240B29-F687-4f45-9708-019B960494DF}">
-                  <a14:hiddenLine xmlns="" xmlns:a14="http://schemas.microsoft.com/office/drawing/2010/main" w="9525">
+                  <a14:hiddenLine xmlns:a14="http://schemas.microsoft.com/office/drawing/2010/main" xmlns="" w="9525">
                     <a:solidFill>
                       <a:srgbClr val="000000"/>
                     </a:solidFill>
@@ -14876,7 +14907,7 @@
               </a:ln>
               <a:extLst>
                 <a:ext uri="{91240B29-F687-4f45-9708-019B960494DF}">
-                  <a14:hiddenLine xmlns="" xmlns:a14="http://schemas.microsoft.com/office/drawing/2010/main" w="9525">
+                  <a14:hiddenLine xmlns:a14="http://schemas.microsoft.com/office/drawing/2010/main" xmlns="" w="9525">
                     <a:solidFill>
                       <a:srgbClr val="000000"/>
                     </a:solidFill>
@@ -14960,7 +14991,7 @@
               </a:ln>
               <a:extLst>
                 <a:ext uri="{91240B29-F687-4f45-9708-019B960494DF}">
-                  <a14:hiddenLine xmlns="" xmlns:a14="http://schemas.microsoft.com/office/drawing/2010/main" w="9525">
+                  <a14:hiddenLine xmlns:a14="http://schemas.microsoft.com/office/drawing/2010/main" xmlns="" w="9525">
                     <a:solidFill>
                       <a:srgbClr val="000000"/>
                     </a:solidFill>
@@ -15022,7 +15053,7 @@
               </a:ln>
               <a:extLst>
                 <a:ext uri="{91240B29-F687-4f45-9708-019B960494DF}">
-                  <a14:hiddenLine xmlns="" xmlns:a14="http://schemas.microsoft.com/office/drawing/2010/main" w="9525">
+                  <a14:hiddenLine xmlns:a14="http://schemas.microsoft.com/office/drawing/2010/main" xmlns="" w="9525">
                     <a:solidFill>
                       <a:srgbClr val="000000"/>
                     </a:solidFill>
@@ -15084,7 +15115,7 @@
               </a:ln>
               <a:extLst>
                 <a:ext uri="{91240B29-F687-4f45-9708-019B960494DF}">
-                  <a14:hiddenLine xmlns="" xmlns:a14="http://schemas.microsoft.com/office/drawing/2010/main" w="9525">
+                  <a14:hiddenLine xmlns:a14="http://schemas.microsoft.com/office/drawing/2010/main" xmlns="" w="9525">
                     <a:solidFill>
                       <a:srgbClr val="000000"/>
                     </a:solidFill>
@@ -15174,7 +15205,7 @@
               </a:ln>
               <a:extLst>
                 <a:ext uri="{91240B29-F687-4f45-9708-019B960494DF}">
-                  <a14:hiddenLine xmlns="" xmlns:a14="http://schemas.microsoft.com/office/drawing/2010/main" w="9525">
+                  <a14:hiddenLine xmlns:a14="http://schemas.microsoft.com/office/drawing/2010/main" xmlns="" w="9525">
                     <a:solidFill>
                       <a:srgbClr val="000000"/>
                     </a:solidFill>
@@ -15208,7 +15239,7 @@
               </a:ln>
               <a:extLst>
                 <a:ext uri="{91240B29-F687-4f45-9708-019B960494DF}">
-                  <a14:hiddenLine xmlns="" xmlns:a14="http://schemas.microsoft.com/office/drawing/2010/main" w="9525">
+                  <a14:hiddenLine xmlns:a14="http://schemas.microsoft.com/office/drawing/2010/main" xmlns="" w="9525">
                     <a:solidFill>
                       <a:srgbClr val="000000"/>
                     </a:solidFill>
@@ -15273,7 +15304,7 @@
               </a:ln>
               <a:extLst>
                 <a:ext uri="{91240B29-F687-4f45-9708-019B960494DF}">
-                  <a14:hiddenLine xmlns="" xmlns:a14="http://schemas.microsoft.com/office/drawing/2010/main" w="9525">
+                  <a14:hiddenLine xmlns:a14="http://schemas.microsoft.com/office/drawing/2010/main" xmlns="" w="9525">
                     <a:solidFill>
                       <a:srgbClr val="000000"/>
                     </a:solidFill>
@@ -15363,7 +15394,7 @@
               </a:ln>
               <a:extLst>
                 <a:ext uri="{91240B29-F687-4f45-9708-019B960494DF}">
-                  <a14:hiddenLine xmlns="" xmlns:a14="http://schemas.microsoft.com/office/drawing/2010/main" w="9525">
+                  <a14:hiddenLine xmlns:a14="http://schemas.microsoft.com/office/drawing/2010/main" xmlns="" w="9525">
                     <a:solidFill>
                       <a:srgbClr val="000000"/>
                     </a:solidFill>
@@ -15425,7 +15456,7 @@
               </a:ln>
               <a:extLst>
                 <a:ext uri="{91240B29-F687-4f45-9708-019B960494DF}">
-                  <a14:hiddenLine xmlns="" xmlns:a14="http://schemas.microsoft.com/office/drawing/2010/main" w="9525">
+                  <a14:hiddenLine xmlns:a14="http://schemas.microsoft.com/office/drawing/2010/main" xmlns="" w="9525">
                     <a:solidFill>
                       <a:srgbClr val="000000"/>
                     </a:solidFill>
@@ -15515,7 +15546,7 @@
               </a:ln>
               <a:extLst>
                 <a:ext uri="{91240B29-F687-4f45-9708-019B960494DF}">
-                  <a14:hiddenLine xmlns="" xmlns:a14="http://schemas.microsoft.com/office/drawing/2010/main" w="9525">
+                  <a14:hiddenLine xmlns:a14="http://schemas.microsoft.com/office/drawing/2010/main" xmlns="" w="9525">
                     <a:solidFill>
                       <a:srgbClr val="000000"/>
                     </a:solidFill>
@@ -15580,7 +15611,7 @@
               </a:ln>
               <a:extLst>
                 <a:ext uri="{91240B29-F687-4f45-9708-019B960494DF}">
-                  <a14:hiddenLine xmlns="" xmlns:a14="http://schemas.microsoft.com/office/drawing/2010/main" w="9525">
+                  <a14:hiddenLine xmlns:a14="http://schemas.microsoft.com/office/drawing/2010/main" xmlns="" w="9525">
                     <a:solidFill>
                       <a:srgbClr val="000000"/>
                     </a:solidFill>
@@ -15642,7 +15673,7 @@
               </a:ln>
               <a:extLst>
                 <a:ext uri="{91240B29-F687-4f45-9708-019B960494DF}">
-                  <a14:hiddenLine xmlns="" xmlns:a14="http://schemas.microsoft.com/office/drawing/2010/main" w="9525">
+                  <a14:hiddenLine xmlns:a14="http://schemas.microsoft.com/office/drawing/2010/main" xmlns="" w="9525">
                     <a:solidFill>
                       <a:srgbClr val="000000"/>
                     </a:solidFill>
@@ -15732,7 +15763,7 @@
               </a:ln>
               <a:extLst>
                 <a:ext uri="{91240B29-F687-4f45-9708-019B960494DF}">
-                  <a14:hiddenLine xmlns="" xmlns:a14="http://schemas.microsoft.com/office/drawing/2010/main" w="9525">
+                  <a14:hiddenLine xmlns:a14="http://schemas.microsoft.com/office/drawing/2010/main" xmlns="" w="9525">
                     <a:solidFill>
                       <a:srgbClr val="000000"/>
                     </a:solidFill>
@@ -15822,7 +15853,7 @@
               </a:ln>
               <a:extLst>
                 <a:ext uri="{91240B29-F687-4f45-9708-019B960494DF}">
-                  <a14:hiddenLine xmlns="" xmlns:a14="http://schemas.microsoft.com/office/drawing/2010/main" w="9525">
+                  <a14:hiddenLine xmlns:a14="http://schemas.microsoft.com/office/drawing/2010/main" xmlns="" w="9525">
                     <a:solidFill>
                       <a:srgbClr val="000000"/>
                     </a:solidFill>
@@ -15887,7 +15918,7 @@
               </a:ln>
               <a:extLst>
                 <a:ext uri="{91240B29-F687-4f45-9708-019B960494DF}">
-                  <a14:hiddenLine xmlns="" xmlns:a14="http://schemas.microsoft.com/office/drawing/2010/main" w="9525">
+                  <a14:hiddenLine xmlns:a14="http://schemas.microsoft.com/office/drawing/2010/main" xmlns="" w="9525">
                     <a:solidFill>
                       <a:srgbClr val="000000"/>
                     </a:solidFill>
@@ -16007,7 +16038,7 @@
               </a:ln>
               <a:extLst>
                 <a:ext uri="{91240B29-F687-4f45-9708-019B960494DF}">
-                  <a14:hiddenLine xmlns="" xmlns:a14="http://schemas.microsoft.com/office/drawing/2010/main" w="9525">
+                  <a14:hiddenLine xmlns:a14="http://schemas.microsoft.com/office/drawing/2010/main" xmlns="" w="9525">
                     <a:solidFill>
                       <a:srgbClr val="000000"/>
                     </a:solidFill>
@@ -16105,7 +16136,7 @@
               </a:ln>
               <a:extLst>
                 <a:ext uri="{91240B29-F687-4f45-9708-019B960494DF}">
-                  <a14:hiddenLine xmlns="" xmlns:a14="http://schemas.microsoft.com/office/drawing/2010/main" w="9525">
+                  <a14:hiddenLine xmlns:a14="http://schemas.microsoft.com/office/drawing/2010/main" xmlns="" w="9525">
                     <a:solidFill>
                       <a:srgbClr val="000000"/>
                     </a:solidFill>
@@ -16220,7 +16251,7 @@
               </a:ln>
               <a:extLst>
                 <a:ext uri="{91240B29-F687-4f45-9708-019B960494DF}">
-                  <a14:hiddenLine xmlns="" xmlns:a14="http://schemas.microsoft.com/office/drawing/2010/main" w="9525">
+                  <a14:hiddenLine xmlns:a14="http://schemas.microsoft.com/office/drawing/2010/main" xmlns="" w="9525">
                     <a:solidFill>
                       <a:srgbClr val="000000"/>
                     </a:solidFill>
@@ -16310,7 +16341,7 @@
               </a:ln>
               <a:extLst>
                 <a:ext uri="{91240B29-F687-4f45-9708-019B960494DF}">
-                  <a14:hiddenLine xmlns="" xmlns:a14="http://schemas.microsoft.com/office/drawing/2010/main" w="9525">
+                  <a14:hiddenLine xmlns:a14="http://schemas.microsoft.com/office/drawing/2010/main" xmlns="" w="9525">
                     <a:solidFill>
                       <a:srgbClr val="000000"/>
                     </a:solidFill>
@@ -16375,7 +16406,7 @@
               </a:ln>
               <a:extLst>
                 <a:ext uri="{91240B29-F687-4f45-9708-019B960494DF}">
-                  <a14:hiddenLine xmlns="" xmlns:a14="http://schemas.microsoft.com/office/drawing/2010/main" w="9525">
+                  <a14:hiddenLine xmlns:a14="http://schemas.microsoft.com/office/drawing/2010/main" xmlns="" w="9525">
                     <a:solidFill>
                       <a:srgbClr val="000000"/>
                     </a:solidFill>
@@ -16465,7 +16496,7 @@
               </a:ln>
               <a:extLst>
                 <a:ext uri="{91240B29-F687-4f45-9708-019B960494DF}">
-                  <a14:hiddenLine xmlns="" xmlns:a14="http://schemas.microsoft.com/office/drawing/2010/main" w="9525">
+                  <a14:hiddenLine xmlns:a14="http://schemas.microsoft.com/office/drawing/2010/main" xmlns="" w="9525">
                     <a:solidFill>
                       <a:srgbClr val="000000"/>
                     </a:solidFill>
@@ -16533,7 +16564,7 @@
               </a:ln>
               <a:extLst>
                 <a:ext uri="{91240B29-F687-4f45-9708-019B960494DF}">
-                  <a14:hiddenLine xmlns="" xmlns:a14="http://schemas.microsoft.com/office/drawing/2010/main" w="9525">
+                  <a14:hiddenLine xmlns:a14="http://schemas.microsoft.com/office/drawing/2010/main" xmlns="" w="9525">
                     <a:solidFill>
                       <a:srgbClr val="000000"/>
                     </a:solidFill>
@@ -16623,7 +16654,7 @@
               </a:ln>
               <a:extLst>
                 <a:ext uri="{91240B29-F687-4f45-9708-019B960494DF}">
-                  <a14:hiddenLine xmlns="" xmlns:a14="http://schemas.microsoft.com/office/drawing/2010/main" w="9525">
+                  <a14:hiddenLine xmlns:a14="http://schemas.microsoft.com/office/drawing/2010/main" xmlns="" w="9525">
                     <a:solidFill>
                       <a:srgbClr val="000000"/>
                     </a:solidFill>
@@ -16691,7 +16722,7 @@
               </a:ln>
               <a:extLst>
                 <a:ext uri="{91240B29-F687-4f45-9708-019B960494DF}">
-                  <a14:hiddenLine xmlns="" xmlns:a14="http://schemas.microsoft.com/office/drawing/2010/main" w="9525">
+                  <a14:hiddenLine xmlns:a14="http://schemas.microsoft.com/office/drawing/2010/main" xmlns="" w="9525">
                     <a:solidFill>
                       <a:srgbClr val="000000"/>
                     </a:solidFill>
@@ -16781,7 +16812,7 @@
               </a:ln>
               <a:extLst>
                 <a:ext uri="{91240B29-F687-4f45-9708-019B960494DF}">
-                  <a14:hiddenLine xmlns="" xmlns:a14="http://schemas.microsoft.com/office/drawing/2010/main" w="9525">
+                  <a14:hiddenLine xmlns:a14="http://schemas.microsoft.com/office/drawing/2010/main" xmlns="" w="9525">
                     <a:solidFill>
                       <a:srgbClr val="000000"/>
                     </a:solidFill>
@@ -16815,7 +16846,7 @@
               </a:ln>
               <a:extLst>
                 <a:ext uri="{91240B29-F687-4f45-9708-019B960494DF}">
-                  <a14:hiddenLine xmlns="" xmlns:a14="http://schemas.microsoft.com/office/drawing/2010/main" w="9525">
+                  <a14:hiddenLine xmlns:a14="http://schemas.microsoft.com/office/drawing/2010/main" xmlns="" w="9525">
                     <a:solidFill>
                       <a:srgbClr val="000000"/>
                     </a:solidFill>

</xml_diff>

<commit_message>
TaskScheduler: Add a note
</commit_message>
<xml_diff>
--- a/TaskScheduler/TaskScheduler.pptx
+++ b/TaskScheduler/TaskScheduler.pptx
@@ -1010,7 +1010,7 @@
           <a:p>
             <a:fld id="{857CC94D-E614-4874-A919-F25B27309A09}" type="datetimeFigureOut">
               <a:rPr lang="en-CA" smtClean="0"/>
-              <a:t>2024-08-28</a:t>
+              <a:t>2024-09-24</a:t>
             </a:fld>
             <a:endParaRPr lang="en-CA"/>
           </a:p>
@@ -2348,6 +2348,53 @@
               <a:t>Can work on any other microcontroller, coded appropriately</a:t>
             </a:r>
           </a:p>
+          <a:p>
+            <a:pPr marL="171450" indent="-171450">
+              <a:buFont typeface="Arial" panose="020B0604020202020204" pitchFamily="34" charset="0"/>
+              <a:buChar char="•"/>
+            </a:pPr>
+            <a:r>
+              <a:rPr lang="en-CA" dirty="0"/>
+              <a:t>Note: Could use compile-time polymorphism instead (CRTP)</a:t>
+            </a:r>
+          </a:p>
+          <a:p>
+            <a:pPr marL="628650" lvl="1" indent="-171450">
+              <a:buFont typeface="Arial" panose="020B0604020202020204" pitchFamily="34" charset="0"/>
+              <a:buChar char="•"/>
+            </a:pPr>
+            <a:r>
+              <a:rPr lang="en-CA" dirty="0"/>
+              <a:t>No virtual functions, more efficient</a:t>
+            </a:r>
+          </a:p>
+          <a:p>
+            <a:pPr marL="628650" lvl="1" indent="-171450">
+              <a:buFont typeface="Arial" panose="020B0604020202020204" pitchFamily="34" charset="0"/>
+              <a:buChar char="•"/>
+            </a:pPr>
+            <a:r>
+              <a:rPr lang="en-CA" dirty="0"/>
+              <a:t>But it makes Task subclasses a bit more complicated</a:t>
+            </a:r>
+          </a:p>
+          <a:p>
+            <a:pPr marL="628650" lvl="1" indent="-171450">
+              <a:buFont typeface="Arial" panose="020B0604020202020204" pitchFamily="34" charset="0"/>
+              <a:buChar char="•"/>
+            </a:pPr>
+            <a:r>
+              <a:rPr lang="en-CA" dirty="0"/>
+              <a:t>Maybe discuss later</a:t>
+            </a:r>
+          </a:p>
+          <a:p>
+            <a:pPr marL="171450" indent="-171450">
+              <a:buFont typeface="Arial" panose="020B0604020202020204" pitchFamily="34" charset="0"/>
+              <a:buChar char="•"/>
+            </a:pPr>
+            <a:endParaRPr lang="en-CA" dirty="0"/>
+          </a:p>
         </p:txBody>
       </p:sp>
       <p:sp>
@@ -4000,7 +4047,7 @@
           <a:noFill/>
           <a:extLst>
             <a:ext uri="{909E8E84-426E-40dd-AFC4-6F175D3DCCD1}">
-              <a14:hiddenFill xmlns:a14="http://schemas.microsoft.com/office/drawing/2010/main" xmlns="">
+              <a14:hiddenFill xmlns="" xmlns:a14="http://schemas.microsoft.com/office/drawing/2010/main">
                 <a:solidFill>
                   <a:srgbClr val="FFFFFF"/>
                 </a:solidFill>
@@ -4066,7 +4113,7 @@
             </a:ln>
             <a:extLst>
               <a:ext uri="{91240B29-F687-4f45-9708-019B960494DF}">
-                <a14:hiddenLine xmlns:a14="http://schemas.microsoft.com/office/drawing/2010/main" xmlns="" w="9525">
+                <a14:hiddenLine xmlns="" xmlns:a14="http://schemas.microsoft.com/office/drawing/2010/main" w="9525">
                   <a:solidFill>
                     <a:srgbClr val="000000"/>
                   </a:solidFill>
@@ -4156,7 +4203,7 @@
             </a:ln>
             <a:extLst>
               <a:ext uri="{91240B29-F687-4f45-9708-019B960494DF}">
-                <a14:hiddenLine xmlns:a14="http://schemas.microsoft.com/office/drawing/2010/main" xmlns="" w="9525">
+                <a14:hiddenLine xmlns="" xmlns:a14="http://schemas.microsoft.com/office/drawing/2010/main" w="9525">
                   <a:solidFill>
                     <a:srgbClr val="000000"/>
                   </a:solidFill>
@@ -4246,7 +4293,7 @@
             </a:ln>
             <a:extLst>
               <a:ext uri="{91240B29-F687-4f45-9708-019B960494DF}">
-                <a14:hiddenLine xmlns:a14="http://schemas.microsoft.com/office/drawing/2010/main" xmlns="" w="9525">
+                <a14:hiddenLine xmlns="" xmlns:a14="http://schemas.microsoft.com/office/drawing/2010/main" w="9525">
                   <a:solidFill>
                     <a:srgbClr val="000000"/>
                   </a:solidFill>
@@ -4280,7 +4327,7 @@
             </a:ln>
             <a:extLst>
               <a:ext uri="{91240B29-F687-4f45-9708-019B960494DF}">
-                <a14:hiddenLine xmlns:a14="http://schemas.microsoft.com/office/drawing/2010/main" xmlns="" w="9525">
+                <a14:hiddenLine xmlns="" xmlns:a14="http://schemas.microsoft.com/office/drawing/2010/main" w="9525">
                   <a:solidFill>
                     <a:srgbClr val="000000"/>
                   </a:solidFill>
@@ -4370,7 +4417,7 @@
             </a:ln>
             <a:extLst>
               <a:ext uri="{91240B29-F687-4f45-9708-019B960494DF}">
-                <a14:hiddenLine xmlns:a14="http://schemas.microsoft.com/office/drawing/2010/main" xmlns="" w="9525">
+                <a14:hiddenLine xmlns="" xmlns:a14="http://schemas.microsoft.com/office/drawing/2010/main" w="9525">
                   <a:solidFill>
                     <a:srgbClr val="000000"/>
                   </a:solidFill>
@@ -4432,7 +4479,7 @@
             </a:ln>
             <a:extLst>
               <a:ext uri="{91240B29-F687-4f45-9708-019B960494DF}">
-                <a14:hiddenLine xmlns:a14="http://schemas.microsoft.com/office/drawing/2010/main" xmlns="" w="9525">
+                <a14:hiddenLine xmlns="" xmlns:a14="http://schemas.microsoft.com/office/drawing/2010/main" w="9525">
                   <a:solidFill>
                     <a:srgbClr val="000000"/>
                   </a:solidFill>
@@ -4494,7 +4541,7 @@
             </a:ln>
             <a:extLst>
               <a:ext uri="{91240B29-F687-4f45-9708-019B960494DF}">
-                <a14:hiddenLine xmlns:a14="http://schemas.microsoft.com/office/drawing/2010/main" xmlns="" w="9525">
+                <a14:hiddenLine xmlns="" xmlns:a14="http://schemas.microsoft.com/office/drawing/2010/main" w="9525">
                   <a:solidFill>
                     <a:srgbClr val="000000"/>
                   </a:solidFill>
@@ -4584,7 +4631,7 @@
             </a:ln>
             <a:extLst>
               <a:ext uri="{91240B29-F687-4f45-9708-019B960494DF}">
-                <a14:hiddenLine xmlns:a14="http://schemas.microsoft.com/office/drawing/2010/main" xmlns="" w="9525">
+                <a14:hiddenLine xmlns="" xmlns:a14="http://schemas.microsoft.com/office/drawing/2010/main" w="9525">
                   <a:solidFill>
                     <a:srgbClr val="000000"/>
                   </a:solidFill>
@@ -4646,7 +4693,7 @@
             </a:ln>
             <a:extLst>
               <a:ext uri="{91240B29-F687-4f45-9708-019B960494DF}">
-                <a14:hiddenLine xmlns:a14="http://schemas.microsoft.com/office/drawing/2010/main" xmlns="" w="9525">
+                <a14:hiddenLine xmlns="" xmlns:a14="http://schemas.microsoft.com/office/drawing/2010/main" w="9525">
                   <a:solidFill>
                     <a:srgbClr val="000000"/>
                   </a:solidFill>
@@ -4708,7 +4755,7 @@
             </a:ln>
             <a:extLst>
               <a:ext uri="{91240B29-F687-4f45-9708-019B960494DF}">
-                <a14:hiddenLine xmlns:a14="http://schemas.microsoft.com/office/drawing/2010/main" xmlns="" w="9525">
+                <a14:hiddenLine xmlns="" xmlns:a14="http://schemas.microsoft.com/office/drawing/2010/main" w="9525">
                   <a:solidFill>
                     <a:srgbClr val="000000"/>
                   </a:solidFill>
@@ -4798,7 +4845,7 @@
             </a:ln>
             <a:extLst>
               <a:ext uri="{91240B29-F687-4f45-9708-019B960494DF}">
-                <a14:hiddenLine xmlns:a14="http://schemas.microsoft.com/office/drawing/2010/main" xmlns="" w="9525">
+                <a14:hiddenLine xmlns="" xmlns:a14="http://schemas.microsoft.com/office/drawing/2010/main" w="9525">
                   <a:solidFill>
                     <a:srgbClr val="000000"/>
                   </a:solidFill>
@@ -4888,7 +4935,7 @@
             </a:ln>
             <a:extLst>
               <a:ext uri="{91240B29-F687-4f45-9708-019B960494DF}">
-                <a14:hiddenLine xmlns:a14="http://schemas.microsoft.com/office/drawing/2010/main" xmlns="" w="9525">
+                <a14:hiddenLine xmlns="" xmlns:a14="http://schemas.microsoft.com/office/drawing/2010/main" w="9525">
                   <a:solidFill>
                     <a:srgbClr val="000000"/>
                   </a:solidFill>
@@ -4950,7 +4997,7 @@
             </a:ln>
             <a:extLst>
               <a:ext uri="{91240B29-F687-4f45-9708-019B960494DF}">
-                <a14:hiddenLine xmlns:a14="http://schemas.microsoft.com/office/drawing/2010/main" xmlns="" w="9525">
+                <a14:hiddenLine xmlns="" xmlns:a14="http://schemas.microsoft.com/office/drawing/2010/main" w="9525">
                   <a:solidFill>
                     <a:srgbClr val="000000"/>
                   </a:solidFill>
@@ -5060,7 +5107,7 @@
             </a:ln>
             <a:extLst>
               <a:ext uri="{91240B29-F687-4f45-9708-019B960494DF}">
-                <a14:hiddenLine xmlns:a14="http://schemas.microsoft.com/office/drawing/2010/main" xmlns="" w="9525">
+                <a14:hiddenLine xmlns="" xmlns:a14="http://schemas.microsoft.com/office/drawing/2010/main" w="9525">
                   <a:solidFill>
                     <a:srgbClr val="000000"/>
                   </a:solidFill>
@@ -5122,7 +5169,7 @@
             </a:ln>
             <a:extLst>
               <a:ext uri="{91240B29-F687-4f45-9708-019B960494DF}">
-                <a14:hiddenLine xmlns:a14="http://schemas.microsoft.com/office/drawing/2010/main" xmlns="" w="9525">
+                <a14:hiddenLine xmlns="" xmlns:a14="http://schemas.microsoft.com/office/drawing/2010/main" w="9525">
                   <a:solidFill>
                     <a:srgbClr val="000000"/>
                   </a:solidFill>
@@ -5212,7 +5259,7 @@
             </a:ln>
             <a:extLst>
               <a:ext uri="{91240B29-F687-4f45-9708-019B960494DF}">
-                <a14:hiddenLine xmlns:a14="http://schemas.microsoft.com/office/drawing/2010/main" xmlns="" w="9525">
+                <a14:hiddenLine xmlns="" xmlns:a14="http://schemas.microsoft.com/office/drawing/2010/main" w="9525">
                   <a:solidFill>
                     <a:srgbClr val="000000"/>
                   </a:solidFill>
@@ -5302,7 +5349,7 @@
             </a:ln>
             <a:extLst>
               <a:ext uri="{91240B29-F687-4f45-9708-019B960494DF}">
-                <a14:hiddenLine xmlns:a14="http://schemas.microsoft.com/office/drawing/2010/main" xmlns="" w="9525">
+                <a14:hiddenLine xmlns="" xmlns:a14="http://schemas.microsoft.com/office/drawing/2010/main" w="9525">
                   <a:solidFill>
                     <a:srgbClr val="000000"/>
                   </a:solidFill>
@@ -5364,7 +5411,7 @@
             </a:ln>
             <a:extLst>
               <a:ext uri="{91240B29-F687-4f45-9708-019B960494DF}">
-                <a14:hiddenLine xmlns:a14="http://schemas.microsoft.com/office/drawing/2010/main" xmlns="" w="9525">
+                <a14:hiddenLine xmlns="" xmlns:a14="http://schemas.microsoft.com/office/drawing/2010/main" w="9525">
                   <a:solidFill>
                     <a:srgbClr val="000000"/>
                   </a:solidFill>
@@ -5454,7 +5501,7 @@
             </a:ln>
             <a:extLst>
               <a:ext uri="{91240B29-F687-4f45-9708-019B960494DF}">
-                <a14:hiddenLine xmlns:a14="http://schemas.microsoft.com/office/drawing/2010/main" xmlns="" w="9525">
+                <a14:hiddenLine xmlns="" xmlns:a14="http://schemas.microsoft.com/office/drawing/2010/main" w="9525">
                   <a:solidFill>
                     <a:srgbClr val="000000"/>
                   </a:solidFill>
@@ -5544,7 +5591,7 @@
             </a:ln>
             <a:extLst>
               <a:ext uri="{91240B29-F687-4f45-9708-019B960494DF}">
-                <a14:hiddenLine xmlns:a14="http://schemas.microsoft.com/office/drawing/2010/main" xmlns="" w="9525">
+                <a14:hiddenLine xmlns="" xmlns:a14="http://schemas.microsoft.com/office/drawing/2010/main" w="9525">
                   <a:solidFill>
                     <a:srgbClr val="000000"/>
                   </a:solidFill>
@@ -5600,7 +5647,7 @@
             </a:ln>
             <a:extLst>
               <a:ext uri="{91240B29-F687-4f45-9708-019B960494DF}">
-                <a14:hiddenLine xmlns:a14="http://schemas.microsoft.com/office/drawing/2010/main" xmlns="" w="9525">
+                <a14:hiddenLine xmlns="" xmlns:a14="http://schemas.microsoft.com/office/drawing/2010/main" w="9525">
                   <a:solidFill>
                     <a:srgbClr val="000000"/>
                   </a:solidFill>
@@ -5690,7 +5737,7 @@
             </a:ln>
             <a:extLst>
               <a:ext uri="{91240B29-F687-4f45-9708-019B960494DF}">
-                <a14:hiddenLine xmlns:a14="http://schemas.microsoft.com/office/drawing/2010/main" xmlns="" w="9525">
+                <a14:hiddenLine xmlns="" xmlns:a14="http://schemas.microsoft.com/office/drawing/2010/main" w="9525">
                   <a:solidFill>
                     <a:srgbClr val="000000"/>
                   </a:solidFill>
@@ -5746,7 +5793,7 @@
             </a:ln>
             <a:extLst>
               <a:ext uri="{91240B29-F687-4f45-9708-019B960494DF}">
-                <a14:hiddenLine xmlns:a14="http://schemas.microsoft.com/office/drawing/2010/main" xmlns="" w="9525">
+                <a14:hiddenLine xmlns="" xmlns:a14="http://schemas.microsoft.com/office/drawing/2010/main" w="9525">
                   <a:solidFill>
                     <a:srgbClr val="000000"/>
                   </a:solidFill>
@@ -5836,7 +5883,7 @@
             </a:ln>
             <a:extLst>
               <a:ext uri="{91240B29-F687-4f45-9708-019B960494DF}">
-                <a14:hiddenLine xmlns:a14="http://schemas.microsoft.com/office/drawing/2010/main" xmlns="" w="9525">
+                <a14:hiddenLine xmlns="" xmlns:a14="http://schemas.microsoft.com/office/drawing/2010/main" w="9525">
                   <a:solidFill>
                     <a:srgbClr val="000000"/>
                   </a:solidFill>
@@ -5904,7 +5951,7 @@
             </a:ln>
             <a:extLst>
               <a:ext uri="{91240B29-F687-4f45-9708-019B960494DF}">
-                <a14:hiddenLine xmlns:a14="http://schemas.microsoft.com/office/drawing/2010/main" xmlns="" w="9525">
+                <a14:hiddenLine xmlns="" xmlns:a14="http://schemas.microsoft.com/office/drawing/2010/main" w="9525">
                   <a:solidFill>
                     <a:srgbClr val="000000"/>
                   </a:solidFill>
@@ -5994,7 +6041,7 @@
             </a:ln>
             <a:extLst>
               <a:ext uri="{91240B29-F687-4f45-9708-019B960494DF}">
-                <a14:hiddenLine xmlns:a14="http://schemas.microsoft.com/office/drawing/2010/main" xmlns="" w="9525">
+                <a14:hiddenLine xmlns="" xmlns:a14="http://schemas.microsoft.com/office/drawing/2010/main" w="9525">
                   <a:solidFill>
                     <a:srgbClr val="000000"/>
                   </a:solidFill>
@@ -6062,7 +6109,7 @@
             </a:ln>
             <a:extLst>
               <a:ext uri="{91240B29-F687-4f45-9708-019B960494DF}">
-                <a14:hiddenLine xmlns:a14="http://schemas.microsoft.com/office/drawing/2010/main" xmlns="" w="9525">
+                <a14:hiddenLine xmlns="" xmlns:a14="http://schemas.microsoft.com/office/drawing/2010/main" w="9525">
                   <a:solidFill>
                     <a:srgbClr val="000000"/>
                   </a:solidFill>
@@ -6152,7 +6199,7 @@
             </a:ln>
             <a:extLst>
               <a:ext uri="{91240B29-F687-4f45-9708-019B960494DF}">
-                <a14:hiddenLine xmlns:a14="http://schemas.microsoft.com/office/drawing/2010/main" xmlns="" w="9525">
+                <a14:hiddenLine xmlns="" xmlns:a14="http://schemas.microsoft.com/office/drawing/2010/main" w="9525">
                   <a:solidFill>
                     <a:srgbClr val="000000"/>
                   </a:solidFill>
@@ -6186,7 +6233,7 @@
             </a:ln>
             <a:extLst>
               <a:ext uri="{91240B29-F687-4f45-9708-019B960494DF}">
-                <a14:hiddenLine xmlns:a14="http://schemas.microsoft.com/office/drawing/2010/main" xmlns="" w="9525">
+                <a14:hiddenLine xmlns="" xmlns:a14="http://schemas.microsoft.com/office/drawing/2010/main" w="9525">
                   <a:solidFill>
                     <a:srgbClr val="000000"/>
                   </a:solidFill>
@@ -6276,7 +6323,7 @@
             </a:ln>
             <a:extLst>
               <a:ext uri="{91240B29-F687-4f45-9708-019B960494DF}">
-                <a14:hiddenLine xmlns:a14="http://schemas.microsoft.com/office/drawing/2010/main" xmlns="" w="9525">
+                <a14:hiddenLine xmlns="" xmlns:a14="http://schemas.microsoft.com/office/drawing/2010/main" w="9525">
                   <a:solidFill>
                     <a:srgbClr val="000000"/>
                   </a:solidFill>
@@ -6338,7 +6385,7 @@
             </a:ln>
             <a:extLst>
               <a:ext uri="{91240B29-F687-4f45-9708-019B960494DF}">
-                <a14:hiddenLine xmlns:a14="http://schemas.microsoft.com/office/drawing/2010/main" xmlns="" w="9525">
+                <a14:hiddenLine xmlns="" xmlns:a14="http://schemas.microsoft.com/office/drawing/2010/main" w="9525">
                   <a:solidFill>
                     <a:srgbClr val="000000"/>
                   </a:solidFill>
@@ -6400,7 +6447,7 @@
             </a:ln>
             <a:extLst>
               <a:ext uri="{91240B29-F687-4f45-9708-019B960494DF}">
-                <a14:hiddenLine xmlns:a14="http://schemas.microsoft.com/office/drawing/2010/main" xmlns="" w="9525">
+                <a14:hiddenLine xmlns="" xmlns:a14="http://schemas.microsoft.com/office/drawing/2010/main" w="9525">
                   <a:solidFill>
                     <a:srgbClr val="000000"/>
                   </a:solidFill>
@@ -6490,7 +6537,7 @@
             </a:ln>
             <a:extLst>
               <a:ext uri="{91240B29-F687-4f45-9708-019B960494DF}">
-                <a14:hiddenLine xmlns:a14="http://schemas.microsoft.com/office/drawing/2010/main" xmlns="" w="9525">
+                <a14:hiddenLine xmlns="" xmlns:a14="http://schemas.microsoft.com/office/drawing/2010/main" w="9525">
                   <a:solidFill>
                     <a:srgbClr val="000000"/>
                   </a:solidFill>
@@ -6558,7 +6605,7 @@
             </a:ln>
             <a:extLst>
               <a:ext uri="{91240B29-F687-4f45-9708-019B960494DF}">
-                <a14:hiddenLine xmlns:a14="http://schemas.microsoft.com/office/drawing/2010/main" xmlns="" w="9525">
+                <a14:hiddenLine xmlns="" xmlns:a14="http://schemas.microsoft.com/office/drawing/2010/main" w="9525">
                   <a:solidFill>
                     <a:srgbClr val="000000"/>
                   </a:solidFill>
@@ -6620,7 +6667,7 @@
             </a:ln>
             <a:extLst>
               <a:ext uri="{91240B29-F687-4f45-9708-019B960494DF}">
-                <a14:hiddenLine xmlns:a14="http://schemas.microsoft.com/office/drawing/2010/main" xmlns="" w="9525">
+                <a14:hiddenLine xmlns="" xmlns:a14="http://schemas.microsoft.com/office/drawing/2010/main" w="9525">
                   <a:solidFill>
                     <a:srgbClr val="000000"/>
                   </a:solidFill>
@@ -6710,7 +6757,7 @@
             </a:ln>
             <a:extLst>
               <a:ext uri="{91240B29-F687-4f45-9708-019B960494DF}">
-                <a14:hiddenLine xmlns:a14="http://schemas.microsoft.com/office/drawing/2010/main" xmlns="" w="9525">
+                <a14:hiddenLine xmlns="" xmlns:a14="http://schemas.microsoft.com/office/drawing/2010/main" w="9525">
                   <a:solidFill>
                     <a:srgbClr val="000000"/>
                   </a:solidFill>
@@ -6772,7 +6819,7 @@
             </a:ln>
             <a:extLst>
               <a:ext uri="{91240B29-F687-4f45-9708-019B960494DF}">
-                <a14:hiddenLine xmlns:a14="http://schemas.microsoft.com/office/drawing/2010/main" xmlns="" w="9525">
+                <a14:hiddenLine xmlns="" xmlns:a14="http://schemas.microsoft.com/office/drawing/2010/main" w="9525">
                   <a:solidFill>
                     <a:srgbClr val="000000"/>
                   </a:solidFill>
@@ -6862,7 +6909,7 @@
             </a:ln>
             <a:extLst>
               <a:ext uri="{91240B29-F687-4f45-9708-019B960494DF}">
-                <a14:hiddenLine xmlns:a14="http://schemas.microsoft.com/office/drawing/2010/main" xmlns="" w="9525">
+                <a14:hiddenLine xmlns="" xmlns:a14="http://schemas.microsoft.com/office/drawing/2010/main" w="9525">
                   <a:solidFill>
                     <a:srgbClr val="000000"/>
                   </a:solidFill>
@@ -6924,7 +6971,7 @@
             </a:ln>
             <a:extLst>
               <a:ext uri="{91240B29-F687-4f45-9708-019B960494DF}">
-                <a14:hiddenLine xmlns:a14="http://schemas.microsoft.com/office/drawing/2010/main" xmlns="" w="9525">
+                <a14:hiddenLine xmlns="" xmlns:a14="http://schemas.microsoft.com/office/drawing/2010/main" w="9525">
                   <a:solidFill>
                     <a:srgbClr val="000000"/>
                   </a:solidFill>
@@ -7014,7 +7061,7 @@
             </a:ln>
             <a:extLst>
               <a:ext uri="{91240B29-F687-4f45-9708-019B960494DF}">
-                <a14:hiddenLine xmlns:a14="http://schemas.microsoft.com/office/drawing/2010/main" xmlns="" w="9525">
+                <a14:hiddenLine xmlns="" xmlns:a14="http://schemas.microsoft.com/office/drawing/2010/main" w="9525">
                   <a:solidFill>
                     <a:srgbClr val="000000"/>
                   </a:solidFill>
@@ -7048,7 +7095,7 @@
             </a:ln>
             <a:extLst>
               <a:ext uri="{91240B29-F687-4f45-9708-019B960494DF}">
-                <a14:hiddenLine xmlns:a14="http://schemas.microsoft.com/office/drawing/2010/main" xmlns="" w="9525">
+                <a14:hiddenLine xmlns="" xmlns:a14="http://schemas.microsoft.com/office/drawing/2010/main" w="9525">
                   <a:solidFill>
                     <a:srgbClr val="000000"/>
                   </a:solidFill>
@@ -7113,7 +7160,7 @@
             </a:ln>
             <a:extLst>
               <a:ext uri="{91240B29-F687-4f45-9708-019B960494DF}">
-                <a14:hiddenLine xmlns:a14="http://schemas.microsoft.com/office/drawing/2010/main" xmlns="" w="9525">
+                <a14:hiddenLine xmlns="" xmlns:a14="http://schemas.microsoft.com/office/drawing/2010/main" w="9525">
                   <a:solidFill>
                     <a:srgbClr val="000000"/>
                   </a:solidFill>
@@ -7203,7 +7250,7 @@
             </a:ln>
             <a:extLst>
               <a:ext uri="{91240B29-F687-4f45-9708-019B960494DF}">
-                <a14:hiddenLine xmlns:a14="http://schemas.microsoft.com/office/drawing/2010/main" xmlns="" w="9525">
+                <a14:hiddenLine xmlns="" xmlns:a14="http://schemas.microsoft.com/office/drawing/2010/main" w="9525">
                   <a:solidFill>
                     <a:srgbClr val="000000"/>
                   </a:solidFill>
@@ -7265,7 +7312,7 @@
             </a:ln>
             <a:extLst>
               <a:ext uri="{91240B29-F687-4f45-9708-019B960494DF}">
-                <a14:hiddenLine xmlns:a14="http://schemas.microsoft.com/office/drawing/2010/main" xmlns="" w="9525">
+                <a14:hiddenLine xmlns="" xmlns:a14="http://schemas.microsoft.com/office/drawing/2010/main" w="9525">
                   <a:solidFill>
                     <a:srgbClr val="000000"/>
                   </a:solidFill>
@@ -7355,7 +7402,7 @@
             </a:ln>
             <a:extLst>
               <a:ext uri="{91240B29-F687-4f45-9708-019B960494DF}">
-                <a14:hiddenLine xmlns:a14="http://schemas.microsoft.com/office/drawing/2010/main" xmlns="" w="9525">
+                <a14:hiddenLine xmlns="" xmlns:a14="http://schemas.microsoft.com/office/drawing/2010/main" w="9525">
                   <a:solidFill>
                     <a:srgbClr val="000000"/>
                   </a:solidFill>
@@ -7445,7 +7492,7 @@
             </a:ln>
             <a:extLst>
               <a:ext uri="{91240B29-F687-4f45-9708-019B960494DF}">
-                <a14:hiddenLine xmlns:a14="http://schemas.microsoft.com/office/drawing/2010/main" xmlns="" w="9525">
+                <a14:hiddenLine xmlns="" xmlns:a14="http://schemas.microsoft.com/office/drawing/2010/main" w="9525">
                   <a:solidFill>
                     <a:srgbClr val="000000"/>
                   </a:solidFill>
@@ -7510,7 +7557,7 @@
             </a:ln>
             <a:extLst>
               <a:ext uri="{91240B29-F687-4f45-9708-019B960494DF}">
-                <a14:hiddenLine xmlns:a14="http://schemas.microsoft.com/office/drawing/2010/main" xmlns="" w="9525">
+                <a14:hiddenLine xmlns="" xmlns:a14="http://schemas.microsoft.com/office/drawing/2010/main" w="9525">
                   <a:solidFill>
                     <a:srgbClr val="000000"/>
                   </a:solidFill>
@@ -7572,7 +7619,7 @@
             </a:ln>
             <a:extLst>
               <a:ext uri="{91240B29-F687-4f45-9708-019B960494DF}">
-                <a14:hiddenLine xmlns:a14="http://schemas.microsoft.com/office/drawing/2010/main" xmlns="" w="9525">
+                <a14:hiddenLine xmlns="" xmlns:a14="http://schemas.microsoft.com/office/drawing/2010/main" w="9525">
                   <a:solidFill>
                     <a:srgbClr val="000000"/>
                   </a:solidFill>
@@ -7662,7 +7709,7 @@
             </a:ln>
             <a:extLst>
               <a:ext uri="{91240B29-F687-4f45-9708-019B960494DF}">
-                <a14:hiddenLine xmlns:a14="http://schemas.microsoft.com/office/drawing/2010/main" xmlns="" w="9525">
+                <a14:hiddenLine xmlns="" xmlns:a14="http://schemas.microsoft.com/office/drawing/2010/main" w="9525">
                   <a:solidFill>
                     <a:srgbClr val="000000"/>
                   </a:solidFill>
@@ -7752,7 +7799,7 @@
             </a:ln>
             <a:extLst>
               <a:ext uri="{91240B29-F687-4f45-9708-019B960494DF}">
-                <a14:hiddenLine xmlns:a14="http://schemas.microsoft.com/office/drawing/2010/main" xmlns="" w="9525">
+                <a14:hiddenLine xmlns="" xmlns:a14="http://schemas.microsoft.com/office/drawing/2010/main" w="9525">
                   <a:solidFill>
                     <a:srgbClr val="000000"/>
                   </a:solidFill>
@@ -7814,7 +7861,7 @@
             </a:ln>
             <a:extLst>
               <a:ext uri="{91240B29-F687-4f45-9708-019B960494DF}">
-                <a14:hiddenLine xmlns:a14="http://schemas.microsoft.com/office/drawing/2010/main" xmlns="" w="9525">
+                <a14:hiddenLine xmlns="" xmlns:a14="http://schemas.microsoft.com/office/drawing/2010/main" w="9525">
                   <a:solidFill>
                     <a:srgbClr val="000000"/>
                   </a:solidFill>
@@ -7934,7 +7981,7 @@
             </a:ln>
             <a:extLst>
               <a:ext uri="{91240B29-F687-4f45-9708-019B960494DF}">
-                <a14:hiddenLine xmlns:a14="http://schemas.microsoft.com/office/drawing/2010/main" xmlns="" w="9525">
+                <a14:hiddenLine xmlns="" xmlns:a14="http://schemas.microsoft.com/office/drawing/2010/main" w="9525">
                   <a:solidFill>
                     <a:srgbClr val="000000"/>
                   </a:solidFill>
@@ -8002,7 +8049,7 @@
             </a:ln>
             <a:extLst>
               <a:ext uri="{91240B29-F687-4f45-9708-019B960494DF}">
-                <a14:hiddenLine xmlns:a14="http://schemas.microsoft.com/office/drawing/2010/main" xmlns="" w="9525">
+                <a14:hiddenLine xmlns="" xmlns:a14="http://schemas.microsoft.com/office/drawing/2010/main" w="9525">
                   <a:solidFill>
                     <a:srgbClr val="000000"/>
                   </a:solidFill>
@@ -8092,7 +8139,7 @@
             </a:ln>
             <a:extLst>
               <a:ext uri="{91240B29-F687-4f45-9708-019B960494DF}">
-                <a14:hiddenLine xmlns:a14="http://schemas.microsoft.com/office/drawing/2010/main" xmlns="" w="9525">
+                <a14:hiddenLine xmlns="" xmlns:a14="http://schemas.microsoft.com/office/drawing/2010/main" w="9525">
                   <a:solidFill>
                     <a:srgbClr val="000000"/>
                   </a:solidFill>
@@ -14019,7 +14066,7 @@
           <a:noFill/>
           <a:extLst>
             <a:ext uri="{909E8E84-426E-40dd-AFC4-6F175D3DCCD1}">
-              <a14:hiddenFill xmlns:a14="http://schemas.microsoft.com/office/drawing/2010/main" xmlns="">
+              <a14:hiddenFill xmlns="" xmlns:a14="http://schemas.microsoft.com/office/drawing/2010/main">
                 <a:solidFill>
                   <a:srgbClr val="FFFFFF"/>
                 </a:solidFill>
@@ -14099,7 +14146,7 @@
               </a:ln>
               <a:extLst>
                 <a:ext uri="{91240B29-F687-4f45-9708-019B960494DF}">
-                  <a14:hiddenLine xmlns:a14="http://schemas.microsoft.com/office/drawing/2010/main" xmlns="" w="9525">
+                  <a14:hiddenLine xmlns="" xmlns:a14="http://schemas.microsoft.com/office/drawing/2010/main" w="9525">
                     <a:solidFill>
                       <a:srgbClr val="000000"/>
                     </a:solidFill>
@@ -14189,7 +14236,7 @@
               </a:ln>
               <a:extLst>
                 <a:ext uri="{91240B29-F687-4f45-9708-019B960494DF}">
-                  <a14:hiddenLine xmlns:a14="http://schemas.microsoft.com/office/drawing/2010/main" xmlns="" w="9525">
+                  <a14:hiddenLine xmlns="" xmlns:a14="http://schemas.microsoft.com/office/drawing/2010/main" w="9525">
                     <a:solidFill>
                       <a:srgbClr val="000000"/>
                     </a:solidFill>
@@ -14279,7 +14326,7 @@
               </a:ln>
               <a:extLst>
                 <a:ext uri="{91240B29-F687-4f45-9708-019B960494DF}">
-                  <a14:hiddenLine xmlns:a14="http://schemas.microsoft.com/office/drawing/2010/main" xmlns="" w="9525">
+                  <a14:hiddenLine xmlns="" xmlns:a14="http://schemas.microsoft.com/office/drawing/2010/main" w="9525">
                     <a:solidFill>
                       <a:srgbClr val="000000"/>
                     </a:solidFill>
@@ -14341,7 +14388,7 @@
               </a:ln>
               <a:extLst>
                 <a:ext uri="{91240B29-F687-4f45-9708-019B960494DF}">
-                  <a14:hiddenLine xmlns:a14="http://schemas.microsoft.com/office/drawing/2010/main" xmlns="" w="9525">
+                  <a14:hiddenLine xmlns="" xmlns:a14="http://schemas.microsoft.com/office/drawing/2010/main" w="9525">
                     <a:solidFill>
                       <a:srgbClr val="000000"/>
                     </a:solidFill>
@@ -14431,7 +14478,7 @@
               </a:ln>
               <a:extLst>
                 <a:ext uri="{91240B29-F687-4f45-9708-019B960494DF}">
-                  <a14:hiddenLine xmlns:a14="http://schemas.microsoft.com/office/drawing/2010/main" xmlns="" w="9525">
+                  <a14:hiddenLine xmlns="" xmlns:a14="http://schemas.microsoft.com/office/drawing/2010/main" w="9525">
                     <a:solidFill>
                       <a:srgbClr val="000000"/>
                     </a:solidFill>
@@ -14493,7 +14540,7 @@
               </a:ln>
               <a:extLst>
                 <a:ext uri="{91240B29-F687-4f45-9708-019B960494DF}">
-                  <a14:hiddenLine xmlns:a14="http://schemas.microsoft.com/office/drawing/2010/main" xmlns="" w="9525">
+                  <a14:hiddenLine xmlns="" xmlns:a14="http://schemas.microsoft.com/office/drawing/2010/main" w="9525">
                     <a:solidFill>
                       <a:srgbClr val="000000"/>
                     </a:solidFill>
@@ -14555,7 +14602,7 @@
               </a:ln>
               <a:extLst>
                 <a:ext uri="{91240B29-F687-4f45-9708-019B960494DF}">
-                  <a14:hiddenLine xmlns:a14="http://schemas.microsoft.com/office/drawing/2010/main" xmlns="" w="9525">
+                  <a14:hiddenLine xmlns="" xmlns:a14="http://schemas.microsoft.com/office/drawing/2010/main" w="9525">
                     <a:solidFill>
                       <a:srgbClr val="000000"/>
                     </a:solidFill>
@@ -14645,7 +14692,7 @@
               </a:ln>
               <a:extLst>
                 <a:ext uri="{91240B29-F687-4f45-9708-019B960494DF}">
-                  <a14:hiddenLine xmlns:a14="http://schemas.microsoft.com/office/drawing/2010/main" xmlns="" w="9525">
+                  <a14:hiddenLine xmlns="" xmlns:a14="http://schemas.microsoft.com/office/drawing/2010/main" w="9525">
                     <a:solidFill>
                       <a:srgbClr val="000000"/>
                     </a:solidFill>
@@ -14735,7 +14782,7 @@
               </a:ln>
               <a:extLst>
                 <a:ext uri="{91240B29-F687-4f45-9708-019B960494DF}">
-                  <a14:hiddenLine xmlns:a14="http://schemas.microsoft.com/office/drawing/2010/main" xmlns="" w="9525">
+                  <a14:hiddenLine xmlns="" xmlns:a14="http://schemas.microsoft.com/office/drawing/2010/main" w="9525">
                     <a:solidFill>
                       <a:srgbClr val="000000"/>
                     </a:solidFill>
@@ -14797,7 +14844,7 @@
               </a:ln>
               <a:extLst>
                 <a:ext uri="{91240B29-F687-4f45-9708-019B960494DF}">
-                  <a14:hiddenLine xmlns:a14="http://schemas.microsoft.com/office/drawing/2010/main" xmlns="" w="9525">
+                  <a14:hiddenLine xmlns="" xmlns:a14="http://schemas.microsoft.com/office/drawing/2010/main" w="9525">
                     <a:solidFill>
                       <a:srgbClr val="000000"/>
                     </a:solidFill>
@@ -14907,7 +14954,7 @@
               </a:ln>
               <a:extLst>
                 <a:ext uri="{91240B29-F687-4f45-9708-019B960494DF}">
-                  <a14:hiddenLine xmlns:a14="http://schemas.microsoft.com/office/drawing/2010/main" xmlns="" w="9525">
+                  <a14:hiddenLine xmlns="" xmlns:a14="http://schemas.microsoft.com/office/drawing/2010/main" w="9525">
                     <a:solidFill>
                       <a:srgbClr val="000000"/>
                     </a:solidFill>
@@ -14991,7 +15038,7 @@
               </a:ln>
               <a:extLst>
                 <a:ext uri="{91240B29-F687-4f45-9708-019B960494DF}">
-                  <a14:hiddenLine xmlns:a14="http://schemas.microsoft.com/office/drawing/2010/main" xmlns="" w="9525">
+                  <a14:hiddenLine xmlns="" xmlns:a14="http://schemas.microsoft.com/office/drawing/2010/main" w="9525">
                     <a:solidFill>
                       <a:srgbClr val="000000"/>
                     </a:solidFill>
@@ -15053,7 +15100,7 @@
               </a:ln>
               <a:extLst>
                 <a:ext uri="{91240B29-F687-4f45-9708-019B960494DF}">
-                  <a14:hiddenLine xmlns:a14="http://schemas.microsoft.com/office/drawing/2010/main" xmlns="" w="9525">
+                  <a14:hiddenLine xmlns="" xmlns:a14="http://schemas.microsoft.com/office/drawing/2010/main" w="9525">
                     <a:solidFill>
                       <a:srgbClr val="000000"/>
                     </a:solidFill>
@@ -15115,7 +15162,7 @@
               </a:ln>
               <a:extLst>
                 <a:ext uri="{91240B29-F687-4f45-9708-019B960494DF}">
-                  <a14:hiddenLine xmlns:a14="http://schemas.microsoft.com/office/drawing/2010/main" xmlns="" w="9525">
+                  <a14:hiddenLine xmlns="" xmlns:a14="http://schemas.microsoft.com/office/drawing/2010/main" w="9525">
                     <a:solidFill>
                       <a:srgbClr val="000000"/>
                     </a:solidFill>
@@ -15205,7 +15252,7 @@
               </a:ln>
               <a:extLst>
                 <a:ext uri="{91240B29-F687-4f45-9708-019B960494DF}">
-                  <a14:hiddenLine xmlns:a14="http://schemas.microsoft.com/office/drawing/2010/main" xmlns="" w="9525">
+                  <a14:hiddenLine xmlns="" xmlns:a14="http://schemas.microsoft.com/office/drawing/2010/main" w="9525">
                     <a:solidFill>
                       <a:srgbClr val="000000"/>
                     </a:solidFill>
@@ -15239,7 +15286,7 @@
               </a:ln>
               <a:extLst>
                 <a:ext uri="{91240B29-F687-4f45-9708-019B960494DF}">
-                  <a14:hiddenLine xmlns:a14="http://schemas.microsoft.com/office/drawing/2010/main" xmlns="" w="9525">
+                  <a14:hiddenLine xmlns="" xmlns:a14="http://schemas.microsoft.com/office/drawing/2010/main" w="9525">
                     <a:solidFill>
                       <a:srgbClr val="000000"/>
                     </a:solidFill>
@@ -15304,7 +15351,7 @@
               </a:ln>
               <a:extLst>
                 <a:ext uri="{91240B29-F687-4f45-9708-019B960494DF}">
-                  <a14:hiddenLine xmlns:a14="http://schemas.microsoft.com/office/drawing/2010/main" xmlns="" w="9525">
+                  <a14:hiddenLine xmlns="" xmlns:a14="http://schemas.microsoft.com/office/drawing/2010/main" w="9525">
                     <a:solidFill>
                       <a:srgbClr val="000000"/>
                     </a:solidFill>
@@ -15394,7 +15441,7 @@
               </a:ln>
               <a:extLst>
                 <a:ext uri="{91240B29-F687-4f45-9708-019B960494DF}">
-                  <a14:hiddenLine xmlns:a14="http://schemas.microsoft.com/office/drawing/2010/main" xmlns="" w="9525">
+                  <a14:hiddenLine xmlns="" xmlns:a14="http://schemas.microsoft.com/office/drawing/2010/main" w="9525">
                     <a:solidFill>
                       <a:srgbClr val="000000"/>
                     </a:solidFill>
@@ -15456,7 +15503,7 @@
               </a:ln>
               <a:extLst>
                 <a:ext uri="{91240B29-F687-4f45-9708-019B960494DF}">
-                  <a14:hiddenLine xmlns:a14="http://schemas.microsoft.com/office/drawing/2010/main" xmlns="" w="9525">
+                  <a14:hiddenLine xmlns="" xmlns:a14="http://schemas.microsoft.com/office/drawing/2010/main" w="9525">
                     <a:solidFill>
                       <a:srgbClr val="000000"/>
                     </a:solidFill>
@@ -15546,7 +15593,7 @@
               </a:ln>
               <a:extLst>
                 <a:ext uri="{91240B29-F687-4f45-9708-019B960494DF}">
-                  <a14:hiddenLine xmlns:a14="http://schemas.microsoft.com/office/drawing/2010/main" xmlns="" w="9525">
+                  <a14:hiddenLine xmlns="" xmlns:a14="http://schemas.microsoft.com/office/drawing/2010/main" w="9525">
                     <a:solidFill>
                       <a:srgbClr val="000000"/>
                     </a:solidFill>
@@ -15611,7 +15658,7 @@
               </a:ln>
               <a:extLst>
                 <a:ext uri="{91240B29-F687-4f45-9708-019B960494DF}">
-                  <a14:hiddenLine xmlns:a14="http://schemas.microsoft.com/office/drawing/2010/main" xmlns="" w="9525">
+                  <a14:hiddenLine xmlns="" xmlns:a14="http://schemas.microsoft.com/office/drawing/2010/main" w="9525">
                     <a:solidFill>
                       <a:srgbClr val="000000"/>
                     </a:solidFill>
@@ -15673,7 +15720,7 @@
               </a:ln>
               <a:extLst>
                 <a:ext uri="{91240B29-F687-4f45-9708-019B960494DF}">
-                  <a14:hiddenLine xmlns:a14="http://schemas.microsoft.com/office/drawing/2010/main" xmlns="" w="9525">
+                  <a14:hiddenLine xmlns="" xmlns:a14="http://schemas.microsoft.com/office/drawing/2010/main" w="9525">
                     <a:solidFill>
                       <a:srgbClr val="000000"/>
                     </a:solidFill>
@@ -15763,7 +15810,7 @@
               </a:ln>
               <a:extLst>
                 <a:ext uri="{91240B29-F687-4f45-9708-019B960494DF}">
-                  <a14:hiddenLine xmlns:a14="http://schemas.microsoft.com/office/drawing/2010/main" xmlns="" w="9525">
+                  <a14:hiddenLine xmlns="" xmlns:a14="http://schemas.microsoft.com/office/drawing/2010/main" w="9525">
                     <a:solidFill>
                       <a:srgbClr val="000000"/>
                     </a:solidFill>
@@ -15853,7 +15900,7 @@
               </a:ln>
               <a:extLst>
                 <a:ext uri="{91240B29-F687-4f45-9708-019B960494DF}">
-                  <a14:hiddenLine xmlns:a14="http://schemas.microsoft.com/office/drawing/2010/main" xmlns="" w="9525">
+                  <a14:hiddenLine xmlns="" xmlns:a14="http://schemas.microsoft.com/office/drawing/2010/main" w="9525">
                     <a:solidFill>
                       <a:srgbClr val="000000"/>
                     </a:solidFill>
@@ -15918,7 +15965,7 @@
               </a:ln>
               <a:extLst>
                 <a:ext uri="{91240B29-F687-4f45-9708-019B960494DF}">
-                  <a14:hiddenLine xmlns:a14="http://schemas.microsoft.com/office/drawing/2010/main" xmlns="" w="9525">
+                  <a14:hiddenLine xmlns="" xmlns:a14="http://schemas.microsoft.com/office/drawing/2010/main" w="9525">
                     <a:solidFill>
                       <a:srgbClr val="000000"/>
                     </a:solidFill>
@@ -16038,7 +16085,7 @@
               </a:ln>
               <a:extLst>
                 <a:ext uri="{91240B29-F687-4f45-9708-019B960494DF}">
-                  <a14:hiddenLine xmlns:a14="http://schemas.microsoft.com/office/drawing/2010/main" xmlns="" w="9525">
+                  <a14:hiddenLine xmlns="" xmlns:a14="http://schemas.microsoft.com/office/drawing/2010/main" w="9525">
                     <a:solidFill>
                       <a:srgbClr val="000000"/>
                     </a:solidFill>
@@ -16136,7 +16183,7 @@
               </a:ln>
               <a:extLst>
                 <a:ext uri="{91240B29-F687-4f45-9708-019B960494DF}">
-                  <a14:hiddenLine xmlns:a14="http://schemas.microsoft.com/office/drawing/2010/main" xmlns="" w="9525">
+                  <a14:hiddenLine xmlns="" xmlns:a14="http://schemas.microsoft.com/office/drawing/2010/main" w="9525">
                     <a:solidFill>
                       <a:srgbClr val="000000"/>
                     </a:solidFill>
@@ -16251,7 +16298,7 @@
               </a:ln>
               <a:extLst>
                 <a:ext uri="{91240B29-F687-4f45-9708-019B960494DF}">
-                  <a14:hiddenLine xmlns:a14="http://schemas.microsoft.com/office/drawing/2010/main" xmlns="" w="9525">
+                  <a14:hiddenLine xmlns="" xmlns:a14="http://schemas.microsoft.com/office/drawing/2010/main" w="9525">
                     <a:solidFill>
                       <a:srgbClr val="000000"/>
                     </a:solidFill>
@@ -16341,7 +16388,7 @@
               </a:ln>
               <a:extLst>
                 <a:ext uri="{91240B29-F687-4f45-9708-019B960494DF}">
-                  <a14:hiddenLine xmlns:a14="http://schemas.microsoft.com/office/drawing/2010/main" xmlns="" w="9525">
+                  <a14:hiddenLine xmlns="" xmlns:a14="http://schemas.microsoft.com/office/drawing/2010/main" w="9525">
                     <a:solidFill>
                       <a:srgbClr val="000000"/>
                     </a:solidFill>
@@ -16406,7 +16453,7 @@
               </a:ln>
               <a:extLst>
                 <a:ext uri="{91240B29-F687-4f45-9708-019B960494DF}">
-                  <a14:hiddenLine xmlns:a14="http://schemas.microsoft.com/office/drawing/2010/main" xmlns="" w="9525">
+                  <a14:hiddenLine xmlns="" xmlns:a14="http://schemas.microsoft.com/office/drawing/2010/main" w="9525">
                     <a:solidFill>
                       <a:srgbClr val="000000"/>
                     </a:solidFill>
@@ -16496,7 +16543,7 @@
               </a:ln>
               <a:extLst>
                 <a:ext uri="{91240B29-F687-4f45-9708-019B960494DF}">
-                  <a14:hiddenLine xmlns:a14="http://schemas.microsoft.com/office/drawing/2010/main" xmlns="" w="9525">
+                  <a14:hiddenLine xmlns="" xmlns:a14="http://schemas.microsoft.com/office/drawing/2010/main" w="9525">
                     <a:solidFill>
                       <a:srgbClr val="000000"/>
                     </a:solidFill>
@@ -16564,7 +16611,7 @@
               </a:ln>
               <a:extLst>
                 <a:ext uri="{91240B29-F687-4f45-9708-019B960494DF}">
-                  <a14:hiddenLine xmlns:a14="http://schemas.microsoft.com/office/drawing/2010/main" xmlns="" w="9525">
+                  <a14:hiddenLine xmlns="" xmlns:a14="http://schemas.microsoft.com/office/drawing/2010/main" w="9525">
                     <a:solidFill>
                       <a:srgbClr val="000000"/>
                     </a:solidFill>
@@ -16654,7 +16701,7 @@
               </a:ln>
               <a:extLst>
                 <a:ext uri="{91240B29-F687-4f45-9708-019B960494DF}">
-                  <a14:hiddenLine xmlns:a14="http://schemas.microsoft.com/office/drawing/2010/main" xmlns="" w="9525">
+                  <a14:hiddenLine xmlns="" xmlns:a14="http://schemas.microsoft.com/office/drawing/2010/main" w="9525">
                     <a:solidFill>
                       <a:srgbClr val="000000"/>
                     </a:solidFill>
@@ -16722,7 +16769,7 @@
               </a:ln>
               <a:extLst>
                 <a:ext uri="{91240B29-F687-4f45-9708-019B960494DF}">
-                  <a14:hiddenLine xmlns:a14="http://schemas.microsoft.com/office/drawing/2010/main" xmlns="" w="9525">
+                  <a14:hiddenLine xmlns="" xmlns:a14="http://schemas.microsoft.com/office/drawing/2010/main" w="9525">
                     <a:solidFill>
                       <a:srgbClr val="000000"/>
                     </a:solidFill>
@@ -16812,7 +16859,7 @@
               </a:ln>
               <a:extLst>
                 <a:ext uri="{91240B29-F687-4f45-9708-019B960494DF}">
-                  <a14:hiddenLine xmlns:a14="http://schemas.microsoft.com/office/drawing/2010/main" xmlns="" w="9525">
+                  <a14:hiddenLine xmlns="" xmlns:a14="http://schemas.microsoft.com/office/drawing/2010/main" w="9525">
                     <a:solidFill>
                       <a:srgbClr val="000000"/>
                     </a:solidFill>
@@ -16846,7 +16893,7 @@
               </a:ln>
               <a:extLst>
                 <a:ext uri="{91240B29-F687-4f45-9708-019B960494DF}">
-                  <a14:hiddenLine xmlns:a14="http://schemas.microsoft.com/office/drawing/2010/main" xmlns="" w="9525">
+                  <a14:hiddenLine xmlns="" xmlns:a14="http://schemas.microsoft.com/office/drawing/2010/main" w="9525">
                     <a:solidFill>
                       <a:srgbClr val="000000"/>
                     </a:solidFill>

</xml_diff>

<commit_message>
TaskScheduler: Add a couple notes
</commit_message>
<xml_diff>
--- a/TaskScheduler/TaskScheduler.pptx
+++ b/TaskScheduler/TaskScheduler.pptx
@@ -1010,7 +1010,7 @@
           <a:p>
             <a:fld id="{857CC94D-E614-4874-A919-F25B27309A09}" type="datetimeFigureOut">
               <a:rPr lang="en-CA" smtClean="0"/>
-              <a:t>2024-09-28</a:t>
+              <a:t>2024-10-05</a:t>
             </a:fld>
             <a:endParaRPr lang="en-CA"/>
           </a:p>
@@ -2815,8 +2815,12 @@
               <a:defRPr/>
             </a:pPr>
             <a:r>
+              <a:rPr lang="en-CA"/>
+              <a:t>This talk is </a:t>
+            </a:r>
+            <a:r>
               <a:rPr lang="en-CA" dirty="0"/>
-              <a:t>This is based on my hobby projects – I don’t have </a:t>
+              <a:t>based on my hobby projects – I don’t have </a:t>
             </a:r>
             <a:r>
               <a:rPr lang="en-CA" i="1" dirty="0"/>
@@ -2824,11 +2828,30 @@
             </a:r>
             <a:r>
               <a:rPr lang="en-CA" i="0" dirty="0"/>
-              <a:t> experience in embedded </a:t>
-            </a:r>
-            <a:r>
-              <a:rPr lang="en-CA" i="0"/>
-              <a:t>systems programming</a:t>
+              <a:t> experience in embedded systems programming</a:t>
+            </a:r>
+          </a:p>
+          <a:p>
+            <a:pPr marL="171450" marR="0" lvl="0" indent="-171450" algn="l" defTabSz="914400" rtl="0" eaLnBrk="1" fontAlgn="auto" latinLnBrk="0" hangingPunct="1">
+              <a:lnSpc>
+                <a:spcPct val="100000"/>
+              </a:lnSpc>
+              <a:spcBef>
+                <a:spcPts val="0"/>
+              </a:spcBef>
+              <a:spcAft>
+                <a:spcPts val="0"/>
+              </a:spcAft>
+              <a:buClrTx/>
+              <a:buSzTx/>
+              <a:buFont typeface="Arial" panose="020B0604020202020204" pitchFamily="34" charset="0"/>
+              <a:buChar char="•"/>
+              <a:tabLst/>
+              <a:defRPr/>
+            </a:pPr>
+            <a:r>
+              <a:rPr lang="en-CA" i="0" dirty="0"/>
+              <a:t>Web site: https://lenp.net/</a:t>
             </a:r>
             <a:endParaRPr lang="en-CA" dirty="0"/>
           </a:p>
@@ -4075,7 +4098,7 @@
           <a:noFill/>
           <a:extLst>
             <a:ext uri="{909E8E84-426E-40dd-AFC4-6F175D3DCCD1}">
-              <a14:hiddenFill xmlns="" xmlns:a14="http://schemas.microsoft.com/office/drawing/2010/main">
+              <a14:hiddenFill xmlns:a14="http://schemas.microsoft.com/office/drawing/2010/main" xmlns="">
                 <a:solidFill>
                   <a:srgbClr val="FFFFFF"/>
                 </a:solidFill>
@@ -4141,7 +4164,7 @@
             </a:ln>
             <a:extLst>
               <a:ext uri="{91240B29-F687-4f45-9708-019B960494DF}">
-                <a14:hiddenLine xmlns="" xmlns:a14="http://schemas.microsoft.com/office/drawing/2010/main" w="9525">
+                <a14:hiddenLine xmlns:a14="http://schemas.microsoft.com/office/drawing/2010/main" xmlns="" w="9525">
                   <a:solidFill>
                     <a:srgbClr val="000000"/>
                   </a:solidFill>
@@ -4231,7 +4254,7 @@
             </a:ln>
             <a:extLst>
               <a:ext uri="{91240B29-F687-4f45-9708-019B960494DF}">
-                <a14:hiddenLine xmlns="" xmlns:a14="http://schemas.microsoft.com/office/drawing/2010/main" w="9525">
+                <a14:hiddenLine xmlns:a14="http://schemas.microsoft.com/office/drawing/2010/main" xmlns="" w="9525">
                   <a:solidFill>
                     <a:srgbClr val="000000"/>
                   </a:solidFill>
@@ -4321,7 +4344,7 @@
             </a:ln>
             <a:extLst>
               <a:ext uri="{91240B29-F687-4f45-9708-019B960494DF}">
-                <a14:hiddenLine xmlns="" xmlns:a14="http://schemas.microsoft.com/office/drawing/2010/main" w="9525">
+                <a14:hiddenLine xmlns:a14="http://schemas.microsoft.com/office/drawing/2010/main" xmlns="" w="9525">
                   <a:solidFill>
                     <a:srgbClr val="000000"/>
                   </a:solidFill>
@@ -4355,7 +4378,7 @@
             </a:ln>
             <a:extLst>
               <a:ext uri="{91240B29-F687-4f45-9708-019B960494DF}">
-                <a14:hiddenLine xmlns="" xmlns:a14="http://schemas.microsoft.com/office/drawing/2010/main" w="9525">
+                <a14:hiddenLine xmlns:a14="http://schemas.microsoft.com/office/drawing/2010/main" xmlns="" w="9525">
                   <a:solidFill>
                     <a:srgbClr val="000000"/>
                   </a:solidFill>
@@ -4445,7 +4468,7 @@
             </a:ln>
             <a:extLst>
               <a:ext uri="{91240B29-F687-4f45-9708-019B960494DF}">
-                <a14:hiddenLine xmlns="" xmlns:a14="http://schemas.microsoft.com/office/drawing/2010/main" w="9525">
+                <a14:hiddenLine xmlns:a14="http://schemas.microsoft.com/office/drawing/2010/main" xmlns="" w="9525">
                   <a:solidFill>
                     <a:srgbClr val="000000"/>
                   </a:solidFill>
@@ -4507,7 +4530,7 @@
             </a:ln>
             <a:extLst>
               <a:ext uri="{91240B29-F687-4f45-9708-019B960494DF}">
-                <a14:hiddenLine xmlns="" xmlns:a14="http://schemas.microsoft.com/office/drawing/2010/main" w="9525">
+                <a14:hiddenLine xmlns:a14="http://schemas.microsoft.com/office/drawing/2010/main" xmlns="" w="9525">
                   <a:solidFill>
                     <a:srgbClr val="000000"/>
                   </a:solidFill>
@@ -4569,7 +4592,7 @@
             </a:ln>
             <a:extLst>
               <a:ext uri="{91240B29-F687-4f45-9708-019B960494DF}">
-                <a14:hiddenLine xmlns="" xmlns:a14="http://schemas.microsoft.com/office/drawing/2010/main" w="9525">
+                <a14:hiddenLine xmlns:a14="http://schemas.microsoft.com/office/drawing/2010/main" xmlns="" w="9525">
                   <a:solidFill>
                     <a:srgbClr val="000000"/>
                   </a:solidFill>
@@ -4659,7 +4682,7 @@
             </a:ln>
             <a:extLst>
               <a:ext uri="{91240B29-F687-4f45-9708-019B960494DF}">
-                <a14:hiddenLine xmlns="" xmlns:a14="http://schemas.microsoft.com/office/drawing/2010/main" w="9525">
+                <a14:hiddenLine xmlns:a14="http://schemas.microsoft.com/office/drawing/2010/main" xmlns="" w="9525">
                   <a:solidFill>
                     <a:srgbClr val="000000"/>
                   </a:solidFill>
@@ -4721,7 +4744,7 @@
             </a:ln>
             <a:extLst>
               <a:ext uri="{91240B29-F687-4f45-9708-019B960494DF}">
-                <a14:hiddenLine xmlns="" xmlns:a14="http://schemas.microsoft.com/office/drawing/2010/main" w="9525">
+                <a14:hiddenLine xmlns:a14="http://schemas.microsoft.com/office/drawing/2010/main" xmlns="" w="9525">
                   <a:solidFill>
                     <a:srgbClr val="000000"/>
                   </a:solidFill>
@@ -4783,7 +4806,7 @@
             </a:ln>
             <a:extLst>
               <a:ext uri="{91240B29-F687-4f45-9708-019B960494DF}">
-                <a14:hiddenLine xmlns="" xmlns:a14="http://schemas.microsoft.com/office/drawing/2010/main" w="9525">
+                <a14:hiddenLine xmlns:a14="http://schemas.microsoft.com/office/drawing/2010/main" xmlns="" w="9525">
                   <a:solidFill>
                     <a:srgbClr val="000000"/>
                   </a:solidFill>
@@ -4873,7 +4896,7 @@
             </a:ln>
             <a:extLst>
               <a:ext uri="{91240B29-F687-4f45-9708-019B960494DF}">
-                <a14:hiddenLine xmlns="" xmlns:a14="http://schemas.microsoft.com/office/drawing/2010/main" w="9525">
+                <a14:hiddenLine xmlns:a14="http://schemas.microsoft.com/office/drawing/2010/main" xmlns="" w="9525">
                   <a:solidFill>
                     <a:srgbClr val="000000"/>
                   </a:solidFill>
@@ -4963,7 +4986,7 @@
             </a:ln>
             <a:extLst>
               <a:ext uri="{91240B29-F687-4f45-9708-019B960494DF}">
-                <a14:hiddenLine xmlns="" xmlns:a14="http://schemas.microsoft.com/office/drawing/2010/main" w="9525">
+                <a14:hiddenLine xmlns:a14="http://schemas.microsoft.com/office/drawing/2010/main" xmlns="" w="9525">
                   <a:solidFill>
                     <a:srgbClr val="000000"/>
                   </a:solidFill>
@@ -5025,7 +5048,7 @@
             </a:ln>
             <a:extLst>
               <a:ext uri="{91240B29-F687-4f45-9708-019B960494DF}">
-                <a14:hiddenLine xmlns="" xmlns:a14="http://schemas.microsoft.com/office/drawing/2010/main" w="9525">
+                <a14:hiddenLine xmlns:a14="http://schemas.microsoft.com/office/drawing/2010/main" xmlns="" w="9525">
                   <a:solidFill>
                     <a:srgbClr val="000000"/>
                   </a:solidFill>
@@ -5135,7 +5158,7 @@
             </a:ln>
             <a:extLst>
               <a:ext uri="{91240B29-F687-4f45-9708-019B960494DF}">
-                <a14:hiddenLine xmlns="" xmlns:a14="http://schemas.microsoft.com/office/drawing/2010/main" w="9525">
+                <a14:hiddenLine xmlns:a14="http://schemas.microsoft.com/office/drawing/2010/main" xmlns="" w="9525">
                   <a:solidFill>
                     <a:srgbClr val="000000"/>
                   </a:solidFill>
@@ -5197,7 +5220,7 @@
             </a:ln>
             <a:extLst>
               <a:ext uri="{91240B29-F687-4f45-9708-019B960494DF}">
-                <a14:hiddenLine xmlns="" xmlns:a14="http://schemas.microsoft.com/office/drawing/2010/main" w="9525">
+                <a14:hiddenLine xmlns:a14="http://schemas.microsoft.com/office/drawing/2010/main" xmlns="" w="9525">
                   <a:solidFill>
                     <a:srgbClr val="000000"/>
                   </a:solidFill>
@@ -5287,7 +5310,7 @@
             </a:ln>
             <a:extLst>
               <a:ext uri="{91240B29-F687-4f45-9708-019B960494DF}">
-                <a14:hiddenLine xmlns="" xmlns:a14="http://schemas.microsoft.com/office/drawing/2010/main" w="9525">
+                <a14:hiddenLine xmlns:a14="http://schemas.microsoft.com/office/drawing/2010/main" xmlns="" w="9525">
                   <a:solidFill>
                     <a:srgbClr val="000000"/>
                   </a:solidFill>
@@ -5377,7 +5400,7 @@
             </a:ln>
             <a:extLst>
               <a:ext uri="{91240B29-F687-4f45-9708-019B960494DF}">
-                <a14:hiddenLine xmlns="" xmlns:a14="http://schemas.microsoft.com/office/drawing/2010/main" w="9525">
+                <a14:hiddenLine xmlns:a14="http://schemas.microsoft.com/office/drawing/2010/main" xmlns="" w="9525">
                   <a:solidFill>
                     <a:srgbClr val="000000"/>
                   </a:solidFill>
@@ -5439,7 +5462,7 @@
             </a:ln>
             <a:extLst>
               <a:ext uri="{91240B29-F687-4f45-9708-019B960494DF}">
-                <a14:hiddenLine xmlns="" xmlns:a14="http://schemas.microsoft.com/office/drawing/2010/main" w="9525">
+                <a14:hiddenLine xmlns:a14="http://schemas.microsoft.com/office/drawing/2010/main" xmlns="" w="9525">
                   <a:solidFill>
                     <a:srgbClr val="000000"/>
                   </a:solidFill>
@@ -5529,7 +5552,7 @@
             </a:ln>
             <a:extLst>
               <a:ext uri="{91240B29-F687-4f45-9708-019B960494DF}">
-                <a14:hiddenLine xmlns="" xmlns:a14="http://schemas.microsoft.com/office/drawing/2010/main" w="9525">
+                <a14:hiddenLine xmlns:a14="http://schemas.microsoft.com/office/drawing/2010/main" xmlns="" w="9525">
                   <a:solidFill>
                     <a:srgbClr val="000000"/>
                   </a:solidFill>
@@ -5619,7 +5642,7 @@
             </a:ln>
             <a:extLst>
               <a:ext uri="{91240B29-F687-4f45-9708-019B960494DF}">
-                <a14:hiddenLine xmlns="" xmlns:a14="http://schemas.microsoft.com/office/drawing/2010/main" w="9525">
+                <a14:hiddenLine xmlns:a14="http://schemas.microsoft.com/office/drawing/2010/main" xmlns="" w="9525">
                   <a:solidFill>
                     <a:srgbClr val="000000"/>
                   </a:solidFill>
@@ -5675,7 +5698,7 @@
             </a:ln>
             <a:extLst>
               <a:ext uri="{91240B29-F687-4f45-9708-019B960494DF}">
-                <a14:hiddenLine xmlns="" xmlns:a14="http://schemas.microsoft.com/office/drawing/2010/main" w="9525">
+                <a14:hiddenLine xmlns:a14="http://schemas.microsoft.com/office/drawing/2010/main" xmlns="" w="9525">
                   <a:solidFill>
                     <a:srgbClr val="000000"/>
                   </a:solidFill>
@@ -5765,7 +5788,7 @@
             </a:ln>
             <a:extLst>
               <a:ext uri="{91240B29-F687-4f45-9708-019B960494DF}">
-                <a14:hiddenLine xmlns="" xmlns:a14="http://schemas.microsoft.com/office/drawing/2010/main" w="9525">
+                <a14:hiddenLine xmlns:a14="http://schemas.microsoft.com/office/drawing/2010/main" xmlns="" w="9525">
                   <a:solidFill>
                     <a:srgbClr val="000000"/>
                   </a:solidFill>
@@ -5821,7 +5844,7 @@
             </a:ln>
             <a:extLst>
               <a:ext uri="{91240B29-F687-4f45-9708-019B960494DF}">
-                <a14:hiddenLine xmlns="" xmlns:a14="http://schemas.microsoft.com/office/drawing/2010/main" w="9525">
+                <a14:hiddenLine xmlns:a14="http://schemas.microsoft.com/office/drawing/2010/main" xmlns="" w="9525">
                   <a:solidFill>
                     <a:srgbClr val="000000"/>
                   </a:solidFill>
@@ -5911,7 +5934,7 @@
             </a:ln>
             <a:extLst>
               <a:ext uri="{91240B29-F687-4f45-9708-019B960494DF}">
-                <a14:hiddenLine xmlns="" xmlns:a14="http://schemas.microsoft.com/office/drawing/2010/main" w="9525">
+                <a14:hiddenLine xmlns:a14="http://schemas.microsoft.com/office/drawing/2010/main" xmlns="" w="9525">
                   <a:solidFill>
                     <a:srgbClr val="000000"/>
                   </a:solidFill>
@@ -5979,7 +6002,7 @@
             </a:ln>
             <a:extLst>
               <a:ext uri="{91240B29-F687-4f45-9708-019B960494DF}">
-                <a14:hiddenLine xmlns="" xmlns:a14="http://schemas.microsoft.com/office/drawing/2010/main" w="9525">
+                <a14:hiddenLine xmlns:a14="http://schemas.microsoft.com/office/drawing/2010/main" xmlns="" w="9525">
                   <a:solidFill>
                     <a:srgbClr val="000000"/>
                   </a:solidFill>
@@ -6069,7 +6092,7 @@
             </a:ln>
             <a:extLst>
               <a:ext uri="{91240B29-F687-4f45-9708-019B960494DF}">
-                <a14:hiddenLine xmlns="" xmlns:a14="http://schemas.microsoft.com/office/drawing/2010/main" w="9525">
+                <a14:hiddenLine xmlns:a14="http://schemas.microsoft.com/office/drawing/2010/main" xmlns="" w="9525">
                   <a:solidFill>
                     <a:srgbClr val="000000"/>
                   </a:solidFill>
@@ -6137,7 +6160,7 @@
             </a:ln>
             <a:extLst>
               <a:ext uri="{91240B29-F687-4f45-9708-019B960494DF}">
-                <a14:hiddenLine xmlns="" xmlns:a14="http://schemas.microsoft.com/office/drawing/2010/main" w="9525">
+                <a14:hiddenLine xmlns:a14="http://schemas.microsoft.com/office/drawing/2010/main" xmlns="" w="9525">
                   <a:solidFill>
                     <a:srgbClr val="000000"/>
                   </a:solidFill>
@@ -6227,7 +6250,7 @@
             </a:ln>
             <a:extLst>
               <a:ext uri="{91240B29-F687-4f45-9708-019B960494DF}">
-                <a14:hiddenLine xmlns="" xmlns:a14="http://schemas.microsoft.com/office/drawing/2010/main" w="9525">
+                <a14:hiddenLine xmlns:a14="http://schemas.microsoft.com/office/drawing/2010/main" xmlns="" w="9525">
                   <a:solidFill>
                     <a:srgbClr val="000000"/>
                   </a:solidFill>
@@ -6261,7 +6284,7 @@
             </a:ln>
             <a:extLst>
               <a:ext uri="{91240B29-F687-4f45-9708-019B960494DF}">
-                <a14:hiddenLine xmlns="" xmlns:a14="http://schemas.microsoft.com/office/drawing/2010/main" w="9525">
+                <a14:hiddenLine xmlns:a14="http://schemas.microsoft.com/office/drawing/2010/main" xmlns="" w="9525">
                   <a:solidFill>
                     <a:srgbClr val="000000"/>
                   </a:solidFill>
@@ -6351,7 +6374,7 @@
             </a:ln>
             <a:extLst>
               <a:ext uri="{91240B29-F687-4f45-9708-019B960494DF}">
-                <a14:hiddenLine xmlns="" xmlns:a14="http://schemas.microsoft.com/office/drawing/2010/main" w="9525">
+                <a14:hiddenLine xmlns:a14="http://schemas.microsoft.com/office/drawing/2010/main" xmlns="" w="9525">
                   <a:solidFill>
                     <a:srgbClr val="000000"/>
                   </a:solidFill>
@@ -6413,7 +6436,7 @@
             </a:ln>
             <a:extLst>
               <a:ext uri="{91240B29-F687-4f45-9708-019B960494DF}">
-                <a14:hiddenLine xmlns="" xmlns:a14="http://schemas.microsoft.com/office/drawing/2010/main" w="9525">
+                <a14:hiddenLine xmlns:a14="http://schemas.microsoft.com/office/drawing/2010/main" xmlns="" w="9525">
                   <a:solidFill>
                     <a:srgbClr val="000000"/>
                   </a:solidFill>
@@ -6475,7 +6498,7 @@
             </a:ln>
             <a:extLst>
               <a:ext uri="{91240B29-F687-4f45-9708-019B960494DF}">
-                <a14:hiddenLine xmlns="" xmlns:a14="http://schemas.microsoft.com/office/drawing/2010/main" w="9525">
+                <a14:hiddenLine xmlns:a14="http://schemas.microsoft.com/office/drawing/2010/main" xmlns="" w="9525">
                   <a:solidFill>
                     <a:srgbClr val="000000"/>
                   </a:solidFill>
@@ -6565,7 +6588,7 @@
             </a:ln>
             <a:extLst>
               <a:ext uri="{91240B29-F687-4f45-9708-019B960494DF}">
-                <a14:hiddenLine xmlns="" xmlns:a14="http://schemas.microsoft.com/office/drawing/2010/main" w="9525">
+                <a14:hiddenLine xmlns:a14="http://schemas.microsoft.com/office/drawing/2010/main" xmlns="" w="9525">
                   <a:solidFill>
                     <a:srgbClr val="000000"/>
                   </a:solidFill>
@@ -6633,7 +6656,7 @@
             </a:ln>
             <a:extLst>
               <a:ext uri="{91240B29-F687-4f45-9708-019B960494DF}">
-                <a14:hiddenLine xmlns="" xmlns:a14="http://schemas.microsoft.com/office/drawing/2010/main" w="9525">
+                <a14:hiddenLine xmlns:a14="http://schemas.microsoft.com/office/drawing/2010/main" xmlns="" w="9525">
                   <a:solidFill>
                     <a:srgbClr val="000000"/>
                   </a:solidFill>
@@ -6695,7 +6718,7 @@
             </a:ln>
             <a:extLst>
               <a:ext uri="{91240B29-F687-4f45-9708-019B960494DF}">
-                <a14:hiddenLine xmlns="" xmlns:a14="http://schemas.microsoft.com/office/drawing/2010/main" w="9525">
+                <a14:hiddenLine xmlns:a14="http://schemas.microsoft.com/office/drawing/2010/main" xmlns="" w="9525">
                   <a:solidFill>
                     <a:srgbClr val="000000"/>
                   </a:solidFill>
@@ -6785,7 +6808,7 @@
             </a:ln>
             <a:extLst>
               <a:ext uri="{91240B29-F687-4f45-9708-019B960494DF}">
-                <a14:hiddenLine xmlns="" xmlns:a14="http://schemas.microsoft.com/office/drawing/2010/main" w="9525">
+                <a14:hiddenLine xmlns:a14="http://schemas.microsoft.com/office/drawing/2010/main" xmlns="" w="9525">
                   <a:solidFill>
                     <a:srgbClr val="000000"/>
                   </a:solidFill>
@@ -6847,7 +6870,7 @@
             </a:ln>
             <a:extLst>
               <a:ext uri="{91240B29-F687-4f45-9708-019B960494DF}">
-                <a14:hiddenLine xmlns="" xmlns:a14="http://schemas.microsoft.com/office/drawing/2010/main" w="9525">
+                <a14:hiddenLine xmlns:a14="http://schemas.microsoft.com/office/drawing/2010/main" xmlns="" w="9525">
                   <a:solidFill>
                     <a:srgbClr val="000000"/>
                   </a:solidFill>
@@ -6937,7 +6960,7 @@
             </a:ln>
             <a:extLst>
               <a:ext uri="{91240B29-F687-4f45-9708-019B960494DF}">
-                <a14:hiddenLine xmlns="" xmlns:a14="http://schemas.microsoft.com/office/drawing/2010/main" w="9525">
+                <a14:hiddenLine xmlns:a14="http://schemas.microsoft.com/office/drawing/2010/main" xmlns="" w="9525">
                   <a:solidFill>
                     <a:srgbClr val="000000"/>
                   </a:solidFill>
@@ -6999,7 +7022,7 @@
             </a:ln>
             <a:extLst>
               <a:ext uri="{91240B29-F687-4f45-9708-019B960494DF}">
-                <a14:hiddenLine xmlns="" xmlns:a14="http://schemas.microsoft.com/office/drawing/2010/main" w="9525">
+                <a14:hiddenLine xmlns:a14="http://schemas.microsoft.com/office/drawing/2010/main" xmlns="" w="9525">
                   <a:solidFill>
                     <a:srgbClr val="000000"/>
                   </a:solidFill>
@@ -7089,7 +7112,7 @@
             </a:ln>
             <a:extLst>
               <a:ext uri="{91240B29-F687-4f45-9708-019B960494DF}">
-                <a14:hiddenLine xmlns="" xmlns:a14="http://schemas.microsoft.com/office/drawing/2010/main" w="9525">
+                <a14:hiddenLine xmlns:a14="http://schemas.microsoft.com/office/drawing/2010/main" xmlns="" w="9525">
                   <a:solidFill>
                     <a:srgbClr val="000000"/>
                   </a:solidFill>
@@ -7123,7 +7146,7 @@
             </a:ln>
             <a:extLst>
               <a:ext uri="{91240B29-F687-4f45-9708-019B960494DF}">
-                <a14:hiddenLine xmlns="" xmlns:a14="http://schemas.microsoft.com/office/drawing/2010/main" w="9525">
+                <a14:hiddenLine xmlns:a14="http://schemas.microsoft.com/office/drawing/2010/main" xmlns="" w="9525">
                   <a:solidFill>
                     <a:srgbClr val="000000"/>
                   </a:solidFill>
@@ -7188,7 +7211,7 @@
             </a:ln>
             <a:extLst>
               <a:ext uri="{91240B29-F687-4f45-9708-019B960494DF}">
-                <a14:hiddenLine xmlns="" xmlns:a14="http://schemas.microsoft.com/office/drawing/2010/main" w="9525">
+                <a14:hiddenLine xmlns:a14="http://schemas.microsoft.com/office/drawing/2010/main" xmlns="" w="9525">
                   <a:solidFill>
                     <a:srgbClr val="000000"/>
                   </a:solidFill>
@@ -7278,7 +7301,7 @@
             </a:ln>
             <a:extLst>
               <a:ext uri="{91240B29-F687-4f45-9708-019B960494DF}">
-                <a14:hiddenLine xmlns="" xmlns:a14="http://schemas.microsoft.com/office/drawing/2010/main" w="9525">
+                <a14:hiddenLine xmlns:a14="http://schemas.microsoft.com/office/drawing/2010/main" xmlns="" w="9525">
                   <a:solidFill>
                     <a:srgbClr val="000000"/>
                   </a:solidFill>
@@ -7340,7 +7363,7 @@
             </a:ln>
             <a:extLst>
               <a:ext uri="{91240B29-F687-4f45-9708-019B960494DF}">
-                <a14:hiddenLine xmlns="" xmlns:a14="http://schemas.microsoft.com/office/drawing/2010/main" w="9525">
+                <a14:hiddenLine xmlns:a14="http://schemas.microsoft.com/office/drawing/2010/main" xmlns="" w="9525">
                   <a:solidFill>
                     <a:srgbClr val="000000"/>
                   </a:solidFill>
@@ -7430,7 +7453,7 @@
             </a:ln>
             <a:extLst>
               <a:ext uri="{91240B29-F687-4f45-9708-019B960494DF}">
-                <a14:hiddenLine xmlns="" xmlns:a14="http://schemas.microsoft.com/office/drawing/2010/main" w="9525">
+                <a14:hiddenLine xmlns:a14="http://schemas.microsoft.com/office/drawing/2010/main" xmlns="" w="9525">
                   <a:solidFill>
                     <a:srgbClr val="000000"/>
                   </a:solidFill>
@@ -7520,7 +7543,7 @@
             </a:ln>
             <a:extLst>
               <a:ext uri="{91240B29-F687-4f45-9708-019B960494DF}">
-                <a14:hiddenLine xmlns="" xmlns:a14="http://schemas.microsoft.com/office/drawing/2010/main" w="9525">
+                <a14:hiddenLine xmlns:a14="http://schemas.microsoft.com/office/drawing/2010/main" xmlns="" w="9525">
                   <a:solidFill>
                     <a:srgbClr val="000000"/>
                   </a:solidFill>
@@ -7585,7 +7608,7 @@
             </a:ln>
             <a:extLst>
               <a:ext uri="{91240B29-F687-4f45-9708-019B960494DF}">
-                <a14:hiddenLine xmlns="" xmlns:a14="http://schemas.microsoft.com/office/drawing/2010/main" w="9525">
+                <a14:hiddenLine xmlns:a14="http://schemas.microsoft.com/office/drawing/2010/main" xmlns="" w="9525">
                   <a:solidFill>
                     <a:srgbClr val="000000"/>
                   </a:solidFill>
@@ -7647,7 +7670,7 @@
             </a:ln>
             <a:extLst>
               <a:ext uri="{91240B29-F687-4f45-9708-019B960494DF}">
-                <a14:hiddenLine xmlns="" xmlns:a14="http://schemas.microsoft.com/office/drawing/2010/main" w="9525">
+                <a14:hiddenLine xmlns:a14="http://schemas.microsoft.com/office/drawing/2010/main" xmlns="" w="9525">
                   <a:solidFill>
                     <a:srgbClr val="000000"/>
                   </a:solidFill>
@@ -7737,7 +7760,7 @@
             </a:ln>
             <a:extLst>
               <a:ext uri="{91240B29-F687-4f45-9708-019B960494DF}">
-                <a14:hiddenLine xmlns="" xmlns:a14="http://schemas.microsoft.com/office/drawing/2010/main" w="9525">
+                <a14:hiddenLine xmlns:a14="http://schemas.microsoft.com/office/drawing/2010/main" xmlns="" w="9525">
                   <a:solidFill>
                     <a:srgbClr val="000000"/>
                   </a:solidFill>
@@ -7827,7 +7850,7 @@
             </a:ln>
             <a:extLst>
               <a:ext uri="{91240B29-F687-4f45-9708-019B960494DF}">
-                <a14:hiddenLine xmlns="" xmlns:a14="http://schemas.microsoft.com/office/drawing/2010/main" w="9525">
+                <a14:hiddenLine xmlns:a14="http://schemas.microsoft.com/office/drawing/2010/main" xmlns="" w="9525">
                   <a:solidFill>
                     <a:srgbClr val="000000"/>
                   </a:solidFill>
@@ -7889,7 +7912,7 @@
             </a:ln>
             <a:extLst>
               <a:ext uri="{91240B29-F687-4f45-9708-019B960494DF}">
-                <a14:hiddenLine xmlns="" xmlns:a14="http://schemas.microsoft.com/office/drawing/2010/main" w="9525">
+                <a14:hiddenLine xmlns:a14="http://schemas.microsoft.com/office/drawing/2010/main" xmlns="" w="9525">
                   <a:solidFill>
                     <a:srgbClr val="000000"/>
                   </a:solidFill>
@@ -8009,7 +8032,7 @@
             </a:ln>
             <a:extLst>
               <a:ext uri="{91240B29-F687-4f45-9708-019B960494DF}">
-                <a14:hiddenLine xmlns="" xmlns:a14="http://schemas.microsoft.com/office/drawing/2010/main" w="9525">
+                <a14:hiddenLine xmlns:a14="http://schemas.microsoft.com/office/drawing/2010/main" xmlns="" w="9525">
                   <a:solidFill>
                     <a:srgbClr val="000000"/>
                   </a:solidFill>
@@ -8077,7 +8100,7 @@
             </a:ln>
             <a:extLst>
               <a:ext uri="{91240B29-F687-4f45-9708-019B960494DF}">
-                <a14:hiddenLine xmlns="" xmlns:a14="http://schemas.microsoft.com/office/drawing/2010/main" w="9525">
+                <a14:hiddenLine xmlns:a14="http://schemas.microsoft.com/office/drawing/2010/main" xmlns="" w="9525">
                   <a:solidFill>
                     <a:srgbClr val="000000"/>
                   </a:solidFill>
@@ -8167,7 +8190,7 @@
             </a:ln>
             <a:extLst>
               <a:ext uri="{91240B29-F687-4f45-9708-019B960494DF}">
-                <a14:hiddenLine xmlns="" xmlns:a14="http://schemas.microsoft.com/office/drawing/2010/main" w="9525">
+                <a14:hiddenLine xmlns:a14="http://schemas.microsoft.com/office/drawing/2010/main" xmlns="" w="9525">
                   <a:solidFill>
                     <a:srgbClr val="000000"/>
                   </a:solidFill>
@@ -14094,7 +14117,7 @@
           <a:noFill/>
           <a:extLst>
             <a:ext uri="{909E8E84-426E-40dd-AFC4-6F175D3DCCD1}">
-              <a14:hiddenFill xmlns="" xmlns:a14="http://schemas.microsoft.com/office/drawing/2010/main">
+              <a14:hiddenFill xmlns:a14="http://schemas.microsoft.com/office/drawing/2010/main" xmlns="">
                 <a:solidFill>
                   <a:srgbClr val="FFFFFF"/>
                 </a:solidFill>
@@ -14174,7 +14197,7 @@
               </a:ln>
               <a:extLst>
                 <a:ext uri="{91240B29-F687-4f45-9708-019B960494DF}">
-                  <a14:hiddenLine xmlns="" xmlns:a14="http://schemas.microsoft.com/office/drawing/2010/main" w="9525">
+                  <a14:hiddenLine xmlns:a14="http://schemas.microsoft.com/office/drawing/2010/main" xmlns="" w="9525">
                     <a:solidFill>
                       <a:srgbClr val="000000"/>
                     </a:solidFill>
@@ -14264,7 +14287,7 @@
               </a:ln>
               <a:extLst>
                 <a:ext uri="{91240B29-F687-4f45-9708-019B960494DF}">
-                  <a14:hiddenLine xmlns="" xmlns:a14="http://schemas.microsoft.com/office/drawing/2010/main" w="9525">
+                  <a14:hiddenLine xmlns:a14="http://schemas.microsoft.com/office/drawing/2010/main" xmlns="" w="9525">
                     <a:solidFill>
                       <a:srgbClr val="000000"/>
                     </a:solidFill>
@@ -14354,7 +14377,7 @@
               </a:ln>
               <a:extLst>
                 <a:ext uri="{91240B29-F687-4f45-9708-019B960494DF}">
-                  <a14:hiddenLine xmlns="" xmlns:a14="http://schemas.microsoft.com/office/drawing/2010/main" w="9525">
+                  <a14:hiddenLine xmlns:a14="http://schemas.microsoft.com/office/drawing/2010/main" xmlns="" w="9525">
                     <a:solidFill>
                       <a:srgbClr val="000000"/>
                     </a:solidFill>
@@ -14416,7 +14439,7 @@
               </a:ln>
               <a:extLst>
                 <a:ext uri="{91240B29-F687-4f45-9708-019B960494DF}">
-                  <a14:hiddenLine xmlns="" xmlns:a14="http://schemas.microsoft.com/office/drawing/2010/main" w="9525">
+                  <a14:hiddenLine xmlns:a14="http://schemas.microsoft.com/office/drawing/2010/main" xmlns="" w="9525">
                     <a:solidFill>
                       <a:srgbClr val="000000"/>
                     </a:solidFill>
@@ -14506,7 +14529,7 @@
               </a:ln>
               <a:extLst>
                 <a:ext uri="{91240B29-F687-4f45-9708-019B960494DF}">
-                  <a14:hiddenLine xmlns="" xmlns:a14="http://schemas.microsoft.com/office/drawing/2010/main" w="9525">
+                  <a14:hiddenLine xmlns:a14="http://schemas.microsoft.com/office/drawing/2010/main" xmlns="" w="9525">
                     <a:solidFill>
                       <a:srgbClr val="000000"/>
                     </a:solidFill>
@@ -14568,7 +14591,7 @@
               </a:ln>
               <a:extLst>
                 <a:ext uri="{91240B29-F687-4f45-9708-019B960494DF}">
-                  <a14:hiddenLine xmlns="" xmlns:a14="http://schemas.microsoft.com/office/drawing/2010/main" w="9525">
+                  <a14:hiddenLine xmlns:a14="http://schemas.microsoft.com/office/drawing/2010/main" xmlns="" w="9525">
                     <a:solidFill>
                       <a:srgbClr val="000000"/>
                     </a:solidFill>
@@ -14630,7 +14653,7 @@
               </a:ln>
               <a:extLst>
                 <a:ext uri="{91240B29-F687-4f45-9708-019B960494DF}">
-                  <a14:hiddenLine xmlns="" xmlns:a14="http://schemas.microsoft.com/office/drawing/2010/main" w="9525">
+                  <a14:hiddenLine xmlns:a14="http://schemas.microsoft.com/office/drawing/2010/main" xmlns="" w="9525">
                     <a:solidFill>
                       <a:srgbClr val="000000"/>
                     </a:solidFill>
@@ -14720,7 +14743,7 @@
               </a:ln>
               <a:extLst>
                 <a:ext uri="{91240B29-F687-4f45-9708-019B960494DF}">
-                  <a14:hiddenLine xmlns="" xmlns:a14="http://schemas.microsoft.com/office/drawing/2010/main" w="9525">
+                  <a14:hiddenLine xmlns:a14="http://schemas.microsoft.com/office/drawing/2010/main" xmlns="" w="9525">
                     <a:solidFill>
                       <a:srgbClr val="000000"/>
                     </a:solidFill>
@@ -14810,7 +14833,7 @@
               </a:ln>
               <a:extLst>
                 <a:ext uri="{91240B29-F687-4f45-9708-019B960494DF}">
-                  <a14:hiddenLine xmlns="" xmlns:a14="http://schemas.microsoft.com/office/drawing/2010/main" w="9525">
+                  <a14:hiddenLine xmlns:a14="http://schemas.microsoft.com/office/drawing/2010/main" xmlns="" w="9525">
                     <a:solidFill>
                       <a:srgbClr val="000000"/>
                     </a:solidFill>
@@ -14872,7 +14895,7 @@
               </a:ln>
               <a:extLst>
                 <a:ext uri="{91240B29-F687-4f45-9708-019B960494DF}">
-                  <a14:hiddenLine xmlns="" xmlns:a14="http://schemas.microsoft.com/office/drawing/2010/main" w="9525">
+                  <a14:hiddenLine xmlns:a14="http://schemas.microsoft.com/office/drawing/2010/main" xmlns="" w="9525">
                     <a:solidFill>
                       <a:srgbClr val="000000"/>
                     </a:solidFill>
@@ -14982,7 +15005,7 @@
               </a:ln>
               <a:extLst>
                 <a:ext uri="{91240B29-F687-4f45-9708-019B960494DF}">
-                  <a14:hiddenLine xmlns="" xmlns:a14="http://schemas.microsoft.com/office/drawing/2010/main" w="9525">
+                  <a14:hiddenLine xmlns:a14="http://schemas.microsoft.com/office/drawing/2010/main" xmlns="" w="9525">
                     <a:solidFill>
                       <a:srgbClr val="000000"/>
                     </a:solidFill>
@@ -15066,7 +15089,7 @@
               </a:ln>
               <a:extLst>
                 <a:ext uri="{91240B29-F687-4f45-9708-019B960494DF}">
-                  <a14:hiddenLine xmlns="" xmlns:a14="http://schemas.microsoft.com/office/drawing/2010/main" w="9525">
+                  <a14:hiddenLine xmlns:a14="http://schemas.microsoft.com/office/drawing/2010/main" xmlns="" w="9525">
                     <a:solidFill>
                       <a:srgbClr val="000000"/>
                     </a:solidFill>
@@ -15128,7 +15151,7 @@
               </a:ln>
               <a:extLst>
                 <a:ext uri="{91240B29-F687-4f45-9708-019B960494DF}">
-                  <a14:hiddenLine xmlns="" xmlns:a14="http://schemas.microsoft.com/office/drawing/2010/main" w="9525">
+                  <a14:hiddenLine xmlns:a14="http://schemas.microsoft.com/office/drawing/2010/main" xmlns="" w="9525">
                     <a:solidFill>
                       <a:srgbClr val="000000"/>
                     </a:solidFill>
@@ -15190,7 +15213,7 @@
               </a:ln>
               <a:extLst>
                 <a:ext uri="{91240B29-F687-4f45-9708-019B960494DF}">
-                  <a14:hiddenLine xmlns="" xmlns:a14="http://schemas.microsoft.com/office/drawing/2010/main" w="9525">
+                  <a14:hiddenLine xmlns:a14="http://schemas.microsoft.com/office/drawing/2010/main" xmlns="" w="9525">
                     <a:solidFill>
                       <a:srgbClr val="000000"/>
                     </a:solidFill>
@@ -15280,7 +15303,7 @@
               </a:ln>
               <a:extLst>
                 <a:ext uri="{91240B29-F687-4f45-9708-019B960494DF}">
-                  <a14:hiddenLine xmlns="" xmlns:a14="http://schemas.microsoft.com/office/drawing/2010/main" w="9525">
+                  <a14:hiddenLine xmlns:a14="http://schemas.microsoft.com/office/drawing/2010/main" xmlns="" w="9525">
                     <a:solidFill>
                       <a:srgbClr val="000000"/>
                     </a:solidFill>
@@ -15314,7 +15337,7 @@
               </a:ln>
               <a:extLst>
                 <a:ext uri="{91240B29-F687-4f45-9708-019B960494DF}">
-                  <a14:hiddenLine xmlns="" xmlns:a14="http://schemas.microsoft.com/office/drawing/2010/main" w="9525">
+                  <a14:hiddenLine xmlns:a14="http://schemas.microsoft.com/office/drawing/2010/main" xmlns="" w="9525">
                     <a:solidFill>
                       <a:srgbClr val="000000"/>
                     </a:solidFill>
@@ -15379,7 +15402,7 @@
               </a:ln>
               <a:extLst>
                 <a:ext uri="{91240B29-F687-4f45-9708-019B960494DF}">
-                  <a14:hiddenLine xmlns="" xmlns:a14="http://schemas.microsoft.com/office/drawing/2010/main" w="9525">
+                  <a14:hiddenLine xmlns:a14="http://schemas.microsoft.com/office/drawing/2010/main" xmlns="" w="9525">
                     <a:solidFill>
                       <a:srgbClr val="000000"/>
                     </a:solidFill>
@@ -15469,7 +15492,7 @@
               </a:ln>
               <a:extLst>
                 <a:ext uri="{91240B29-F687-4f45-9708-019B960494DF}">
-                  <a14:hiddenLine xmlns="" xmlns:a14="http://schemas.microsoft.com/office/drawing/2010/main" w="9525">
+                  <a14:hiddenLine xmlns:a14="http://schemas.microsoft.com/office/drawing/2010/main" xmlns="" w="9525">
                     <a:solidFill>
                       <a:srgbClr val="000000"/>
                     </a:solidFill>
@@ -15531,7 +15554,7 @@
               </a:ln>
               <a:extLst>
                 <a:ext uri="{91240B29-F687-4f45-9708-019B960494DF}">
-                  <a14:hiddenLine xmlns="" xmlns:a14="http://schemas.microsoft.com/office/drawing/2010/main" w="9525">
+                  <a14:hiddenLine xmlns:a14="http://schemas.microsoft.com/office/drawing/2010/main" xmlns="" w="9525">
                     <a:solidFill>
                       <a:srgbClr val="000000"/>
                     </a:solidFill>
@@ -15621,7 +15644,7 @@
               </a:ln>
               <a:extLst>
                 <a:ext uri="{91240B29-F687-4f45-9708-019B960494DF}">
-                  <a14:hiddenLine xmlns="" xmlns:a14="http://schemas.microsoft.com/office/drawing/2010/main" w="9525">
+                  <a14:hiddenLine xmlns:a14="http://schemas.microsoft.com/office/drawing/2010/main" xmlns="" w="9525">
                     <a:solidFill>
                       <a:srgbClr val="000000"/>
                     </a:solidFill>
@@ -15686,7 +15709,7 @@
               </a:ln>
               <a:extLst>
                 <a:ext uri="{91240B29-F687-4f45-9708-019B960494DF}">
-                  <a14:hiddenLine xmlns="" xmlns:a14="http://schemas.microsoft.com/office/drawing/2010/main" w="9525">
+                  <a14:hiddenLine xmlns:a14="http://schemas.microsoft.com/office/drawing/2010/main" xmlns="" w="9525">
                     <a:solidFill>
                       <a:srgbClr val="000000"/>
                     </a:solidFill>
@@ -15748,7 +15771,7 @@
               </a:ln>
               <a:extLst>
                 <a:ext uri="{91240B29-F687-4f45-9708-019B960494DF}">
-                  <a14:hiddenLine xmlns="" xmlns:a14="http://schemas.microsoft.com/office/drawing/2010/main" w="9525">
+                  <a14:hiddenLine xmlns:a14="http://schemas.microsoft.com/office/drawing/2010/main" xmlns="" w="9525">
                     <a:solidFill>
                       <a:srgbClr val="000000"/>
                     </a:solidFill>
@@ -15838,7 +15861,7 @@
               </a:ln>
               <a:extLst>
                 <a:ext uri="{91240B29-F687-4f45-9708-019B960494DF}">
-                  <a14:hiddenLine xmlns="" xmlns:a14="http://schemas.microsoft.com/office/drawing/2010/main" w="9525">
+                  <a14:hiddenLine xmlns:a14="http://schemas.microsoft.com/office/drawing/2010/main" xmlns="" w="9525">
                     <a:solidFill>
                       <a:srgbClr val="000000"/>
                     </a:solidFill>
@@ -15928,7 +15951,7 @@
               </a:ln>
               <a:extLst>
                 <a:ext uri="{91240B29-F687-4f45-9708-019B960494DF}">
-                  <a14:hiddenLine xmlns="" xmlns:a14="http://schemas.microsoft.com/office/drawing/2010/main" w="9525">
+                  <a14:hiddenLine xmlns:a14="http://schemas.microsoft.com/office/drawing/2010/main" xmlns="" w="9525">
                     <a:solidFill>
                       <a:srgbClr val="000000"/>
                     </a:solidFill>
@@ -15993,7 +16016,7 @@
               </a:ln>
               <a:extLst>
                 <a:ext uri="{91240B29-F687-4f45-9708-019B960494DF}">
-                  <a14:hiddenLine xmlns="" xmlns:a14="http://schemas.microsoft.com/office/drawing/2010/main" w="9525">
+                  <a14:hiddenLine xmlns:a14="http://schemas.microsoft.com/office/drawing/2010/main" xmlns="" w="9525">
                     <a:solidFill>
                       <a:srgbClr val="000000"/>
                     </a:solidFill>
@@ -16113,7 +16136,7 @@
               </a:ln>
               <a:extLst>
                 <a:ext uri="{91240B29-F687-4f45-9708-019B960494DF}">
-                  <a14:hiddenLine xmlns="" xmlns:a14="http://schemas.microsoft.com/office/drawing/2010/main" w="9525">
+                  <a14:hiddenLine xmlns:a14="http://schemas.microsoft.com/office/drawing/2010/main" xmlns="" w="9525">
                     <a:solidFill>
                       <a:srgbClr val="000000"/>
                     </a:solidFill>
@@ -16211,7 +16234,7 @@
               </a:ln>
               <a:extLst>
                 <a:ext uri="{91240B29-F687-4f45-9708-019B960494DF}">
-                  <a14:hiddenLine xmlns="" xmlns:a14="http://schemas.microsoft.com/office/drawing/2010/main" w="9525">
+                  <a14:hiddenLine xmlns:a14="http://schemas.microsoft.com/office/drawing/2010/main" xmlns="" w="9525">
                     <a:solidFill>
                       <a:srgbClr val="000000"/>
                     </a:solidFill>
@@ -16326,7 +16349,7 @@
               </a:ln>
               <a:extLst>
                 <a:ext uri="{91240B29-F687-4f45-9708-019B960494DF}">
-                  <a14:hiddenLine xmlns="" xmlns:a14="http://schemas.microsoft.com/office/drawing/2010/main" w="9525">
+                  <a14:hiddenLine xmlns:a14="http://schemas.microsoft.com/office/drawing/2010/main" xmlns="" w="9525">
                     <a:solidFill>
                       <a:srgbClr val="000000"/>
                     </a:solidFill>
@@ -16416,7 +16439,7 @@
               </a:ln>
               <a:extLst>
                 <a:ext uri="{91240B29-F687-4f45-9708-019B960494DF}">
-                  <a14:hiddenLine xmlns="" xmlns:a14="http://schemas.microsoft.com/office/drawing/2010/main" w="9525">
+                  <a14:hiddenLine xmlns:a14="http://schemas.microsoft.com/office/drawing/2010/main" xmlns="" w="9525">
                     <a:solidFill>
                       <a:srgbClr val="000000"/>
                     </a:solidFill>
@@ -16481,7 +16504,7 @@
               </a:ln>
               <a:extLst>
                 <a:ext uri="{91240B29-F687-4f45-9708-019B960494DF}">
-                  <a14:hiddenLine xmlns="" xmlns:a14="http://schemas.microsoft.com/office/drawing/2010/main" w="9525">
+                  <a14:hiddenLine xmlns:a14="http://schemas.microsoft.com/office/drawing/2010/main" xmlns="" w="9525">
                     <a:solidFill>
                       <a:srgbClr val="000000"/>
                     </a:solidFill>
@@ -16571,7 +16594,7 @@
               </a:ln>
               <a:extLst>
                 <a:ext uri="{91240B29-F687-4f45-9708-019B960494DF}">
-                  <a14:hiddenLine xmlns="" xmlns:a14="http://schemas.microsoft.com/office/drawing/2010/main" w="9525">
+                  <a14:hiddenLine xmlns:a14="http://schemas.microsoft.com/office/drawing/2010/main" xmlns="" w="9525">
                     <a:solidFill>
                       <a:srgbClr val="000000"/>
                     </a:solidFill>
@@ -16639,7 +16662,7 @@
               </a:ln>
               <a:extLst>
                 <a:ext uri="{91240B29-F687-4f45-9708-019B960494DF}">
-                  <a14:hiddenLine xmlns="" xmlns:a14="http://schemas.microsoft.com/office/drawing/2010/main" w="9525">
+                  <a14:hiddenLine xmlns:a14="http://schemas.microsoft.com/office/drawing/2010/main" xmlns="" w="9525">
                     <a:solidFill>
                       <a:srgbClr val="000000"/>
                     </a:solidFill>
@@ -16729,7 +16752,7 @@
               </a:ln>
               <a:extLst>
                 <a:ext uri="{91240B29-F687-4f45-9708-019B960494DF}">
-                  <a14:hiddenLine xmlns="" xmlns:a14="http://schemas.microsoft.com/office/drawing/2010/main" w="9525">
+                  <a14:hiddenLine xmlns:a14="http://schemas.microsoft.com/office/drawing/2010/main" xmlns="" w="9525">
                     <a:solidFill>
                       <a:srgbClr val="000000"/>
                     </a:solidFill>
@@ -16797,7 +16820,7 @@
               </a:ln>
               <a:extLst>
                 <a:ext uri="{91240B29-F687-4f45-9708-019B960494DF}">
-                  <a14:hiddenLine xmlns="" xmlns:a14="http://schemas.microsoft.com/office/drawing/2010/main" w="9525">
+                  <a14:hiddenLine xmlns:a14="http://schemas.microsoft.com/office/drawing/2010/main" xmlns="" w="9525">
                     <a:solidFill>
                       <a:srgbClr val="000000"/>
                     </a:solidFill>
@@ -16887,7 +16910,7 @@
               </a:ln>
               <a:extLst>
                 <a:ext uri="{91240B29-F687-4f45-9708-019B960494DF}">
-                  <a14:hiddenLine xmlns="" xmlns:a14="http://schemas.microsoft.com/office/drawing/2010/main" w="9525">
+                  <a14:hiddenLine xmlns:a14="http://schemas.microsoft.com/office/drawing/2010/main" xmlns="" w="9525">
                     <a:solidFill>
                       <a:srgbClr val="000000"/>
                     </a:solidFill>
@@ -16921,7 +16944,7 @@
               </a:ln>
               <a:extLst>
                 <a:ext uri="{91240B29-F687-4f45-9708-019B960494DF}">
-                  <a14:hiddenLine xmlns="" xmlns:a14="http://schemas.microsoft.com/office/drawing/2010/main" w="9525">
+                  <a14:hiddenLine xmlns:a14="http://schemas.microsoft.com/office/drawing/2010/main" xmlns="" w="9525">
                     <a:solidFill>
                       <a:srgbClr val="000000"/>
                     </a:solidFill>

</xml_diff>

<commit_message>
TaskScheduler: add a slide
</commit_message>
<xml_diff>
--- a/TaskScheduler/TaskScheduler.pptx
+++ b/TaskScheduler/TaskScheduler.pptx
@@ -5,7 +5,7 @@
     <p:sldMasterId id="2147483669" r:id="rId1"/>
   </p:sldMasterIdLst>
   <p:notesMasterIdLst>
-    <p:notesMasterId r:id="rId25"/>
+    <p:notesMasterId r:id="rId26"/>
   </p:notesMasterIdLst>
   <p:sldIdLst>
     <p:sldId id="256" r:id="rId2"/>
@@ -31,6 +31,7 @@
     <p:sldId id="280" r:id="rId22"/>
     <p:sldId id="264" r:id="rId23"/>
     <p:sldId id="261" r:id="rId24"/>
+    <p:sldId id="285" r:id="rId25"/>
   </p:sldIdLst>
   <p:sldSz cx="12192000" cy="6858000"/>
   <p:notesSz cx="6858000" cy="9144000"/>
@@ -3964,7 +3965,7 @@
           <a:noFill/>
           <a:extLst>
             <a:ext uri="{909E8E84-426E-40dd-AFC4-6F175D3DCCD1}">
-              <a14:hiddenFill xmlns:a14="http://schemas.microsoft.com/office/drawing/2010/main" xmlns="">
+              <a14:hiddenFill xmlns="" xmlns:a14="http://schemas.microsoft.com/office/drawing/2010/main">
                 <a:solidFill>
                   <a:srgbClr val="FFFFFF"/>
                 </a:solidFill>
@@ -4030,7 +4031,7 @@
             </a:ln>
             <a:extLst>
               <a:ext uri="{91240B29-F687-4f45-9708-019B960494DF}">
-                <a14:hiddenLine xmlns:a14="http://schemas.microsoft.com/office/drawing/2010/main" xmlns="" w="9525">
+                <a14:hiddenLine xmlns="" xmlns:a14="http://schemas.microsoft.com/office/drawing/2010/main" w="9525">
                   <a:solidFill>
                     <a:srgbClr val="000000"/>
                   </a:solidFill>
@@ -4120,7 +4121,7 @@
             </a:ln>
             <a:extLst>
               <a:ext uri="{91240B29-F687-4f45-9708-019B960494DF}">
-                <a14:hiddenLine xmlns:a14="http://schemas.microsoft.com/office/drawing/2010/main" xmlns="" w="9525">
+                <a14:hiddenLine xmlns="" xmlns:a14="http://schemas.microsoft.com/office/drawing/2010/main" w="9525">
                   <a:solidFill>
                     <a:srgbClr val="000000"/>
                   </a:solidFill>
@@ -4210,7 +4211,7 @@
             </a:ln>
             <a:extLst>
               <a:ext uri="{91240B29-F687-4f45-9708-019B960494DF}">
-                <a14:hiddenLine xmlns:a14="http://schemas.microsoft.com/office/drawing/2010/main" xmlns="" w="9525">
+                <a14:hiddenLine xmlns="" xmlns:a14="http://schemas.microsoft.com/office/drawing/2010/main" w="9525">
                   <a:solidFill>
                     <a:srgbClr val="000000"/>
                   </a:solidFill>
@@ -4244,7 +4245,7 @@
             </a:ln>
             <a:extLst>
               <a:ext uri="{91240B29-F687-4f45-9708-019B960494DF}">
-                <a14:hiddenLine xmlns:a14="http://schemas.microsoft.com/office/drawing/2010/main" xmlns="" w="9525">
+                <a14:hiddenLine xmlns="" xmlns:a14="http://schemas.microsoft.com/office/drawing/2010/main" w="9525">
                   <a:solidFill>
                     <a:srgbClr val="000000"/>
                   </a:solidFill>
@@ -4334,7 +4335,7 @@
             </a:ln>
             <a:extLst>
               <a:ext uri="{91240B29-F687-4f45-9708-019B960494DF}">
-                <a14:hiddenLine xmlns:a14="http://schemas.microsoft.com/office/drawing/2010/main" xmlns="" w="9525">
+                <a14:hiddenLine xmlns="" xmlns:a14="http://schemas.microsoft.com/office/drawing/2010/main" w="9525">
                   <a:solidFill>
                     <a:srgbClr val="000000"/>
                   </a:solidFill>
@@ -4396,7 +4397,7 @@
             </a:ln>
             <a:extLst>
               <a:ext uri="{91240B29-F687-4f45-9708-019B960494DF}">
-                <a14:hiddenLine xmlns:a14="http://schemas.microsoft.com/office/drawing/2010/main" xmlns="" w="9525">
+                <a14:hiddenLine xmlns="" xmlns:a14="http://schemas.microsoft.com/office/drawing/2010/main" w="9525">
                   <a:solidFill>
                     <a:srgbClr val="000000"/>
                   </a:solidFill>
@@ -4458,7 +4459,7 @@
             </a:ln>
             <a:extLst>
               <a:ext uri="{91240B29-F687-4f45-9708-019B960494DF}">
-                <a14:hiddenLine xmlns:a14="http://schemas.microsoft.com/office/drawing/2010/main" xmlns="" w="9525">
+                <a14:hiddenLine xmlns="" xmlns:a14="http://schemas.microsoft.com/office/drawing/2010/main" w="9525">
                   <a:solidFill>
                     <a:srgbClr val="000000"/>
                   </a:solidFill>
@@ -4548,7 +4549,7 @@
             </a:ln>
             <a:extLst>
               <a:ext uri="{91240B29-F687-4f45-9708-019B960494DF}">
-                <a14:hiddenLine xmlns:a14="http://schemas.microsoft.com/office/drawing/2010/main" xmlns="" w="9525">
+                <a14:hiddenLine xmlns="" xmlns:a14="http://schemas.microsoft.com/office/drawing/2010/main" w="9525">
                   <a:solidFill>
                     <a:srgbClr val="000000"/>
                   </a:solidFill>
@@ -4610,7 +4611,7 @@
             </a:ln>
             <a:extLst>
               <a:ext uri="{91240B29-F687-4f45-9708-019B960494DF}">
-                <a14:hiddenLine xmlns:a14="http://schemas.microsoft.com/office/drawing/2010/main" xmlns="" w="9525">
+                <a14:hiddenLine xmlns="" xmlns:a14="http://schemas.microsoft.com/office/drawing/2010/main" w="9525">
                   <a:solidFill>
                     <a:srgbClr val="000000"/>
                   </a:solidFill>
@@ -4672,7 +4673,7 @@
             </a:ln>
             <a:extLst>
               <a:ext uri="{91240B29-F687-4f45-9708-019B960494DF}">
-                <a14:hiddenLine xmlns:a14="http://schemas.microsoft.com/office/drawing/2010/main" xmlns="" w="9525">
+                <a14:hiddenLine xmlns="" xmlns:a14="http://schemas.microsoft.com/office/drawing/2010/main" w="9525">
                   <a:solidFill>
                     <a:srgbClr val="000000"/>
                   </a:solidFill>
@@ -4762,7 +4763,7 @@
             </a:ln>
             <a:extLst>
               <a:ext uri="{91240B29-F687-4f45-9708-019B960494DF}">
-                <a14:hiddenLine xmlns:a14="http://schemas.microsoft.com/office/drawing/2010/main" xmlns="" w="9525">
+                <a14:hiddenLine xmlns="" xmlns:a14="http://schemas.microsoft.com/office/drawing/2010/main" w="9525">
                   <a:solidFill>
                     <a:srgbClr val="000000"/>
                   </a:solidFill>
@@ -4852,7 +4853,7 @@
             </a:ln>
             <a:extLst>
               <a:ext uri="{91240B29-F687-4f45-9708-019B960494DF}">
-                <a14:hiddenLine xmlns:a14="http://schemas.microsoft.com/office/drawing/2010/main" xmlns="" w="9525">
+                <a14:hiddenLine xmlns="" xmlns:a14="http://schemas.microsoft.com/office/drawing/2010/main" w="9525">
                   <a:solidFill>
                     <a:srgbClr val="000000"/>
                   </a:solidFill>
@@ -4914,7 +4915,7 @@
             </a:ln>
             <a:extLst>
               <a:ext uri="{91240B29-F687-4f45-9708-019B960494DF}">
-                <a14:hiddenLine xmlns:a14="http://schemas.microsoft.com/office/drawing/2010/main" xmlns="" w="9525">
+                <a14:hiddenLine xmlns="" xmlns:a14="http://schemas.microsoft.com/office/drawing/2010/main" w="9525">
                   <a:solidFill>
                     <a:srgbClr val="000000"/>
                   </a:solidFill>
@@ -5024,7 +5025,7 @@
             </a:ln>
             <a:extLst>
               <a:ext uri="{91240B29-F687-4f45-9708-019B960494DF}">
-                <a14:hiddenLine xmlns:a14="http://schemas.microsoft.com/office/drawing/2010/main" xmlns="" w="9525">
+                <a14:hiddenLine xmlns="" xmlns:a14="http://schemas.microsoft.com/office/drawing/2010/main" w="9525">
                   <a:solidFill>
                     <a:srgbClr val="000000"/>
                   </a:solidFill>
@@ -5086,7 +5087,7 @@
             </a:ln>
             <a:extLst>
               <a:ext uri="{91240B29-F687-4f45-9708-019B960494DF}">
-                <a14:hiddenLine xmlns:a14="http://schemas.microsoft.com/office/drawing/2010/main" xmlns="" w="9525">
+                <a14:hiddenLine xmlns="" xmlns:a14="http://schemas.microsoft.com/office/drawing/2010/main" w="9525">
                   <a:solidFill>
                     <a:srgbClr val="000000"/>
                   </a:solidFill>
@@ -5176,7 +5177,7 @@
             </a:ln>
             <a:extLst>
               <a:ext uri="{91240B29-F687-4f45-9708-019B960494DF}">
-                <a14:hiddenLine xmlns:a14="http://schemas.microsoft.com/office/drawing/2010/main" xmlns="" w="9525">
+                <a14:hiddenLine xmlns="" xmlns:a14="http://schemas.microsoft.com/office/drawing/2010/main" w="9525">
                   <a:solidFill>
                     <a:srgbClr val="000000"/>
                   </a:solidFill>
@@ -5266,7 +5267,7 @@
             </a:ln>
             <a:extLst>
               <a:ext uri="{91240B29-F687-4f45-9708-019B960494DF}">
-                <a14:hiddenLine xmlns:a14="http://schemas.microsoft.com/office/drawing/2010/main" xmlns="" w="9525">
+                <a14:hiddenLine xmlns="" xmlns:a14="http://schemas.microsoft.com/office/drawing/2010/main" w="9525">
                   <a:solidFill>
                     <a:srgbClr val="000000"/>
                   </a:solidFill>
@@ -5328,7 +5329,7 @@
             </a:ln>
             <a:extLst>
               <a:ext uri="{91240B29-F687-4f45-9708-019B960494DF}">
-                <a14:hiddenLine xmlns:a14="http://schemas.microsoft.com/office/drawing/2010/main" xmlns="" w="9525">
+                <a14:hiddenLine xmlns="" xmlns:a14="http://schemas.microsoft.com/office/drawing/2010/main" w="9525">
                   <a:solidFill>
                     <a:srgbClr val="000000"/>
                   </a:solidFill>
@@ -5418,7 +5419,7 @@
             </a:ln>
             <a:extLst>
               <a:ext uri="{91240B29-F687-4f45-9708-019B960494DF}">
-                <a14:hiddenLine xmlns:a14="http://schemas.microsoft.com/office/drawing/2010/main" xmlns="" w="9525">
+                <a14:hiddenLine xmlns="" xmlns:a14="http://schemas.microsoft.com/office/drawing/2010/main" w="9525">
                   <a:solidFill>
                     <a:srgbClr val="000000"/>
                   </a:solidFill>
@@ -5508,7 +5509,7 @@
             </a:ln>
             <a:extLst>
               <a:ext uri="{91240B29-F687-4f45-9708-019B960494DF}">
-                <a14:hiddenLine xmlns:a14="http://schemas.microsoft.com/office/drawing/2010/main" xmlns="" w="9525">
+                <a14:hiddenLine xmlns="" xmlns:a14="http://schemas.microsoft.com/office/drawing/2010/main" w="9525">
                   <a:solidFill>
                     <a:srgbClr val="000000"/>
                   </a:solidFill>
@@ -5564,7 +5565,7 @@
             </a:ln>
             <a:extLst>
               <a:ext uri="{91240B29-F687-4f45-9708-019B960494DF}">
-                <a14:hiddenLine xmlns:a14="http://schemas.microsoft.com/office/drawing/2010/main" xmlns="" w="9525">
+                <a14:hiddenLine xmlns="" xmlns:a14="http://schemas.microsoft.com/office/drawing/2010/main" w="9525">
                   <a:solidFill>
                     <a:srgbClr val="000000"/>
                   </a:solidFill>
@@ -5654,7 +5655,7 @@
             </a:ln>
             <a:extLst>
               <a:ext uri="{91240B29-F687-4f45-9708-019B960494DF}">
-                <a14:hiddenLine xmlns:a14="http://schemas.microsoft.com/office/drawing/2010/main" xmlns="" w="9525">
+                <a14:hiddenLine xmlns="" xmlns:a14="http://schemas.microsoft.com/office/drawing/2010/main" w="9525">
                   <a:solidFill>
                     <a:srgbClr val="000000"/>
                   </a:solidFill>
@@ -5710,7 +5711,7 @@
             </a:ln>
             <a:extLst>
               <a:ext uri="{91240B29-F687-4f45-9708-019B960494DF}">
-                <a14:hiddenLine xmlns:a14="http://schemas.microsoft.com/office/drawing/2010/main" xmlns="" w="9525">
+                <a14:hiddenLine xmlns="" xmlns:a14="http://schemas.microsoft.com/office/drawing/2010/main" w="9525">
                   <a:solidFill>
                     <a:srgbClr val="000000"/>
                   </a:solidFill>
@@ -5800,7 +5801,7 @@
             </a:ln>
             <a:extLst>
               <a:ext uri="{91240B29-F687-4f45-9708-019B960494DF}">
-                <a14:hiddenLine xmlns:a14="http://schemas.microsoft.com/office/drawing/2010/main" xmlns="" w="9525">
+                <a14:hiddenLine xmlns="" xmlns:a14="http://schemas.microsoft.com/office/drawing/2010/main" w="9525">
                   <a:solidFill>
                     <a:srgbClr val="000000"/>
                   </a:solidFill>
@@ -5868,7 +5869,7 @@
             </a:ln>
             <a:extLst>
               <a:ext uri="{91240B29-F687-4f45-9708-019B960494DF}">
-                <a14:hiddenLine xmlns:a14="http://schemas.microsoft.com/office/drawing/2010/main" xmlns="" w="9525">
+                <a14:hiddenLine xmlns="" xmlns:a14="http://schemas.microsoft.com/office/drawing/2010/main" w="9525">
                   <a:solidFill>
                     <a:srgbClr val="000000"/>
                   </a:solidFill>
@@ -5958,7 +5959,7 @@
             </a:ln>
             <a:extLst>
               <a:ext uri="{91240B29-F687-4f45-9708-019B960494DF}">
-                <a14:hiddenLine xmlns:a14="http://schemas.microsoft.com/office/drawing/2010/main" xmlns="" w="9525">
+                <a14:hiddenLine xmlns="" xmlns:a14="http://schemas.microsoft.com/office/drawing/2010/main" w="9525">
                   <a:solidFill>
                     <a:srgbClr val="000000"/>
                   </a:solidFill>
@@ -6026,7 +6027,7 @@
             </a:ln>
             <a:extLst>
               <a:ext uri="{91240B29-F687-4f45-9708-019B960494DF}">
-                <a14:hiddenLine xmlns:a14="http://schemas.microsoft.com/office/drawing/2010/main" xmlns="" w="9525">
+                <a14:hiddenLine xmlns="" xmlns:a14="http://schemas.microsoft.com/office/drawing/2010/main" w="9525">
                   <a:solidFill>
                     <a:srgbClr val="000000"/>
                   </a:solidFill>
@@ -6116,7 +6117,7 @@
             </a:ln>
             <a:extLst>
               <a:ext uri="{91240B29-F687-4f45-9708-019B960494DF}">
-                <a14:hiddenLine xmlns:a14="http://schemas.microsoft.com/office/drawing/2010/main" xmlns="" w="9525">
+                <a14:hiddenLine xmlns="" xmlns:a14="http://schemas.microsoft.com/office/drawing/2010/main" w="9525">
                   <a:solidFill>
                     <a:srgbClr val="000000"/>
                   </a:solidFill>
@@ -6150,7 +6151,7 @@
             </a:ln>
             <a:extLst>
               <a:ext uri="{91240B29-F687-4f45-9708-019B960494DF}">
-                <a14:hiddenLine xmlns:a14="http://schemas.microsoft.com/office/drawing/2010/main" xmlns="" w="9525">
+                <a14:hiddenLine xmlns="" xmlns:a14="http://schemas.microsoft.com/office/drawing/2010/main" w="9525">
                   <a:solidFill>
                     <a:srgbClr val="000000"/>
                   </a:solidFill>
@@ -6240,7 +6241,7 @@
             </a:ln>
             <a:extLst>
               <a:ext uri="{91240B29-F687-4f45-9708-019B960494DF}">
-                <a14:hiddenLine xmlns:a14="http://schemas.microsoft.com/office/drawing/2010/main" xmlns="" w="9525">
+                <a14:hiddenLine xmlns="" xmlns:a14="http://schemas.microsoft.com/office/drawing/2010/main" w="9525">
                   <a:solidFill>
                     <a:srgbClr val="000000"/>
                   </a:solidFill>
@@ -6302,7 +6303,7 @@
             </a:ln>
             <a:extLst>
               <a:ext uri="{91240B29-F687-4f45-9708-019B960494DF}">
-                <a14:hiddenLine xmlns:a14="http://schemas.microsoft.com/office/drawing/2010/main" xmlns="" w="9525">
+                <a14:hiddenLine xmlns="" xmlns:a14="http://schemas.microsoft.com/office/drawing/2010/main" w="9525">
                   <a:solidFill>
                     <a:srgbClr val="000000"/>
                   </a:solidFill>
@@ -6364,7 +6365,7 @@
             </a:ln>
             <a:extLst>
               <a:ext uri="{91240B29-F687-4f45-9708-019B960494DF}">
-                <a14:hiddenLine xmlns:a14="http://schemas.microsoft.com/office/drawing/2010/main" xmlns="" w="9525">
+                <a14:hiddenLine xmlns="" xmlns:a14="http://schemas.microsoft.com/office/drawing/2010/main" w="9525">
                   <a:solidFill>
                     <a:srgbClr val="000000"/>
                   </a:solidFill>
@@ -6454,7 +6455,7 @@
             </a:ln>
             <a:extLst>
               <a:ext uri="{91240B29-F687-4f45-9708-019B960494DF}">
-                <a14:hiddenLine xmlns:a14="http://schemas.microsoft.com/office/drawing/2010/main" xmlns="" w="9525">
+                <a14:hiddenLine xmlns="" xmlns:a14="http://schemas.microsoft.com/office/drawing/2010/main" w="9525">
                   <a:solidFill>
                     <a:srgbClr val="000000"/>
                   </a:solidFill>
@@ -6522,7 +6523,7 @@
             </a:ln>
             <a:extLst>
               <a:ext uri="{91240B29-F687-4f45-9708-019B960494DF}">
-                <a14:hiddenLine xmlns:a14="http://schemas.microsoft.com/office/drawing/2010/main" xmlns="" w="9525">
+                <a14:hiddenLine xmlns="" xmlns:a14="http://schemas.microsoft.com/office/drawing/2010/main" w="9525">
                   <a:solidFill>
                     <a:srgbClr val="000000"/>
                   </a:solidFill>
@@ -6584,7 +6585,7 @@
             </a:ln>
             <a:extLst>
               <a:ext uri="{91240B29-F687-4f45-9708-019B960494DF}">
-                <a14:hiddenLine xmlns:a14="http://schemas.microsoft.com/office/drawing/2010/main" xmlns="" w="9525">
+                <a14:hiddenLine xmlns="" xmlns:a14="http://schemas.microsoft.com/office/drawing/2010/main" w="9525">
                   <a:solidFill>
                     <a:srgbClr val="000000"/>
                   </a:solidFill>
@@ -6674,7 +6675,7 @@
             </a:ln>
             <a:extLst>
               <a:ext uri="{91240B29-F687-4f45-9708-019B960494DF}">
-                <a14:hiddenLine xmlns:a14="http://schemas.microsoft.com/office/drawing/2010/main" xmlns="" w="9525">
+                <a14:hiddenLine xmlns="" xmlns:a14="http://schemas.microsoft.com/office/drawing/2010/main" w="9525">
                   <a:solidFill>
                     <a:srgbClr val="000000"/>
                   </a:solidFill>
@@ -6736,7 +6737,7 @@
             </a:ln>
             <a:extLst>
               <a:ext uri="{91240B29-F687-4f45-9708-019B960494DF}">
-                <a14:hiddenLine xmlns:a14="http://schemas.microsoft.com/office/drawing/2010/main" xmlns="" w="9525">
+                <a14:hiddenLine xmlns="" xmlns:a14="http://schemas.microsoft.com/office/drawing/2010/main" w="9525">
                   <a:solidFill>
                     <a:srgbClr val="000000"/>
                   </a:solidFill>
@@ -6826,7 +6827,7 @@
             </a:ln>
             <a:extLst>
               <a:ext uri="{91240B29-F687-4f45-9708-019B960494DF}">
-                <a14:hiddenLine xmlns:a14="http://schemas.microsoft.com/office/drawing/2010/main" xmlns="" w="9525">
+                <a14:hiddenLine xmlns="" xmlns:a14="http://schemas.microsoft.com/office/drawing/2010/main" w="9525">
                   <a:solidFill>
                     <a:srgbClr val="000000"/>
                   </a:solidFill>
@@ -6888,7 +6889,7 @@
             </a:ln>
             <a:extLst>
               <a:ext uri="{91240B29-F687-4f45-9708-019B960494DF}">
-                <a14:hiddenLine xmlns:a14="http://schemas.microsoft.com/office/drawing/2010/main" xmlns="" w="9525">
+                <a14:hiddenLine xmlns="" xmlns:a14="http://schemas.microsoft.com/office/drawing/2010/main" w="9525">
                   <a:solidFill>
                     <a:srgbClr val="000000"/>
                   </a:solidFill>
@@ -6978,7 +6979,7 @@
             </a:ln>
             <a:extLst>
               <a:ext uri="{91240B29-F687-4f45-9708-019B960494DF}">
-                <a14:hiddenLine xmlns:a14="http://schemas.microsoft.com/office/drawing/2010/main" xmlns="" w="9525">
+                <a14:hiddenLine xmlns="" xmlns:a14="http://schemas.microsoft.com/office/drawing/2010/main" w="9525">
                   <a:solidFill>
                     <a:srgbClr val="000000"/>
                   </a:solidFill>
@@ -7012,7 +7013,7 @@
             </a:ln>
             <a:extLst>
               <a:ext uri="{91240B29-F687-4f45-9708-019B960494DF}">
-                <a14:hiddenLine xmlns:a14="http://schemas.microsoft.com/office/drawing/2010/main" xmlns="" w="9525">
+                <a14:hiddenLine xmlns="" xmlns:a14="http://schemas.microsoft.com/office/drawing/2010/main" w="9525">
                   <a:solidFill>
                     <a:srgbClr val="000000"/>
                   </a:solidFill>
@@ -7077,7 +7078,7 @@
             </a:ln>
             <a:extLst>
               <a:ext uri="{91240B29-F687-4f45-9708-019B960494DF}">
-                <a14:hiddenLine xmlns:a14="http://schemas.microsoft.com/office/drawing/2010/main" xmlns="" w="9525">
+                <a14:hiddenLine xmlns="" xmlns:a14="http://schemas.microsoft.com/office/drawing/2010/main" w="9525">
                   <a:solidFill>
                     <a:srgbClr val="000000"/>
                   </a:solidFill>
@@ -7167,7 +7168,7 @@
             </a:ln>
             <a:extLst>
               <a:ext uri="{91240B29-F687-4f45-9708-019B960494DF}">
-                <a14:hiddenLine xmlns:a14="http://schemas.microsoft.com/office/drawing/2010/main" xmlns="" w="9525">
+                <a14:hiddenLine xmlns="" xmlns:a14="http://schemas.microsoft.com/office/drawing/2010/main" w="9525">
                   <a:solidFill>
                     <a:srgbClr val="000000"/>
                   </a:solidFill>
@@ -7229,7 +7230,7 @@
             </a:ln>
             <a:extLst>
               <a:ext uri="{91240B29-F687-4f45-9708-019B960494DF}">
-                <a14:hiddenLine xmlns:a14="http://schemas.microsoft.com/office/drawing/2010/main" xmlns="" w="9525">
+                <a14:hiddenLine xmlns="" xmlns:a14="http://schemas.microsoft.com/office/drawing/2010/main" w="9525">
                   <a:solidFill>
                     <a:srgbClr val="000000"/>
                   </a:solidFill>
@@ -7319,7 +7320,7 @@
             </a:ln>
             <a:extLst>
               <a:ext uri="{91240B29-F687-4f45-9708-019B960494DF}">
-                <a14:hiddenLine xmlns:a14="http://schemas.microsoft.com/office/drawing/2010/main" xmlns="" w="9525">
+                <a14:hiddenLine xmlns="" xmlns:a14="http://schemas.microsoft.com/office/drawing/2010/main" w="9525">
                   <a:solidFill>
                     <a:srgbClr val="000000"/>
                   </a:solidFill>
@@ -7409,7 +7410,7 @@
             </a:ln>
             <a:extLst>
               <a:ext uri="{91240B29-F687-4f45-9708-019B960494DF}">
-                <a14:hiddenLine xmlns:a14="http://schemas.microsoft.com/office/drawing/2010/main" xmlns="" w="9525">
+                <a14:hiddenLine xmlns="" xmlns:a14="http://schemas.microsoft.com/office/drawing/2010/main" w="9525">
                   <a:solidFill>
                     <a:srgbClr val="000000"/>
                   </a:solidFill>
@@ -7474,7 +7475,7 @@
             </a:ln>
             <a:extLst>
               <a:ext uri="{91240B29-F687-4f45-9708-019B960494DF}">
-                <a14:hiddenLine xmlns:a14="http://schemas.microsoft.com/office/drawing/2010/main" xmlns="" w="9525">
+                <a14:hiddenLine xmlns="" xmlns:a14="http://schemas.microsoft.com/office/drawing/2010/main" w="9525">
                   <a:solidFill>
                     <a:srgbClr val="000000"/>
                   </a:solidFill>
@@ -7536,7 +7537,7 @@
             </a:ln>
             <a:extLst>
               <a:ext uri="{91240B29-F687-4f45-9708-019B960494DF}">
-                <a14:hiddenLine xmlns:a14="http://schemas.microsoft.com/office/drawing/2010/main" xmlns="" w="9525">
+                <a14:hiddenLine xmlns="" xmlns:a14="http://schemas.microsoft.com/office/drawing/2010/main" w="9525">
                   <a:solidFill>
                     <a:srgbClr val="000000"/>
                   </a:solidFill>
@@ -7626,7 +7627,7 @@
             </a:ln>
             <a:extLst>
               <a:ext uri="{91240B29-F687-4f45-9708-019B960494DF}">
-                <a14:hiddenLine xmlns:a14="http://schemas.microsoft.com/office/drawing/2010/main" xmlns="" w="9525">
+                <a14:hiddenLine xmlns="" xmlns:a14="http://schemas.microsoft.com/office/drawing/2010/main" w="9525">
                   <a:solidFill>
                     <a:srgbClr val="000000"/>
                   </a:solidFill>
@@ -7716,7 +7717,7 @@
             </a:ln>
             <a:extLst>
               <a:ext uri="{91240B29-F687-4f45-9708-019B960494DF}">
-                <a14:hiddenLine xmlns:a14="http://schemas.microsoft.com/office/drawing/2010/main" xmlns="" w="9525">
+                <a14:hiddenLine xmlns="" xmlns:a14="http://schemas.microsoft.com/office/drawing/2010/main" w="9525">
                   <a:solidFill>
                     <a:srgbClr val="000000"/>
                   </a:solidFill>
@@ -7778,7 +7779,7 @@
             </a:ln>
             <a:extLst>
               <a:ext uri="{91240B29-F687-4f45-9708-019B960494DF}">
-                <a14:hiddenLine xmlns:a14="http://schemas.microsoft.com/office/drawing/2010/main" xmlns="" w="9525">
+                <a14:hiddenLine xmlns="" xmlns:a14="http://schemas.microsoft.com/office/drawing/2010/main" w="9525">
                   <a:solidFill>
                     <a:srgbClr val="000000"/>
                   </a:solidFill>
@@ -7898,7 +7899,7 @@
             </a:ln>
             <a:extLst>
               <a:ext uri="{91240B29-F687-4f45-9708-019B960494DF}">
-                <a14:hiddenLine xmlns:a14="http://schemas.microsoft.com/office/drawing/2010/main" xmlns="" w="9525">
+                <a14:hiddenLine xmlns="" xmlns:a14="http://schemas.microsoft.com/office/drawing/2010/main" w="9525">
                   <a:solidFill>
                     <a:srgbClr val="000000"/>
                   </a:solidFill>
@@ -7966,7 +7967,7 @@
             </a:ln>
             <a:extLst>
               <a:ext uri="{91240B29-F687-4f45-9708-019B960494DF}">
-                <a14:hiddenLine xmlns:a14="http://schemas.microsoft.com/office/drawing/2010/main" xmlns="" w="9525">
+                <a14:hiddenLine xmlns="" xmlns:a14="http://schemas.microsoft.com/office/drawing/2010/main" w="9525">
                   <a:solidFill>
                     <a:srgbClr val="000000"/>
                   </a:solidFill>
@@ -8056,7 +8057,7 @@
             </a:ln>
             <a:extLst>
               <a:ext uri="{91240B29-F687-4f45-9708-019B960494DF}">
-                <a14:hiddenLine xmlns:a14="http://schemas.microsoft.com/office/drawing/2010/main" xmlns="" w="9525">
+                <a14:hiddenLine xmlns="" xmlns:a14="http://schemas.microsoft.com/office/drawing/2010/main" w="9525">
                   <a:solidFill>
                     <a:srgbClr val="000000"/>
                   </a:solidFill>
@@ -13982,7 +13983,7 @@
           <a:noFill/>
           <a:extLst>
             <a:ext uri="{909E8E84-426E-40dd-AFC4-6F175D3DCCD1}">
-              <a14:hiddenFill xmlns:a14="http://schemas.microsoft.com/office/drawing/2010/main" xmlns="">
+              <a14:hiddenFill xmlns="" xmlns:a14="http://schemas.microsoft.com/office/drawing/2010/main">
                 <a:solidFill>
                   <a:srgbClr val="FFFFFF"/>
                 </a:solidFill>
@@ -14062,7 +14063,7 @@
               </a:ln>
               <a:extLst>
                 <a:ext uri="{91240B29-F687-4f45-9708-019B960494DF}">
-                  <a14:hiddenLine xmlns:a14="http://schemas.microsoft.com/office/drawing/2010/main" xmlns="" w="9525">
+                  <a14:hiddenLine xmlns="" xmlns:a14="http://schemas.microsoft.com/office/drawing/2010/main" w="9525">
                     <a:solidFill>
                       <a:srgbClr val="000000"/>
                     </a:solidFill>
@@ -14152,7 +14153,7 @@
               </a:ln>
               <a:extLst>
                 <a:ext uri="{91240B29-F687-4f45-9708-019B960494DF}">
-                  <a14:hiddenLine xmlns:a14="http://schemas.microsoft.com/office/drawing/2010/main" xmlns="" w="9525">
+                  <a14:hiddenLine xmlns="" xmlns:a14="http://schemas.microsoft.com/office/drawing/2010/main" w="9525">
                     <a:solidFill>
                       <a:srgbClr val="000000"/>
                     </a:solidFill>
@@ -14242,7 +14243,7 @@
               </a:ln>
               <a:extLst>
                 <a:ext uri="{91240B29-F687-4f45-9708-019B960494DF}">
-                  <a14:hiddenLine xmlns:a14="http://schemas.microsoft.com/office/drawing/2010/main" xmlns="" w="9525">
+                  <a14:hiddenLine xmlns="" xmlns:a14="http://schemas.microsoft.com/office/drawing/2010/main" w="9525">
                     <a:solidFill>
                       <a:srgbClr val="000000"/>
                     </a:solidFill>
@@ -14304,7 +14305,7 @@
               </a:ln>
               <a:extLst>
                 <a:ext uri="{91240B29-F687-4f45-9708-019B960494DF}">
-                  <a14:hiddenLine xmlns:a14="http://schemas.microsoft.com/office/drawing/2010/main" xmlns="" w="9525">
+                  <a14:hiddenLine xmlns="" xmlns:a14="http://schemas.microsoft.com/office/drawing/2010/main" w="9525">
                     <a:solidFill>
                       <a:srgbClr val="000000"/>
                     </a:solidFill>
@@ -14394,7 +14395,7 @@
               </a:ln>
               <a:extLst>
                 <a:ext uri="{91240B29-F687-4f45-9708-019B960494DF}">
-                  <a14:hiddenLine xmlns:a14="http://schemas.microsoft.com/office/drawing/2010/main" xmlns="" w="9525">
+                  <a14:hiddenLine xmlns="" xmlns:a14="http://schemas.microsoft.com/office/drawing/2010/main" w="9525">
                     <a:solidFill>
                       <a:srgbClr val="000000"/>
                     </a:solidFill>
@@ -14456,7 +14457,7 @@
               </a:ln>
               <a:extLst>
                 <a:ext uri="{91240B29-F687-4f45-9708-019B960494DF}">
-                  <a14:hiddenLine xmlns:a14="http://schemas.microsoft.com/office/drawing/2010/main" xmlns="" w="9525">
+                  <a14:hiddenLine xmlns="" xmlns:a14="http://schemas.microsoft.com/office/drawing/2010/main" w="9525">
                     <a:solidFill>
                       <a:srgbClr val="000000"/>
                     </a:solidFill>
@@ -14518,7 +14519,7 @@
               </a:ln>
               <a:extLst>
                 <a:ext uri="{91240B29-F687-4f45-9708-019B960494DF}">
-                  <a14:hiddenLine xmlns:a14="http://schemas.microsoft.com/office/drawing/2010/main" xmlns="" w="9525">
+                  <a14:hiddenLine xmlns="" xmlns:a14="http://schemas.microsoft.com/office/drawing/2010/main" w="9525">
                     <a:solidFill>
                       <a:srgbClr val="000000"/>
                     </a:solidFill>
@@ -14608,7 +14609,7 @@
               </a:ln>
               <a:extLst>
                 <a:ext uri="{91240B29-F687-4f45-9708-019B960494DF}">
-                  <a14:hiddenLine xmlns:a14="http://schemas.microsoft.com/office/drawing/2010/main" xmlns="" w="9525">
+                  <a14:hiddenLine xmlns="" xmlns:a14="http://schemas.microsoft.com/office/drawing/2010/main" w="9525">
                     <a:solidFill>
                       <a:srgbClr val="000000"/>
                     </a:solidFill>
@@ -14698,7 +14699,7 @@
               </a:ln>
               <a:extLst>
                 <a:ext uri="{91240B29-F687-4f45-9708-019B960494DF}">
-                  <a14:hiddenLine xmlns:a14="http://schemas.microsoft.com/office/drawing/2010/main" xmlns="" w="9525">
+                  <a14:hiddenLine xmlns="" xmlns:a14="http://schemas.microsoft.com/office/drawing/2010/main" w="9525">
                     <a:solidFill>
                       <a:srgbClr val="000000"/>
                     </a:solidFill>
@@ -14760,7 +14761,7 @@
               </a:ln>
               <a:extLst>
                 <a:ext uri="{91240B29-F687-4f45-9708-019B960494DF}">
-                  <a14:hiddenLine xmlns:a14="http://schemas.microsoft.com/office/drawing/2010/main" xmlns="" w="9525">
+                  <a14:hiddenLine xmlns="" xmlns:a14="http://schemas.microsoft.com/office/drawing/2010/main" w="9525">
                     <a:solidFill>
                       <a:srgbClr val="000000"/>
                     </a:solidFill>
@@ -14870,7 +14871,7 @@
               </a:ln>
               <a:extLst>
                 <a:ext uri="{91240B29-F687-4f45-9708-019B960494DF}">
-                  <a14:hiddenLine xmlns:a14="http://schemas.microsoft.com/office/drawing/2010/main" xmlns="" w="9525">
+                  <a14:hiddenLine xmlns="" xmlns:a14="http://schemas.microsoft.com/office/drawing/2010/main" w="9525">
                     <a:solidFill>
                       <a:srgbClr val="000000"/>
                     </a:solidFill>
@@ -14954,7 +14955,7 @@
               </a:ln>
               <a:extLst>
                 <a:ext uri="{91240B29-F687-4f45-9708-019B960494DF}">
-                  <a14:hiddenLine xmlns:a14="http://schemas.microsoft.com/office/drawing/2010/main" xmlns="" w="9525">
+                  <a14:hiddenLine xmlns="" xmlns:a14="http://schemas.microsoft.com/office/drawing/2010/main" w="9525">
                     <a:solidFill>
                       <a:srgbClr val="000000"/>
                     </a:solidFill>
@@ -15016,7 +15017,7 @@
               </a:ln>
               <a:extLst>
                 <a:ext uri="{91240B29-F687-4f45-9708-019B960494DF}">
-                  <a14:hiddenLine xmlns:a14="http://schemas.microsoft.com/office/drawing/2010/main" xmlns="" w="9525">
+                  <a14:hiddenLine xmlns="" xmlns:a14="http://schemas.microsoft.com/office/drawing/2010/main" w="9525">
                     <a:solidFill>
                       <a:srgbClr val="000000"/>
                     </a:solidFill>
@@ -15078,7 +15079,7 @@
               </a:ln>
               <a:extLst>
                 <a:ext uri="{91240B29-F687-4f45-9708-019B960494DF}">
-                  <a14:hiddenLine xmlns:a14="http://schemas.microsoft.com/office/drawing/2010/main" xmlns="" w="9525">
+                  <a14:hiddenLine xmlns="" xmlns:a14="http://schemas.microsoft.com/office/drawing/2010/main" w="9525">
                     <a:solidFill>
                       <a:srgbClr val="000000"/>
                     </a:solidFill>
@@ -15168,7 +15169,7 @@
               </a:ln>
               <a:extLst>
                 <a:ext uri="{91240B29-F687-4f45-9708-019B960494DF}">
-                  <a14:hiddenLine xmlns:a14="http://schemas.microsoft.com/office/drawing/2010/main" xmlns="" w="9525">
+                  <a14:hiddenLine xmlns="" xmlns:a14="http://schemas.microsoft.com/office/drawing/2010/main" w="9525">
                     <a:solidFill>
                       <a:srgbClr val="000000"/>
                     </a:solidFill>
@@ -15202,7 +15203,7 @@
               </a:ln>
               <a:extLst>
                 <a:ext uri="{91240B29-F687-4f45-9708-019B960494DF}">
-                  <a14:hiddenLine xmlns:a14="http://schemas.microsoft.com/office/drawing/2010/main" xmlns="" w="9525">
+                  <a14:hiddenLine xmlns="" xmlns:a14="http://schemas.microsoft.com/office/drawing/2010/main" w="9525">
                     <a:solidFill>
                       <a:srgbClr val="000000"/>
                     </a:solidFill>
@@ -15267,7 +15268,7 @@
               </a:ln>
               <a:extLst>
                 <a:ext uri="{91240B29-F687-4f45-9708-019B960494DF}">
-                  <a14:hiddenLine xmlns:a14="http://schemas.microsoft.com/office/drawing/2010/main" xmlns="" w="9525">
+                  <a14:hiddenLine xmlns="" xmlns:a14="http://schemas.microsoft.com/office/drawing/2010/main" w="9525">
                     <a:solidFill>
                       <a:srgbClr val="000000"/>
                     </a:solidFill>
@@ -15357,7 +15358,7 @@
               </a:ln>
               <a:extLst>
                 <a:ext uri="{91240B29-F687-4f45-9708-019B960494DF}">
-                  <a14:hiddenLine xmlns:a14="http://schemas.microsoft.com/office/drawing/2010/main" xmlns="" w="9525">
+                  <a14:hiddenLine xmlns="" xmlns:a14="http://schemas.microsoft.com/office/drawing/2010/main" w="9525">
                     <a:solidFill>
                       <a:srgbClr val="000000"/>
                     </a:solidFill>
@@ -15419,7 +15420,7 @@
               </a:ln>
               <a:extLst>
                 <a:ext uri="{91240B29-F687-4f45-9708-019B960494DF}">
-                  <a14:hiddenLine xmlns:a14="http://schemas.microsoft.com/office/drawing/2010/main" xmlns="" w="9525">
+                  <a14:hiddenLine xmlns="" xmlns:a14="http://schemas.microsoft.com/office/drawing/2010/main" w="9525">
                     <a:solidFill>
                       <a:srgbClr val="000000"/>
                     </a:solidFill>
@@ -15509,7 +15510,7 @@
               </a:ln>
               <a:extLst>
                 <a:ext uri="{91240B29-F687-4f45-9708-019B960494DF}">
-                  <a14:hiddenLine xmlns:a14="http://schemas.microsoft.com/office/drawing/2010/main" xmlns="" w="9525">
+                  <a14:hiddenLine xmlns="" xmlns:a14="http://schemas.microsoft.com/office/drawing/2010/main" w="9525">
                     <a:solidFill>
                       <a:srgbClr val="000000"/>
                     </a:solidFill>
@@ -15574,7 +15575,7 @@
               </a:ln>
               <a:extLst>
                 <a:ext uri="{91240B29-F687-4f45-9708-019B960494DF}">
-                  <a14:hiddenLine xmlns:a14="http://schemas.microsoft.com/office/drawing/2010/main" xmlns="" w="9525">
+                  <a14:hiddenLine xmlns="" xmlns:a14="http://schemas.microsoft.com/office/drawing/2010/main" w="9525">
                     <a:solidFill>
                       <a:srgbClr val="000000"/>
                     </a:solidFill>
@@ -15636,7 +15637,7 @@
               </a:ln>
               <a:extLst>
                 <a:ext uri="{91240B29-F687-4f45-9708-019B960494DF}">
-                  <a14:hiddenLine xmlns:a14="http://schemas.microsoft.com/office/drawing/2010/main" xmlns="" w="9525">
+                  <a14:hiddenLine xmlns="" xmlns:a14="http://schemas.microsoft.com/office/drawing/2010/main" w="9525">
                     <a:solidFill>
                       <a:srgbClr val="000000"/>
                     </a:solidFill>
@@ -15726,7 +15727,7 @@
               </a:ln>
               <a:extLst>
                 <a:ext uri="{91240B29-F687-4f45-9708-019B960494DF}">
-                  <a14:hiddenLine xmlns:a14="http://schemas.microsoft.com/office/drawing/2010/main" xmlns="" w="9525">
+                  <a14:hiddenLine xmlns="" xmlns:a14="http://schemas.microsoft.com/office/drawing/2010/main" w="9525">
                     <a:solidFill>
                       <a:srgbClr val="000000"/>
                     </a:solidFill>
@@ -15816,7 +15817,7 @@
               </a:ln>
               <a:extLst>
                 <a:ext uri="{91240B29-F687-4f45-9708-019B960494DF}">
-                  <a14:hiddenLine xmlns:a14="http://schemas.microsoft.com/office/drawing/2010/main" xmlns="" w="9525">
+                  <a14:hiddenLine xmlns="" xmlns:a14="http://schemas.microsoft.com/office/drawing/2010/main" w="9525">
                     <a:solidFill>
                       <a:srgbClr val="000000"/>
                     </a:solidFill>
@@ -15881,7 +15882,7 @@
               </a:ln>
               <a:extLst>
                 <a:ext uri="{91240B29-F687-4f45-9708-019B960494DF}">
-                  <a14:hiddenLine xmlns:a14="http://schemas.microsoft.com/office/drawing/2010/main" xmlns="" w="9525">
+                  <a14:hiddenLine xmlns="" xmlns:a14="http://schemas.microsoft.com/office/drawing/2010/main" w="9525">
                     <a:solidFill>
                       <a:srgbClr val="000000"/>
                     </a:solidFill>
@@ -16001,7 +16002,7 @@
               </a:ln>
               <a:extLst>
                 <a:ext uri="{91240B29-F687-4f45-9708-019B960494DF}">
-                  <a14:hiddenLine xmlns:a14="http://schemas.microsoft.com/office/drawing/2010/main" xmlns="" w="9525">
+                  <a14:hiddenLine xmlns="" xmlns:a14="http://schemas.microsoft.com/office/drawing/2010/main" w="9525">
                     <a:solidFill>
                       <a:srgbClr val="000000"/>
                     </a:solidFill>
@@ -16099,7 +16100,7 @@
               </a:ln>
               <a:extLst>
                 <a:ext uri="{91240B29-F687-4f45-9708-019B960494DF}">
-                  <a14:hiddenLine xmlns:a14="http://schemas.microsoft.com/office/drawing/2010/main" xmlns="" w="9525">
+                  <a14:hiddenLine xmlns="" xmlns:a14="http://schemas.microsoft.com/office/drawing/2010/main" w="9525">
                     <a:solidFill>
                       <a:srgbClr val="000000"/>
                     </a:solidFill>
@@ -16214,7 +16215,7 @@
               </a:ln>
               <a:extLst>
                 <a:ext uri="{91240B29-F687-4f45-9708-019B960494DF}">
-                  <a14:hiddenLine xmlns:a14="http://schemas.microsoft.com/office/drawing/2010/main" xmlns="" w="9525">
+                  <a14:hiddenLine xmlns="" xmlns:a14="http://schemas.microsoft.com/office/drawing/2010/main" w="9525">
                     <a:solidFill>
                       <a:srgbClr val="000000"/>
                     </a:solidFill>
@@ -16304,7 +16305,7 @@
               </a:ln>
               <a:extLst>
                 <a:ext uri="{91240B29-F687-4f45-9708-019B960494DF}">
-                  <a14:hiddenLine xmlns:a14="http://schemas.microsoft.com/office/drawing/2010/main" xmlns="" w="9525">
+                  <a14:hiddenLine xmlns="" xmlns:a14="http://schemas.microsoft.com/office/drawing/2010/main" w="9525">
                     <a:solidFill>
                       <a:srgbClr val="000000"/>
                     </a:solidFill>
@@ -16369,7 +16370,7 @@
               </a:ln>
               <a:extLst>
                 <a:ext uri="{91240B29-F687-4f45-9708-019B960494DF}">
-                  <a14:hiddenLine xmlns:a14="http://schemas.microsoft.com/office/drawing/2010/main" xmlns="" w="9525">
+                  <a14:hiddenLine xmlns="" xmlns:a14="http://schemas.microsoft.com/office/drawing/2010/main" w="9525">
                     <a:solidFill>
                       <a:srgbClr val="000000"/>
                     </a:solidFill>
@@ -16459,7 +16460,7 @@
               </a:ln>
               <a:extLst>
                 <a:ext uri="{91240B29-F687-4f45-9708-019B960494DF}">
-                  <a14:hiddenLine xmlns:a14="http://schemas.microsoft.com/office/drawing/2010/main" xmlns="" w="9525">
+                  <a14:hiddenLine xmlns="" xmlns:a14="http://schemas.microsoft.com/office/drawing/2010/main" w="9525">
                     <a:solidFill>
                       <a:srgbClr val="000000"/>
                     </a:solidFill>
@@ -16527,7 +16528,7 @@
               </a:ln>
               <a:extLst>
                 <a:ext uri="{91240B29-F687-4f45-9708-019B960494DF}">
-                  <a14:hiddenLine xmlns:a14="http://schemas.microsoft.com/office/drawing/2010/main" xmlns="" w="9525">
+                  <a14:hiddenLine xmlns="" xmlns:a14="http://schemas.microsoft.com/office/drawing/2010/main" w="9525">
                     <a:solidFill>
                       <a:srgbClr val="000000"/>
                     </a:solidFill>
@@ -16617,7 +16618,7 @@
               </a:ln>
               <a:extLst>
                 <a:ext uri="{91240B29-F687-4f45-9708-019B960494DF}">
-                  <a14:hiddenLine xmlns:a14="http://schemas.microsoft.com/office/drawing/2010/main" xmlns="" w="9525">
+                  <a14:hiddenLine xmlns="" xmlns:a14="http://schemas.microsoft.com/office/drawing/2010/main" w="9525">
                     <a:solidFill>
                       <a:srgbClr val="000000"/>
                     </a:solidFill>
@@ -16685,7 +16686,7 @@
               </a:ln>
               <a:extLst>
                 <a:ext uri="{91240B29-F687-4f45-9708-019B960494DF}">
-                  <a14:hiddenLine xmlns:a14="http://schemas.microsoft.com/office/drawing/2010/main" xmlns="" w="9525">
+                  <a14:hiddenLine xmlns="" xmlns:a14="http://schemas.microsoft.com/office/drawing/2010/main" w="9525">
                     <a:solidFill>
                       <a:srgbClr val="000000"/>
                     </a:solidFill>
@@ -16775,7 +16776,7 @@
               </a:ln>
               <a:extLst>
                 <a:ext uri="{91240B29-F687-4f45-9708-019B960494DF}">
-                  <a14:hiddenLine xmlns:a14="http://schemas.microsoft.com/office/drawing/2010/main" xmlns="" w="9525">
+                  <a14:hiddenLine xmlns="" xmlns:a14="http://schemas.microsoft.com/office/drawing/2010/main" w="9525">
                     <a:solidFill>
                       <a:srgbClr val="000000"/>
                     </a:solidFill>
@@ -16809,7 +16810,7 @@
               </a:ln>
               <a:extLst>
                 <a:ext uri="{91240B29-F687-4f45-9708-019B960494DF}">
-                  <a14:hiddenLine xmlns:a14="http://schemas.microsoft.com/office/drawing/2010/main" xmlns="" w="9525">
+                  <a14:hiddenLine xmlns="" xmlns:a14="http://schemas.microsoft.com/office/drawing/2010/main" w="9525">
                     <a:solidFill>
                       <a:srgbClr val="000000"/>
                     </a:solidFill>
@@ -28340,6 +28341,188 @@
 </p:sld>
 </file>
 
+<file path=ppt/slides/slide24.xml><?xml version="1.0" encoding="utf-8"?>
+<p:sld xmlns:a="http://schemas.openxmlformats.org/drawingml/2006/main" xmlns:r="http://schemas.openxmlformats.org/officeDocument/2006/relationships" xmlns:p="http://schemas.openxmlformats.org/presentationml/2006/main">
+  <p:cSld>
+    <p:spTree>
+      <p:nvGrpSpPr>
+        <p:cNvPr id="1" name=""/>
+        <p:cNvGrpSpPr/>
+        <p:nvPr/>
+      </p:nvGrpSpPr>
+      <p:grpSpPr>
+        <a:xfrm>
+          <a:off x="0" y="0"/>
+          <a:ext cx="0" cy="0"/>
+          <a:chOff x="0" y="0"/>
+          <a:chExt cx="0" cy="0"/>
+        </a:xfrm>
+      </p:grpSpPr>
+      <p:sp>
+        <p:nvSpPr>
+          <p:cNvPr id="7" name="Title 6">
+            <a:extLst>
+              <a:ext uri="{FF2B5EF4-FFF2-40B4-BE49-F238E27FC236}">
+                <a16:creationId xmlns:a16="http://schemas.microsoft.com/office/drawing/2014/main" id="{DF95DD07-AC43-C93A-5442-958656924C5A}"/>
+              </a:ext>
+            </a:extLst>
+          </p:cNvPr>
+          <p:cNvSpPr>
+            <a:spLocks noGrp="1"/>
+          </p:cNvSpPr>
+          <p:nvPr>
+            <p:ph type="title"/>
+          </p:nvPr>
+        </p:nvSpPr>
+        <p:spPr/>
+        <p:txBody>
+          <a:bodyPr/>
+          <a:lstStyle/>
+          <a:p>
+            <a:r>
+              <a:rPr lang="en-CA" dirty="0"/>
+              <a:t>Appendix A – Compile-Time Polymorphism</a:t>
+            </a:r>
+          </a:p>
+        </p:txBody>
+      </p:sp>
+      <p:sp>
+        <p:nvSpPr>
+          <p:cNvPr id="8" name="Text Placeholder 7">
+            <a:extLst>
+              <a:ext uri="{FF2B5EF4-FFF2-40B4-BE49-F238E27FC236}">
+                <a16:creationId xmlns:a16="http://schemas.microsoft.com/office/drawing/2014/main" id="{AAC46AF1-8D2C-591F-E86B-03A185F53EAA}"/>
+              </a:ext>
+            </a:extLst>
+          </p:cNvPr>
+          <p:cNvSpPr>
+            <a:spLocks noGrp="1"/>
+          </p:cNvSpPr>
+          <p:nvPr>
+            <p:ph type="body" idx="1"/>
+          </p:nvPr>
+        </p:nvSpPr>
+        <p:spPr/>
+        <p:txBody>
+          <a:bodyPr/>
+          <a:lstStyle/>
+          <a:p>
+            <a:endParaRPr lang="en-CA"/>
+          </a:p>
+        </p:txBody>
+      </p:sp>
+      <p:sp>
+        <p:nvSpPr>
+          <p:cNvPr id="4" name="Footer Placeholder 3">
+            <a:extLst>
+              <a:ext uri="{FF2B5EF4-FFF2-40B4-BE49-F238E27FC236}">
+                <a16:creationId xmlns:a16="http://schemas.microsoft.com/office/drawing/2014/main" id="{7A51B8FA-32B8-F994-8FBE-4CE93B4E14E9}"/>
+              </a:ext>
+            </a:extLst>
+          </p:cNvPr>
+          <p:cNvSpPr>
+            <a:spLocks noGrp="1"/>
+          </p:cNvSpPr>
+          <p:nvPr>
+            <p:ph type="ftr" sz="quarter" idx="11"/>
+          </p:nvPr>
+        </p:nvSpPr>
+        <p:spPr/>
+        <p:txBody>
+          <a:bodyPr/>
+          <a:lstStyle/>
+          <a:p>
+            <a:r>
+              <a:rPr lang="en-US"/>
+              <a:t>Len Popp – https://lenp.net/presentations/</a:t>
+            </a:r>
+            <a:endParaRPr lang="en-US" dirty="0"/>
+          </a:p>
+        </p:txBody>
+      </p:sp>
+      <p:sp>
+        <p:nvSpPr>
+          <p:cNvPr id="5" name="Date Placeholder 4">
+            <a:extLst>
+              <a:ext uri="{FF2B5EF4-FFF2-40B4-BE49-F238E27FC236}">
+                <a16:creationId xmlns:a16="http://schemas.microsoft.com/office/drawing/2014/main" id="{70EBA136-DF7D-957D-3D9F-1D0E479C695C}"/>
+              </a:ext>
+            </a:extLst>
+          </p:cNvPr>
+          <p:cNvSpPr>
+            <a:spLocks noGrp="1"/>
+          </p:cNvSpPr>
+          <p:nvPr>
+            <p:ph type="dt" sz="half" idx="10"/>
+          </p:nvPr>
+        </p:nvSpPr>
+        <p:spPr/>
+        <p:txBody>
+          <a:bodyPr/>
+          <a:lstStyle/>
+          <a:p>
+            <a:r>
+              <a:rPr lang="en-US"/>
+              <a:t>2024-10-08</a:t>
+            </a:r>
+            <a:endParaRPr lang="en-US" dirty="0"/>
+          </a:p>
+        </p:txBody>
+      </p:sp>
+      <p:sp>
+        <p:nvSpPr>
+          <p:cNvPr id="6" name="Slide Number Placeholder 5">
+            <a:extLst>
+              <a:ext uri="{FF2B5EF4-FFF2-40B4-BE49-F238E27FC236}">
+                <a16:creationId xmlns:a16="http://schemas.microsoft.com/office/drawing/2014/main" id="{7D82D720-29D4-C112-68F8-B6F3A5F1A068}"/>
+              </a:ext>
+            </a:extLst>
+          </p:cNvPr>
+          <p:cNvSpPr>
+            <a:spLocks noGrp="1"/>
+          </p:cNvSpPr>
+          <p:nvPr>
+            <p:ph type="sldNum" sz="quarter" idx="12"/>
+          </p:nvPr>
+        </p:nvSpPr>
+        <p:spPr/>
+        <p:txBody>
+          <a:bodyPr/>
+          <a:lstStyle/>
+          <a:p>
+            <a:fld id="{6D22F896-40B5-4ADD-8801-0D06FADFA095}" type="slidenum">
+              <a:rPr lang="en-US" smtClean="0"/>
+              <a:t>24</a:t>
+            </a:fld>
+            <a:endParaRPr lang="en-US" dirty="0"/>
+          </a:p>
+        </p:txBody>
+      </p:sp>
+    </p:spTree>
+    <p:extLst>
+      <p:ext uri="{BB962C8B-B14F-4D97-AF65-F5344CB8AC3E}">
+        <p14:creationId xmlns:p14="http://schemas.microsoft.com/office/powerpoint/2010/main" val="1060605695"/>
+      </p:ext>
+    </p:extLst>
+  </p:cSld>
+  <p:clrMapOvr>
+    <a:masterClrMapping/>
+  </p:clrMapOvr>
+  <mc:AlternateContent xmlns:mc="http://schemas.openxmlformats.org/markup-compatibility/2006" xmlns:p14="http://schemas.microsoft.com/office/powerpoint/2010/main">
+    <mc:Choice Requires="p14">
+      <p:transition p14:dur="250">
+        <p:fade/>
+      </p:transition>
+    </mc:Choice>
+    <mc:Fallback xmlns="">
+      <p:transition>
+        <p:fade/>
+      </p:transition>
+    </mc:Fallback>
+  </mc:AlternateContent>
+</p:sld>
+</file>
+
 <file path=ppt/slides/slide3.xml><?xml version="1.0" encoding="utf-8"?>
 <p:sld xmlns:a="http://schemas.openxmlformats.org/drawingml/2006/main" xmlns:r="http://schemas.openxmlformats.org/officeDocument/2006/relationships" xmlns:p="http://schemas.openxmlformats.org/presentationml/2006/main">
   <p:cSld>

</xml_diff>

<commit_message>
TaskScheduler: fix a slideware bug
</commit_message>
<xml_diff>
--- a/TaskScheduler/TaskScheduler.pptx
+++ b/TaskScheduler/TaskScheduler.pptx
@@ -1010,7 +1010,7 @@
           <a:p>
             <a:fld id="{857CC94D-E614-4874-A919-F25B27309A09}" type="datetimeFigureOut">
               <a:rPr lang="en-CA" smtClean="0"/>
-              <a:t>2024-10-08</a:t>
+              <a:t>2024-10-24</a:t>
             </a:fld>
             <a:endParaRPr lang="en-CA"/>
           </a:p>
@@ -3965,7 +3965,7 @@
           <a:noFill/>
           <a:extLst>
             <a:ext uri="{909E8E84-426E-40dd-AFC4-6F175D3DCCD1}">
-              <a14:hiddenFill xmlns="" xmlns:a14="http://schemas.microsoft.com/office/drawing/2010/main">
+              <a14:hiddenFill xmlns:a14="http://schemas.microsoft.com/office/drawing/2010/main" xmlns="">
                 <a:solidFill>
                   <a:srgbClr val="FFFFFF"/>
                 </a:solidFill>
@@ -4031,7 +4031,7 @@
             </a:ln>
             <a:extLst>
               <a:ext uri="{91240B29-F687-4f45-9708-019B960494DF}">
-                <a14:hiddenLine xmlns="" xmlns:a14="http://schemas.microsoft.com/office/drawing/2010/main" w="9525">
+                <a14:hiddenLine xmlns:a14="http://schemas.microsoft.com/office/drawing/2010/main" xmlns="" w="9525">
                   <a:solidFill>
                     <a:srgbClr val="000000"/>
                   </a:solidFill>
@@ -4121,7 +4121,7 @@
             </a:ln>
             <a:extLst>
               <a:ext uri="{91240B29-F687-4f45-9708-019B960494DF}">
-                <a14:hiddenLine xmlns="" xmlns:a14="http://schemas.microsoft.com/office/drawing/2010/main" w="9525">
+                <a14:hiddenLine xmlns:a14="http://schemas.microsoft.com/office/drawing/2010/main" xmlns="" w="9525">
                   <a:solidFill>
                     <a:srgbClr val="000000"/>
                   </a:solidFill>
@@ -4211,7 +4211,7 @@
             </a:ln>
             <a:extLst>
               <a:ext uri="{91240B29-F687-4f45-9708-019B960494DF}">
-                <a14:hiddenLine xmlns="" xmlns:a14="http://schemas.microsoft.com/office/drawing/2010/main" w="9525">
+                <a14:hiddenLine xmlns:a14="http://schemas.microsoft.com/office/drawing/2010/main" xmlns="" w="9525">
                   <a:solidFill>
                     <a:srgbClr val="000000"/>
                   </a:solidFill>
@@ -4245,7 +4245,7 @@
             </a:ln>
             <a:extLst>
               <a:ext uri="{91240B29-F687-4f45-9708-019B960494DF}">
-                <a14:hiddenLine xmlns="" xmlns:a14="http://schemas.microsoft.com/office/drawing/2010/main" w="9525">
+                <a14:hiddenLine xmlns:a14="http://schemas.microsoft.com/office/drawing/2010/main" xmlns="" w="9525">
                   <a:solidFill>
                     <a:srgbClr val="000000"/>
                   </a:solidFill>
@@ -4335,7 +4335,7 @@
             </a:ln>
             <a:extLst>
               <a:ext uri="{91240B29-F687-4f45-9708-019B960494DF}">
-                <a14:hiddenLine xmlns="" xmlns:a14="http://schemas.microsoft.com/office/drawing/2010/main" w="9525">
+                <a14:hiddenLine xmlns:a14="http://schemas.microsoft.com/office/drawing/2010/main" xmlns="" w="9525">
                   <a:solidFill>
                     <a:srgbClr val="000000"/>
                   </a:solidFill>
@@ -4397,7 +4397,7 @@
             </a:ln>
             <a:extLst>
               <a:ext uri="{91240B29-F687-4f45-9708-019B960494DF}">
-                <a14:hiddenLine xmlns="" xmlns:a14="http://schemas.microsoft.com/office/drawing/2010/main" w="9525">
+                <a14:hiddenLine xmlns:a14="http://schemas.microsoft.com/office/drawing/2010/main" xmlns="" w="9525">
                   <a:solidFill>
                     <a:srgbClr val="000000"/>
                   </a:solidFill>
@@ -4459,7 +4459,7 @@
             </a:ln>
             <a:extLst>
               <a:ext uri="{91240B29-F687-4f45-9708-019B960494DF}">
-                <a14:hiddenLine xmlns="" xmlns:a14="http://schemas.microsoft.com/office/drawing/2010/main" w="9525">
+                <a14:hiddenLine xmlns:a14="http://schemas.microsoft.com/office/drawing/2010/main" xmlns="" w="9525">
                   <a:solidFill>
                     <a:srgbClr val="000000"/>
                   </a:solidFill>
@@ -4549,7 +4549,7 @@
             </a:ln>
             <a:extLst>
               <a:ext uri="{91240B29-F687-4f45-9708-019B960494DF}">
-                <a14:hiddenLine xmlns="" xmlns:a14="http://schemas.microsoft.com/office/drawing/2010/main" w="9525">
+                <a14:hiddenLine xmlns:a14="http://schemas.microsoft.com/office/drawing/2010/main" xmlns="" w="9525">
                   <a:solidFill>
                     <a:srgbClr val="000000"/>
                   </a:solidFill>
@@ -4611,7 +4611,7 @@
             </a:ln>
             <a:extLst>
               <a:ext uri="{91240B29-F687-4f45-9708-019B960494DF}">
-                <a14:hiddenLine xmlns="" xmlns:a14="http://schemas.microsoft.com/office/drawing/2010/main" w="9525">
+                <a14:hiddenLine xmlns:a14="http://schemas.microsoft.com/office/drawing/2010/main" xmlns="" w="9525">
                   <a:solidFill>
                     <a:srgbClr val="000000"/>
                   </a:solidFill>
@@ -4673,7 +4673,7 @@
             </a:ln>
             <a:extLst>
               <a:ext uri="{91240B29-F687-4f45-9708-019B960494DF}">
-                <a14:hiddenLine xmlns="" xmlns:a14="http://schemas.microsoft.com/office/drawing/2010/main" w="9525">
+                <a14:hiddenLine xmlns:a14="http://schemas.microsoft.com/office/drawing/2010/main" xmlns="" w="9525">
                   <a:solidFill>
                     <a:srgbClr val="000000"/>
                   </a:solidFill>
@@ -4763,7 +4763,7 @@
             </a:ln>
             <a:extLst>
               <a:ext uri="{91240B29-F687-4f45-9708-019B960494DF}">
-                <a14:hiddenLine xmlns="" xmlns:a14="http://schemas.microsoft.com/office/drawing/2010/main" w="9525">
+                <a14:hiddenLine xmlns:a14="http://schemas.microsoft.com/office/drawing/2010/main" xmlns="" w="9525">
                   <a:solidFill>
                     <a:srgbClr val="000000"/>
                   </a:solidFill>
@@ -4853,7 +4853,7 @@
             </a:ln>
             <a:extLst>
               <a:ext uri="{91240B29-F687-4f45-9708-019B960494DF}">
-                <a14:hiddenLine xmlns="" xmlns:a14="http://schemas.microsoft.com/office/drawing/2010/main" w="9525">
+                <a14:hiddenLine xmlns:a14="http://schemas.microsoft.com/office/drawing/2010/main" xmlns="" w="9525">
                   <a:solidFill>
                     <a:srgbClr val="000000"/>
                   </a:solidFill>
@@ -4915,7 +4915,7 @@
             </a:ln>
             <a:extLst>
               <a:ext uri="{91240B29-F687-4f45-9708-019B960494DF}">
-                <a14:hiddenLine xmlns="" xmlns:a14="http://schemas.microsoft.com/office/drawing/2010/main" w="9525">
+                <a14:hiddenLine xmlns:a14="http://schemas.microsoft.com/office/drawing/2010/main" xmlns="" w="9525">
                   <a:solidFill>
                     <a:srgbClr val="000000"/>
                   </a:solidFill>
@@ -5025,7 +5025,7 @@
             </a:ln>
             <a:extLst>
               <a:ext uri="{91240B29-F687-4f45-9708-019B960494DF}">
-                <a14:hiddenLine xmlns="" xmlns:a14="http://schemas.microsoft.com/office/drawing/2010/main" w="9525">
+                <a14:hiddenLine xmlns:a14="http://schemas.microsoft.com/office/drawing/2010/main" xmlns="" w="9525">
                   <a:solidFill>
                     <a:srgbClr val="000000"/>
                   </a:solidFill>
@@ -5087,7 +5087,7 @@
             </a:ln>
             <a:extLst>
               <a:ext uri="{91240B29-F687-4f45-9708-019B960494DF}">
-                <a14:hiddenLine xmlns="" xmlns:a14="http://schemas.microsoft.com/office/drawing/2010/main" w="9525">
+                <a14:hiddenLine xmlns:a14="http://schemas.microsoft.com/office/drawing/2010/main" xmlns="" w="9525">
                   <a:solidFill>
                     <a:srgbClr val="000000"/>
                   </a:solidFill>
@@ -5177,7 +5177,7 @@
             </a:ln>
             <a:extLst>
               <a:ext uri="{91240B29-F687-4f45-9708-019B960494DF}">
-                <a14:hiddenLine xmlns="" xmlns:a14="http://schemas.microsoft.com/office/drawing/2010/main" w="9525">
+                <a14:hiddenLine xmlns:a14="http://schemas.microsoft.com/office/drawing/2010/main" xmlns="" w="9525">
                   <a:solidFill>
                     <a:srgbClr val="000000"/>
                   </a:solidFill>
@@ -5267,7 +5267,7 @@
             </a:ln>
             <a:extLst>
               <a:ext uri="{91240B29-F687-4f45-9708-019B960494DF}">
-                <a14:hiddenLine xmlns="" xmlns:a14="http://schemas.microsoft.com/office/drawing/2010/main" w="9525">
+                <a14:hiddenLine xmlns:a14="http://schemas.microsoft.com/office/drawing/2010/main" xmlns="" w="9525">
                   <a:solidFill>
                     <a:srgbClr val="000000"/>
                   </a:solidFill>
@@ -5329,7 +5329,7 @@
             </a:ln>
             <a:extLst>
               <a:ext uri="{91240B29-F687-4f45-9708-019B960494DF}">
-                <a14:hiddenLine xmlns="" xmlns:a14="http://schemas.microsoft.com/office/drawing/2010/main" w="9525">
+                <a14:hiddenLine xmlns:a14="http://schemas.microsoft.com/office/drawing/2010/main" xmlns="" w="9525">
                   <a:solidFill>
                     <a:srgbClr val="000000"/>
                   </a:solidFill>
@@ -5419,7 +5419,7 @@
             </a:ln>
             <a:extLst>
               <a:ext uri="{91240B29-F687-4f45-9708-019B960494DF}">
-                <a14:hiddenLine xmlns="" xmlns:a14="http://schemas.microsoft.com/office/drawing/2010/main" w="9525">
+                <a14:hiddenLine xmlns:a14="http://schemas.microsoft.com/office/drawing/2010/main" xmlns="" w="9525">
                   <a:solidFill>
                     <a:srgbClr val="000000"/>
                   </a:solidFill>
@@ -5509,7 +5509,7 @@
             </a:ln>
             <a:extLst>
               <a:ext uri="{91240B29-F687-4f45-9708-019B960494DF}">
-                <a14:hiddenLine xmlns="" xmlns:a14="http://schemas.microsoft.com/office/drawing/2010/main" w="9525">
+                <a14:hiddenLine xmlns:a14="http://schemas.microsoft.com/office/drawing/2010/main" xmlns="" w="9525">
                   <a:solidFill>
                     <a:srgbClr val="000000"/>
                   </a:solidFill>
@@ -5565,7 +5565,7 @@
             </a:ln>
             <a:extLst>
               <a:ext uri="{91240B29-F687-4f45-9708-019B960494DF}">
-                <a14:hiddenLine xmlns="" xmlns:a14="http://schemas.microsoft.com/office/drawing/2010/main" w="9525">
+                <a14:hiddenLine xmlns:a14="http://schemas.microsoft.com/office/drawing/2010/main" xmlns="" w="9525">
                   <a:solidFill>
                     <a:srgbClr val="000000"/>
                   </a:solidFill>
@@ -5655,7 +5655,7 @@
             </a:ln>
             <a:extLst>
               <a:ext uri="{91240B29-F687-4f45-9708-019B960494DF}">
-                <a14:hiddenLine xmlns="" xmlns:a14="http://schemas.microsoft.com/office/drawing/2010/main" w="9525">
+                <a14:hiddenLine xmlns:a14="http://schemas.microsoft.com/office/drawing/2010/main" xmlns="" w="9525">
                   <a:solidFill>
                     <a:srgbClr val="000000"/>
                   </a:solidFill>
@@ -5711,7 +5711,7 @@
             </a:ln>
             <a:extLst>
               <a:ext uri="{91240B29-F687-4f45-9708-019B960494DF}">
-                <a14:hiddenLine xmlns="" xmlns:a14="http://schemas.microsoft.com/office/drawing/2010/main" w="9525">
+                <a14:hiddenLine xmlns:a14="http://schemas.microsoft.com/office/drawing/2010/main" xmlns="" w="9525">
                   <a:solidFill>
                     <a:srgbClr val="000000"/>
                   </a:solidFill>
@@ -5801,7 +5801,7 @@
             </a:ln>
             <a:extLst>
               <a:ext uri="{91240B29-F687-4f45-9708-019B960494DF}">
-                <a14:hiddenLine xmlns="" xmlns:a14="http://schemas.microsoft.com/office/drawing/2010/main" w="9525">
+                <a14:hiddenLine xmlns:a14="http://schemas.microsoft.com/office/drawing/2010/main" xmlns="" w="9525">
                   <a:solidFill>
                     <a:srgbClr val="000000"/>
                   </a:solidFill>
@@ -5869,7 +5869,7 @@
             </a:ln>
             <a:extLst>
               <a:ext uri="{91240B29-F687-4f45-9708-019B960494DF}">
-                <a14:hiddenLine xmlns="" xmlns:a14="http://schemas.microsoft.com/office/drawing/2010/main" w="9525">
+                <a14:hiddenLine xmlns:a14="http://schemas.microsoft.com/office/drawing/2010/main" xmlns="" w="9525">
                   <a:solidFill>
                     <a:srgbClr val="000000"/>
                   </a:solidFill>
@@ -5959,7 +5959,7 @@
             </a:ln>
             <a:extLst>
               <a:ext uri="{91240B29-F687-4f45-9708-019B960494DF}">
-                <a14:hiddenLine xmlns="" xmlns:a14="http://schemas.microsoft.com/office/drawing/2010/main" w="9525">
+                <a14:hiddenLine xmlns:a14="http://schemas.microsoft.com/office/drawing/2010/main" xmlns="" w="9525">
                   <a:solidFill>
                     <a:srgbClr val="000000"/>
                   </a:solidFill>
@@ -6027,7 +6027,7 @@
             </a:ln>
             <a:extLst>
               <a:ext uri="{91240B29-F687-4f45-9708-019B960494DF}">
-                <a14:hiddenLine xmlns="" xmlns:a14="http://schemas.microsoft.com/office/drawing/2010/main" w="9525">
+                <a14:hiddenLine xmlns:a14="http://schemas.microsoft.com/office/drawing/2010/main" xmlns="" w="9525">
                   <a:solidFill>
                     <a:srgbClr val="000000"/>
                   </a:solidFill>
@@ -6117,7 +6117,7 @@
             </a:ln>
             <a:extLst>
               <a:ext uri="{91240B29-F687-4f45-9708-019B960494DF}">
-                <a14:hiddenLine xmlns="" xmlns:a14="http://schemas.microsoft.com/office/drawing/2010/main" w="9525">
+                <a14:hiddenLine xmlns:a14="http://schemas.microsoft.com/office/drawing/2010/main" xmlns="" w="9525">
                   <a:solidFill>
                     <a:srgbClr val="000000"/>
                   </a:solidFill>
@@ -6151,7 +6151,7 @@
             </a:ln>
             <a:extLst>
               <a:ext uri="{91240B29-F687-4f45-9708-019B960494DF}">
-                <a14:hiddenLine xmlns="" xmlns:a14="http://schemas.microsoft.com/office/drawing/2010/main" w="9525">
+                <a14:hiddenLine xmlns:a14="http://schemas.microsoft.com/office/drawing/2010/main" xmlns="" w="9525">
                   <a:solidFill>
                     <a:srgbClr val="000000"/>
                   </a:solidFill>
@@ -6241,7 +6241,7 @@
             </a:ln>
             <a:extLst>
               <a:ext uri="{91240B29-F687-4f45-9708-019B960494DF}">
-                <a14:hiddenLine xmlns="" xmlns:a14="http://schemas.microsoft.com/office/drawing/2010/main" w="9525">
+                <a14:hiddenLine xmlns:a14="http://schemas.microsoft.com/office/drawing/2010/main" xmlns="" w="9525">
                   <a:solidFill>
                     <a:srgbClr val="000000"/>
                   </a:solidFill>
@@ -6303,7 +6303,7 @@
             </a:ln>
             <a:extLst>
               <a:ext uri="{91240B29-F687-4f45-9708-019B960494DF}">
-                <a14:hiddenLine xmlns="" xmlns:a14="http://schemas.microsoft.com/office/drawing/2010/main" w="9525">
+                <a14:hiddenLine xmlns:a14="http://schemas.microsoft.com/office/drawing/2010/main" xmlns="" w="9525">
                   <a:solidFill>
                     <a:srgbClr val="000000"/>
                   </a:solidFill>
@@ -6365,7 +6365,7 @@
             </a:ln>
             <a:extLst>
               <a:ext uri="{91240B29-F687-4f45-9708-019B960494DF}">
-                <a14:hiddenLine xmlns="" xmlns:a14="http://schemas.microsoft.com/office/drawing/2010/main" w="9525">
+                <a14:hiddenLine xmlns:a14="http://schemas.microsoft.com/office/drawing/2010/main" xmlns="" w="9525">
                   <a:solidFill>
                     <a:srgbClr val="000000"/>
                   </a:solidFill>
@@ -6455,7 +6455,7 @@
             </a:ln>
             <a:extLst>
               <a:ext uri="{91240B29-F687-4f45-9708-019B960494DF}">
-                <a14:hiddenLine xmlns="" xmlns:a14="http://schemas.microsoft.com/office/drawing/2010/main" w="9525">
+                <a14:hiddenLine xmlns:a14="http://schemas.microsoft.com/office/drawing/2010/main" xmlns="" w="9525">
                   <a:solidFill>
                     <a:srgbClr val="000000"/>
                   </a:solidFill>
@@ -6523,7 +6523,7 @@
             </a:ln>
             <a:extLst>
               <a:ext uri="{91240B29-F687-4f45-9708-019B960494DF}">
-                <a14:hiddenLine xmlns="" xmlns:a14="http://schemas.microsoft.com/office/drawing/2010/main" w="9525">
+                <a14:hiddenLine xmlns:a14="http://schemas.microsoft.com/office/drawing/2010/main" xmlns="" w="9525">
                   <a:solidFill>
                     <a:srgbClr val="000000"/>
                   </a:solidFill>
@@ -6585,7 +6585,7 @@
             </a:ln>
             <a:extLst>
               <a:ext uri="{91240B29-F687-4f45-9708-019B960494DF}">
-                <a14:hiddenLine xmlns="" xmlns:a14="http://schemas.microsoft.com/office/drawing/2010/main" w="9525">
+                <a14:hiddenLine xmlns:a14="http://schemas.microsoft.com/office/drawing/2010/main" xmlns="" w="9525">
                   <a:solidFill>
                     <a:srgbClr val="000000"/>
                   </a:solidFill>
@@ -6675,7 +6675,7 @@
             </a:ln>
             <a:extLst>
               <a:ext uri="{91240B29-F687-4f45-9708-019B960494DF}">
-                <a14:hiddenLine xmlns="" xmlns:a14="http://schemas.microsoft.com/office/drawing/2010/main" w="9525">
+                <a14:hiddenLine xmlns:a14="http://schemas.microsoft.com/office/drawing/2010/main" xmlns="" w="9525">
                   <a:solidFill>
                     <a:srgbClr val="000000"/>
                   </a:solidFill>
@@ -6737,7 +6737,7 @@
             </a:ln>
             <a:extLst>
               <a:ext uri="{91240B29-F687-4f45-9708-019B960494DF}">
-                <a14:hiddenLine xmlns="" xmlns:a14="http://schemas.microsoft.com/office/drawing/2010/main" w="9525">
+                <a14:hiddenLine xmlns:a14="http://schemas.microsoft.com/office/drawing/2010/main" xmlns="" w="9525">
                   <a:solidFill>
                     <a:srgbClr val="000000"/>
                   </a:solidFill>
@@ -6827,7 +6827,7 @@
             </a:ln>
             <a:extLst>
               <a:ext uri="{91240B29-F687-4f45-9708-019B960494DF}">
-                <a14:hiddenLine xmlns="" xmlns:a14="http://schemas.microsoft.com/office/drawing/2010/main" w="9525">
+                <a14:hiddenLine xmlns:a14="http://schemas.microsoft.com/office/drawing/2010/main" xmlns="" w="9525">
                   <a:solidFill>
                     <a:srgbClr val="000000"/>
                   </a:solidFill>
@@ -6889,7 +6889,7 @@
             </a:ln>
             <a:extLst>
               <a:ext uri="{91240B29-F687-4f45-9708-019B960494DF}">
-                <a14:hiddenLine xmlns="" xmlns:a14="http://schemas.microsoft.com/office/drawing/2010/main" w="9525">
+                <a14:hiddenLine xmlns:a14="http://schemas.microsoft.com/office/drawing/2010/main" xmlns="" w="9525">
                   <a:solidFill>
                     <a:srgbClr val="000000"/>
                   </a:solidFill>
@@ -6979,7 +6979,7 @@
             </a:ln>
             <a:extLst>
               <a:ext uri="{91240B29-F687-4f45-9708-019B960494DF}">
-                <a14:hiddenLine xmlns="" xmlns:a14="http://schemas.microsoft.com/office/drawing/2010/main" w="9525">
+                <a14:hiddenLine xmlns:a14="http://schemas.microsoft.com/office/drawing/2010/main" xmlns="" w="9525">
                   <a:solidFill>
                     <a:srgbClr val="000000"/>
                   </a:solidFill>
@@ -7013,7 +7013,7 @@
             </a:ln>
             <a:extLst>
               <a:ext uri="{91240B29-F687-4f45-9708-019B960494DF}">
-                <a14:hiddenLine xmlns="" xmlns:a14="http://schemas.microsoft.com/office/drawing/2010/main" w="9525">
+                <a14:hiddenLine xmlns:a14="http://schemas.microsoft.com/office/drawing/2010/main" xmlns="" w="9525">
                   <a:solidFill>
                     <a:srgbClr val="000000"/>
                   </a:solidFill>
@@ -7078,7 +7078,7 @@
             </a:ln>
             <a:extLst>
               <a:ext uri="{91240B29-F687-4f45-9708-019B960494DF}">
-                <a14:hiddenLine xmlns="" xmlns:a14="http://schemas.microsoft.com/office/drawing/2010/main" w="9525">
+                <a14:hiddenLine xmlns:a14="http://schemas.microsoft.com/office/drawing/2010/main" xmlns="" w="9525">
                   <a:solidFill>
                     <a:srgbClr val="000000"/>
                   </a:solidFill>
@@ -7168,7 +7168,7 @@
             </a:ln>
             <a:extLst>
               <a:ext uri="{91240B29-F687-4f45-9708-019B960494DF}">
-                <a14:hiddenLine xmlns="" xmlns:a14="http://schemas.microsoft.com/office/drawing/2010/main" w="9525">
+                <a14:hiddenLine xmlns:a14="http://schemas.microsoft.com/office/drawing/2010/main" xmlns="" w="9525">
                   <a:solidFill>
                     <a:srgbClr val="000000"/>
                   </a:solidFill>
@@ -7230,7 +7230,7 @@
             </a:ln>
             <a:extLst>
               <a:ext uri="{91240B29-F687-4f45-9708-019B960494DF}">
-                <a14:hiddenLine xmlns="" xmlns:a14="http://schemas.microsoft.com/office/drawing/2010/main" w="9525">
+                <a14:hiddenLine xmlns:a14="http://schemas.microsoft.com/office/drawing/2010/main" xmlns="" w="9525">
                   <a:solidFill>
                     <a:srgbClr val="000000"/>
                   </a:solidFill>
@@ -7320,7 +7320,7 @@
             </a:ln>
             <a:extLst>
               <a:ext uri="{91240B29-F687-4f45-9708-019B960494DF}">
-                <a14:hiddenLine xmlns="" xmlns:a14="http://schemas.microsoft.com/office/drawing/2010/main" w="9525">
+                <a14:hiddenLine xmlns:a14="http://schemas.microsoft.com/office/drawing/2010/main" xmlns="" w="9525">
                   <a:solidFill>
                     <a:srgbClr val="000000"/>
                   </a:solidFill>
@@ -7410,7 +7410,7 @@
             </a:ln>
             <a:extLst>
               <a:ext uri="{91240B29-F687-4f45-9708-019B960494DF}">
-                <a14:hiddenLine xmlns="" xmlns:a14="http://schemas.microsoft.com/office/drawing/2010/main" w="9525">
+                <a14:hiddenLine xmlns:a14="http://schemas.microsoft.com/office/drawing/2010/main" xmlns="" w="9525">
                   <a:solidFill>
                     <a:srgbClr val="000000"/>
                   </a:solidFill>
@@ -7475,7 +7475,7 @@
             </a:ln>
             <a:extLst>
               <a:ext uri="{91240B29-F687-4f45-9708-019B960494DF}">
-                <a14:hiddenLine xmlns="" xmlns:a14="http://schemas.microsoft.com/office/drawing/2010/main" w="9525">
+                <a14:hiddenLine xmlns:a14="http://schemas.microsoft.com/office/drawing/2010/main" xmlns="" w="9525">
                   <a:solidFill>
                     <a:srgbClr val="000000"/>
                   </a:solidFill>
@@ -7537,7 +7537,7 @@
             </a:ln>
             <a:extLst>
               <a:ext uri="{91240B29-F687-4f45-9708-019B960494DF}">
-                <a14:hiddenLine xmlns="" xmlns:a14="http://schemas.microsoft.com/office/drawing/2010/main" w="9525">
+                <a14:hiddenLine xmlns:a14="http://schemas.microsoft.com/office/drawing/2010/main" xmlns="" w="9525">
                   <a:solidFill>
                     <a:srgbClr val="000000"/>
                   </a:solidFill>
@@ -7627,7 +7627,7 @@
             </a:ln>
             <a:extLst>
               <a:ext uri="{91240B29-F687-4f45-9708-019B960494DF}">
-                <a14:hiddenLine xmlns="" xmlns:a14="http://schemas.microsoft.com/office/drawing/2010/main" w="9525">
+                <a14:hiddenLine xmlns:a14="http://schemas.microsoft.com/office/drawing/2010/main" xmlns="" w="9525">
                   <a:solidFill>
                     <a:srgbClr val="000000"/>
                   </a:solidFill>
@@ -7717,7 +7717,7 @@
             </a:ln>
             <a:extLst>
               <a:ext uri="{91240B29-F687-4f45-9708-019B960494DF}">
-                <a14:hiddenLine xmlns="" xmlns:a14="http://schemas.microsoft.com/office/drawing/2010/main" w="9525">
+                <a14:hiddenLine xmlns:a14="http://schemas.microsoft.com/office/drawing/2010/main" xmlns="" w="9525">
                   <a:solidFill>
                     <a:srgbClr val="000000"/>
                   </a:solidFill>
@@ -7779,7 +7779,7 @@
             </a:ln>
             <a:extLst>
               <a:ext uri="{91240B29-F687-4f45-9708-019B960494DF}">
-                <a14:hiddenLine xmlns="" xmlns:a14="http://schemas.microsoft.com/office/drawing/2010/main" w="9525">
+                <a14:hiddenLine xmlns:a14="http://schemas.microsoft.com/office/drawing/2010/main" xmlns="" w="9525">
                   <a:solidFill>
                     <a:srgbClr val="000000"/>
                   </a:solidFill>
@@ -7899,7 +7899,7 @@
             </a:ln>
             <a:extLst>
               <a:ext uri="{91240B29-F687-4f45-9708-019B960494DF}">
-                <a14:hiddenLine xmlns="" xmlns:a14="http://schemas.microsoft.com/office/drawing/2010/main" w="9525">
+                <a14:hiddenLine xmlns:a14="http://schemas.microsoft.com/office/drawing/2010/main" xmlns="" w="9525">
                   <a:solidFill>
                     <a:srgbClr val="000000"/>
                   </a:solidFill>
@@ -7967,7 +7967,7 @@
             </a:ln>
             <a:extLst>
               <a:ext uri="{91240B29-F687-4f45-9708-019B960494DF}">
-                <a14:hiddenLine xmlns="" xmlns:a14="http://schemas.microsoft.com/office/drawing/2010/main" w="9525">
+                <a14:hiddenLine xmlns:a14="http://schemas.microsoft.com/office/drawing/2010/main" xmlns="" w="9525">
                   <a:solidFill>
                     <a:srgbClr val="000000"/>
                   </a:solidFill>
@@ -8057,7 +8057,7 @@
             </a:ln>
             <a:extLst>
               <a:ext uri="{91240B29-F687-4f45-9708-019B960494DF}">
-                <a14:hiddenLine xmlns="" xmlns:a14="http://schemas.microsoft.com/office/drawing/2010/main" w="9525">
+                <a14:hiddenLine xmlns:a14="http://schemas.microsoft.com/office/drawing/2010/main" xmlns="" w="9525">
                   <a:solidFill>
                     <a:srgbClr val="000000"/>
                   </a:solidFill>
@@ -13983,7 +13983,7 @@
           <a:noFill/>
           <a:extLst>
             <a:ext uri="{909E8E84-426E-40dd-AFC4-6F175D3DCCD1}">
-              <a14:hiddenFill xmlns="" xmlns:a14="http://schemas.microsoft.com/office/drawing/2010/main">
+              <a14:hiddenFill xmlns:a14="http://schemas.microsoft.com/office/drawing/2010/main" xmlns="">
                 <a:solidFill>
                   <a:srgbClr val="FFFFFF"/>
                 </a:solidFill>
@@ -14063,7 +14063,7 @@
               </a:ln>
               <a:extLst>
                 <a:ext uri="{91240B29-F687-4f45-9708-019B960494DF}">
-                  <a14:hiddenLine xmlns="" xmlns:a14="http://schemas.microsoft.com/office/drawing/2010/main" w="9525">
+                  <a14:hiddenLine xmlns:a14="http://schemas.microsoft.com/office/drawing/2010/main" xmlns="" w="9525">
                     <a:solidFill>
                       <a:srgbClr val="000000"/>
                     </a:solidFill>
@@ -14153,7 +14153,7 @@
               </a:ln>
               <a:extLst>
                 <a:ext uri="{91240B29-F687-4f45-9708-019B960494DF}">
-                  <a14:hiddenLine xmlns="" xmlns:a14="http://schemas.microsoft.com/office/drawing/2010/main" w="9525">
+                  <a14:hiddenLine xmlns:a14="http://schemas.microsoft.com/office/drawing/2010/main" xmlns="" w="9525">
                     <a:solidFill>
                       <a:srgbClr val="000000"/>
                     </a:solidFill>
@@ -14243,7 +14243,7 @@
               </a:ln>
               <a:extLst>
                 <a:ext uri="{91240B29-F687-4f45-9708-019B960494DF}">
-                  <a14:hiddenLine xmlns="" xmlns:a14="http://schemas.microsoft.com/office/drawing/2010/main" w="9525">
+                  <a14:hiddenLine xmlns:a14="http://schemas.microsoft.com/office/drawing/2010/main" xmlns="" w="9525">
                     <a:solidFill>
                       <a:srgbClr val="000000"/>
                     </a:solidFill>
@@ -14305,7 +14305,7 @@
               </a:ln>
               <a:extLst>
                 <a:ext uri="{91240B29-F687-4f45-9708-019B960494DF}">
-                  <a14:hiddenLine xmlns="" xmlns:a14="http://schemas.microsoft.com/office/drawing/2010/main" w="9525">
+                  <a14:hiddenLine xmlns:a14="http://schemas.microsoft.com/office/drawing/2010/main" xmlns="" w="9525">
                     <a:solidFill>
                       <a:srgbClr val="000000"/>
                     </a:solidFill>
@@ -14395,7 +14395,7 @@
               </a:ln>
               <a:extLst>
                 <a:ext uri="{91240B29-F687-4f45-9708-019B960494DF}">
-                  <a14:hiddenLine xmlns="" xmlns:a14="http://schemas.microsoft.com/office/drawing/2010/main" w="9525">
+                  <a14:hiddenLine xmlns:a14="http://schemas.microsoft.com/office/drawing/2010/main" xmlns="" w="9525">
                     <a:solidFill>
                       <a:srgbClr val="000000"/>
                     </a:solidFill>
@@ -14457,7 +14457,7 @@
               </a:ln>
               <a:extLst>
                 <a:ext uri="{91240B29-F687-4f45-9708-019B960494DF}">
-                  <a14:hiddenLine xmlns="" xmlns:a14="http://schemas.microsoft.com/office/drawing/2010/main" w="9525">
+                  <a14:hiddenLine xmlns:a14="http://schemas.microsoft.com/office/drawing/2010/main" xmlns="" w="9525">
                     <a:solidFill>
                       <a:srgbClr val="000000"/>
                     </a:solidFill>
@@ -14519,7 +14519,7 @@
               </a:ln>
               <a:extLst>
                 <a:ext uri="{91240B29-F687-4f45-9708-019B960494DF}">
-                  <a14:hiddenLine xmlns="" xmlns:a14="http://schemas.microsoft.com/office/drawing/2010/main" w="9525">
+                  <a14:hiddenLine xmlns:a14="http://schemas.microsoft.com/office/drawing/2010/main" xmlns="" w="9525">
                     <a:solidFill>
                       <a:srgbClr val="000000"/>
                     </a:solidFill>
@@ -14609,7 +14609,7 @@
               </a:ln>
               <a:extLst>
                 <a:ext uri="{91240B29-F687-4f45-9708-019B960494DF}">
-                  <a14:hiddenLine xmlns="" xmlns:a14="http://schemas.microsoft.com/office/drawing/2010/main" w="9525">
+                  <a14:hiddenLine xmlns:a14="http://schemas.microsoft.com/office/drawing/2010/main" xmlns="" w="9525">
                     <a:solidFill>
                       <a:srgbClr val="000000"/>
                     </a:solidFill>
@@ -14699,7 +14699,7 @@
               </a:ln>
               <a:extLst>
                 <a:ext uri="{91240B29-F687-4f45-9708-019B960494DF}">
-                  <a14:hiddenLine xmlns="" xmlns:a14="http://schemas.microsoft.com/office/drawing/2010/main" w="9525">
+                  <a14:hiddenLine xmlns:a14="http://schemas.microsoft.com/office/drawing/2010/main" xmlns="" w="9525">
                     <a:solidFill>
                       <a:srgbClr val="000000"/>
                     </a:solidFill>
@@ -14761,7 +14761,7 @@
               </a:ln>
               <a:extLst>
                 <a:ext uri="{91240B29-F687-4f45-9708-019B960494DF}">
-                  <a14:hiddenLine xmlns="" xmlns:a14="http://schemas.microsoft.com/office/drawing/2010/main" w="9525">
+                  <a14:hiddenLine xmlns:a14="http://schemas.microsoft.com/office/drawing/2010/main" xmlns="" w="9525">
                     <a:solidFill>
                       <a:srgbClr val="000000"/>
                     </a:solidFill>
@@ -14871,7 +14871,7 @@
               </a:ln>
               <a:extLst>
                 <a:ext uri="{91240B29-F687-4f45-9708-019B960494DF}">
-                  <a14:hiddenLine xmlns="" xmlns:a14="http://schemas.microsoft.com/office/drawing/2010/main" w="9525">
+                  <a14:hiddenLine xmlns:a14="http://schemas.microsoft.com/office/drawing/2010/main" xmlns="" w="9525">
                     <a:solidFill>
                       <a:srgbClr val="000000"/>
                     </a:solidFill>
@@ -14955,7 +14955,7 @@
               </a:ln>
               <a:extLst>
                 <a:ext uri="{91240B29-F687-4f45-9708-019B960494DF}">
-                  <a14:hiddenLine xmlns="" xmlns:a14="http://schemas.microsoft.com/office/drawing/2010/main" w="9525">
+                  <a14:hiddenLine xmlns:a14="http://schemas.microsoft.com/office/drawing/2010/main" xmlns="" w="9525">
                     <a:solidFill>
                       <a:srgbClr val="000000"/>
                     </a:solidFill>
@@ -15017,7 +15017,7 @@
               </a:ln>
               <a:extLst>
                 <a:ext uri="{91240B29-F687-4f45-9708-019B960494DF}">
-                  <a14:hiddenLine xmlns="" xmlns:a14="http://schemas.microsoft.com/office/drawing/2010/main" w="9525">
+                  <a14:hiddenLine xmlns:a14="http://schemas.microsoft.com/office/drawing/2010/main" xmlns="" w="9525">
                     <a:solidFill>
                       <a:srgbClr val="000000"/>
                     </a:solidFill>
@@ -15079,7 +15079,7 @@
               </a:ln>
               <a:extLst>
                 <a:ext uri="{91240B29-F687-4f45-9708-019B960494DF}">
-                  <a14:hiddenLine xmlns="" xmlns:a14="http://schemas.microsoft.com/office/drawing/2010/main" w="9525">
+                  <a14:hiddenLine xmlns:a14="http://schemas.microsoft.com/office/drawing/2010/main" xmlns="" w="9525">
                     <a:solidFill>
                       <a:srgbClr val="000000"/>
                     </a:solidFill>
@@ -15169,7 +15169,7 @@
               </a:ln>
               <a:extLst>
                 <a:ext uri="{91240B29-F687-4f45-9708-019B960494DF}">
-                  <a14:hiddenLine xmlns="" xmlns:a14="http://schemas.microsoft.com/office/drawing/2010/main" w="9525">
+                  <a14:hiddenLine xmlns:a14="http://schemas.microsoft.com/office/drawing/2010/main" xmlns="" w="9525">
                     <a:solidFill>
                       <a:srgbClr val="000000"/>
                     </a:solidFill>
@@ -15203,7 +15203,7 @@
               </a:ln>
               <a:extLst>
                 <a:ext uri="{91240B29-F687-4f45-9708-019B960494DF}">
-                  <a14:hiddenLine xmlns="" xmlns:a14="http://schemas.microsoft.com/office/drawing/2010/main" w="9525">
+                  <a14:hiddenLine xmlns:a14="http://schemas.microsoft.com/office/drawing/2010/main" xmlns="" w="9525">
                     <a:solidFill>
                       <a:srgbClr val="000000"/>
                     </a:solidFill>
@@ -15268,7 +15268,7 @@
               </a:ln>
               <a:extLst>
                 <a:ext uri="{91240B29-F687-4f45-9708-019B960494DF}">
-                  <a14:hiddenLine xmlns="" xmlns:a14="http://schemas.microsoft.com/office/drawing/2010/main" w="9525">
+                  <a14:hiddenLine xmlns:a14="http://schemas.microsoft.com/office/drawing/2010/main" xmlns="" w="9525">
                     <a:solidFill>
                       <a:srgbClr val="000000"/>
                     </a:solidFill>
@@ -15358,7 +15358,7 @@
               </a:ln>
               <a:extLst>
                 <a:ext uri="{91240B29-F687-4f45-9708-019B960494DF}">
-                  <a14:hiddenLine xmlns="" xmlns:a14="http://schemas.microsoft.com/office/drawing/2010/main" w="9525">
+                  <a14:hiddenLine xmlns:a14="http://schemas.microsoft.com/office/drawing/2010/main" xmlns="" w="9525">
                     <a:solidFill>
                       <a:srgbClr val="000000"/>
                     </a:solidFill>
@@ -15420,7 +15420,7 @@
               </a:ln>
               <a:extLst>
                 <a:ext uri="{91240B29-F687-4f45-9708-019B960494DF}">
-                  <a14:hiddenLine xmlns="" xmlns:a14="http://schemas.microsoft.com/office/drawing/2010/main" w="9525">
+                  <a14:hiddenLine xmlns:a14="http://schemas.microsoft.com/office/drawing/2010/main" xmlns="" w="9525">
                     <a:solidFill>
                       <a:srgbClr val="000000"/>
                     </a:solidFill>
@@ -15510,7 +15510,7 @@
               </a:ln>
               <a:extLst>
                 <a:ext uri="{91240B29-F687-4f45-9708-019B960494DF}">
-                  <a14:hiddenLine xmlns="" xmlns:a14="http://schemas.microsoft.com/office/drawing/2010/main" w="9525">
+                  <a14:hiddenLine xmlns:a14="http://schemas.microsoft.com/office/drawing/2010/main" xmlns="" w="9525">
                     <a:solidFill>
                       <a:srgbClr val="000000"/>
                     </a:solidFill>
@@ -15575,7 +15575,7 @@
               </a:ln>
               <a:extLst>
                 <a:ext uri="{91240B29-F687-4f45-9708-019B960494DF}">
-                  <a14:hiddenLine xmlns="" xmlns:a14="http://schemas.microsoft.com/office/drawing/2010/main" w="9525">
+                  <a14:hiddenLine xmlns:a14="http://schemas.microsoft.com/office/drawing/2010/main" xmlns="" w="9525">
                     <a:solidFill>
                       <a:srgbClr val="000000"/>
                     </a:solidFill>
@@ -15637,7 +15637,7 @@
               </a:ln>
               <a:extLst>
                 <a:ext uri="{91240B29-F687-4f45-9708-019B960494DF}">
-                  <a14:hiddenLine xmlns="" xmlns:a14="http://schemas.microsoft.com/office/drawing/2010/main" w="9525">
+                  <a14:hiddenLine xmlns:a14="http://schemas.microsoft.com/office/drawing/2010/main" xmlns="" w="9525">
                     <a:solidFill>
                       <a:srgbClr val="000000"/>
                     </a:solidFill>
@@ -15727,7 +15727,7 @@
               </a:ln>
               <a:extLst>
                 <a:ext uri="{91240B29-F687-4f45-9708-019B960494DF}">
-                  <a14:hiddenLine xmlns="" xmlns:a14="http://schemas.microsoft.com/office/drawing/2010/main" w="9525">
+                  <a14:hiddenLine xmlns:a14="http://schemas.microsoft.com/office/drawing/2010/main" xmlns="" w="9525">
                     <a:solidFill>
                       <a:srgbClr val="000000"/>
                     </a:solidFill>
@@ -15817,7 +15817,7 @@
               </a:ln>
               <a:extLst>
                 <a:ext uri="{91240B29-F687-4f45-9708-019B960494DF}">
-                  <a14:hiddenLine xmlns="" xmlns:a14="http://schemas.microsoft.com/office/drawing/2010/main" w="9525">
+                  <a14:hiddenLine xmlns:a14="http://schemas.microsoft.com/office/drawing/2010/main" xmlns="" w="9525">
                     <a:solidFill>
                       <a:srgbClr val="000000"/>
                     </a:solidFill>
@@ -15882,7 +15882,7 @@
               </a:ln>
               <a:extLst>
                 <a:ext uri="{91240B29-F687-4f45-9708-019B960494DF}">
-                  <a14:hiddenLine xmlns="" xmlns:a14="http://schemas.microsoft.com/office/drawing/2010/main" w="9525">
+                  <a14:hiddenLine xmlns:a14="http://schemas.microsoft.com/office/drawing/2010/main" xmlns="" w="9525">
                     <a:solidFill>
                       <a:srgbClr val="000000"/>
                     </a:solidFill>
@@ -16002,7 +16002,7 @@
               </a:ln>
               <a:extLst>
                 <a:ext uri="{91240B29-F687-4f45-9708-019B960494DF}">
-                  <a14:hiddenLine xmlns="" xmlns:a14="http://schemas.microsoft.com/office/drawing/2010/main" w="9525">
+                  <a14:hiddenLine xmlns:a14="http://schemas.microsoft.com/office/drawing/2010/main" xmlns="" w="9525">
                     <a:solidFill>
                       <a:srgbClr val="000000"/>
                     </a:solidFill>
@@ -16100,7 +16100,7 @@
               </a:ln>
               <a:extLst>
                 <a:ext uri="{91240B29-F687-4f45-9708-019B960494DF}">
-                  <a14:hiddenLine xmlns="" xmlns:a14="http://schemas.microsoft.com/office/drawing/2010/main" w="9525">
+                  <a14:hiddenLine xmlns:a14="http://schemas.microsoft.com/office/drawing/2010/main" xmlns="" w="9525">
                     <a:solidFill>
                       <a:srgbClr val="000000"/>
                     </a:solidFill>
@@ -16215,7 +16215,7 @@
               </a:ln>
               <a:extLst>
                 <a:ext uri="{91240B29-F687-4f45-9708-019B960494DF}">
-                  <a14:hiddenLine xmlns="" xmlns:a14="http://schemas.microsoft.com/office/drawing/2010/main" w="9525">
+                  <a14:hiddenLine xmlns:a14="http://schemas.microsoft.com/office/drawing/2010/main" xmlns="" w="9525">
                     <a:solidFill>
                       <a:srgbClr val="000000"/>
                     </a:solidFill>
@@ -16305,7 +16305,7 @@
               </a:ln>
               <a:extLst>
                 <a:ext uri="{91240B29-F687-4f45-9708-019B960494DF}">
-                  <a14:hiddenLine xmlns="" xmlns:a14="http://schemas.microsoft.com/office/drawing/2010/main" w="9525">
+                  <a14:hiddenLine xmlns:a14="http://schemas.microsoft.com/office/drawing/2010/main" xmlns="" w="9525">
                     <a:solidFill>
                       <a:srgbClr val="000000"/>
                     </a:solidFill>
@@ -16370,7 +16370,7 @@
               </a:ln>
               <a:extLst>
                 <a:ext uri="{91240B29-F687-4f45-9708-019B960494DF}">
-                  <a14:hiddenLine xmlns="" xmlns:a14="http://schemas.microsoft.com/office/drawing/2010/main" w="9525">
+                  <a14:hiddenLine xmlns:a14="http://schemas.microsoft.com/office/drawing/2010/main" xmlns="" w="9525">
                     <a:solidFill>
                       <a:srgbClr val="000000"/>
                     </a:solidFill>
@@ -16460,7 +16460,7 @@
               </a:ln>
               <a:extLst>
                 <a:ext uri="{91240B29-F687-4f45-9708-019B960494DF}">
-                  <a14:hiddenLine xmlns="" xmlns:a14="http://schemas.microsoft.com/office/drawing/2010/main" w="9525">
+                  <a14:hiddenLine xmlns:a14="http://schemas.microsoft.com/office/drawing/2010/main" xmlns="" w="9525">
                     <a:solidFill>
                       <a:srgbClr val="000000"/>
                     </a:solidFill>
@@ -16528,7 +16528,7 @@
               </a:ln>
               <a:extLst>
                 <a:ext uri="{91240B29-F687-4f45-9708-019B960494DF}">
-                  <a14:hiddenLine xmlns="" xmlns:a14="http://schemas.microsoft.com/office/drawing/2010/main" w="9525">
+                  <a14:hiddenLine xmlns:a14="http://schemas.microsoft.com/office/drawing/2010/main" xmlns="" w="9525">
                     <a:solidFill>
                       <a:srgbClr val="000000"/>
                     </a:solidFill>
@@ -16618,7 +16618,7 @@
               </a:ln>
               <a:extLst>
                 <a:ext uri="{91240B29-F687-4f45-9708-019B960494DF}">
-                  <a14:hiddenLine xmlns="" xmlns:a14="http://schemas.microsoft.com/office/drawing/2010/main" w="9525">
+                  <a14:hiddenLine xmlns:a14="http://schemas.microsoft.com/office/drawing/2010/main" xmlns="" w="9525">
                     <a:solidFill>
                       <a:srgbClr val="000000"/>
                     </a:solidFill>
@@ -16686,7 +16686,7 @@
               </a:ln>
               <a:extLst>
                 <a:ext uri="{91240B29-F687-4f45-9708-019B960494DF}">
-                  <a14:hiddenLine xmlns="" xmlns:a14="http://schemas.microsoft.com/office/drawing/2010/main" w="9525">
+                  <a14:hiddenLine xmlns:a14="http://schemas.microsoft.com/office/drawing/2010/main" xmlns="" w="9525">
                     <a:solidFill>
                       <a:srgbClr val="000000"/>
                     </a:solidFill>
@@ -16776,7 +16776,7 @@
               </a:ln>
               <a:extLst>
                 <a:ext uri="{91240B29-F687-4f45-9708-019B960494DF}">
-                  <a14:hiddenLine xmlns="" xmlns:a14="http://schemas.microsoft.com/office/drawing/2010/main" w="9525">
+                  <a14:hiddenLine xmlns:a14="http://schemas.microsoft.com/office/drawing/2010/main" xmlns="" w="9525">
                     <a:solidFill>
                       <a:srgbClr val="000000"/>
                     </a:solidFill>
@@ -16810,7 +16810,7 @@
               </a:ln>
               <a:extLst>
                 <a:ext uri="{91240B29-F687-4f45-9708-019B960494DF}">
-                  <a14:hiddenLine xmlns="" xmlns:a14="http://schemas.microsoft.com/office/drawing/2010/main" w="9525">
+                  <a14:hiddenLine xmlns:a14="http://schemas.microsoft.com/office/drawing/2010/main" xmlns="" w="9525">
                     <a:solidFill>
                       <a:srgbClr val="000000"/>
                     </a:solidFill>
@@ -25576,7 +25576,7 @@
                 </a:highlight>
                 <a:latin typeface="Hack" panose="020B0609030202020204" pitchFamily="49" charset="0"/>
               </a:rPr>
-              <a:t>void</a:t>
+              <a:t>static</a:t>
             </a:r>
             <a:r>
               <a:rPr lang="en-CA" b="0" dirty="0">
@@ -25592,6 +25592,32 @@
               <a:t> </a:t>
             </a:r>
             <a:r>
+              <a:rPr lang="en-CA" b="0" dirty="0">
+                <a:solidFill>
+                  <a:srgbClr val="0000FF"/>
+                </a:solidFill>
+                <a:effectLst/>
+                <a:highlight>
+                  <a:srgbClr val="FFFFFF"/>
+                </a:highlight>
+                <a:latin typeface="Hack" panose="020B0609030202020204" pitchFamily="49" charset="0"/>
+              </a:rPr>
+              <a:t>void</a:t>
+            </a:r>
+            <a:r>
+              <a:rPr lang="en-CA" b="0" dirty="0">
+                <a:solidFill>
+                  <a:srgbClr val="000000"/>
+                </a:solidFill>
+                <a:effectLst/>
+                <a:highlight>
+                  <a:srgbClr val="FFFFFF"/>
+                </a:highlight>
+                <a:latin typeface="Hack" panose="020B0609030202020204" pitchFamily="49" charset="0"/>
+              </a:rPr>
+              <a:t> </a:t>
+            </a:r>
+            <a:r>
               <a:rPr lang="en-CA" b="0" dirty="0" err="1">
                 <a:solidFill>
                   <a:srgbClr val="000000"/>
@@ -25605,7 +25631,7 @@
               <a:t>initAll</a:t>
             </a:r>
             <a:r>
-              <a:rPr lang="en-CA" b="0" dirty="0">
+              <a:rPr lang="en-CA" b="0">
                 <a:solidFill>
                   <a:srgbClr val="000000"/>
                 </a:solidFill>
@@ -25615,20 +25641,7 @@
                 </a:highlight>
                 <a:latin typeface="Hack" panose="020B0609030202020204" pitchFamily="49" charset="0"/>
               </a:rPr>
-              <a:t>() </a:t>
-            </a:r>
-            <a:r>
-              <a:rPr lang="en-CA" b="0" dirty="0">
-                <a:solidFill>
-                  <a:srgbClr val="0000FF"/>
-                </a:solidFill>
-                <a:effectLst/>
-                <a:highlight>
-                  <a:srgbClr val="FFFFFF"/>
-                </a:highlight>
-                <a:latin typeface="Hack" panose="020B0609030202020204" pitchFamily="49" charset="0"/>
-              </a:rPr>
-              <a:t>const</a:t>
+              <a:t>()</a:t>
             </a:r>
             <a:endParaRPr lang="en-CA" dirty="0">
               <a:solidFill>
@@ -25773,7 +25786,7 @@
                 </a:highlight>
                 <a:latin typeface="Hack" panose="020B0609030202020204" pitchFamily="49" charset="0"/>
               </a:rPr>
-              <a:t>void</a:t>
+              <a:t>static void</a:t>
             </a:r>
             <a:r>
               <a:rPr lang="en-CA" b="0" dirty="0">
@@ -25812,20 +25825,7 @@
                 </a:highlight>
                 <a:latin typeface="Hack" panose="020B0609030202020204" pitchFamily="49" charset="0"/>
               </a:rPr>
-              <a:t>() </a:t>
-            </a:r>
-            <a:r>
-              <a:rPr lang="en-CA" b="0" dirty="0">
-                <a:solidFill>
-                  <a:srgbClr val="0000FF"/>
-                </a:solidFill>
-                <a:effectLst/>
-                <a:highlight>
-                  <a:srgbClr val="FFFFFF"/>
-                </a:highlight>
-                <a:latin typeface="Hack" panose="020B0609030202020204" pitchFamily="49" charset="0"/>
-              </a:rPr>
-              <a:t>const</a:t>
+              <a:t>()</a:t>
             </a:r>
             <a:endParaRPr lang="en-CA" dirty="0">
               <a:solidFill>

</xml_diff>

<commit_message>
TaskScheduler: remove most of the notes
</commit_message>
<xml_diff>
--- a/TaskScheduler/TaskScheduler.pptx
+++ b/TaskScheduler/TaskScheduler.pptx
@@ -1411,13 +1411,8 @@
             </a:pPr>
             <a:r>
               <a:rPr lang="en-US" sz="1200" dirty="0"/>
-              <a:t>Time: approx. </a:t>
-            </a:r>
-            <a:r>
-              <a:rPr lang="en-US" sz="1200"/>
-              <a:t>20-25 mins</a:t>
-            </a:r>
-            <a:endParaRPr lang="en-US" sz="1200" dirty="0"/>
+              <a:t>Time: approx. 20-25 mins</a:t>
+            </a:r>
           </a:p>
         </p:txBody>
       </p:sp>
@@ -1602,10 +1597,7 @@
               <a:tabLst/>
               <a:defRPr/>
             </a:pPr>
-            <a:r>
-              <a:rPr lang="en-CA" dirty="0"/>
-              <a:t>Clock/timer for elapsed time: Any microcontroller has this</a:t>
-            </a:r>
+            <a:endParaRPr lang="en-CA" dirty="0"/>
           </a:p>
         </p:txBody>
       </p:sp>
@@ -1857,38 +1849,8 @@
           <a:bodyPr/>
           <a:lstStyle/>
           <a:p>
-            <a:pPr marL="171450" lvl="0" indent="-171450">
-              <a:buFont typeface="Arial" panose="020B0604020202020204" pitchFamily="34" charset="0"/>
-              <a:buChar char="•"/>
-            </a:pPr>
-            <a:r>
-              <a:rPr lang="en-CA" dirty="0"/>
-              <a:t>This is the main() code running on the demo board.</a:t>
-            </a:r>
-          </a:p>
-          <a:p>
-            <a:pPr marL="628650" lvl="1" indent="-171450">
-              <a:buFont typeface="Arial" panose="020B0604020202020204" pitchFamily="34" charset="0"/>
-              <a:buChar char="•"/>
-            </a:pPr>
-            <a:r>
-              <a:rPr lang="en-CA" dirty="0" err="1"/>
-              <a:t>TaskList</a:t>
-            </a:r>
-            <a:r>
-              <a:rPr lang="en-CA" dirty="0"/>
-              <a:t> is defined at compile time</a:t>
-            </a:r>
-          </a:p>
-          <a:p>
-            <a:pPr marL="628650" lvl="1" indent="-171450">
-              <a:buFont typeface="Arial" panose="020B0604020202020204" pitchFamily="34" charset="0"/>
-              <a:buChar char="•"/>
-            </a:pPr>
-            <a:r>
-              <a:rPr lang="en-CA" dirty="0"/>
-              <a:t>Hence the funny brackets &lt;&gt;</a:t>
-            </a:r>
+            <a:pPr lvl="0"/>
+            <a:endParaRPr lang="en-CA" dirty="0"/>
           </a:p>
         </p:txBody>
       </p:sp>
@@ -1972,270 +1934,7 @@
           <a:bodyPr/>
           <a:lstStyle/>
           <a:p>
-            <a:pPr marL="171450" indent="-171450">
-              <a:buFont typeface="Arial" panose="020B0604020202020204" pitchFamily="34" charset="0"/>
-              <a:buChar char="•"/>
-            </a:pPr>
-            <a:r>
-              <a:rPr lang="en-CA" dirty="0"/>
-              <a:t>This is one of the tasks running on the demo board</a:t>
-            </a:r>
-          </a:p>
-          <a:p>
-            <a:pPr marL="171450" marR="0" lvl="0" indent="-171450" algn="l" defTabSz="914400" rtl="0" eaLnBrk="1" fontAlgn="auto" latinLnBrk="0" hangingPunct="1">
-              <a:lnSpc>
-                <a:spcPct val="100000"/>
-              </a:lnSpc>
-              <a:spcBef>
-                <a:spcPts val="0"/>
-              </a:spcBef>
-              <a:spcAft>
-                <a:spcPts val="0"/>
-              </a:spcAft>
-              <a:buClrTx/>
-              <a:buSzTx/>
-              <a:buFont typeface="Arial" panose="020B0604020202020204" pitchFamily="34" charset="0"/>
-              <a:buChar char="•"/>
-              <a:tabLst/>
-              <a:defRPr/>
-            </a:pPr>
-            <a:r>
-              <a:rPr lang="en-CA" dirty="0"/>
-              <a:t>Implements 3 virtual functions:</a:t>
-            </a:r>
-          </a:p>
-          <a:p>
-            <a:pPr marL="628650" lvl="1" indent="-171450">
-              <a:buFont typeface="Arial" panose="020B0604020202020204" pitchFamily="34" charset="0"/>
-              <a:buChar char="•"/>
-            </a:pPr>
-            <a:r>
-              <a:rPr lang="en-CA" dirty="0" err="1"/>
-              <a:t>intervalMicros</a:t>
-            </a:r>
-            <a:r>
-              <a:rPr lang="en-CA" dirty="0"/>
-              <a:t>() specifies how often the task should run</a:t>
-            </a:r>
-          </a:p>
-          <a:p>
-            <a:pPr marL="628650" lvl="1" indent="-171450">
-              <a:buFont typeface="Arial" panose="020B0604020202020204" pitchFamily="34" charset="0"/>
-              <a:buChar char="•"/>
-            </a:pPr>
-            <a:r>
-              <a:rPr lang="en-CA" dirty="0" err="1"/>
-              <a:t>init</a:t>
-            </a:r>
-            <a:r>
-              <a:rPr lang="en-CA" dirty="0"/>
-              <a:t>() is called once at startup</a:t>
-            </a:r>
-          </a:p>
-          <a:p>
-            <a:pPr marL="628650" lvl="1" indent="-171450">
-              <a:buFont typeface="Arial" panose="020B0604020202020204" pitchFamily="34" charset="0"/>
-              <a:buChar char="•"/>
-            </a:pPr>
-            <a:r>
-              <a:rPr lang="en-CA" dirty="0"/>
-              <a:t>execute() is called as required – must be a short snippet of work</a:t>
-            </a:r>
-          </a:p>
-          <a:p>
-            <a:pPr marL="171450" marR="0" lvl="0" indent="-171450" algn="l" defTabSz="914400" rtl="0" eaLnBrk="1" fontAlgn="auto" latinLnBrk="0" hangingPunct="1">
-              <a:lnSpc>
-                <a:spcPct val="100000"/>
-              </a:lnSpc>
-              <a:spcBef>
-                <a:spcPts val="0"/>
-              </a:spcBef>
-              <a:spcAft>
-                <a:spcPts val="0"/>
-              </a:spcAft>
-              <a:buClrTx/>
-              <a:buSzTx/>
-              <a:buFont typeface="Arial" panose="020B0604020202020204" pitchFamily="34" charset="0"/>
-              <a:buChar char="•"/>
-              <a:tabLst/>
-              <a:defRPr/>
-            </a:pPr>
-            <a:r>
-              <a:rPr lang="en-CA" dirty="0"/>
-              <a:t>Not necessary to declare an instance of </a:t>
-            </a:r>
-            <a:r>
-              <a:rPr lang="en-CA" sz="1050" dirty="0">
-                <a:solidFill>
-                  <a:schemeClr val="bg2"/>
-                </a:solidFill>
-                <a:highlight>
-                  <a:srgbClr val="FFFFFF"/>
-                </a:highlight>
-                <a:latin typeface="Hack" panose="020B0609030202020204" pitchFamily="49" charset="0"/>
-                <a:ea typeface="Hack" panose="020B0609030202020204" pitchFamily="49" charset="0"/>
-                <a:cs typeface="Hack" panose="020B0609030202020204" pitchFamily="49" charset="0"/>
-              </a:rPr>
-              <a:t>the Task</a:t>
-            </a:r>
-          </a:p>
-          <a:p>
-            <a:pPr marL="628650" marR="0" lvl="1" indent="-171450" algn="l" defTabSz="914400" rtl="0" eaLnBrk="1" fontAlgn="auto" latinLnBrk="0" hangingPunct="1">
-              <a:lnSpc>
-                <a:spcPct val="100000"/>
-              </a:lnSpc>
-              <a:spcBef>
-                <a:spcPts val="0"/>
-              </a:spcBef>
-              <a:spcAft>
-                <a:spcPts val="0"/>
-              </a:spcAft>
-              <a:buClrTx/>
-              <a:buSzTx/>
-              <a:buFont typeface="Arial" panose="020B0604020202020204" pitchFamily="34" charset="0"/>
-              <a:buChar char="•"/>
-              <a:tabLst/>
-              <a:defRPr/>
-            </a:pPr>
-            <a:r>
-              <a:rPr lang="en-CA" sz="1050" dirty="0">
-                <a:solidFill>
-                  <a:schemeClr val="bg2"/>
-                </a:solidFill>
-                <a:highlight>
-                  <a:srgbClr val="FFFFFF"/>
-                </a:highlight>
-                <a:latin typeface="Hack" panose="020B0609030202020204" pitchFamily="49" charset="0"/>
-                <a:ea typeface="Hack" panose="020B0609030202020204" pitchFamily="49" charset="0"/>
-                <a:cs typeface="Hack" panose="020B0609030202020204" pitchFamily="49" charset="0"/>
-              </a:rPr>
-              <a:t>This was one of the drivers for me to create the crazy template code to be shown later</a:t>
-            </a:r>
-          </a:p>
-          <a:p>
-            <a:pPr marL="628650" marR="0" lvl="1" indent="-171450" algn="l" defTabSz="914400" rtl="0" eaLnBrk="1" fontAlgn="auto" latinLnBrk="0" hangingPunct="1">
-              <a:lnSpc>
-                <a:spcPct val="100000"/>
-              </a:lnSpc>
-              <a:spcBef>
-                <a:spcPts val="0"/>
-              </a:spcBef>
-              <a:spcAft>
-                <a:spcPts val="0"/>
-              </a:spcAft>
-              <a:buClrTx/>
-              <a:buSzTx/>
-              <a:buFont typeface="Arial" panose="020B0604020202020204" pitchFamily="34" charset="0"/>
-              <a:buChar char="•"/>
-              <a:tabLst/>
-              <a:defRPr/>
-            </a:pPr>
-            <a:r>
-              <a:rPr lang="en-CA" sz="1050" dirty="0">
-                <a:solidFill>
-                  <a:schemeClr val="bg2"/>
-                </a:solidFill>
-                <a:highlight>
-                  <a:srgbClr val="FFFFFF"/>
-                </a:highlight>
-                <a:latin typeface="Hack" panose="020B0609030202020204" pitchFamily="49" charset="0"/>
-                <a:ea typeface="Hack" panose="020B0609030202020204" pitchFamily="49" charset="0"/>
-                <a:cs typeface="Hack" panose="020B0609030202020204" pitchFamily="49" charset="0"/>
-              </a:rPr>
-              <a:t>I don’t like having to define/declare things in 2 places – annoying and error prone</a:t>
-            </a:r>
-          </a:p>
-          <a:p>
-            <a:pPr marL="171450" indent="-171450">
-              <a:buFont typeface="Arial" panose="020B0604020202020204" pitchFamily="34" charset="0"/>
-              <a:buChar char="•"/>
-            </a:pPr>
-            <a:r>
-              <a:rPr lang="en-CA" i="1" dirty="0"/>
-              <a:t>Note: Brief aside about virtual functions</a:t>
-            </a:r>
-          </a:p>
-          <a:p>
-            <a:pPr marL="628650" lvl="1" indent="-171450">
-              <a:buFont typeface="Arial" panose="020B0604020202020204" pitchFamily="34" charset="0"/>
-              <a:buChar char="•"/>
-            </a:pPr>
-            <a:r>
-              <a:rPr lang="en-CA" i="0" dirty="0"/>
-              <a:t>Small overhead calling a virtual function – </a:t>
-            </a:r>
-            <a:r>
-              <a:rPr lang="en-CA" i="0" dirty="0" err="1"/>
-              <a:t>vtbl</a:t>
-            </a:r>
-            <a:r>
-              <a:rPr lang="en-CA" i="0" dirty="0"/>
-              <a:t> in memory, 1 memory access per call in this implementation</a:t>
-            </a:r>
-          </a:p>
-          <a:p>
-            <a:pPr marL="628650" lvl="1" indent="-171450">
-              <a:buFont typeface="Arial" panose="020B0604020202020204" pitchFamily="34" charset="0"/>
-              <a:buChar char="•"/>
-            </a:pPr>
-            <a:r>
-              <a:rPr lang="en-CA" i="0" dirty="0"/>
-              <a:t>But since there is one static instance of </a:t>
-            </a:r>
-            <a:r>
-              <a:rPr lang="en-CA" i="0" dirty="0" err="1"/>
-              <a:t>LedBlinkTask</a:t>
-            </a:r>
-            <a:r>
-              <a:rPr lang="en-CA" i="0" dirty="0"/>
-              <a:t>, the compiler can figure out which virtual function to call</a:t>
-            </a:r>
-          </a:p>
-          <a:p>
-            <a:pPr marL="628650" lvl="1" indent="-171450">
-              <a:buFont typeface="Arial" panose="020B0604020202020204" pitchFamily="34" charset="0"/>
-              <a:buChar char="•"/>
-            </a:pPr>
-            <a:r>
-              <a:rPr lang="en-CA" i="1" dirty="0"/>
-              <a:t>Sometimes</a:t>
-            </a:r>
-            <a:r>
-              <a:rPr lang="en-CA" i="0" dirty="0"/>
-              <a:t> </a:t>
-            </a:r>
-            <a:r>
-              <a:rPr lang="en-CA" i="0" dirty="0" err="1"/>
-              <a:t>gcc</a:t>
-            </a:r>
-            <a:r>
-              <a:rPr lang="en-CA" i="0" dirty="0"/>
-              <a:t> optimizes to call the function directly or pull it inline</a:t>
-            </a:r>
-          </a:p>
-          <a:p>
-            <a:pPr marL="628650" lvl="1" indent="-171450">
-              <a:buFont typeface="Arial" panose="020B0604020202020204" pitchFamily="34" charset="0"/>
-              <a:buChar char="•"/>
-            </a:pPr>
-            <a:r>
-              <a:rPr lang="en-CA" i="0" dirty="0"/>
-              <a:t>There’s still some overhead so it can be helpful to use </a:t>
-            </a:r>
-            <a:r>
-              <a:rPr lang="en-CA" dirty="0"/>
-              <a:t>compile-time polymorphism instead</a:t>
-            </a:r>
-          </a:p>
-          <a:p>
-            <a:pPr marL="628650" lvl="1" indent="-171450">
-              <a:buFont typeface="Arial" panose="020B0604020202020204" pitchFamily="34" charset="0"/>
-              <a:buChar char="•"/>
-            </a:pPr>
-            <a:r>
-              <a:rPr lang="en-CA" i="1" dirty="0"/>
-              <a:t>Discuss that later</a:t>
-            </a:r>
+            <a:endParaRPr lang="en-CA" i="1" dirty="0"/>
           </a:p>
         </p:txBody>
       </p:sp>
@@ -2403,24 +2102,7 @@
           <a:bodyPr/>
           <a:lstStyle/>
           <a:p>
-            <a:pPr marL="171450" indent="-171450">
-              <a:buFont typeface="Arial" panose="020B0604020202020204" pitchFamily="34" charset="0"/>
-              <a:buChar char="•"/>
-            </a:pPr>
-            <a:r>
-              <a:rPr lang="en-CA" dirty="0"/>
-              <a:t>tick() is implemented with Pi Pico SDK functions &amp; types</a:t>
-            </a:r>
-          </a:p>
-          <a:p>
-            <a:pPr marL="171450" indent="-171450">
-              <a:buFont typeface="Arial" panose="020B0604020202020204" pitchFamily="34" charset="0"/>
-              <a:buChar char="•"/>
-            </a:pPr>
-            <a:r>
-              <a:rPr lang="en-CA" dirty="0"/>
-              <a:t>Can work on any other microcontroller, coded appropriately</a:t>
-            </a:r>
+            <a:endParaRPr lang="en-CA" dirty="0"/>
           </a:p>
         </p:txBody>
       </p:sp>
@@ -2504,52 +2186,7 @@
           <a:bodyPr/>
           <a:lstStyle/>
           <a:p>
-            <a:pPr marL="171450" indent="-171450">
-              <a:buFont typeface="Arial" panose="020B0604020202020204" pitchFamily="34" charset="0"/>
-              <a:buChar char="•"/>
-            </a:pPr>
-            <a:r>
-              <a:rPr lang="en-CA" dirty="0" err="1"/>
-              <a:t>TaskList</a:t>
-            </a:r>
-            <a:r>
-              <a:rPr lang="en-CA" dirty="0"/>
-              <a:t> is the template that was used in main.cpp</a:t>
-            </a:r>
-          </a:p>
-          <a:p>
-            <a:pPr marL="171450" indent="-171450">
-              <a:buFont typeface="Arial" panose="020B0604020202020204" pitchFamily="34" charset="0"/>
-              <a:buChar char="•"/>
-            </a:pPr>
-            <a:r>
-              <a:rPr lang="en-CA" dirty="0"/>
-              <a:t>Variadic template – parameter pack</a:t>
-            </a:r>
-          </a:p>
-          <a:p>
-            <a:pPr marL="171450" indent="-171450">
-              <a:buFont typeface="Arial" panose="020B0604020202020204" pitchFamily="34" charset="0"/>
-              <a:buChar char="•"/>
-            </a:pPr>
-            <a:r>
-              <a:rPr lang="en-CA" dirty="0"/>
-              <a:t>Fold expression (C++17) iterates over the template parameters</a:t>
-            </a:r>
-          </a:p>
-          <a:p>
-            <a:pPr marL="171450" indent="-171450">
-              <a:buFont typeface="Arial" panose="020B0604020202020204" pitchFamily="34" charset="0"/>
-              <a:buChar char="•"/>
-            </a:pPr>
-            <a:r>
-              <a:rPr lang="en-CA" dirty="0" err="1"/>
-              <a:t>taskInstance</a:t>
-            </a:r>
-            <a:r>
-              <a:rPr lang="en-CA" dirty="0"/>
-              <a:t>&lt;&gt; is a variable template declaring one instance of any Task class</a:t>
-            </a:r>
+            <a:endParaRPr lang="en-CA" dirty="0"/>
           </a:p>
         </p:txBody>
       </p:sp>
@@ -2717,96 +2354,6 @@
           <a:bodyPr/>
           <a:lstStyle/>
           <a:p>
-            <a:pPr marL="171450" marR="0" lvl="0" indent="-171450" algn="l" defTabSz="914400" rtl="0" eaLnBrk="1" fontAlgn="auto" latinLnBrk="0" hangingPunct="1">
-              <a:lnSpc>
-                <a:spcPct val="100000"/>
-              </a:lnSpc>
-              <a:spcBef>
-                <a:spcPts val="0"/>
-              </a:spcBef>
-              <a:spcAft>
-                <a:spcPts val="0"/>
-              </a:spcAft>
-              <a:buClrTx/>
-              <a:buSzTx/>
-              <a:buFont typeface="Arial" panose="020B0604020202020204" pitchFamily="34" charset="0"/>
-              <a:buChar char="•"/>
-              <a:tabLst/>
-              <a:defRPr/>
-            </a:pPr>
-            <a:r>
-              <a:rPr lang="en-CA" dirty="0"/>
-              <a:t>I worked at </a:t>
-            </a:r>
-            <a:r>
-              <a:rPr lang="en-CA" dirty="0" err="1"/>
-              <a:t>ImageWare</a:t>
-            </a:r>
-            <a:r>
-              <a:rPr lang="en-CA" dirty="0"/>
-              <a:t> Systems for a long time</a:t>
-            </a:r>
-          </a:p>
-          <a:p>
-            <a:pPr marL="171450" marR="0" lvl="0" indent="-171450" algn="l" defTabSz="914400" rtl="0" eaLnBrk="1" fontAlgn="auto" latinLnBrk="0" hangingPunct="1">
-              <a:lnSpc>
-                <a:spcPct val="100000"/>
-              </a:lnSpc>
-              <a:spcBef>
-                <a:spcPts val="0"/>
-              </a:spcBef>
-              <a:spcAft>
-                <a:spcPts val="0"/>
-              </a:spcAft>
-              <a:buClrTx/>
-              <a:buSzTx/>
-              <a:buFont typeface="Arial" panose="020B0604020202020204" pitchFamily="34" charset="0"/>
-              <a:buChar char="•"/>
-              <a:tabLst/>
-              <a:defRPr/>
-            </a:pPr>
-            <a:r>
-              <a:rPr lang="en-CA"/>
-              <a:t>This talk is </a:t>
-            </a:r>
-            <a:r>
-              <a:rPr lang="en-CA" dirty="0"/>
-              <a:t>based on my hobby projects – I don’t have </a:t>
-            </a:r>
-            <a:r>
-              <a:rPr lang="en-CA" i="1" dirty="0"/>
-              <a:t>professional</a:t>
-            </a:r>
-            <a:r>
-              <a:rPr lang="en-CA" i="0" dirty="0"/>
-              <a:t> experience in embedded systems programming</a:t>
-            </a:r>
-          </a:p>
-          <a:p>
-            <a:pPr marL="171450" marR="0" lvl="0" indent="-171450" algn="l" defTabSz="914400" rtl="0" eaLnBrk="1" fontAlgn="auto" latinLnBrk="0" hangingPunct="1">
-              <a:lnSpc>
-                <a:spcPct val="100000"/>
-              </a:lnSpc>
-              <a:spcBef>
-                <a:spcPts val="0"/>
-              </a:spcBef>
-              <a:spcAft>
-                <a:spcPts val="0"/>
-              </a:spcAft>
-              <a:buClrTx/>
-              <a:buSzTx/>
-              <a:buFont typeface="Arial" panose="020B0604020202020204" pitchFamily="34" charset="0"/>
-              <a:buChar char="•"/>
-              <a:tabLst/>
-              <a:defRPr/>
-            </a:pPr>
-            <a:r>
-              <a:rPr lang="en-CA" i="0" dirty="0"/>
-              <a:t>Web site: https://lenp.net/</a:t>
-            </a:r>
-            <a:endParaRPr lang="en-CA" dirty="0"/>
-          </a:p>
-          <a:p>
             <a:endParaRPr lang="en-CA" dirty="0"/>
           </a:p>
         </p:txBody>
@@ -3193,6 +2740,90 @@
 </p:notes>
 </file>
 
+<file path=ppt/notesSlides/notesSlide24.xml><?xml version="1.0" encoding="utf-8"?>
+<p:notes xmlns:a="http://schemas.openxmlformats.org/drawingml/2006/main" xmlns:r="http://schemas.openxmlformats.org/officeDocument/2006/relationships" xmlns:p="http://schemas.openxmlformats.org/presentationml/2006/main">
+  <p:cSld>
+    <p:spTree>
+      <p:nvGrpSpPr>
+        <p:cNvPr id="1" name=""/>
+        <p:cNvGrpSpPr/>
+        <p:nvPr/>
+      </p:nvGrpSpPr>
+      <p:grpSpPr>
+        <a:xfrm>
+          <a:off x="0" y="0"/>
+          <a:ext cx="0" cy="0"/>
+          <a:chOff x="0" y="0"/>
+          <a:chExt cx="0" cy="0"/>
+        </a:xfrm>
+      </p:grpSpPr>
+      <p:sp>
+        <p:nvSpPr>
+          <p:cNvPr id="2" name="Slide Image Placeholder 1"/>
+          <p:cNvSpPr>
+            <a:spLocks noGrp="1" noRot="1" noChangeAspect="1"/>
+          </p:cNvSpPr>
+          <p:nvPr>
+            <p:ph type="sldImg"/>
+          </p:nvPr>
+        </p:nvSpPr>
+        <p:spPr/>
+      </p:sp>
+      <p:sp>
+        <p:nvSpPr>
+          <p:cNvPr id="3" name="Notes Placeholder 2"/>
+          <p:cNvSpPr>
+            <a:spLocks noGrp="1"/>
+          </p:cNvSpPr>
+          <p:nvPr>
+            <p:ph type="body" idx="1"/>
+          </p:nvPr>
+        </p:nvSpPr>
+        <p:spPr/>
+        <p:txBody>
+          <a:bodyPr/>
+          <a:lstStyle/>
+          <a:p>
+            <a:endParaRPr lang="en-CA"/>
+          </a:p>
+        </p:txBody>
+      </p:sp>
+      <p:sp>
+        <p:nvSpPr>
+          <p:cNvPr id="4" name="Slide Number Placeholder 3"/>
+          <p:cNvSpPr>
+            <a:spLocks noGrp="1"/>
+          </p:cNvSpPr>
+          <p:nvPr>
+            <p:ph type="sldNum" sz="quarter" idx="5"/>
+          </p:nvPr>
+        </p:nvSpPr>
+        <p:spPr/>
+        <p:txBody>
+          <a:bodyPr/>
+          <a:lstStyle/>
+          <a:p>
+            <a:fld id="{A2E8EC5D-AF6A-40C0-9969-DE3CD2E745D4}" type="slidenum">
+              <a:rPr lang="en-CA" smtClean="0"/>
+              <a:t>24</a:t>
+            </a:fld>
+            <a:endParaRPr lang="en-CA"/>
+          </a:p>
+        </p:txBody>
+      </p:sp>
+    </p:spTree>
+    <p:extLst>
+      <p:ext uri="{BB962C8B-B14F-4D97-AF65-F5344CB8AC3E}">
+        <p14:creationId xmlns:p14="http://schemas.microsoft.com/office/powerpoint/2010/main" val="1490183838"/>
+      </p:ext>
+    </p:extLst>
+  </p:cSld>
+  <p:clrMapOvr>
+    <a:masterClrMapping/>
+  </p:clrMapOvr>
+</p:notes>
+</file>
+
 <file path=ppt/notesSlides/notesSlide3.xml><?xml version="1.0" encoding="utf-8"?>
 <p:notes xmlns:a="http://schemas.openxmlformats.org/drawingml/2006/main" xmlns:r="http://schemas.openxmlformats.org/officeDocument/2006/relationships" xmlns:p="http://schemas.openxmlformats.org/presentationml/2006/main">
   <p:cSld>
@@ -3237,10 +2868,7 @@
           <a:bodyPr/>
           <a:lstStyle/>
           <a:p>
-            <a:r>
-              <a:rPr lang="en-CA" dirty="0"/>
-              <a:t>Feel free to ask questions</a:t>
-            </a:r>
+            <a:endParaRPr lang="en-CA" dirty="0"/>
           </a:p>
         </p:txBody>
       </p:sp>
@@ -3324,34 +2952,7 @@
           <a:bodyPr/>
           <a:lstStyle/>
           <a:p>
-            <a:pPr marL="171450" indent="-171450">
-              <a:buFont typeface="Arial" panose="020B0604020202020204" pitchFamily="34" charset="0"/>
-              <a:buChar char="•"/>
-            </a:pPr>
-            <a:r>
-              <a:rPr lang="en-CA" dirty="0"/>
-              <a:t>Warning / promise: Not sure which it is</a:t>
-            </a:r>
-          </a:p>
-          <a:p>
-            <a:pPr marL="171450" indent="-171450">
-              <a:buFont typeface="Arial" panose="020B0604020202020204" pitchFamily="34" charset="0"/>
-              <a:buChar char="•"/>
-            </a:pPr>
-            <a:r>
-              <a:rPr lang="en-CA" dirty="0"/>
-              <a:t>Will be showing some modern C++</a:t>
-            </a:r>
-          </a:p>
-          <a:p>
-            <a:pPr marL="171450" indent="-171450">
-              <a:buFont typeface="Arial" panose="020B0604020202020204" pitchFamily="34" charset="0"/>
-              <a:buChar char="•"/>
-            </a:pPr>
-            <a:r>
-              <a:rPr lang="en-CA" dirty="0"/>
-              <a:t>Looks strange to someone like me</a:t>
-            </a:r>
+            <a:endParaRPr lang="en-CA" dirty="0"/>
           </a:p>
         </p:txBody>
       </p:sp>
@@ -3519,7 +3120,7 @@
           <a:bodyPr/>
           <a:lstStyle/>
           <a:p>
-            <a:pPr marL="171450" marR="0" lvl="0" indent="-171450" algn="l" defTabSz="914400" rtl="0" eaLnBrk="1" fontAlgn="auto" latinLnBrk="0" hangingPunct="1">
+            <a:pPr marR="0" lvl="0" algn="l" defTabSz="914400" rtl="0" eaLnBrk="1" fontAlgn="auto" latinLnBrk="0" hangingPunct="1">
               <a:lnSpc>
                 <a:spcPct val="100000"/>
               </a:lnSpc>
@@ -3531,72 +3132,10 @@
               </a:spcAft>
               <a:buClrTx/>
               <a:buSzTx/>
-              <a:buFont typeface="Arial" panose="020B0604020202020204" pitchFamily="34" charset="0"/>
-              <a:buChar char="•"/>
               <a:tabLst/>
               <a:defRPr/>
             </a:pPr>
-            <a:r>
-              <a:rPr lang="en-CA" dirty="0"/>
-              <a:t>Embedded microcontroller in a device</a:t>
-            </a:r>
-          </a:p>
-          <a:p>
-            <a:pPr marL="171450" marR="0" lvl="0" indent="-171450" algn="l" defTabSz="914400" rtl="0" eaLnBrk="1" fontAlgn="auto" latinLnBrk="0" hangingPunct="1">
-              <a:lnSpc>
-                <a:spcPct val="100000"/>
-              </a:lnSpc>
-              <a:spcBef>
-                <a:spcPts val="0"/>
-              </a:spcBef>
-              <a:spcAft>
-                <a:spcPts val="0"/>
-              </a:spcAft>
-              <a:buClrTx/>
-              <a:buSzTx/>
-              <a:buFont typeface="Arial" panose="020B0604020202020204" pitchFamily="34" charset="0"/>
-              <a:buChar char="•"/>
-              <a:tabLst/>
-              <a:defRPr/>
-            </a:pPr>
-            <a:r>
-              <a:rPr lang="en-CA" dirty="0"/>
-              <a:t>...</a:t>
-            </a:r>
-          </a:p>
-          <a:p>
-            <a:pPr marL="171450" marR="0" lvl="0" indent="-171450" algn="l" defTabSz="914400" rtl="0" eaLnBrk="1" fontAlgn="auto" latinLnBrk="0" hangingPunct="1">
-              <a:lnSpc>
-                <a:spcPct val="100000"/>
-              </a:lnSpc>
-              <a:spcBef>
-                <a:spcPts val="0"/>
-              </a:spcBef>
-              <a:spcAft>
-                <a:spcPts val="0"/>
-              </a:spcAft>
-              <a:buClrTx/>
-              <a:buSzTx/>
-              <a:buFont typeface="Arial" panose="020B0604020202020204" pitchFamily="34" charset="0"/>
-              <a:buChar char="•"/>
-              <a:tabLst/>
-              <a:defRPr/>
-            </a:pPr>
-            <a:r>
-              <a:rPr lang="en-CA" dirty="0"/>
-              <a:t>Want a simple task scheduler</a:t>
-            </a:r>
-          </a:p>
-          <a:p>
-            <a:pPr marL="628650" lvl="1" indent="-171450">
-              <a:buFont typeface="Arial" panose="020B0604020202020204" pitchFamily="34" charset="0"/>
-              <a:buChar char="•"/>
-              <a:defRPr/>
-            </a:pPr>
-            <a:r>
-              <a:rPr lang="en-CA" dirty="0"/>
-              <a:t>In lieu of a proper OS, this is the kernel of a kernel</a:t>
-            </a:r>
+            <a:endParaRPr lang="en-CA" dirty="0"/>
           </a:p>
         </p:txBody>
       </p:sp>
@@ -3680,10 +3219,7 @@
           <a:bodyPr/>
           <a:lstStyle/>
           <a:p>
-            <a:r>
-              <a:rPr lang="en-CA" dirty="0"/>
-              <a:t>Module from a modular synthesizer, which I made, that does digital audio synthesis</a:t>
-            </a:r>
+            <a:endParaRPr lang="en-CA" dirty="0"/>
           </a:p>
         </p:txBody>
       </p:sp>
@@ -3965,7 +3501,7 @@
           <a:noFill/>
           <a:extLst>
             <a:ext uri="{909E8E84-426E-40dd-AFC4-6F175D3DCCD1}">
-              <a14:hiddenFill xmlns:a14="http://schemas.microsoft.com/office/drawing/2010/main" xmlns="">
+              <a14:hiddenFill xmlns="" xmlns:a14="http://schemas.microsoft.com/office/drawing/2010/main">
                 <a:solidFill>
                   <a:srgbClr val="FFFFFF"/>
                 </a:solidFill>
@@ -4031,7 +3567,7 @@
             </a:ln>
             <a:extLst>
               <a:ext uri="{91240B29-F687-4f45-9708-019B960494DF}">
-                <a14:hiddenLine xmlns:a14="http://schemas.microsoft.com/office/drawing/2010/main" xmlns="" w="9525">
+                <a14:hiddenLine xmlns="" xmlns:a14="http://schemas.microsoft.com/office/drawing/2010/main" w="9525">
                   <a:solidFill>
                     <a:srgbClr val="000000"/>
                   </a:solidFill>
@@ -4121,7 +3657,7 @@
             </a:ln>
             <a:extLst>
               <a:ext uri="{91240B29-F687-4f45-9708-019B960494DF}">
-                <a14:hiddenLine xmlns:a14="http://schemas.microsoft.com/office/drawing/2010/main" xmlns="" w="9525">
+                <a14:hiddenLine xmlns="" xmlns:a14="http://schemas.microsoft.com/office/drawing/2010/main" w="9525">
                   <a:solidFill>
                     <a:srgbClr val="000000"/>
                   </a:solidFill>
@@ -4211,7 +3747,7 @@
             </a:ln>
             <a:extLst>
               <a:ext uri="{91240B29-F687-4f45-9708-019B960494DF}">
-                <a14:hiddenLine xmlns:a14="http://schemas.microsoft.com/office/drawing/2010/main" xmlns="" w="9525">
+                <a14:hiddenLine xmlns="" xmlns:a14="http://schemas.microsoft.com/office/drawing/2010/main" w="9525">
                   <a:solidFill>
                     <a:srgbClr val="000000"/>
                   </a:solidFill>
@@ -4245,7 +3781,7 @@
             </a:ln>
             <a:extLst>
               <a:ext uri="{91240B29-F687-4f45-9708-019B960494DF}">
-                <a14:hiddenLine xmlns:a14="http://schemas.microsoft.com/office/drawing/2010/main" xmlns="" w="9525">
+                <a14:hiddenLine xmlns="" xmlns:a14="http://schemas.microsoft.com/office/drawing/2010/main" w="9525">
                   <a:solidFill>
                     <a:srgbClr val="000000"/>
                   </a:solidFill>
@@ -4335,7 +3871,7 @@
             </a:ln>
             <a:extLst>
               <a:ext uri="{91240B29-F687-4f45-9708-019B960494DF}">
-                <a14:hiddenLine xmlns:a14="http://schemas.microsoft.com/office/drawing/2010/main" xmlns="" w="9525">
+                <a14:hiddenLine xmlns="" xmlns:a14="http://schemas.microsoft.com/office/drawing/2010/main" w="9525">
                   <a:solidFill>
                     <a:srgbClr val="000000"/>
                   </a:solidFill>
@@ -4397,7 +3933,7 @@
             </a:ln>
             <a:extLst>
               <a:ext uri="{91240B29-F687-4f45-9708-019B960494DF}">
-                <a14:hiddenLine xmlns:a14="http://schemas.microsoft.com/office/drawing/2010/main" xmlns="" w="9525">
+                <a14:hiddenLine xmlns="" xmlns:a14="http://schemas.microsoft.com/office/drawing/2010/main" w="9525">
                   <a:solidFill>
                     <a:srgbClr val="000000"/>
                   </a:solidFill>
@@ -4459,7 +3995,7 @@
             </a:ln>
             <a:extLst>
               <a:ext uri="{91240B29-F687-4f45-9708-019B960494DF}">
-                <a14:hiddenLine xmlns:a14="http://schemas.microsoft.com/office/drawing/2010/main" xmlns="" w="9525">
+                <a14:hiddenLine xmlns="" xmlns:a14="http://schemas.microsoft.com/office/drawing/2010/main" w="9525">
                   <a:solidFill>
                     <a:srgbClr val="000000"/>
                   </a:solidFill>
@@ -4549,7 +4085,7 @@
             </a:ln>
             <a:extLst>
               <a:ext uri="{91240B29-F687-4f45-9708-019B960494DF}">
-                <a14:hiddenLine xmlns:a14="http://schemas.microsoft.com/office/drawing/2010/main" xmlns="" w="9525">
+                <a14:hiddenLine xmlns="" xmlns:a14="http://schemas.microsoft.com/office/drawing/2010/main" w="9525">
                   <a:solidFill>
                     <a:srgbClr val="000000"/>
                   </a:solidFill>
@@ -4611,7 +4147,7 @@
             </a:ln>
             <a:extLst>
               <a:ext uri="{91240B29-F687-4f45-9708-019B960494DF}">
-                <a14:hiddenLine xmlns:a14="http://schemas.microsoft.com/office/drawing/2010/main" xmlns="" w="9525">
+                <a14:hiddenLine xmlns="" xmlns:a14="http://schemas.microsoft.com/office/drawing/2010/main" w="9525">
                   <a:solidFill>
                     <a:srgbClr val="000000"/>
                   </a:solidFill>
@@ -4673,7 +4209,7 @@
             </a:ln>
             <a:extLst>
               <a:ext uri="{91240B29-F687-4f45-9708-019B960494DF}">
-                <a14:hiddenLine xmlns:a14="http://schemas.microsoft.com/office/drawing/2010/main" xmlns="" w="9525">
+                <a14:hiddenLine xmlns="" xmlns:a14="http://schemas.microsoft.com/office/drawing/2010/main" w="9525">
                   <a:solidFill>
                     <a:srgbClr val="000000"/>
                   </a:solidFill>
@@ -4763,7 +4299,7 @@
             </a:ln>
             <a:extLst>
               <a:ext uri="{91240B29-F687-4f45-9708-019B960494DF}">
-                <a14:hiddenLine xmlns:a14="http://schemas.microsoft.com/office/drawing/2010/main" xmlns="" w="9525">
+                <a14:hiddenLine xmlns="" xmlns:a14="http://schemas.microsoft.com/office/drawing/2010/main" w="9525">
                   <a:solidFill>
                     <a:srgbClr val="000000"/>
                   </a:solidFill>
@@ -4853,7 +4389,7 @@
             </a:ln>
             <a:extLst>
               <a:ext uri="{91240B29-F687-4f45-9708-019B960494DF}">
-                <a14:hiddenLine xmlns:a14="http://schemas.microsoft.com/office/drawing/2010/main" xmlns="" w="9525">
+                <a14:hiddenLine xmlns="" xmlns:a14="http://schemas.microsoft.com/office/drawing/2010/main" w="9525">
                   <a:solidFill>
                     <a:srgbClr val="000000"/>
                   </a:solidFill>
@@ -4915,7 +4451,7 @@
             </a:ln>
             <a:extLst>
               <a:ext uri="{91240B29-F687-4f45-9708-019B960494DF}">
-                <a14:hiddenLine xmlns:a14="http://schemas.microsoft.com/office/drawing/2010/main" xmlns="" w="9525">
+                <a14:hiddenLine xmlns="" xmlns:a14="http://schemas.microsoft.com/office/drawing/2010/main" w="9525">
                   <a:solidFill>
                     <a:srgbClr val="000000"/>
                   </a:solidFill>
@@ -5025,7 +4561,7 @@
             </a:ln>
             <a:extLst>
               <a:ext uri="{91240B29-F687-4f45-9708-019B960494DF}">
-                <a14:hiddenLine xmlns:a14="http://schemas.microsoft.com/office/drawing/2010/main" xmlns="" w="9525">
+                <a14:hiddenLine xmlns="" xmlns:a14="http://schemas.microsoft.com/office/drawing/2010/main" w="9525">
                   <a:solidFill>
                     <a:srgbClr val="000000"/>
                   </a:solidFill>
@@ -5087,7 +4623,7 @@
             </a:ln>
             <a:extLst>
               <a:ext uri="{91240B29-F687-4f45-9708-019B960494DF}">
-                <a14:hiddenLine xmlns:a14="http://schemas.microsoft.com/office/drawing/2010/main" xmlns="" w="9525">
+                <a14:hiddenLine xmlns="" xmlns:a14="http://schemas.microsoft.com/office/drawing/2010/main" w="9525">
                   <a:solidFill>
                     <a:srgbClr val="000000"/>
                   </a:solidFill>
@@ -5177,7 +4713,7 @@
             </a:ln>
             <a:extLst>
               <a:ext uri="{91240B29-F687-4f45-9708-019B960494DF}">
-                <a14:hiddenLine xmlns:a14="http://schemas.microsoft.com/office/drawing/2010/main" xmlns="" w="9525">
+                <a14:hiddenLine xmlns="" xmlns:a14="http://schemas.microsoft.com/office/drawing/2010/main" w="9525">
                   <a:solidFill>
                     <a:srgbClr val="000000"/>
                   </a:solidFill>
@@ -5267,7 +4803,7 @@
             </a:ln>
             <a:extLst>
               <a:ext uri="{91240B29-F687-4f45-9708-019B960494DF}">
-                <a14:hiddenLine xmlns:a14="http://schemas.microsoft.com/office/drawing/2010/main" xmlns="" w="9525">
+                <a14:hiddenLine xmlns="" xmlns:a14="http://schemas.microsoft.com/office/drawing/2010/main" w="9525">
                   <a:solidFill>
                     <a:srgbClr val="000000"/>
                   </a:solidFill>
@@ -5329,7 +4865,7 @@
             </a:ln>
             <a:extLst>
               <a:ext uri="{91240B29-F687-4f45-9708-019B960494DF}">
-                <a14:hiddenLine xmlns:a14="http://schemas.microsoft.com/office/drawing/2010/main" xmlns="" w="9525">
+                <a14:hiddenLine xmlns="" xmlns:a14="http://schemas.microsoft.com/office/drawing/2010/main" w="9525">
                   <a:solidFill>
                     <a:srgbClr val="000000"/>
                   </a:solidFill>
@@ -5419,7 +4955,7 @@
             </a:ln>
             <a:extLst>
               <a:ext uri="{91240B29-F687-4f45-9708-019B960494DF}">
-                <a14:hiddenLine xmlns:a14="http://schemas.microsoft.com/office/drawing/2010/main" xmlns="" w="9525">
+                <a14:hiddenLine xmlns="" xmlns:a14="http://schemas.microsoft.com/office/drawing/2010/main" w="9525">
                   <a:solidFill>
                     <a:srgbClr val="000000"/>
                   </a:solidFill>
@@ -5509,7 +5045,7 @@
             </a:ln>
             <a:extLst>
               <a:ext uri="{91240B29-F687-4f45-9708-019B960494DF}">
-                <a14:hiddenLine xmlns:a14="http://schemas.microsoft.com/office/drawing/2010/main" xmlns="" w="9525">
+                <a14:hiddenLine xmlns="" xmlns:a14="http://schemas.microsoft.com/office/drawing/2010/main" w="9525">
                   <a:solidFill>
                     <a:srgbClr val="000000"/>
                   </a:solidFill>
@@ -5565,7 +5101,7 @@
             </a:ln>
             <a:extLst>
               <a:ext uri="{91240B29-F687-4f45-9708-019B960494DF}">
-                <a14:hiddenLine xmlns:a14="http://schemas.microsoft.com/office/drawing/2010/main" xmlns="" w="9525">
+                <a14:hiddenLine xmlns="" xmlns:a14="http://schemas.microsoft.com/office/drawing/2010/main" w="9525">
                   <a:solidFill>
                     <a:srgbClr val="000000"/>
                   </a:solidFill>
@@ -5655,7 +5191,7 @@
             </a:ln>
             <a:extLst>
               <a:ext uri="{91240B29-F687-4f45-9708-019B960494DF}">
-                <a14:hiddenLine xmlns:a14="http://schemas.microsoft.com/office/drawing/2010/main" xmlns="" w="9525">
+                <a14:hiddenLine xmlns="" xmlns:a14="http://schemas.microsoft.com/office/drawing/2010/main" w="9525">
                   <a:solidFill>
                     <a:srgbClr val="000000"/>
                   </a:solidFill>
@@ -5711,7 +5247,7 @@
             </a:ln>
             <a:extLst>
               <a:ext uri="{91240B29-F687-4f45-9708-019B960494DF}">
-                <a14:hiddenLine xmlns:a14="http://schemas.microsoft.com/office/drawing/2010/main" xmlns="" w="9525">
+                <a14:hiddenLine xmlns="" xmlns:a14="http://schemas.microsoft.com/office/drawing/2010/main" w="9525">
                   <a:solidFill>
                     <a:srgbClr val="000000"/>
                   </a:solidFill>
@@ -5801,7 +5337,7 @@
             </a:ln>
             <a:extLst>
               <a:ext uri="{91240B29-F687-4f45-9708-019B960494DF}">
-                <a14:hiddenLine xmlns:a14="http://schemas.microsoft.com/office/drawing/2010/main" xmlns="" w="9525">
+                <a14:hiddenLine xmlns="" xmlns:a14="http://schemas.microsoft.com/office/drawing/2010/main" w="9525">
                   <a:solidFill>
                     <a:srgbClr val="000000"/>
                   </a:solidFill>
@@ -5869,7 +5405,7 @@
             </a:ln>
             <a:extLst>
               <a:ext uri="{91240B29-F687-4f45-9708-019B960494DF}">
-                <a14:hiddenLine xmlns:a14="http://schemas.microsoft.com/office/drawing/2010/main" xmlns="" w="9525">
+                <a14:hiddenLine xmlns="" xmlns:a14="http://schemas.microsoft.com/office/drawing/2010/main" w="9525">
                   <a:solidFill>
                     <a:srgbClr val="000000"/>
                   </a:solidFill>
@@ -5959,7 +5495,7 @@
             </a:ln>
             <a:extLst>
               <a:ext uri="{91240B29-F687-4f45-9708-019B960494DF}">
-                <a14:hiddenLine xmlns:a14="http://schemas.microsoft.com/office/drawing/2010/main" xmlns="" w="9525">
+                <a14:hiddenLine xmlns="" xmlns:a14="http://schemas.microsoft.com/office/drawing/2010/main" w="9525">
                   <a:solidFill>
                     <a:srgbClr val="000000"/>
                   </a:solidFill>
@@ -6027,7 +5563,7 @@
             </a:ln>
             <a:extLst>
               <a:ext uri="{91240B29-F687-4f45-9708-019B960494DF}">
-                <a14:hiddenLine xmlns:a14="http://schemas.microsoft.com/office/drawing/2010/main" xmlns="" w="9525">
+                <a14:hiddenLine xmlns="" xmlns:a14="http://schemas.microsoft.com/office/drawing/2010/main" w="9525">
                   <a:solidFill>
                     <a:srgbClr val="000000"/>
                   </a:solidFill>
@@ -6117,7 +5653,7 @@
             </a:ln>
             <a:extLst>
               <a:ext uri="{91240B29-F687-4f45-9708-019B960494DF}">
-                <a14:hiddenLine xmlns:a14="http://schemas.microsoft.com/office/drawing/2010/main" xmlns="" w="9525">
+                <a14:hiddenLine xmlns="" xmlns:a14="http://schemas.microsoft.com/office/drawing/2010/main" w="9525">
                   <a:solidFill>
                     <a:srgbClr val="000000"/>
                   </a:solidFill>
@@ -6151,7 +5687,7 @@
             </a:ln>
             <a:extLst>
               <a:ext uri="{91240B29-F687-4f45-9708-019B960494DF}">
-                <a14:hiddenLine xmlns:a14="http://schemas.microsoft.com/office/drawing/2010/main" xmlns="" w="9525">
+                <a14:hiddenLine xmlns="" xmlns:a14="http://schemas.microsoft.com/office/drawing/2010/main" w="9525">
                   <a:solidFill>
                     <a:srgbClr val="000000"/>
                   </a:solidFill>
@@ -6241,7 +5777,7 @@
             </a:ln>
             <a:extLst>
               <a:ext uri="{91240B29-F687-4f45-9708-019B960494DF}">
-                <a14:hiddenLine xmlns:a14="http://schemas.microsoft.com/office/drawing/2010/main" xmlns="" w="9525">
+                <a14:hiddenLine xmlns="" xmlns:a14="http://schemas.microsoft.com/office/drawing/2010/main" w="9525">
                   <a:solidFill>
                     <a:srgbClr val="000000"/>
                   </a:solidFill>
@@ -6303,7 +5839,7 @@
             </a:ln>
             <a:extLst>
               <a:ext uri="{91240B29-F687-4f45-9708-019B960494DF}">
-                <a14:hiddenLine xmlns:a14="http://schemas.microsoft.com/office/drawing/2010/main" xmlns="" w="9525">
+                <a14:hiddenLine xmlns="" xmlns:a14="http://schemas.microsoft.com/office/drawing/2010/main" w="9525">
                   <a:solidFill>
                     <a:srgbClr val="000000"/>
                   </a:solidFill>
@@ -6365,7 +5901,7 @@
             </a:ln>
             <a:extLst>
               <a:ext uri="{91240B29-F687-4f45-9708-019B960494DF}">
-                <a14:hiddenLine xmlns:a14="http://schemas.microsoft.com/office/drawing/2010/main" xmlns="" w="9525">
+                <a14:hiddenLine xmlns="" xmlns:a14="http://schemas.microsoft.com/office/drawing/2010/main" w="9525">
                   <a:solidFill>
                     <a:srgbClr val="000000"/>
                   </a:solidFill>
@@ -6455,7 +5991,7 @@
             </a:ln>
             <a:extLst>
               <a:ext uri="{91240B29-F687-4f45-9708-019B960494DF}">
-                <a14:hiddenLine xmlns:a14="http://schemas.microsoft.com/office/drawing/2010/main" xmlns="" w="9525">
+                <a14:hiddenLine xmlns="" xmlns:a14="http://schemas.microsoft.com/office/drawing/2010/main" w="9525">
                   <a:solidFill>
                     <a:srgbClr val="000000"/>
                   </a:solidFill>
@@ -6523,7 +6059,7 @@
             </a:ln>
             <a:extLst>
               <a:ext uri="{91240B29-F687-4f45-9708-019B960494DF}">
-                <a14:hiddenLine xmlns:a14="http://schemas.microsoft.com/office/drawing/2010/main" xmlns="" w="9525">
+                <a14:hiddenLine xmlns="" xmlns:a14="http://schemas.microsoft.com/office/drawing/2010/main" w="9525">
                   <a:solidFill>
                     <a:srgbClr val="000000"/>
                   </a:solidFill>
@@ -6585,7 +6121,7 @@
             </a:ln>
             <a:extLst>
               <a:ext uri="{91240B29-F687-4f45-9708-019B960494DF}">
-                <a14:hiddenLine xmlns:a14="http://schemas.microsoft.com/office/drawing/2010/main" xmlns="" w="9525">
+                <a14:hiddenLine xmlns="" xmlns:a14="http://schemas.microsoft.com/office/drawing/2010/main" w="9525">
                   <a:solidFill>
                     <a:srgbClr val="000000"/>
                   </a:solidFill>
@@ -6675,7 +6211,7 @@
             </a:ln>
             <a:extLst>
               <a:ext uri="{91240B29-F687-4f45-9708-019B960494DF}">
-                <a14:hiddenLine xmlns:a14="http://schemas.microsoft.com/office/drawing/2010/main" xmlns="" w="9525">
+                <a14:hiddenLine xmlns="" xmlns:a14="http://schemas.microsoft.com/office/drawing/2010/main" w="9525">
                   <a:solidFill>
                     <a:srgbClr val="000000"/>
                   </a:solidFill>
@@ -6737,7 +6273,7 @@
             </a:ln>
             <a:extLst>
               <a:ext uri="{91240B29-F687-4f45-9708-019B960494DF}">
-                <a14:hiddenLine xmlns:a14="http://schemas.microsoft.com/office/drawing/2010/main" xmlns="" w="9525">
+                <a14:hiddenLine xmlns="" xmlns:a14="http://schemas.microsoft.com/office/drawing/2010/main" w="9525">
                   <a:solidFill>
                     <a:srgbClr val="000000"/>
                   </a:solidFill>
@@ -6827,7 +6363,7 @@
             </a:ln>
             <a:extLst>
               <a:ext uri="{91240B29-F687-4f45-9708-019B960494DF}">
-                <a14:hiddenLine xmlns:a14="http://schemas.microsoft.com/office/drawing/2010/main" xmlns="" w="9525">
+                <a14:hiddenLine xmlns="" xmlns:a14="http://schemas.microsoft.com/office/drawing/2010/main" w="9525">
                   <a:solidFill>
                     <a:srgbClr val="000000"/>
                   </a:solidFill>
@@ -6889,7 +6425,7 @@
             </a:ln>
             <a:extLst>
               <a:ext uri="{91240B29-F687-4f45-9708-019B960494DF}">
-                <a14:hiddenLine xmlns:a14="http://schemas.microsoft.com/office/drawing/2010/main" xmlns="" w="9525">
+                <a14:hiddenLine xmlns="" xmlns:a14="http://schemas.microsoft.com/office/drawing/2010/main" w="9525">
                   <a:solidFill>
                     <a:srgbClr val="000000"/>
                   </a:solidFill>
@@ -6979,7 +6515,7 @@
             </a:ln>
             <a:extLst>
               <a:ext uri="{91240B29-F687-4f45-9708-019B960494DF}">
-                <a14:hiddenLine xmlns:a14="http://schemas.microsoft.com/office/drawing/2010/main" xmlns="" w="9525">
+                <a14:hiddenLine xmlns="" xmlns:a14="http://schemas.microsoft.com/office/drawing/2010/main" w="9525">
                   <a:solidFill>
                     <a:srgbClr val="000000"/>
                   </a:solidFill>
@@ -7013,7 +6549,7 @@
             </a:ln>
             <a:extLst>
               <a:ext uri="{91240B29-F687-4f45-9708-019B960494DF}">
-                <a14:hiddenLine xmlns:a14="http://schemas.microsoft.com/office/drawing/2010/main" xmlns="" w="9525">
+                <a14:hiddenLine xmlns="" xmlns:a14="http://schemas.microsoft.com/office/drawing/2010/main" w="9525">
                   <a:solidFill>
                     <a:srgbClr val="000000"/>
                   </a:solidFill>
@@ -7078,7 +6614,7 @@
             </a:ln>
             <a:extLst>
               <a:ext uri="{91240B29-F687-4f45-9708-019B960494DF}">
-                <a14:hiddenLine xmlns:a14="http://schemas.microsoft.com/office/drawing/2010/main" xmlns="" w="9525">
+                <a14:hiddenLine xmlns="" xmlns:a14="http://schemas.microsoft.com/office/drawing/2010/main" w="9525">
                   <a:solidFill>
                     <a:srgbClr val="000000"/>
                   </a:solidFill>
@@ -7168,7 +6704,7 @@
             </a:ln>
             <a:extLst>
               <a:ext uri="{91240B29-F687-4f45-9708-019B960494DF}">
-                <a14:hiddenLine xmlns:a14="http://schemas.microsoft.com/office/drawing/2010/main" xmlns="" w="9525">
+                <a14:hiddenLine xmlns="" xmlns:a14="http://schemas.microsoft.com/office/drawing/2010/main" w="9525">
                   <a:solidFill>
                     <a:srgbClr val="000000"/>
                   </a:solidFill>
@@ -7230,7 +6766,7 @@
             </a:ln>
             <a:extLst>
               <a:ext uri="{91240B29-F687-4f45-9708-019B960494DF}">
-                <a14:hiddenLine xmlns:a14="http://schemas.microsoft.com/office/drawing/2010/main" xmlns="" w="9525">
+                <a14:hiddenLine xmlns="" xmlns:a14="http://schemas.microsoft.com/office/drawing/2010/main" w="9525">
                   <a:solidFill>
                     <a:srgbClr val="000000"/>
                   </a:solidFill>
@@ -7320,7 +6856,7 @@
             </a:ln>
             <a:extLst>
               <a:ext uri="{91240B29-F687-4f45-9708-019B960494DF}">
-                <a14:hiddenLine xmlns:a14="http://schemas.microsoft.com/office/drawing/2010/main" xmlns="" w="9525">
+                <a14:hiddenLine xmlns="" xmlns:a14="http://schemas.microsoft.com/office/drawing/2010/main" w="9525">
                   <a:solidFill>
                     <a:srgbClr val="000000"/>
                   </a:solidFill>
@@ -7410,7 +6946,7 @@
             </a:ln>
             <a:extLst>
               <a:ext uri="{91240B29-F687-4f45-9708-019B960494DF}">
-                <a14:hiddenLine xmlns:a14="http://schemas.microsoft.com/office/drawing/2010/main" xmlns="" w="9525">
+                <a14:hiddenLine xmlns="" xmlns:a14="http://schemas.microsoft.com/office/drawing/2010/main" w="9525">
                   <a:solidFill>
                     <a:srgbClr val="000000"/>
                   </a:solidFill>
@@ -7475,7 +7011,7 @@
             </a:ln>
             <a:extLst>
               <a:ext uri="{91240B29-F687-4f45-9708-019B960494DF}">
-                <a14:hiddenLine xmlns:a14="http://schemas.microsoft.com/office/drawing/2010/main" xmlns="" w="9525">
+                <a14:hiddenLine xmlns="" xmlns:a14="http://schemas.microsoft.com/office/drawing/2010/main" w="9525">
                   <a:solidFill>
                     <a:srgbClr val="000000"/>
                   </a:solidFill>
@@ -7537,7 +7073,7 @@
             </a:ln>
             <a:extLst>
               <a:ext uri="{91240B29-F687-4f45-9708-019B960494DF}">
-                <a14:hiddenLine xmlns:a14="http://schemas.microsoft.com/office/drawing/2010/main" xmlns="" w="9525">
+                <a14:hiddenLine xmlns="" xmlns:a14="http://schemas.microsoft.com/office/drawing/2010/main" w="9525">
                   <a:solidFill>
                     <a:srgbClr val="000000"/>
                   </a:solidFill>
@@ -7627,7 +7163,7 @@
             </a:ln>
             <a:extLst>
               <a:ext uri="{91240B29-F687-4f45-9708-019B960494DF}">
-                <a14:hiddenLine xmlns:a14="http://schemas.microsoft.com/office/drawing/2010/main" xmlns="" w="9525">
+                <a14:hiddenLine xmlns="" xmlns:a14="http://schemas.microsoft.com/office/drawing/2010/main" w="9525">
                   <a:solidFill>
                     <a:srgbClr val="000000"/>
                   </a:solidFill>
@@ -7717,7 +7253,7 @@
             </a:ln>
             <a:extLst>
               <a:ext uri="{91240B29-F687-4f45-9708-019B960494DF}">
-                <a14:hiddenLine xmlns:a14="http://schemas.microsoft.com/office/drawing/2010/main" xmlns="" w="9525">
+                <a14:hiddenLine xmlns="" xmlns:a14="http://schemas.microsoft.com/office/drawing/2010/main" w="9525">
                   <a:solidFill>
                     <a:srgbClr val="000000"/>
                   </a:solidFill>
@@ -7779,7 +7315,7 @@
             </a:ln>
             <a:extLst>
               <a:ext uri="{91240B29-F687-4f45-9708-019B960494DF}">
-                <a14:hiddenLine xmlns:a14="http://schemas.microsoft.com/office/drawing/2010/main" xmlns="" w="9525">
+                <a14:hiddenLine xmlns="" xmlns:a14="http://schemas.microsoft.com/office/drawing/2010/main" w="9525">
                   <a:solidFill>
                     <a:srgbClr val="000000"/>
                   </a:solidFill>
@@ -7899,7 +7435,7 @@
             </a:ln>
             <a:extLst>
               <a:ext uri="{91240B29-F687-4f45-9708-019B960494DF}">
-                <a14:hiddenLine xmlns:a14="http://schemas.microsoft.com/office/drawing/2010/main" xmlns="" w="9525">
+                <a14:hiddenLine xmlns="" xmlns:a14="http://schemas.microsoft.com/office/drawing/2010/main" w="9525">
                   <a:solidFill>
                     <a:srgbClr val="000000"/>
                   </a:solidFill>
@@ -7967,7 +7503,7 @@
             </a:ln>
             <a:extLst>
               <a:ext uri="{91240B29-F687-4f45-9708-019B960494DF}">
-                <a14:hiddenLine xmlns:a14="http://schemas.microsoft.com/office/drawing/2010/main" xmlns="" w="9525">
+                <a14:hiddenLine xmlns="" xmlns:a14="http://schemas.microsoft.com/office/drawing/2010/main" w="9525">
                   <a:solidFill>
                     <a:srgbClr val="000000"/>
                   </a:solidFill>
@@ -8057,7 +7593,7 @@
             </a:ln>
             <a:extLst>
               <a:ext uri="{91240B29-F687-4f45-9708-019B960494DF}">
-                <a14:hiddenLine xmlns:a14="http://schemas.microsoft.com/office/drawing/2010/main" xmlns="" w="9525">
+                <a14:hiddenLine xmlns="" xmlns:a14="http://schemas.microsoft.com/office/drawing/2010/main" w="9525">
                   <a:solidFill>
                     <a:srgbClr val="000000"/>
                   </a:solidFill>
@@ -13983,7 +13519,7 @@
           <a:noFill/>
           <a:extLst>
             <a:ext uri="{909E8E84-426E-40dd-AFC4-6F175D3DCCD1}">
-              <a14:hiddenFill xmlns:a14="http://schemas.microsoft.com/office/drawing/2010/main" xmlns="">
+              <a14:hiddenFill xmlns="" xmlns:a14="http://schemas.microsoft.com/office/drawing/2010/main">
                 <a:solidFill>
                   <a:srgbClr val="FFFFFF"/>
                 </a:solidFill>
@@ -14063,7 +13599,7 @@
               </a:ln>
               <a:extLst>
                 <a:ext uri="{91240B29-F687-4f45-9708-019B960494DF}">
-                  <a14:hiddenLine xmlns:a14="http://schemas.microsoft.com/office/drawing/2010/main" xmlns="" w="9525">
+                  <a14:hiddenLine xmlns="" xmlns:a14="http://schemas.microsoft.com/office/drawing/2010/main" w="9525">
                     <a:solidFill>
                       <a:srgbClr val="000000"/>
                     </a:solidFill>
@@ -14153,7 +13689,7 @@
               </a:ln>
               <a:extLst>
                 <a:ext uri="{91240B29-F687-4f45-9708-019B960494DF}">
-                  <a14:hiddenLine xmlns:a14="http://schemas.microsoft.com/office/drawing/2010/main" xmlns="" w="9525">
+                  <a14:hiddenLine xmlns="" xmlns:a14="http://schemas.microsoft.com/office/drawing/2010/main" w="9525">
                     <a:solidFill>
                       <a:srgbClr val="000000"/>
                     </a:solidFill>
@@ -14243,7 +13779,7 @@
               </a:ln>
               <a:extLst>
                 <a:ext uri="{91240B29-F687-4f45-9708-019B960494DF}">
-                  <a14:hiddenLine xmlns:a14="http://schemas.microsoft.com/office/drawing/2010/main" xmlns="" w="9525">
+                  <a14:hiddenLine xmlns="" xmlns:a14="http://schemas.microsoft.com/office/drawing/2010/main" w="9525">
                     <a:solidFill>
                       <a:srgbClr val="000000"/>
                     </a:solidFill>
@@ -14305,7 +13841,7 @@
               </a:ln>
               <a:extLst>
                 <a:ext uri="{91240B29-F687-4f45-9708-019B960494DF}">
-                  <a14:hiddenLine xmlns:a14="http://schemas.microsoft.com/office/drawing/2010/main" xmlns="" w="9525">
+                  <a14:hiddenLine xmlns="" xmlns:a14="http://schemas.microsoft.com/office/drawing/2010/main" w="9525">
                     <a:solidFill>
                       <a:srgbClr val="000000"/>
                     </a:solidFill>
@@ -14395,7 +13931,7 @@
               </a:ln>
               <a:extLst>
                 <a:ext uri="{91240B29-F687-4f45-9708-019B960494DF}">
-                  <a14:hiddenLine xmlns:a14="http://schemas.microsoft.com/office/drawing/2010/main" xmlns="" w="9525">
+                  <a14:hiddenLine xmlns="" xmlns:a14="http://schemas.microsoft.com/office/drawing/2010/main" w="9525">
                     <a:solidFill>
                       <a:srgbClr val="000000"/>
                     </a:solidFill>
@@ -14457,7 +13993,7 @@
               </a:ln>
               <a:extLst>
                 <a:ext uri="{91240B29-F687-4f45-9708-019B960494DF}">
-                  <a14:hiddenLine xmlns:a14="http://schemas.microsoft.com/office/drawing/2010/main" xmlns="" w="9525">
+                  <a14:hiddenLine xmlns="" xmlns:a14="http://schemas.microsoft.com/office/drawing/2010/main" w="9525">
                     <a:solidFill>
                       <a:srgbClr val="000000"/>
                     </a:solidFill>
@@ -14519,7 +14055,7 @@
               </a:ln>
               <a:extLst>
                 <a:ext uri="{91240B29-F687-4f45-9708-019B960494DF}">
-                  <a14:hiddenLine xmlns:a14="http://schemas.microsoft.com/office/drawing/2010/main" xmlns="" w="9525">
+                  <a14:hiddenLine xmlns="" xmlns:a14="http://schemas.microsoft.com/office/drawing/2010/main" w="9525">
                     <a:solidFill>
                       <a:srgbClr val="000000"/>
                     </a:solidFill>
@@ -14609,7 +14145,7 @@
               </a:ln>
               <a:extLst>
                 <a:ext uri="{91240B29-F687-4f45-9708-019B960494DF}">
-                  <a14:hiddenLine xmlns:a14="http://schemas.microsoft.com/office/drawing/2010/main" xmlns="" w="9525">
+                  <a14:hiddenLine xmlns="" xmlns:a14="http://schemas.microsoft.com/office/drawing/2010/main" w="9525">
                     <a:solidFill>
                       <a:srgbClr val="000000"/>
                     </a:solidFill>
@@ -14699,7 +14235,7 @@
               </a:ln>
               <a:extLst>
                 <a:ext uri="{91240B29-F687-4f45-9708-019B960494DF}">
-                  <a14:hiddenLine xmlns:a14="http://schemas.microsoft.com/office/drawing/2010/main" xmlns="" w="9525">
+                  <a14:hiddenLine xmlns="" xmlns:a14="http://schemas.microsoft.com/office/drawing/2010/main" w="9525">
                     <a:solidFill>
                       <a:srgbClr val="000000"/>
                     </a:solidFill>
@@ -14761,7 +14297,7 @@
               </a:ln>
               <a:extLst>
                 <a:ext uri="{91240B29-F687-4f45-9708-019B960494DF}">
-                  <a14:hiddenLine xmlns:a14="http://schemas.microsoft.com/office/drawing/2010/main" xmlns="" w="9525">
+                  <a14:hiddenLine xmlns="" xmlns:a14="http://schemas.microsoft.com/office/drawing/2010/main" w="9525">
                     <a:solidFill>
                       <a:srgbClr val="000000"/>
                     </a:solidFill>
@@ -14871,7 +14407,7 @@
               </a:ln>
               <a:extLst>
                 <a:ext uri="{91240B29-F687-4f45-9708-019B960494DF}">
-                  <a14:hiddenLine xmlns:a14="http://schemas.microsoft.com/office/drawing/2010/main" xmlns="" w="9525">
+                  <a14:hiddenLine xmlns="" xmlns:a14="http://schemas.microsoft.com/office/drawing/2010/main" w="9525">
                     <a:solidFill>
                       <a:srgbClr val="000000"/>
                     </a:solidFill>
@@ -14955,7 +14491,7 @@
               </a:ln>
               <a:extLst>
                 <a:ext uri="{91240B29-F687-4f45-9708-019B960494DF}">
-                  <a14:hiddenLine xmlns:a14="http://schemas.microsoft.com/office/drawing/2010/main" xmlns="" w="9525">
+                  <a14:hiddenLine xmlns="" xmlns:a14="http://schemas.microsoft.com/office/drawing/2010/main" w="9525">
                     <a:solidFill>
                       <a:srgbClr val="000000"/>
                     </a:solidFill>
@@ -15017,7 +14553,7 @@
               </a:ln>
               <a:extLst>
                 <a:ext uri="{91240B29-F687-4f45-9708-019B960494DF}">
-                  <a14:hiddenLine xmlns:a14="http://schemas.microsoft.com/office/drawing/2010/main" xmlns="" w="9525">
+                  <a14:hiddenLine xmlns="" xmlns:a14="http://schemas.microsoft.com/office/drawing/2010/main" w="9525">
                     <a:solidFill>
                       <a:srgbClr val="000000"/>
                     </a:solidFill>
@@ -15079,7 +14615,7 @@
               </a:ln>
               <a:extLst>
                 <a:ext uri="{91240B29-F687-4f45-9708-019B960494DF}">
-                  <a14:hiddenLine xmlns:a14="http://schemas.microsoft.com/office/drawing/2010/main" xmlns="" w="9525">
+                  <a14:hiddenLine xmlns="" xmlns:a14="http://schemas.microsoft.com/office/drawing/2010/main" w="9525">
                     <a:solidFill>
                       <a:srgbClr val="000000"/>
                     </a:solidFill>
@@ -15169,7 +14705,7 @@
               </a:ln>
               <a:extLst>
                 <a:ext uri="{91240B29-F687-4f45-9708-019B960494DF}">
-                  <a14:hiddenLine xmlns:a14="http://schemas.microsoft.com/office/drawing/2010/main" xmlns="" w="9525">
+                  <a14:hiddenLine xmlns="" xmlns:a14="http://schemas.microsoft.com/office/drawing/2010/main" w="9525">
                     <a:solidFill>
                       <a:srgbClr val="000000"/>
                     </a:solidFill>
@@ -15203,7 +14739,7 @@
               </a:ln>
               <a:extLst>
                 <a:ext uri="{91240B29-F687-4f45-9708-019B960494DF}">
-                  <a14:hiddenLine xmlns:a14="http://schemas.microsoft.com/office/drawing/2010/main" xmlns="" w="9525">
+                  <a14:hiddenLine xmlns="" xmlns:a14="http://schemas.microsoft.com/office/drawing/2010/main" w="9525">
                     <a:solidFill>
                       <a:srgbClr val="000000"/>
                     </a:solidFill>
@@ -15268,7 +14804,7 @@
               </a:ln>
               <a:extLst>
                 <a:ext uri="{91240B29-F687-4f45-9708-019B960494DF}">
-                  <a14:hiddenLine xmlns:a14="http://schemas.microsoft.com/office/drawing/2010/main" xmlns="" w="9525">
+                  <a14:hiddenLine xmlns="" xmlns:a14="http://schemas.microsoft.com/office/drawing/2010/main" w="9525">
                     <a:solidFill>
                       <a:srgbClr val="000000"/>
                     </a:solidFill>
@@ -15358,7 +14894,7 @@
               </a:ln>
               <a:extLst>
                 <a:ext uri="{91240B29-F687-4f45-9708-019B960494DF}">
-                  <a14:hiddenLine xmlns:a14="http://schemas.microsoft.com/office/drawing/2010/main" xmlns="" w="9525">
+                  <a14:hiddenLine xmlns="" xmlns:a14="http://schemas.microsoft.com/office/drawing/2010/main" w="9525">
                     <a:solidFill>
                       <a:srgbClr val="000000"/>
                     </a:solidFill>
@@ -15420,7 +14956,7 @@
               </a:ln>
               <a:extLst>
                 <a:ext uri="{91240B29-F687-4f45-9708-019B960494DF}">
-                  <a14:hiddenLine xmlns:a14="http://schemas.microsoft.com/office/drawing/2010/main" xmlns="" w="9525">
+                  <a14:hiddenLine xmlns="" xmlns:a14="http://schemas.microsoft.com/office/drawing/2010/main" w="9525">
                     <a:solidFill>
                       <a:srgbClr val="000000"/>
                     </a:solidFill>
@@ -15510,7 +15046,7 @@
               </a:ln>
               <a:extLst>
                 <a:ext uri="{91240B29-F687-4f45-9708-019B960494DF}">
-                  <a14:hiddenLine xmlns:a14="http://schemas.microsoft.com/office/drawing/2010/main" xmlns="" w="9525">
+                  <a14:hiddenLine xmlns="" xmlns:a14="http://schemas.microsoft.com/office/drawing/2010/main" w="9525">
                     <a:solidFill>
                       <a:srgbClr val="000000"/>
                     </a:solidFill>
@@ -15575,7 +15111,7 @@
               </a:ln>
               <a:extLst>
                 <a:ext uri="{91240B29-F687-4f45-9708-019B960494DF}">
-                  <a14:hiddenLine xmlns:a14="http://schemas.microsoft.com/office/drawing/2010/main" xmlns="" w="9525">
+                  <a14:hiddenLine xmlns="" xmlns:a14="http://schemas.microsoft.com/office/drawing/2010/main" w="9525">
                     <a:solidFill>
                       <a:srgbClr val="000000"/>
                     </a:solidFill>
@@ -15637,7 +15173,7 @@
               </a:ln>
               <a:extLst>
                 <a:ext uri="{91240B29-F687-4f45-9708-019B960494DF}">
-                  <a14:hiddenLine xmlns:a14="http://schemas.microsoft.com/office/drawing/2010/main" xmlns="" w="9525">
+                  <a14:hiddenLine xmlns="" xmlns:a14="http://schemas.microsoft.com/office/drawing/2010/main" w="9525">
                     <a:solidFill>
                       <a:srgbClr val="000000"/>
                     </a:solidFill>
@@ -15727,7 +15263,7 @@
               </a:ln>
               <a:extLst>
                 <a:ext uri="{91240B29-F687-4f45-9708-019B960494DF}">
-                  <a14:hiddenLine xmlns:a14="http://schemas.microsoft.com/office/drawing/2010/main" xmlns="" w="9525">
+                  <a14:hiddenLine xmlns="" xmlns:a14="http://schemas.microsoft.com/office/drawing/2010/main" w="9525">
                     <a:solidFill>
                       <a:srgbClr val="000000"/>
                     </a:solidFill>
@@ -15817,7 +15353,7 @@
               </a:ln>
               <a:extLst>
                 <a:ext uri="{91240B29-F687-4f45-9708-019B960494DF}">
-                  <a14:hiddenLine xmlns:a14="http://schemas.microsoft.com/office/drawing/2010/main" xmlns="" w="9525">
+                  <a14:hiddenLine xmlns="" xmlns:a14="http://schemas.microsoft.com/office/drawing/2010/main" w="9525">
                     <a:solidFill>
                       <a:srgbClr val="000000"/>
                     </a:solidFill>
@@ -15882,7 +15418,7 @@
               </a:ln>
               <a:extLst>
                 <a:ext uri="{91240B29-F687-4f45-9708-019B960494DF}">
-                  <a14:hiddenLine xmlns:a14="http://schemas.microsoft.com/office/drawing/2010/main" xmlns="" w="9525">
+                  <a14:hiddenLine xmlns="" xmlns:a14="http://schemas.microsoft.com/office/drawing/2010/main" w="9525">
                     <a:solidFill>
                       <a:srgbClr val="000000"/>
                     </a:solidFill>
@@ -16002,7 +15538,7 @@
               </a:ln>
               <a:extLst>
                 <a:ext uri="{91240B29-F687-4f45-9708-019B960494DF}">
-                  <a14:hiddenLine xmlns:a14="http://schemas.microsoft.com/office/drawing/2010/main" xmlns="" w="9525">
+                  <a14:hiddenLine xmlns="" xmlns:a14="http://schemas.microsoft.com/office/drawing/2010/main" w="9525">
                     <a:solidFill>
                       <a:srgbClr val="000000"/>
                     </a:solidFill>
@@ -16100,7 +15636,7 @@
               </a:ln>
               <a:extLst>
                 <a:ext uri="{91240B29-F687-4f45-9708-019B960494DF}">
-                  <a14:hiddenLine xmlns:a14="http://schemas.microsoft.com/office/drawing/2010/main" xmlns="" w="9525">
+                  <a14:hiddenLine xmlns="" xmlns:a14="http://schemas.microsoft.com/office/drawing/2010/main" w="9525">
                     <a:solidFill>
                       <a:srgbClr val="000000"/>
                     </a:solidFill>
@@ -16215,7 +15751,7 @@
               </a:ln>
               <a:extLst>
                 <a:ext uri="{91240B29-F687-4f45-9708-019B960494DF}">
-                  <a14:hiddenLine xmlns:a14="http://schemas.microsoft.com/office/drawing/2010/main" xmlns="" w="9525">
+                  <a14:hiddenLine xmlns="" xmlns:a14="http://schemas.microsoft.com/office/drawing/2010/main" w="9525">
                     <a:solidFill>
                       <a:srgbClr val="000000"/>
                     </a:solidFill>
@@ -16305,7 +15841,7 @@
               </a:ln>
               <a:extLst>
                 <a:ext uri="{91240B29-F687-4f45-9708-019B960494DF}">
-                  <a14:hiddenLine xmlns:a14="http://schemas.microsoft.com/office/drawing/2010/main" xmlns="" w="9525">
+                  <a14:hiddenLine xmlns="" xmlns:a14="http://schemas.microsoft.com/office/drawing/2010/main" w="9525">
                     <a:solidFill>
                       <a:srgbClr val="000000"/>
                     </a:solidFill>
@@ -16370,7 +15906,7 @@
               </a:ln>
               <a:extLst>
                 <a:ext uri="{91240B29-F687-4f45-9708-019B960494DF}">
-                  <a14:hiddenLine xmlns:a14="http://schemas.microsoft.com/office/drawing/2010/main" xmlns="" w="9525">
+                  <a14:hiddenLine xmlns="" xmlns:a14="http://schemas.microsoft.com/office/drawing/2010/main" w="9525">
                     <a:solidFill>
                       <a:srgbClr val="000000"/>
                     </a:solidFill>
@@ -16460,7 +15996,7 @@
               </a:ln>
               <a:extLst>
                 <a:ext uri="{91240B29-F687-4f45-9708-019B960494DF}">
-                  <a14:hiddenLine xmlns:a14="http://schemas.microsoft.com/office/drawing/2010/main" xmlns="" w="9525">
+                  <a14:hiddenLine xmlns="" xmlns:a14="http://schemas.microsoft.com/office/drawing/2010/main" w="9525">
                     <a:solidFill>
                       <a:srgbClr val="000000"/>
                     </a:solidFill>
@@ -16528,7 +16064,7 @@
               </a:ln>
               <a:extLst>
                 <a:ext uri="{91240B29-F687-4f45-9708-019B960494DF}">
-                  <a14:hiddenLine xmlns:a14="http://schemas.microsoft.com/office/drawing/2010/main" xmlns="" w="9525">
+                  <a14:hiddenLine xmlns="" xmlns:a14="http://schemas.microsoft.com/office/drawing/2010/main" w="9525">
                     <a:solidFill>
                       <a:srgbClr val="000000"/>
                     </a:solidFill>
@@ -16618,7 +16154,7 @@
               </a:ln>
               <a:extLst>
                 <a:ext uri="{91240B29-F687-4f45-9708-019B960494DF}">
-                  <a14:hiddenLine xmlns:a14="http://schemas.microsoft.com/office/drawing/2010/main" xmlns="" w="9525">
+                  <a14:hiddenLine xmlns="" xmlns:a14="http://schemas.microsoft.com/office/drawing/2010/main" w="9525">
                     <a:solidFill>
                       <a:srgbClr val="000000"/>
                     </a:solidFill>
@@ -16686,7 +16222,7 @@
               </a:ln>
               <a:extLst>
                 <a:ext uri="{91240B29-F687-4f45-9708-019B960494DF}">
-                  <a14:hiddenLine xmlns:a14="http://schemas.microsoft.com/office/drawing/2010/main" xmlns="" w="9525">
+                  <a14:hiddenLine xmlns="" xmlns:a14="http://schemas.microsoft.com/office/drawing/2010/main" w="9525">
                     <a:solidFill>
                       <a:srgbClr val="000000"/>
                     </a:solidFill>
@@ -16776,7 +16312,7 @@
               </a:ln>
               <a:extLst>
                 <a:ext uri="{91240B29-F687-4f45-9708-019B960494DF}">
-                  <a14:hiddenLine xmlns:a14="http://schemas.microsoft.com/office/drawing/2010/main" xmlns="" w="9525">
+                  <a14:hiddenLine xmlns="" xmlns:a14="http://schemas.microsoft.com/office/drawing/2010/main" w="9525">
                     <a:solidFill>
                       <a:srgbClr val="000000"/>
                     </a:solidFill>
@@ -16810,7 +16346,7 @@
               </a:ln>
               <a:extLst>
                 <a:ext uri="{91240B29-F687-4f45-9708-019B960494DF}">
-                  <a14:hiddenLine xmlns:a14="http://schemas.microsoft.com/office/drawing/2010/main" xmlns="" w="9525">
+                  <a14:hiddenLine xmlns="" xmlns:a14="http://schemas.microsoft.com/office/drawing/2010/main" w="9525">
                     <a:solidFill>
                       <a:srgbClr val="000000"/>
                     </a:solidFill>

</xml_diff>